<commit_message>
Issue 77: Add ink object to the test cases file Update Issue 77
</commit_message>
<xml_diff>
--- a/doc/Test scenarios.pptx
+++ b/doc/Test scenarios.pptx
@@ -15,25 +15,21 @@
     <p:sldId id="282" r:id="rId9"/>
     <p:sldId id="280" r:id="rId10"/>
     <p:sldId id="261" r:id="rId11"/>
-    <p:sldId id="279" r:id="rId12"/>
-    <p:sldId id="262" r:id="rId13"/>
-    <p:sldId id="278" r:id="rId14"/>
-    <p:sldId id="269" r:id="rId15"/>
-    <p:sldId id="273" r:id="rId16"/>
-    <p:sldId id="270" r:id="rId17"/>
-    <p:sldId id="274" r:id="rId18"/>
-    <p:sldId id="275" r:id="rId19"/>
-    <p:sldId id="277" r:id="rId20"/>
-    <p:sldId id="276" r:id="rId21"/>
-    <p:sldId id="293" r:id="rId22"/>
-    <p:sldId id="292" r:id="rId23"/>
-    <p:sldId id="295" r:id="rId24"/>
-    <p:sldId id="294" r:id="rId25"/>
-    <p:sldId id="287" r:id="rId26"/>
-    <p:sldId id="288" r:id="rId27"/>
-    <p:sldId id="289" r:id="rId28"/>
-    <p:sldId id="290" r:id="rId29"/>
-    <p:sldId id="291" r:id="rId30"/>
+    <p:sldId id="262" r:id="rId12"/>
+    <p:sldId id="278" r:id="rId13"/>
+    <p:sldId id="269" r:id="rId14"/>
+    <p:sldId id="270" r:id="rId15"/>
+    <p:sldId id="274" r:id="rId16"/>
+    <p:sldId id="275" r:id="rId17"/>
+    <p:sldId id="276" r:id="rId18"/>
+    <p:sldId id="293" r:id="rId19"/>
+    <p:sldId id="292" r:id="rId20"/>
+    <p:sldId id="294" r:id="rId21"/>
+    <p:sldId id="287" r:id="rId22"/>
+    <p:sldId id="288" r:id="rId23"/>
+    <p:sldId id="289" r:id="rId24"/>
+    <p:sldId id="290" r:id="rId25"/>
+    <p:sldId id="291" r:id="rId26"/>
   </p:sldIdLst>
   <p:sldSz cx="9144000" cy="6858000" type="screen4x3"/>
   <p:notesSz cx="6858000" cy="9144000"/>
@@ -151,19 +147,15 @@
             <p14:sldId id="282"/>
             <p14:sldId id="280"/>
             <p14:sldId id="261"/>
-            <p14:sldId id="279"/>
             <p14:sldId id="262"/>
             <p14:sldId id="278"/>
             <p14:sldId id="269"/>
-            <p14:sldId id="273"/>
             <p14:sldId id="270"/>
             <p14:sldId id="274"/>
             <p14:sldId id="275"/>
-            <p14:sldId id="277"/>
             <p14:sldId id="276"/>
             <p14:sldId id="293"/>
             <p14:sldId id="292"/>
-            <p14:sldId id="295"/>
             <p14:sldId id="294"/>
           </p14:sldIdLst>
         </p14:section>
@@ -180,6 +172,119 @@
     </p:ext>
   </p:extLst>
 </p:presentation>
+</file>
+
+<file path=ppt/ink/ink1.xml><?xml version="1.0" encoding="utf-8"?>
+<inkml:ink xmlns:inkml="http://www.w3.org/2003/InkML">
+  <inkml:definitions>
+    <inkml:context xml:id="ctx0">
+      <inkml:inkSource xml:id="inkSrc0">
+        <inkml:traceFormat>
+          <inkml:channel name="X" type="integer" max="32767" units="cm"/>
+          <inkml:channel name="Y" type="integer" max="32767" units="cm"/>
+          <inkml:channel name="F" type="integer" max="1023" units="dev"/>
+        </inkml:traceFormat>
+        <inkml:channelProperties>
+          <inkml:channelProperty channel="X" name="resolution" value="5654.35693" units="1/cm"/>
+          <inkml:channelProperty channel="Y" name="resolution" value="9046.65918" units="1/cm"/>
+          <inkml:channelProperty channel="F" name="resolution" value="2.82441E-6" units="1/dev"/>
+        </inkml:channelProperties>
+      </inkml:inkSource>
+      <inkml:timestamp xml:id="ts0" timeString="2013-12-12T09:51:24.701"/>
+    </inkml:context>
+    <inkml:brush xml:id="br0">
+      <inkml:brushProperty name="width" value="0.06667" units="cm"/>
+      <inkml:brushProperty name="height" value="0.06667" units="cm"/>
+      <inkml:brushProperty name="color" value="#ED1C24"/>
+      <inkml:brushProperty name="fitToCurve" value="1"/>
+    </inkml:brush>
+  </inkml:definitions>
+  <inkml:traceGroup>
+    <inkml:annotationXML>
+      <emma:emma xmlns:emma="http://www.w3.org/2003/04/emma" version="1.0">
+        <emma:interpretation id="{D0486ABC-8BAD-4310-B840-8734D49340B4}" emma:medium="tactile" emma:mode="ink">
+          <msink:context xmlns:msink="http://schemas.microsoft.com/ink/2010/main" type="writingRegion" rotatedBoundingBox="13385,3437 12628,6456 9999,5797 10757,2777"/>
+        </emma:interpretation>
+      </emma:emma>
+    </inkml:annotationXML>
+    <inkml:traceGroup>
+      <inkml:annotationXML>
+        <emma:emma xmlns:emma="http://www.w3.org/2003/04/emma" version="1.0">
+          <emma:interpretation id="{4DD21ABB-BDC8-40D1-8F8C-5979E7FB16EF}" emma:medium="tactile" emma:mode="ink">
+            <msink:context xmlns:msink="http://schemas.microsoft.com/ink/2010/main" type="paragraph" rotatedBoundingBox="13385,3437 12628,6456 9999,5797 10757,2777" alignmentLevel="1"/>
+          </emma:interpretation>
+        </emma:emma>
+      </inkml:annotationXML>
+      <inkml:traceGroup>
+        <inkml:annotationXML>
+          <emma:emma xmlns:emma="http://www.w3.org/2003/04/emma" version="1.0">
+            <emma:interpretation id="{B14D9308-2EB9-4017-9AA3-2CBB2D51F055}" emma:medium="tactile" emma:mode="ink">
+              <msink:context xmlns:msink="http://schemas.microsoft.com/ink/2010/main" type="line" rotatedBoundingBox="13385,3437 12628,6456 9999,5797 10757,2777"/>
+            </emma:interpretation>
+          </emma:emma>
+        </inkml:annotationXML>
+        <inkml:traceGroup>
+          <inkml:annotationXML>
+            <emma:emma xmlns:emma="http://www.w3.org/2003/04/emma" version="1.0">
+              <emma:interpretation id="{9900F8A0-F647-40B1-B8EE-26C962BA8AE3}" emma:medium="tactile" emma:mode="ink">
+                <msink:context xmlns:msink="http://schemas.microsoft.com/ink/2010/main" type="inkWord" rotatedBoundingBox="13385,3437 12628,6456 9999,5797 10757,2777"/>
+              </emma:interpretation>
+              <emma:one-of disjunction-type="recognition" id="oneOf0">
+                <emma:interpretation id="interp0" emma:lang="en-US" emma:confidence="0">
+                  <emma:literal>DE</emma:literal>
+                </emma:interpretation>
+                <emma:interpretation id="interp1" emma:lang="en-US" emma:confidence="0">
+                  <emma:literal>RE</emma:literal>
+                </emma:interpretation>
+                <emma:interpretation id="interp2" emma:lang="en-US" emma:confidence="0">
+                  <emma:literal>AGE</emma:literal>
+                </emma:interpretation>
+                <emma:interpretation id="interp3" emma:lang="en-US" emma:confidence="0">
+                  <emma:literal>RBE</emma:literal>
+                </emma:interpretation>
+                <emma:interpretation id="interp4" emma:lang="en-US" emma:confidence="0">
+                  <emma:literal>QBE</emma:literal>
+                </emma:interpretation>
+              </emma:one-of>
+            </emma:emma>
+          </inkml:annotationXML>
+          <inkml:trace contextRef="#ctx0" brushRef="#br0">1049 2203 6,'0'-3'31,"0"3"1,0 0-12,0 0-2,0 0-1,0 0-5,0 0 2,0 0 6,0 0-2,0 0-4,0 0-4,0 0 2,0 0-1,0 0 1,0 0-3,0 0 3,0 0 0,0 0-7,0 0-3,-6 0 1,-3 0 2,2 0 1,-5 6-3,0 4-1,-3-1 1,0 9-1,0 3-1,0 3 2,2 3 0,4-2 4,-1-1-6,-1 1 1,1 3 3,-2-1-3,2 0 1,2 7-1,-1-1-1,-1-2 2,5 2-2,2 4-1,-1-3 2,4-1-2,0-2 2,0 6 2,0-7-3,0 3 2,12 5 1,0-8-2,8-3-1,-5 7 0,2-7 1,1-2-1,2-1-1,10-7-1,-6 5 2,4-6-1,2-7 1,0 3-1,2-6 2,-5-3-1,6 0 2,-3-3-3,2 0 0,-9 0 2,8 0 1,0 0-2,-1 0 3,4-7-3,-4-10 1,-2-4 2,-1-7 0,0 1-3,1 0 3,-3-7-3,-4 0 1,-5 4-1,1 0 4,1-5 1,-5 8-2,-4 0 3,-3 5-2,-2-5 3,-4 2 0,2-2-4,-2-1-2,0-2 0,0-1 9,0 7-9,0 3 2,0 0-2,-15-6-1,0-1 1,-4 3-2,7 4 1,4-2-1,-2 6 0,0-5 0,2 7 1,-1 3-1,2-3 1,-2 13-1,0-8-1,-1 0 2,5-2 1,-8 3-1,8 3 0,-2 0-1,4 0 1,-2 0 0,1 3 0,1 3 0,0 0 0,3 0 0,-2 0-1,2 0 0,0 0 0,0 0 0,0 0 1,0-3 0,0 3-1,0 0 0,0 0 0,0 0-1,0 0 1,0 0-1,0 0-1,0 0 0,0 0 0,0 0 0,0 0-2,0 0 0,0 0-2,0 0 0,0 0-4,0 0 1,0 0 3,0 0 6,0 0 1,2 12-1,13 9 0,3 3 0,4-6 0,-4 7 0,1 0 0,2 3-1,-2-4 2,8 0-1,-3 4 0,3 2-1,-5-3 1,8-2-1,-5-6 0,2 1 0,-5 5 0,3-10-4,-2 0-1,2-5 4,-3-4 0,-2 0 0,8 0-3,-6-2 2,2-4 2,-3 0-2,1 0 2,-2 0 2,9-4-1,-6-8 2,2 0-4,0-7 4,-1-2-2,4-4 0,-3 1 0,-5-1 0,5-2 0,-1-4 0,1 4 0,-4 3 0,3-3 1,-2-4-1,-1 1 0,-3-5 0,1-1 0,-1 2 0,-3 5 1,-3 3 2,-2-4 2,-5 6 0,-1-6-2,-1-2-2,0-8 0,-3 4-1,0 5 2,0-4-2,0 4 3,0 7 1,0 2-1,0 1 3,-6 0-1,-6-1 0,-3 3-3,-2 1 3,2 3 0,-2 3-3,-1 0-3,-4 5 0,-3-2 0,0 3 1,2 0 0,-4 3 0,-5 0 0,2 3-2,-3 0 3,6 0-2,-2 0 0,2 0 3,6 0-5,-1 0 1,1 0 2,6 9-3,-1 0 1,1 3 1,-6 4-1,2 0 0,1-5 1,6 1 2,2-6-1,2 1 0,5-3 2,-1-4-4,4 0 1,0 0-2,0 0-2,0 0 0,0 0-2,0 0-4,0 0 2,0 0 1,0 0-2,0 0 7,0 0 4,15-11 1,5 3-1,0-5-1,5-2 0,-3 0 1,2-7-1,4 1 1,-1 0-2,1-7 2,-1 0 1,0-2-2,1-6 0,-1-1 1,1-7 1,-1 8-1,-2-3 1,2-4-1,1 0 0,2 0 2,-12 1-1,1 0-1,-1 0 0,-1 1 4,-4 1-1,-6 18 1,1-1-4,-4-2 2,-1 3 2,-1-8-2,-2 3-1,0-7 0,0 0 2,0 1-1,0 2-2,0 1 2,-12-8-2,-3 9 1,3 1 0,-3 1 3,-3 6-4,-1 6 1,-2-7-3,-6 3 3,5-2-2,-3 3 3,-2 6-2,3 6-2,0-3 1,-1-1 1,3 2 2,-1 2-3,-2 0 0,3 2-3,2 4 2,0 0 1,3 0-1,-8 0-1,3 0 0,1 18 3,2 7-6,-1-4 7,2 7-2,1-1 0,-3 1 0,5-4 0,0 12-2,-5-5 2,8-3 0,-3 5-1,0-9 1,3 4 0,2-1-1,2 3 1,-2 2-1,5-8 0,-2-3-1,1 3 1,4 1-3,-5 2 3,7 0 0,0-7-2,0 7 0,0-9 1,0-3 0,0-3-1,0-1 1,0-7 0,0-1 1,0-3-1,0 0 1,0 0-2,0 0 2,0 0 1,0 0-1,0 0 1,0 0 1,0 0-1,0 0 0,0 0-1,0 0 0,0 0 0,0 0 0,0 0-4,0 0 4,0 0 6,0 0-3,0-6 0,7-15-1,1-9 2,4-7-3,-2-6 1,-2 0-1,2-8 0,2-4 1,3-9 1,-5 0-2,-5 2 1,-1 2 1,-4 9 1,0-5-1,0 11-1,0-4 1,-9-4 2,-6 5-3,-10-7 1,-3 12 0,-6 6-1,-1 7 1,0 9 0,0 2-2,-2 2 0,6-2-1,0-6-2,-2 13 3,-4 6-1,10 3 1,-4 3 0,1 0-1,-4 0 1,7 0-2,2 0 2,-2 6-2,-4 13-1,4 4 3,-7 2-1,1 10-1,8 1 0,0 6 1,5-2 0,5-1-1,-2-2 1,6-4 1,4 10 0,-2-3-1,6-1 1,0 4-1,3-3-1,0-3 1,0-1 0,0 3 1,15 2-2,1 2 4,3-4-4,-1 0 2,-3-5 0,2 3 0,3-4 0,-8 0 0,9-4 0,-6-5 0,-3-6-1,0-5 0,-5-5 0,-1-1 0,-4-4 1,3 3 1,-5-6 0,0 0-1,0 0 1,2 0 2,-2 0-1,0 0 0,0 0 3,0 0-1,0 0 2,0 0 0,0 0-1,0 0-2,0 0 1,0 0 0,0 0 3,0 0-1,0 0 2,0 0 0,0 0-4,0 0-2,0-6-1,-7-12 0,-13-2-1,-5-7 0,-5 3 0,3-7-1,-8 1 1,-2-6 0,7-2 0,-3-1-1,-1 3 0,1 2 1,-1 1-1,-2 8 1,-1 3-3,-5 4 2,-2 3 1,-7 0 0,4 9 0,-1 0 0,9 3 1,4 3-2,-4-7 1,3 7 0,-1 0 1,-10 0-4,9 7 5,1 14-2,0 3-2,10-1 1,-1-3 0,-2 8 1,-1 7-1,10 9-1,-1-2 0,7-2 1,-3 6-1,-1-1 0,13 2 1,1 2 0,5 5-1,0-5 0,0 0 1,15 0 0,10 0-2,-7-3 3,6-4-1,4-3 0,5-4 0,1-4-1,-4-1 1,10-13-3,-1 5 3,1-10 2,5-3-1,2-3 0,-2-6-1,1 0 2,-9 0 2,2 0-3,-2 0 0,-7 0 0,1 0 0,3 0 1,-4-2-1,3-5 1,-2 1-1,-6-4 0,-7-2 0,-3 6 1,-9 4 1,-6 2 4,0 0-2,0 0-1,0 0 1,0 0-3,0 0 1,0 0 1,0 0 3,0 0 0,0 0 3,0 0 1,0 0-8,0 0-3,0 0-1,-28 0 1,-2 0 2,-3 0-1,-1 0-3,4 0 3,-5 0-1,5 0 0,-3 0 0,-16 18 0,4 7 1,-5 11-2,-2 4 2,7-1-2,-4 5 0,13-2 1,5-2-1,-2 2 0,8-2 0,3 9-1,-1-1 2,-2 5 2,-2-4-1,5-4-1,12 0-1,2-8 2,1-3-2,-1 8 0,4-8 1,4 3-2,0 0 1,0-10-2,0 0 1,16 1 0,5-1 2,13-2-3,-1-4 3,1-3 0,-4-2 0,13-1 3,-6-9-3,5-3 0,4-3 3,-7 0 2,4 0-2,3-3 1,0-18-1,3-1 1,-7 4-1,11-3 0,-11-7 0,3-8 1,-1 2 0,-8-2-1,-2-1 1,-6 3 0,2 3-1,-3-5 1,-2 2 0,-10 7 1,3-1-2,-9 10 2,1 3 0,-5-3 0,5-3 0,-2-10 0,4-3-1,-2 3 3,-7 7 1,-3 15-5,0 9 0,-3 0 0,-7 0 1,8 0 0,2-3-1,0-10 0,0 2 1,0 8 1,0 3-1,-3 0 1,-4 0-3,7 0 0,0 0-1,0 0 0,0 0-1,0 0-3,0 0-1,-3 0-4,-5 0-17,1 0-29,7 0-99,0 0-91</inkml:trace>
+          <inkml:trace contextRef="#ctx0" brushRef="#br0" timeOffset="-5262">985 2087 75,'0'3'45,"0"0"-25,0-3 29,0 0-11,0 0-11,0 0-3,0 0 6,0 0-4,0 0-3,0 0 4,0 0-1,-3 0-4,3 0-1,0 0-4,0 0-1,0 0-6,-7 0-5,2 0-3,-5 0 0,1 0 2,-6-9 0,0-4 3,2-7-2,-5-1-4,1-5 3,-3-5 1,3-2-1,1 0 2,1-4-2,3-5 0,0-1 0,2-6 0,7-3 0,1-3-1,2-3-3,0 3 4,0-7 1,0 5-4,8 6 0,7 4 0,1 8 2,-1 8-3,3-2 1,0 3-2,1-1-2,-1 3 3,4 7-1,3 0 1,8-1-1,4 4 1,-2-1-2,9 5-1,-1 1 3,-1 4-1,1 6 1,-4 3-1,4 0-1,-3 0 1,-1 0 0,1 0 0,-3 3 0,3 8 1,0 6-3,-7 2 2,-3-5-1,1 2 1,-3 8-1,-8-3 0,-1 4 2,9-1 0,-8 2-1,0 3 0,-3-2 0,-4 0 0,-5 4 0,4-2 2,-2 1-2,0 3 3,-5 0-4,2 1 1,-4-1 2,-1 4-1,-2-4-5,0 4 6,0 0-3,0 3 4,0-1-1,0 4 1,0 3-2,-5-3 0,-7 2-2,-1-8 2,4-3 0,-1-5-1,2 0 0,-7-5 2,0-3 0,-5 2 1,3-9-1,-5 2 1,7-3 0,0 1-1,-7-5-1,1 0 0,-9-3-3,5-3 3,-6 0 0,3-3 0,-2 0 0,5 0 0,5 0 0,-2 0 0,1 3 0,2-3-1,-6 0 0,10 0 1,-2 0 0,2 0 0,-1 0 1,1 0-1,-4 0 1,4 0-1,5 0 0,0 0 0,-3 0 0,1 0 0,2 0 0,-2 0 0,2 0 0,-1 0 0,2 0 1,-1 0 0,5 0-1,-5 0 0,-5 0 0,3 0 0,-1-3 0,4-3 0,1 3 0,1 0-1,-2 0 0,5 3 1,-1-3 0,2 0-1,0 0 1,-1 0-1,4 3-6,-3-3-18,3 3-36,0 0-79,0-3-46</inkml:trace>
+        </inkml:traceGroup>
+      </inkml:traceGroup>
+    </inkml:traceGroup>
+  </inkml:traceGroup>
+</inkml:ink>
+</file>
+
+<file path=ppt/ink/ink2.xml><?xml version="1.0" encoding="utf-8"?>
+<inkml:ink xmlns:inkml="http://www.w3.org/2003/InkML">
+  <inkml:definitions>
+    <inkml:context xml:id="ctx0">
+      <inkml:inkSource xml:id="inkSrc0">
+        <inkml:traceFormat>
+          <inkml:channel name="X" type="integer" max="32767" units="cm"/>
+          <inkml:channel name="Y" type="integer" max="32767" units="cm"/>
+          <inkml:channel name="F" type="integer" max="1023" units="dev"/>
+        </inkml:traceFormat>
+        <inkml:channelProperties>
+          <inkml:channelProperty channel="X" name="resolution" value="5654.35693" units="1/cm"/>
+          <inkml:channelProperty channel="Y" name="resolution" value="9046.65918" units="1/cm"/>
+          <inkml:channelProperty channel="F" name="resolution" value="2.82441E-6" units="1/dev"/>
+        </inkml:channelProperties>
+      </inkml:inkSource>
+      <inkml:timestamp xml:id="ts0" timeString="2013-12-12T09:51:34.750"/>
+    </inkml:context>
+    <inkml:brush xml:id="br0">
+      <inkml:brushProperty name="width" value="0.06667" units="cm"/>
+      <inkml:brushProperty name="height" value="0.06667" units="cm"/>
+      <inkml:brushProperty name="color" value="#ED1C24"/>
+      <inkml:brushProperty name="fitToCurve" value="1"/>
+    </inkml:brush>
+  </inkml:definitions>
+  <inkml:trace contextRef="#ctx0" brushRef="#br0">848 1596 6,'0'-2'31,"0"2"1,0 0-12,0 0-2,0 0-1,0 0-5,0 0 2,0 0 6,0 0-2,0 0-4,0 0-4,0 0 2,0 0-1,0 0 1,0 0-3,0 0 3,0 0 0,0 0-7,0 0-3,-6 0 1,0 0 2,0 0 1,-4 4-3,0 3-1,-2 0 1,0 6-1,0 2-1,0 3 2,2 1 0,2-1 4,0 0-6,-1 0 1,1 2 3,-1-1-3,1 1 1,1 5-1,-1-1-1,1-2 2,2 2-2,3 3-1,-1-3 2,3 0-2,0-1 2,0 3 2,0-4-3,0 2 2,10 4 1,0-7-2,5-1-1,-3 4 0,3-4 1,-1-2-1,2 0-1,8-6-1,-4 4 2,2-5-1,2-4 1,1 2-1,0-5 2,-3-2-1,5 1 2,-3-3-3,2 0 0,-7 0 2,6 0 1,0 0-2,-1 0 3,4-6-3,-4-6 1,-2-3 2,0-5 0,0 0-3,1 0 3,-3-4-3,-3-1 1,-5 3-1,3 1 4,-1-5 1,-4 7-2,-2-1 3,-4 5-2,0-5 3,-4 2 0,2-2-4,-2 0-2,0-2 0,0 0 9,0 5-9,0 1 2,0 1-2,-12-5-1,0 0 1,-4 2-2,6 2 1,3 0-1,0 4 0,-1-4 0,1 5 1,0 2-1,1-2 1,-1 10-1,0-6-1,-1 0 2,3-2 1,-5 2-1,6 3 0,-2-1-1,4 1 1,-2 0 0,0 2 0,2 2 0,0 0 0,2 0 0,-2 0-1,2 0 0,0 0 0,0 0 0,0 0 1,0-3 0,0 3-1,0 0 0,0 0 0,0 0-1,0 0 1,0 0-1,0 0-1,0 0 0,0 0 0,0 0 0,0 0-2,0 0 0,0 0-2,0 0 0,0 0-4,0 0 1,0 0 3,0 0 6,0 0 1,2 9-1,10 7 0,3 1 0,2-4 0,-2 5 0,0 0 0,2 2-1,-2-3 2,8 1-1,-5 2 0,5 2-1,-6-2 1,8-2-1,-5-5 0,2 2 0,-5 3 0,3-7-4,-1 0-1,1-4 4,-2-3 0,-2 1 0,7-1-3,-6-1 2,3-3 2,-3 0-2,1 0 2,-2 0 2,8-3-1,-6-6 2,2 1-4,0-6 4,0-1-2,2-3 0,-2 1 0,-3-2 0,3 0 0,0-4 0,0 4 0,-4 1 0,4-2 1,-2-2-1,-1 0 0,-3-3 0,2-1 0,-2 1 0,-2 4 1,-2 3 2,-2-4 2,-4 4 0,0-4-2,-2-1-2,0-5 0,-2 2-1,0 3 2,0-3-2,0 4 3,0 5 1,0 0-1,0 3 3,-4-2-1,-6 1 0,-3 1-3,0 1 3,1 2 0,-2 2-3,-1 0-3,-3 4 0,-2-1 0,1 2 1,0-1 0,-3 3 0,-4 0 0,2 2-2,-3 0 3,5 0-2,-1 0 0,1 0 3,5 0-5,-1 0 1,2 0 2,3 6-3,0 1 1,1 2 1,-5 2-1,2 1 0,0-4 1,5 1 2,3-5-1,0 1 0,5-3 2,-2-2-4,4 0 1,0 0-2,0 0-2,0 0 0,0 0-2,0 0-4,0 0 2,0 0 1,0 0-2,0 0 7,0 0 4,13-7 1,2 1-1,2-4-1,3 0 0,-3-1 1,3-5-1,3 1 1,-1-1-2,0-4 2,0 0 1,0-2-2,0-4 0,0-1 1,1-4 1,-1 5-1,-2-3 1,2-2-1,0 0 0,2 0 2,-9 0-1,0 0-1,0 1 0,-1 0 4,-4 2-1,-4 12 1,0-1-4,-2-1 2,-2 2 2,0-5-2,-2 1-1,0-5 0,0 1 2,0-1-1,0 3-2,0 0 2,-10-5-2,-2 6 1,2 0 0,-2 2 3,-3 4-4,0 4 1,-2-5-3,-5 2 3,4-1-2,-2 2 3,-2 4-2,3 5-2,-1-3 1,1 0 1,1 1 2,-1 2-3,-1-1 0,2 3-3,2 2 2,0 0 1,2 0-1,-6 0-1,2 0 0,2 13 3,0 5-6,-1-3 7,3 5-2,1 0 0,-4 0 0,5-3 0,0 10-2,-4-5 2,6-2 0,-2 4-1,0-6 1,2 2 0,2-1-1,1 3 1,0 1-1,2-5 0,0-3-1,0 2 1,3 1-3,-3 2 3,5 0 0,0-6-2,0 6 0,0-7 1,0-2 0,0-2-1,0-2 1,0-4 0,0 0 1,0-3-1,0 0 1,0 0-2,0 0 2,0 0 1,0 0-1,0 0 1,0 0 1,0 0-1,0 0 0,0 0-1,0 0 0,0 0 0,0 0 0,0 0-4,0 0 4,0 0 6,0 0-3,0-5 0,5-10-1,2-7 2,3-5-3,-3-4 1,0 0-1,1-6 0,2-3 1,2-6 1,-4-1-2,-4 3 1,0 0 1,-4 7 1,0-4-1,0 9-1,0-4 1,-8-2 2,-4 3-3,-8-5 1,-2 9 0,-6 5-1,-1 4 1,1 6 0,0 3-2,-2 0 0,5 0-1,0-5-2,-2 9 3,-3 5-1,8 1 1,-2 3 0,-1 0-1,-2 0 1,5 0-2,2 0 2,-3 4-2,-1 11-1,2 1 3,-6 2-1,2 8-1,6-1 0,0 6 1,3-2 0,5-1-1,-1-1 1,4-3 1,3 7 0,-1-2-1,4-1 1,1 4-1,2-3-1,0-3 1,0 0 0,0 3 1,12 0-2,0 2 4,4-2-4,-2-1 2,-1-3 0,1 1 0,1-2 0,-5 1 0,7-5 0,-5-3 0,-2-3-1,0-5 0,-4-3 0,-2-1 0,-2-3 1,2 2 1,-4-4 0,0 0-1,0 0 1,2 0 2,-2 0-1,0 0 0,0 0 3,0 0-1,0 0 2,0 0 0,0 0-1,0 0-2,0 0 1,0 0 0,0 0 3,0 0-1,0 0 2,0 0 0,0 0-4,0 0-2,0-4-1,-6-9 0,-10-1-1,-4-6 0,-5 3 0,3-5-1,-5 0 1,-3-5 0,5 0 0,-1-2-1,-2 3 0,1 2 1,0 0-1,-2 6 1,-1 2-3,-4 3 2,-2 2 1,-5 0 0,4 7 0,-2-1 0,7 3 1,4 2-2,-4-5 1,3 5 0,-1 0 1,-7 0-4,5 5 5,3 10-2,-1 3-2,8-2 1,-1-1 0,-1 5 1,-1 6-1,8 5-1,-1 0 0,6-2 1,-2 4-1,-2 0 0,12 1 1,-1 1 0,5 5-1,0-5 0,0 1 1,12-1 0,8 0-2,-5-1 3,5-4-1,2-1 0,4-4 0,2-3-1,-4 0 1,9-9-3,-1 2 3,0-6 2,4-2-1,2-3 0,-1-4-1,-1 0 2,-6 0 2,2 0-3,-2 0 0,-5 0 0,-1 0 0,4 0 1,-4-2-1,3-3 1,-2 1-1,-5-3 0,-6-1 0,-1 3 1,-9 3 1,-4 2 4,0 0-2,0 0-1,0 0 1,0 0-3,0 0 1,0 0 1,0 0 3,0 0 0,0 0 3,0 0 1,0 0-8,0 0-3,0 0-1,-22 0 1,-3 0 2,-1 0-1,-2 0-3,4 0 3,-4 0-1,4 0 0,-3 0 0,-13 13 0,4 5 1,-4 8-2,-2 4 2,5-2-2,-3 4 0,11-2 1,4-1-1,-2 2 0,7-3 0,3 8-1,-2-1 2,-1 3 2,-2-3-1,4-2-1,10 0-1,2-6 2,0-3-2,0 7 0,2-7 1,4 3-2,0 0 1,0-8-2,0 1 1,14 0 0,2 0 2,12-2-3,-2-2 3,2-3 0,-4-2 0,11 0 3,-5-7-3,4-2 0,3-2 3,-5 0 2,2 0-2,4-2 1,-2-13-1,4-1 1,-5 3-1,7-2 0,-8-6 0,2-5 1,0 2 0,-7-3-1,-2 1 1,-4 1 0,1 3-1,-2-4 1,-2 1 0,-8 5 1,3 0-2,-8 7 2,1 2 0,-3-2 0,2-2 0,0-8 0,3-1-1,-2 2 3,-6 4 1,-2 12-5,0 6 0,-2 0 0,-6 0 1,6 0 0,2-2-1,0-8 0,0 2 1,0 6 1,0 2-1,-2 0 1,-4 0-3,6 0 0,0 0-1,0 0 0,0 0-1,0 0-3,0 0-1,-2 0-4,-5 0-17,2 0-29,5 0-99,0 0-91</inkml:trace>
+  <inkml:trace contextRef="#ctx0" brushRef="#br0" timeOffset="1">796 1512 75,'0'2'45,"0"0"-25,0-2 29,0 0-11,0 0-11,0 0-3,0 0 6,0 0-4,0 0-3,0 0 4,0 0-1,-2 0-4,2 0-1,0 0-4,0 0-1,0 0-6,-6 0-5,2 0-3,-4 0 0,0 0 2,-4-6 0,0-3 3,2-6-2,-5 0-4,1-4 3,-1-4 1,0 0-1,3-2 2,0-1-2,2-5 0,0 0 0,2-4 0,6-3 0,0-2-1,2-2-3,0 2 4,0-4 1,0 2-4,6 5 0,7 3 0,0 6 2,-1 5-3,2-1 1,1 2-2,0 0-2,0 2 3,2 5-1,3-1 1,7 1-1,3 2 1,-1-1-2,6 3-1,-1 2 3,1 3-1,-1 3 1,-2 3-1,3 0-1,-3 0 1,0 0 0,0 0 0,-2 3 0,2 5 1,0 4-3,-5 1 2,-3-2-1,2 0 1,-4 7-1,-6-3 0,0 3 2,6-1 0,-5 3-1,-2 0 0,0 0 0,-6 0 0,-2 2 0,3-1 2,-2 0-2,0 4 3,-4-1-4,2 0 1,-4 0 2,0 3-1,-2-3-5,0 3 6,0 0-3,0 1 4,0 1-1,0 2 1,0 2-2,-4-2 0,-6 2-2,0-6 2,2-3 0,0-3-1,1 0 0,-5-3 2,0-3 0,-3 1 1,0-5-1,-3 0 1,6-1 0,0 0-1,-6-4-1,2 1 0,-9-3-3,5-1 3,-5-1 0,3-2 0,-3 0 0,6 0 0,2 0 0,-1 0 0,2 2 0,0-2-1,-4 0 0,8 0 1,-2 0 0,1 0 0,1 0 1,0 0-1,-4 0 1,4 0-1,5 0 0,-2 0 0,-1 0 0,0 0 0,2 0 0,-2 0 0,2 0 0,-1 0 0,2 0 1,-1 0 0,3 0-1,-2 0 0,-5 0 0,2 0 0,0-2 0,2-3 0,1 3 0,2 0-1,-2-1 0,4 3 1,-2-1 0,3-2-1,0 1 1,-2 0-1,4 2-6,-2-2-18,2 2-36,0 0-79,0-3-46</inkml:trace>
+</inkml:ink>
 </file>
 
 <file path=ppt/slideLayouts/slideLayout1.xml><?xml version="1.0" encoding="utf-8"?>
@@ -364,7 +469,7 @@
             <a:fld id="{1D8BD707-D9CF-40AE-B4C6-C98DA3205C09}" type="datetimeFigureOut">
               <a:rPr lang="en-US" smtClean="0"/>
               <a:pPr/>
-              <a:t>11/23/2013</a:t>
+              <a:t>12/12/2013</a:t>
             </a:fld>
             <a:endParaRPr lang="en-US"/>
           </a:p>
@@ -531,7 +636,7 @@
             <a:fld id="{1D8BD707-D9CF-40AE-B4C6-C98DA3205C09}" type="datetimeFigureOut">
               <a:rPr lang="en-US" smtClean="0"/>
               <a:pPr/>
-              <a:t>11/23/2013</a:t>
+              <a:t>12/12/2013</a:t>
             </a:fld>
             <a:endParaRPr lang="en-US"/>
           </a:p>
@@ -708,7 +813,7 @@
             <a:fld id="{1D8BD707-D9CF-40AE-B4C6-C98DA3205C09}" type="datetimeFigureOut">
               <a:rPr lang="en-US" smtClean="0"/>
               <a:pPr/>
-              <a:t>11/23/2013</a:t>
+              <a:t>12/12/2013</a:t>
             </a:fld>
             <a:endParaRPr lang="en-US"/>
           </a:p>
@@ -875,7 +980,7 @@
             <a:fld id="{1D8BD707-D9CF-40AE-B4C6-C98DA3205C09}" type="datetimeFigureOut">
               <a:rPr lang="en-US" smtClean="0"/>
               <a:pPr/>
-              <a:t>11/23/2013</a:t>
+              <a:t>12/12/2013</a:t>
             </a:fld>
             <a:endParaRPr lang="en-US"/>
           </a:p>
@@ -1118,7 +1223,7 @@
             <a:fld id="{1D8BD707-D9CF-40AE-B4C6-C98DA3205C09}" type="datetimeFigureOut">
               <a:rPr lang="en-US" smtClean="0"/>
               <a:pPr/>
-              <a:t>11/23/2013</a:t>
+              <a:t>12/12/2013</a:t>
             </a:fld>
             <a:endParaRPr lang="en-US"/>
           </a:p>
@@ -1403,7 +1508,7 @@
             <a:fld id="{1D8BD707-D9CF-40AE-B4C6-C98DA3205C09}" type="datetimeFigureOut">
               <a:rPr lang="en-US" smtClean="0"/>
               <a:pPr/>
-              <a:t>11/23/2013</a:t>
+              <a:t>12/12/2013</a:t>
             </a:fld>
             <a:endParaRPr lang="en-US"/>
           </a:p>
@@ -1822,7 +1927,7 @@
             <a:fld id="{1D8BD707-D9CF-40AE-B4C6-C98DA3205C09}" type="datetimeFigureOut">
               <a:rPr lang="en-US" smtClean="0"/>
               <a:pPr/>
-              <a:t>11/23/2013</a:t>
+              <a:t>12/12/2013</a:t>
             </a:fld>
             <a:endParaRPr lang="en-US"/>
           </a:p>
@@ -1937,7 +2042,7 @@
             <a:fld id="{1D8BD707-D9CF-40AE-B4C6-C98DA3205C09}" type="datetimeFigureOut">
               <a:rPr lang="en-US" smtClean="0"/>
               <a:pPr/>
-              <a:t>11/23/2013</a:t>
+              <a:t>12/12/2013</a:t>
             </a:fld>
             <a:endParaRPr lang="en-US"/>
           </a:p>
@@ -2029,7 +2134,7 @@
             <a:fld id="{1D8BD707-D9CF-40AE-B4C6-C98DA3205C09}" type="datetimeFigureOut">
               <a:rPr lang="en-US" smtClean="0"/>
               <a:pPr/>
-              <a:t>11/23/2013</a:t>
+              <a:t>12/12/2013</a:t>
             </a:fld>
             <a:endParaRPr lang="en-US"/>
           </a:p>
@@ -2303,7 +2408,7 @@
             <a:fld id="{1D8BD707-D9CF-40AE-B4C6-C98DA3205C09}" type="datetimeFigureOut">
               <a:rPr lang="en-US" smtClean="0"/>
               <a:pPr/>
-              <a:t>11/23/2013</a:t>
+              <a:t>12/12/2013</a:t>
             </a:fld>
             <a:endParaRPr lang="en-US"/>
           </a:p>
@@ -2553,7 +2658,7 @@
             <a:fld id="{1D8BD707-D9CF-40AE-B4C6-C98DA3205C09}" type="datetimeFigureOut">
               <a:rPr lang="en-US" smtClean="0"/>
               <a:pPr/>
-              <a:t>11/23/2013</a:t>
+              <a:t>12/12/2013</a:t>
             </a:fld>
             <a:endParaRPr lang="en-US"/>
           </a:p>
@@ -2763,7 +2868,7 @@
             <a:fld id="{1D8BD707-D9CF-40AE-B4C6-C98DA3205C09}" type="datetimeFigureOut">
               <a:rPr lang="en-US" smtClean="0"/>
               <a:pPr/>
-              <a:t>11/23/2013</a:t>
+              <a:t>12/12/2013</a:t>
             </a:fld>
             <a:endParaRPr lang="en-US"/>
           </a:p>
@@ -3337,6 +3442,45 @@
           </a:p>
         </p:txBody>
       </p:sp>
+      <mc:AlternateContent xmlns:mc="http://schemas.openxmlformats.org/markup-compatibility/2006">
+        <mc:Choice xmlns:p14="http://schemas.microsoft.com/office/powerpoint/2010/main" Requires="p14">
+          <p:contentPart p14:bwMode="auto" r:id="rId2">
+            <p14:nvContentPartPr>
+              <p14:cNvPr id="7" name="Ink 6"/>
+              <p14:cNvContentPartPr/>
+              <p14:nvPr/>
+            </p14:nvContentPartPr>
+            <p14:xfrm>
+              <a:off x="3754080" y="1101411"/>
+              <a:ext cx="911520" cy="1130040"/>
+            </p14:xfrm>
+          </p:contentPart>
+        </mc:Choice>
+        <mc:Fallback>
+          <p:pic>
+            <p:nvPicPr>
+              <p:cNvPr id="7" name="Ink 6"/>
+              <p:cNvPicPr/>
+              <p:nvPr/>
+            </p:nvPicPr>
+            <p:blipFill>
+              <a:blip r:embed="rId3"/>
+              <a:stretch>
+                <a:fillRect/>
+              </a:stretch>
+            </p:blipFill>
+            <p:spPr>
+              <a:xfrm>
+                <a:off x="3742560" y="1090251"/>
+                <a:ext cx="933840" cy="1150920"/>
+              </a:xfrm>
+              <a:prstGeom prst="rect">
+                <a:avLst/>
+              </a:prstGeom>
+            </p:spPr>
+          </p:pic>
+        </mc:Fallback>
+      </mc:AlternateContent>
     </p:spTree>
     <p:extLst>
       <p:ext uri="{BB962C8B-B14F-4D97-AF65-F5344CB8AC3E}">
@@ -3347,6 +3491,9 @@
   <p:clrMapOvr>
     <a:masterClrMapping/>
   </p:clrMapOvr>
+  <p:transition spd="slow">
+    <p:push dir="u"/>
+  </p:transition>
   <p:timing>
     <p:tnLst>
       <p:par>
@@ -3358,383 +3505,6 @@
 </file>
 
 <file path=ppt/slides/slide11.xml><?xml version="1.0" encoding="utf-8"?>
-<p:sld xmlns:a="http://schemas.openxmlformats.org/drawingml/2006/main" xmlns:r="http://schemas.openxmlformats.org/officeDocument/2006/relationships" xmlns:p="http://schemas.openxmlformats.org/presentationml/2006/main">
-  <p:cSld name="PPSlide201311231452581803">
-    <p:spTree>
-      <p:nvGrpSpPr>
-        <p:cNvPr id="1" name=""/>
-        <p:cNvGrpSpPr/>
-        <p:nvPr/>
-      </p:nvGrpSpPr>
-      <p:grpSpPr>
-        <a:xfrm>
-          <a:off x="0" y="0"/>
-          <a:ext cx="0" cy="0"/>
-          <a:chOff x="0" y="0"/>
-          <a:chExt cx="0" cy="0"/>
-        </a:xfrm>
-      </p:grpSpPr>
-      <p:sp>
-        <p:nvSpPr>
-          <p:cNvPr id="4" name="Notched Right Arrow 3"/>
-          <p:cNvSpPr/>
-          <p:nvPr/>
-        </p:nvSpPr>
-        <p:spPr>
-          <a:xfrm rot="19804930">
-            <a:off x="1752600" y="1752600"/>
-            <a:ext cx="1371600" cy="838200"/>
-          </a:xfrm>
-          <a:prstGeom prst="notchedRightArrow">
-            <a:avLst/>
-          </a:prstGeom>
-        </p:spPr>
-        <p:style>
-          <a:lnRef idx="2">
-            <a:schemeClr val="accent1">
-              <a:shade val="50000"/>
-            </a:schemeClr>
-          </a:lnRef>
-          <a:fillRef idx="1">
-            <a:schemeClr val="accent1"/>
-          </a:fillRef>
-          <a:effectRef idx="0">
-            <a:schemeClr val="accent1"/>
-          </a:effectRef>
-          <a:fontRef idx="minor">
-            <a:schemeClr val="lt1"/>
-          </a:fontRef>
-        </p:style>
-        <p:txBody>
-          <a:bodyPr rtlCol="0" anchor="ctr"/>
-          <a:lstStyle/>
-          <a:p>
-            <a:pPr algn="ctr"/>
-            <a:endParaRPr lang="en-SG"/>
-          </a:p>
-        </p:txBody>
-      </p:sp>
-      <p:sp>
-        <p:nvSpPr>
-          <p:cNvPr id="5" name="Notched Right Arrow 4"/>
-          <p:cNvSpPr/>
-          <p:nvPr/>
-        </p:nvSpPr>
-        <p:spPr>
-          <a:xfrm rot="20389402">
-            <a:off x="3962400" y="3276600"/>
-            <a:ext cx="1371600" cy="838200"/>
-          </a:xfrm>
-          <a:prstGeom prst="notchedRightArrow">
-            <a:avLst/>
-          </a:prstGeom>
-        </p:spPr>
-        <p:style>
-          <a:lnRef idx="2">
-            <a:schemeClr val="accent1">
-              <a:shade val="50000"/>
-            </a:schemeClr>
-          </a:lnRef>
-          <a:fillRef idx="1">
-            <a:schemeClr val="accent1"/>
-          </a:fillRef>
-          <a:effectRef idx="0">
-            <a:schemeClr val="accent1"/>
-          </a:effectRef>
-          <a:fontRef idx="minor">
-            <a:schemeClr val="lt1"/>
-          </a:fontRef>
-        </p:style>
-        <p:txBody>
-          <a:bodyPr rtlCol="0" anchor="ctr"/>
-          <a:lstStyle/>
-          <a:p>
-            <a:pPr algn="ctr"/>
-            <a:endParaRPr lang="en-SG"/>
-          </a:p>
-        </p:txBody>
-      </p:sp>
-      <p:sp>
-        <p:nvSpPr>
-          <p:cNvPr id="6" name="Notched Right Arrow 5"/>
-          <p:cNvSpPr/>
-          <p:nvPr/>
-        </p:nvSpPr>
-        <p:spPr>
-          <a:xfrm rot="1690524">
-            <a:off x="6172200" y="4800600"/>
-            <a:ext cx="1371600" cy="838200"/>
-          </a:xfrm>
-          <a:prstGeom prst="notchedRightArrow">
-            <a:avLst/>
-          </a:prstGeom>
-        </p:spPr>
-        <p:style>
-          <a:lnRef idx="2">
-            <a:schemeClr val="accent1">
-              <a:shade val="50000"/>
-            </a:schemeClr>
-          </a:lnRef>
-          <a:fillRef idx="1">
-            <a:schemeClr val="accent1"/>
-          </a:fillRef>
-          <a:effectRef idx="0">
-            <a:schemeClr val="accent1"/>
-          </a:effectRef>
-          <a:fontRef idx="minor">
-            <a:schemeClr val="lt1"/>
-          </a:fontRef>
-        </p:style>
-        <p:txBody>
-          <a:bodyPr rtlCol="0" anchor="ctr"/>
-          <a:lstStyle/>
-          <a:p>
-            <a:pPr algn="ctr"/>
-            <a:endParaRPr lang="en-SG"/>
-          </a:p>
-        </p:txBody>
-      </p:sp>
-      <p:pic>
-        <p:nvPicPr>
-          <p:cNvPr id="13314" name="PPIndicator201311231452582113"/>
-          <p:cNvPicPr>
-            <a:picLocks noChangeAspect="1" noChangeArrowheads="1"/>
-          </p:cNvPicPr>
-          <p:nvPr/>
-        </p:nvPicPr>
-        <p:blipFill>
-          <a:blip r:embed="rId2">
-            <a:extLst>
-              <a:ext uri="{28A0092B-C50C-407E-A947-70E740481C1C}">
-                <a14:useLocalDpi xmlns:a14="http://schemas.microsoft.com/office/drawing/2010/main" val="0"/>
-              </a:ext>
-            </a:extLst>
-          </a:blip>
-          <a:srcRect/>
-          <a:stretch>
-            <a:fillRect/>
-          </a:stretch>
-        </p:blipFill>
-        <p:spPr bwMode="auto">
-          <a:xfrm>
-            <a:off x="7756525" y="0"/>
-            <a:ext cx="1450975" cy="1365250"/>
-          </a:xfrm>
-          <a:prstGeom prst="rect">
-            <a:avLst/>
-          </a:prstGeom>
-          <a:noFill/>
-          <a:ln>
-            <a:noFill/>
-          </a:ln>
-          <a:effectLst/>
-          <a:extLst>
-            <a:ext uri="{909E8E84-426E-40DD-AFC4-6F175D3DCCD1}">
-              <a14:hiddenFill xmlns:a14="http://schemas.microsoft.com/office/drawing/2010/main">
-                <a:solidFill>
-                  <a:schemeClr val="accent1"/>
-                </a:solidFill>
-              </a14:hiddenFill>
-            </a:ext>
-            <a:ext uri="{91240B29-F687-4F45-9708-019B960494DF}">
-              <a14:hiddenLine xmlns:a14="http://schemas.microsoft.com/office/drawing/2010/main" w="9525">
-                <a:solidFill>
-                  <a:schemeClr val="tx1"/>
-                </a:solidFill>
-                <a:miter lim="800000"/>
-                <a:headEnd/>
-                <a:tailEnd/>
-              </a14:hiddenLine>
-            </a:ext>
-            <a:ext uri="{AF507438-7753-43E0-B8FC-AC1667EBCBE1}">
-              <a14:hiddenEffects xmlns:a14="http://schemas.microsoft.com/office/drawing/2010/main">
-                <a:effectLst>
-                  <a:outerShdw dist="35921" dir="2700000" algn="ctr" rotWithShape="0">
-                    <a:schemeClr val="bg2"/>
-                  </a:outerShdw>
-                </a:effectLst>
-              </a14:hiddenEffects>
-            </a:ext>
-          </a:extLst>
-        </p:spPr>
-      </p:pic>
-    </p:spTree>
-    <p:extLst>
-      <p:ext uri="{BB962C8B-B14F-4D97-AF65-F5344CB8AC3E}">
-        <p14:creationId xmlns:p14="http://schemas.microsoft.com/office/powerpoint/2010/main" val="2780003793"/>
-      </p:ext>
-    </p:extLst>
-  </p:cSld>
-  <p:clrMapOvr>
-    <a:masterClrMapping/>
-  </p:clrMapOvr>
-  <p:transition advClick="0" advTm="0">
-    <p:fade/>
-  </p:transition>
-  <p:timing>
-    <p:tnLst>
-      <p:par>
-        <p:cTn id="1" dur="indefinite" restart="never" nodeType="tmRoot">
-          <p:childTnLst>
-            <p:seq concurrent="1" nextAc="seek">
-              <p:cTn id="2" dur="indefinite" nodeType="mainSeq">
-                <p:childTnLst>
-                  <p:par>
-                    <p:cTn id="3" fill="hold">
-                      <p:stCondLst>
-                        <p:cond delay="indefinite"/>
-                        <p:cond evt="onBegin" delay="0">
-                          <p:tn val="2"/>
-                        </p:cond>
-                      </p:stCondLst>
-                      <p:childTnLst>
-                        <p:par>
-                          <p:cTn id="4" fill="hold">
-                            <p:stCondLst>
-                              <p:cond delay="0"/>
-                            </p:stCondLst>
-                            <p:childTnLst>
-                              <p:par>
-                                <p:cTn id="5" presetID="42" presetClass="path" presetSubtype="0" accel="50000" decel="50000" fill="hold" grpId="0" nodeType="withEffect">
-                                  <p:stCondLst>
-                                    <p:cond delay="0"/>
-                                  </p:stCondLst>
-                                  <p:childTnLst>
-                                    <p:animMotion origin="layout" path="M 0 0 C 0.05416667 0.1111111 0.05416667 0.1111111 0.1083333 0.2222222 E" pathEditMode="relative" ptsTypes="">
-                                      <p:cBhvr>
-                                        <p:cTn id="6" dur="500" fill="hold"/>
-                                        <p:tgtEl>
-                                          <p:spTgt spid="4"/>
-                                        </p:tgtEl>
-                                        <p:attrNameLst>
-                                          <p:attrName>ppt_x</p:attrName>
-                                          <p:attrName>ppt_y</p:attrName>
-                                        </p:attrNameLst>
-                                      </p:cBhvr>
-                                    </p:animMotion>
-                                  </p:childTnLst>
-                                </p:cTn>
-                              </p:par>
-                              <p:par>
-                                <p:cTn id="7" presetID="8" presetClass="emph" presetSubtype="0" fill="hold" grpId="1" nodeType="withEffect">
-                                  <p:stCondLst>
-                                    <p:cond delay="0"/>
-                                  </p:stCondLst>
-                                  <p:childTnLst>
-                                    <p:animRot by="1795071">
-                                      <p:cBhvr>
-                                        <p:cTn id="8" dur="500" fill="hold"/>
-                                        <p:tgtEl>
-                                          <p:spTgt spid="4"/>
-                                        </p:tgtEl>
-                                        <p:attrNameLst>
-                                          <p:attrName>r</p:attrName>
-                                        </p:attrNameLst>
-                                      </p:cBhvr>
-                                    </p:animRot>
-                                  </p:childTnLst>
-                                </p:cTn>
-                              </p:par>
-                              <p:par>
-                                <p:cTn id="9" presetID="8" presetClass="emph" presetSubtype="0" fill="hold" grpId="0" nodeType="withEffect">
-                                  <p:stCondLst>
-                                    <p:cond delay="0"/>
-                                  </p:stCondLst>
-                                  <p:childTnLst>
-                                    <p:animRot by="1210598">
-                                      <p:cBhvr>
-                                        <p:cTn id="10" dur="500" fill="hold"/>
-                                        <p:tgtEl>
-                                          <p:spTgt spid="5"/>
-                                        </p:tgtEl>
-                                        <p:attrNameLst>
-                                          <p:attrName>r</p:attrName>
-                                        </p:attrNameLst>
-                                      </p:cBhvr>
-                                    </p:animRot>
-                                  </p:childTnLst>
-                                </p:cTn>
-                              </p:par>
-                              <p:par>
-                                <p:cTn id="11" presetID="42" presetClass="path" presetSubtype="0" accel="50000" decel="50000" fill="hold" grpId="0" nodeType="withEffect">
-                                  <p:stCondLst>
-                                    <p:cond delay="0"/>
-                                  </p:stCondLst>
-                                  <p:childTnLst>
-                                    <p:animMotion origin="layout" path="M 0 0 C -0.05471609 -0.1111111 -0.05471609 -0.1111111 -0.1094322 -0.2222222 E" pathEditMode="relative" ptsTypes="">
-                                      <p:cBhvr>
-                                        <p:cTn id="12" dur="500" fill="hold"/>
-                                        <p:tgtEl>
-                                          <p:spTgt spid="6"/>
-                                        </p:tgtEl>
-                                        <p:attrNameLst>
-                                          <p:attrName>ppt_x</p:attrName>
-                                          <p:attrName>ppt_y</p:attrName>
-                                        </p:attrNameLst>
-                                      </p:cBhvr>
-                                    </p:animMotion>
-                                  </p:childTnLst>
-                                </p:cTn>
-                              </p:par>
-                              <p:par>
-                                <p:cTn id="13" presetID="8" presetClass="emph" presetSubtype="0" fill="hold" grpId="1" nodeType="withEffect">
-                                  <p:stCondLst>
-                                    <p:cond delay="0"/>
-                                  </p:stCondLst>
-                                  <p:childTnLst>
-                                    <p:animRot by="-1690524">
-                                      <p:cBhvr>
-                                        <p:cTn id="14" dur="500" fill="hold"/>
-                                        <p:tgtEl>
-                                          <p:spTgt spid="6"/>
-                                        </p:tgtEl>
-                                        <p:attrNameLst>
-                                          <p:attrName>r</p:attrName>
-                                        </p:attrNameLst>
-                                      </p:cBhvr>
-                                    </p:animRot>
-                                  </p:childTnLst>
-                                </p:cTn>
-                              </p:par>
-                            </p:childTnLst>
-                          </p:cTn>
-                        </p:par>
-                      </p:childTnLst>
-                    </p:cTn>
-                  </p:par>
-                </p:childTnLst>
-              </p:cTn>
-              <p:prevCondLst>
-                <p:cond evt="onPrev" delay="0">
-                  <p:tgtEl>
-                    <p:sldTgt/>
-                  </p:tgtEl>
-                </p:cond>
-              </p:prevCondLst>
-              <p:nextCondLst>
-                <p:cond evt="onNext" delay="0">
-                  <p:tgtEl>
-                    <p:sldTgt/>
-                  </p:tgtEl>
-                </p:cond>
-              </p:nextCondLst>
-            </p:seq>
-          </p:childTnLst>
-        </p:cTn>
-      </p:par>
-    </p:tnLst>
-    <p:bldLst>
-      <p:bldP spid="4" grpId="0" animBg="1"/>
-      <p:bldP spid="4" grpId="1" animBg="1"/>
-      <p:bldP spid="5" grpId="0" animBg="1"/>
-      <p:bldP spid="6" grpId="0" animBg="1"/>
-      <p:bldP spid="6" grpId="1" animBg="1"/>
-    </p:bldLst>
-  </p:timing>
-</p:sld>
-</file>
-
-<file path=ppt/slides/slide12.xml><?xml version="1.0" encoding="utf-8"?>
 <p:sld xmlns:a="http://schemas.openxmlformats.org/drawingml/2006/main" xmlns:r="http://schemas.openxmlformats.org/officeDocument/2006/relationships" xmlns:p="http://schemas.openxmlformats.org/presentationml/2006/main">
   <p:cSld>
     <p:spTree>
@@ -3871,6 +3641,45 @@
           </a:p>
         </p:txBody>
       </p:sp>
+      <mc:AlternateContent xmlns:mc="http://schemas.openxmlformats.org/markup-compatibility/2006">
+        <mc:Choice xmlns:p14="http://schemas.microsoft.com/office/powerpoint/2010/main" Requires="p14">
+          <p:contentPart p14:bwMode="auto" r:id="rId2">
+            <p14:nvContentPartPr>
+              <p14:cNvPr id="7" name="Ink 6"/>
+              <p14:cNvContentPartPr/>
+              <p14:nvPr/>
+            </p14:nvContentPartPr>
+            <p14:xfrm rot="1441388">
+              <a:off x="6837491" y="3285672"/>
+              <a:ext cx="734708" cy="820054"/>
+            </p14:xfrm>
+          </p:contentPart>
+        </mc:Choice>
+        <mc:Fallback>
+          <p:pic>
+            <p:nvPicPr>
+              <p:cNvPr id="7" name="Ink 6"/>
+              <p:cNvPicPr/>
+              <p:nvPr/>
+            </p:nvPicPr>
+            <p:blipFill>
+              <a:blip r:embed="rId3"/>
+              <a:stretch>
+                <a:fillRect/>
+              </a:stretch>
+            </p:blipFill>
+            <p:spPr>
+              <a:xfrm rot="1441388">
+                <a:off x="6825977" y="3274863"/>
+                <a:ext cx="757015" cy="840591"/>
+              </a:xfrm>
+              <a:prstGeom prst="rect">
+                <a:avLst/>
+              </a:prstGeom>
+            </p:spPr>
+          </p:pic>
+        </mc:Fallback>
+      </mc:AlternateContent>
     </p:spTree>
     <p:extLst>
       <p:ext uri="{BB962C8B-B14F-4D97-AF65-F5344CB8AC3E}">
@@ -3899,7 +3708,7 @@
 </p:sld>
 </file>
 
-<file path=ppt/slides/slide13.xml><?xml version="1.0" encoding="utf-8"?>
+<file path=ppt/slides/slide12.xml><?xml version="1.0" encoding="utf-8"?>
 <p:sld xmlns:a="http://schemas.openxmlformats.org/drawingml/2006/main" xmlns:r="http://schemas.openxmlformats.org/officeDocument/2006/relationships" xmlns:p="http://schemas.openxmlformats.org/presentationml/2006/main">
   <p:cSld>
     <p:bg>
@@ -4014,7 +3823,7 @@
 </p:sld>
 </file>
 
-<file path=ppt/slides/slide14.xml><?xml version="1.0" encoding="utf-8"?>
+<file path=ppt/slides/slide13.xml><?xml version="1.0" encoding="utf-8"?>
 <p:sld xmlns:a="http://schemas.openxmlformats.org/drawingml/2006/main" xmlns:r="http://schemas.openxmlformats.org/officeDocument/2006/relationships" xmlns:p="http://schemas.openxmlformats.org/presentationml/2006/main">
   <p:cSld>
     <p:spTree>
@@ -4481,713 +4290,7 @@
 </p:sld>
 </file>
 
-<file path=ppt/slides/slide15.xml><?xml version="1.0" encoding="utf-8"?>
-<p:sld xmlns:a="http://schemas.openxmlformats.org/drawingml/2006/main" xmlns:r="http://schemas.openxmlformats.org/officeDocument/2006/relationships" xmlns:p="http://schemas.openxmlformats.org/presentationml/2006/main">
-  <p:cSld name="PPSlide201311231447369624">
-    <p:spTree>
-      <p:nvGrpSpPr>
-        <p:cNvPr id="1" name=""/>
-        <p:cNvGrpSpPr/>
-        <p:nvPr/>
-      </p:nvGrpSpPr>
-      <p:grpSpPr>
-        <a:xfrm>
-          <a:off x="0" y="0"/>
-          <a:ext cx="0" cy="0"/>
-          <a:chOff x="0" y="0"/>
-          <a:chExt cx="0" cy="0"/>
-        </a:xfrm>
-      </p:grpSpPr>
-      <p:sp>
-        <p:nvSpPr>
-          <p:cNvPr id="4" name="Rectangle 3"/>
-          <p:cNvSpPr/>
-          <p:nvPr/>
-        </p:nvSpPr>
-        <p:spPr>
-          <a:xfrm>
-            <a:off x="838200" y="1143000"/>
-            <a:ext cx="3657600" cy="914400"/>
-          </a:xfrm>
-          <a:prstGeom prst="rect">
-            <a:avLst/>
-          </a:prstGeom>
-        </p:spPr>
-        <p:style>
-          <a:lnRef idx="2">
-            <a:schemeClr val="accent1">
-              <a:shade val="50000"/>
-            </a:schemeClr>
-          </a:lnRef>
-          <a:fillRef idx="1">
-            <a:schemeClr val="accent1"/>
-          </a:fillRef>
-          <a:effectRef idx="0">
-            <a:schemeClr val="accent1"/>
-          </a:effectRef>
-          <a:fontRef idx="minor">
-            <a:schemeClr val="lt1"/>
-          </a:fontRef>
-        </p:style>
-        <p:txBody>
-          <a:bodyPr rtlCol="0" anchor="ctr"/>
-          <a:lstStyle/>
-          <a:p>
-            <a:r>
-              <a:rPr lang="en-US" dirty="0" err="1">
-                <a:solidFill>
-                  <a:schemeClr val="bg1"/>
-                </a:solidFill>
-              </a:rPr>
-              <a:t>Lorem</a:t>
-            </a:r>
-            <a:r>
-              <a:rPr lang="en-US" dirty="0">
-                <a:solidFill>
-                  <a:schemeClr val="bg1"/>
-                </a:solidFill>
-              </a:rPr>
-              <a:t> </a:t>
-            </a:r>
-            <a:r>
-              <a:rPr lang="en-US" dirty="0" err="1">
-                <a:solidFill>
-                  <a:schemeClr val="bg1"/>
-                </a:solidFill>
-              </a:rPr>
-              <a:t>ipsum</a:t>
-            </a:r>
-            <a:r>
-              <a:rPr lang="en-US" dirty="0">
-                <a:solidFill>
-                  <a:schemeClr val="bg1"/>
-                </a:solidFill>
-              </a:rPr>
-              <a:t> dolor sit </a:t>
-            </a:r>
-            <a:r>
-              <a:rPr lang="en-US" dirty="0" err="1">
-                <a:solidFill>
-                  <a:schemeClr val="bg1"/>
-                </a:solidFill>
-              </a:rPr>
-              <a:t>amet</a:t>
-            </a:r>
-            <a:r>
-              <a:rPr lang="en-US" dirty="0">
-                <a:solidFill>
-                  <a:schemeClr val="bg1"/>
-                </a:solidFill>
-              </a:rPr>
-              <a:t>, </a:t>
-            </a:r>
-            <a:r>
-              <a:rPr lang="en-US" dirty="0" err="1">
-                <a:solidFill>
-                  <a:schemeClr val="bg1"/>
-                </a:solidFill>
-              </a:rPr>
-              <a:t>consectetur</a:t>
-            </a:r>
-            <a:r>
-              <a:rPr lang="en-US" dirty="0">
-                <a:solidFill>
-                  <a:schemeClr val="bg1"/>
-                </a:solidFill>
-              </a:rPr>
-              <a:t> </a:t>
-            </a:r>
-            <a:r>
-              <a:rPr lang="en-US" dirty="0" err="1">
-                <a:solidFill>
-                  <a:schemeClr val="bg1"/>
-                </a:solidFill>
-              </a:rPr>
-              <a:t>adipiscing</a:t>
-            </a:r>
-            <a:r>
-              <a:rPr lang="en-US" dirty="0">
-                <a:solidFill>
-                  <a:schemeClr val="bg1"/>
-                </a:solidFill>
-              </a:rPr>
-              <a:t> </a:t>
-            </a:r>
-            <a:r>
-              <a:rPr lang="en-US" dirty="0" err="1">
-                <a:solidFill>
-                  <a:schemeClr val="bg1"/>
-                </a:solidFill>
-              </a:rPr>
-              <a:t>elit</a:t>
-            </a:r>
-            <a:r>
-              <a:rPr lang="en-US" dirty="0">
-                <a:solidFill>
-                  <a:schemeClr val="bg1"/>
-                </a:solidFill>
-              </a:rPr>
-              <a:t>. </a:t>
-            </a:r>
-            <a:r>
-              <a:rPr lang="en-US" dirty="0" err="1">
-                <a:solidFill>
-                  <a:schemeClr val="bg1"/>
-                </a:solidFill>
-              </a:rPr>
-              <a:t>Sed</a:t>
-            </a:r>
-            <a:r>
-              <a:rPr lang="en-US" dirty="0">
-                <a:solidFill>
-                  <a:schemeClr val="bg1"/>
-                </a:solidFill>
-              </a:rPr>
-              <a:t> </a:t>
-            </a:r>
-            <a:r>
-              <a:rPr lang="en-US" dirty="0" err="1">
-                <a:solidFill>
-                  <a:schemeClr val="bg1"/>
-                </a:solidFill>
-              </a:rPr>
-              <a:t>accumsan</a:t>
-            </a:r>
-            <a:r>
-              <a:rPr lang="en-US" dirty="0">
-                <a:solidFill>
-                  <a:schemeClr val="bg1"/>
-                </a:solidFill>
-              </a:rPr>
-              <a:t> vitae </a:t>
-            </a:r>
-            <a:r>
-              <a:rPr lang="en-US" dirty="0" err="1">
-                <a:solidFill>
-                  <a:schemeClr val="bg1"/>
-                </a:solidFill>
-              </a:rPr>
-              <a:t>eros</a:t>
-            </a:r>
-            <a:r>
-              <a:rPr lang="en-US" dirty="0">
-                <a:solidFill>
-                  <a:schemeClr val="bg1"/>
-                </a:solidFill>
-              </a:rPr>
-              <a:t> a </a:t>
-            </a:r>
-            <a:r>
-              <a:rPr lang="en-US" dirty="0" err="1">
-                <a:solidFill>
-                  <a:schemeClr val="bg1"/>
-                </a:solidFill>
-              </a:rPr>
-              <a:t>luctus</a:t>
-            </a:r>
-            <a:r>
-              <a:rPr lang="en-US" dirty="0">
-                <a:solidFill>
-                  <a:schemeClr val="bg1"/>
-                </a:solidFill>
-              </a:rPr>
-              <a:t>. </a:t>
-            </a:r>
-            <a:r>
-              <a:rPr lang="en-US" dirty="0" err="1">
-                <a:solidFill>
-                  <a:schemeClr val="bg1"/>
-                </a:solidFill>
-              </a:rPr>
-              <a:t>Aenean</a:t>
-            </a:r>
-            <a:endParaRPr lang="en-SG" dirty="0">
-              <a:solidFill>
-                <a:schemeClr val="bg1"/>
-              </a:solidFill>
-            </a:endParaRPr>
-          </a:p>
-        </p:txBody>
-      </p:sp>
-      <p:sp>
-        <p:nvSpPr>
-          <p:cNvPr id="6" name="Rectangle 5"/>
-          <p:cNvSpPr/>
-          <p:nvPr/>
-        </p:nvSpPr>
-        <p:spPr>
-          <a:xfrm>
-            <a:off x="4876800" y="1137138"/>
-            <a:ext cx="3657600" cy="914400"/>
-          </a:xfrm>
-          <a:prstGeom prst="rect">
-            <a:avLst/>
-          </a:prstGeom>
-          <a:solidFill>
-            <a:srgbClr val="00B050"/>
-          </a:solidFill>
-          <a:ln>
-            <a:solidFill>
-              <a:srgbClr val="002060"/>
-            </a:solidFill>
-          </a:ln>
-        </p:spPr>
-        <p:style>
-          <a:lnRef idx="2">
-            <a:schemeClr val="accent1">
-              <a:shade val="50000"/>
-            </a:schemeClr>
-          </a:lnRef>
-          <a:fillRef idx="1">
-            <a:schemeClr val="accent1"/>
-          </a:fillRef>
-          <a:effectRef idx="0">
-            <a:schemeClr val="accent1"/>
-          </a:effectRef>
-          <a:fontRef idx="minor">
-            <a:schemeClr val="lt1"/>
-          </a:fontRef>
-        </p:style>
-        <p:txBody>
-          <a:bodyPr rtlCol="0" anchor="ctr"/>
-          <a:lstStyle/>
-          <a:p>
-            <a:r>
-              <a:rPr lang="en-US" dirty="0" err="1">
-                <a:solidFill>
-                  <a:schemeClr val="bg1"/>
-                </a:solidFill>
-              </a:rPr>
-              <a:t>Lorem</a:t>
-            </a:r>
-            <a:r>
-              <a:rPr lang="en-US" dirty="0">
-                <a:solidFill>
-                  <a:schemeClr val="bg1"/>
-                </a:solidFill>
-              </a:rPr>
-              <a:t> </a:t>
-            </a:r>
-            <a:r>
-              <a:rPr lang="en-US" dirty="0" err="1">
-                <a:solidFill>
-                  <a:schemeClr val="bg1"/>
-                </a:solidFill>
-              </a:rPr>
-              <a:t>ipsum</a:t>
-            </a:r>
-            <a:r>
-              <a:rPr lang="en-US" dirty="0">
-                <a:solidFill>
-                  <a:schemeClr val="bg1"/>
-                </a:solidFill>
-              </a:rPr>
-              <a:t> dolor sit </a:t>
-            </a:r>
-            <a:r>
-              <a:rPr lang="en-US" dirty="0" err="1">
-                <a:solidFill>
-                  <a:schemeClr val="bg1"/>
-                </a:solidFill>
-              </a:rPr>
-              <a:t>amet</a:t>
-            </a:r>
-            <a:r>
-              <a:rPr lang="en-US" dirty="0">
-                <a:solidFill>
-                  <a:schemeClr val="bg1"/>
-                </a:solidFill>
-              </a:rPr>
-              <a:t>, </a:t>
-            </a:r>
-            <a:r>
-              <a:rPr lang="en-US" dirty="0" err="1">
-                <a:solidFill>
-                  <a:schemeClr val="bg1"/>
-                </a:solidFill>
-              </a:rPr>
-              <a:t>consectetur</a:t>
-            </a:r>
-            <a:r>
-              <a:rPr lang="en-US" dirty="0">
-                <a:solidFill>
-                  <a:schemeClr val="bg1"/>
-                </a:solidFill>
-              </a:rPr>
-              <a:t> </a:t>
-            </a:r>
-            <a:r>
-              <a:rPr lang="en-US" dirty="0" err="1">
-                <a:solidFill>
-                  <a:schemeClr val="bg1"/>
-                </a:solidFill>
-              </a:rPr>
-              <a:t>adipiscing</a:t>
-            </a:r>
-            <a:r>
-              <a:rPr lang="en-US" dirty="0">
-                <a:solidFill>
-                  <a:schemeClr val="bg1"/>
-                </a:solidFill>
-              </a:rPr>
-              <a:t> </a:t>
-            </a:r>
-            <a:r>
-              <a:rPr lang="en-US" dirty="0" err="1">
-                <a:solidFill>
-                  <a:schemeClr val="bg1"/>
-                </a:solidFill>
-              </a:rPr>
-              <a:t>elit</a:t>
-            </a:r>
-            <a:r>
-              <a:rPr lang="en-US" dirty="0">
-                <a:solidFill>
-                  <a:schemeClr val="bg1"/>
-                </a:solidFill>
-              </a:rPr>
-              <a:t>. </a:t>
-            </a:r>
-            <a:r>
-              <a:rPr lang="en-US" dirty="0" err="1">
-                <a:solidFill>
-                  <a:schemeClr val="bg1"/>
-                </a:solidFill>
-              </a:rPr>
-              <a:t>Sed</a:t>
-            </a:r>
-            <a:r>
-              <a:rPr lang="en-US" dirty="0">
-                <a:solidFill>
-                  <a:schemeClr val="bg1"/>
-                </a:solidFill>
-              </a:rPr>
-              <a:t> </a:t>
-            </a:r>
-            <a:r>
-              <a:rPr lang="en-US" dirty="0" err="1">
-                <a:solidFill>
-                  <a:schemeClr val="bg1"/>
-                </a:solidFill>
-              </a:rPr>
-              <a:t>accumsan</a:t>
-            </a:r>
-            <a:r>
-              <a:rPr lang="en-US" dirty="0">
-                <a:solidFill>
-                  <a:schemeClr val="bg1"/>
-                </a:solidFill>
-              </a:rPr>
-              <a:t> vitae </a:t>
-            </a:r>
-            <a:r>
-              <a:rPr lang="en-US" dirty="0" err="1">
-                <a:solidFill>
-                  <a:schemeClr val="bg1"/>
-                </a:solidFill>
-              </a:rPr>
-              <a:t>eros</a:t>
-            </a:r>
-            <a:r>
-              <a:rPr lang="en-US" dirty="0">
-                <a:solidFill>
-                  <a:schemeClr val="bg1"/>
-                </a:solidFill>
-              </a:rPr>
-              <a:t> a </a:t>
-            </a:r>
-            <a:r>
-              <a:rPr lang="en-US" dirty="0" err="1">
-                <a:solidFill>
-                  <a:schemeClr val="bg1"/>
-                </a:solidFill>
-              </a:rPr>
-              <a:t>luctus</a:t>
-            </a:r>
-            <a:r>
-              <a:rPr lang="en-US" dirty="0">
-                <a:solidFill>
-                  <a:schemeClr val="bg1"/>
-                </a:solidFill>
-              </a:rPr>
-              <a:t>. </a:t>
-            </a:r>
-            <a:r>
-              <a:rPr lang="en-US" dirty="0" err="1">
-                <a:solidFill>
-                  <a:schemeClr val="bg1"/>
-                </a:solidFill>
-              </a:rPr>
-              <a:t>Aenean</a:t>
-            </a:r>
-            <a:endParaRPr lang="en-SG" dirty="0">
-              <a:solidFill>
-                <a:schemeClr val="bg1"/>
-              </a:solidFill>
-            </a:endParaRPr>
-          </a:p>
-        </p:txBody>
-      </p:sp>
-      <p:pic>
-        <p:nvPicPr>
-          <p:cNvPr id="11266" name="PPIndicator201311231447370034"/>
-          <p:cNvPicPr>
-            <a:picLocks noChangeAspect="1" noChangeArrowheads="1"/>
-          </p:cNvPicPr>
-          <p:nvPr/>
-        </p:nvPicPr>
-        <p:blipFill>
-          <a:blip r:embed="rId2">
-            <a:extLst>
-              <a:ext uri="{28A0092B-C50C-407E-A947-70E740481C1C}">
-                <a14:useLocalDpi xmlns:a14="http://schemas.microsoft.com/office/drawing/2010/main" val="0"/>
-              </a:ext>
-            </a:extLst>
-          </a:blip>
-          <a:srcRect/>
-          <a:stretch>
-            <a:fillRect/>
-          </a:stretch>
-        </p:blipFill>
-        <p:spPr bwMode="auto">
-          <a:xfrm>
-            <a:off x="7756525" y="0"/>
-            <a:ext cx="1450975" cy="1365250"/>
-          </a:xfrm>
-          <a:prstGeom prst="rect">
-            <a:avLst/>
-          </a:prstGeom>
-          <a:noFill/>
-          <a:ln>
-            <a:noFill/>
-          </a:ln>
-          <a:effectLst/>
-          <a:extLst>
-            <a:ext uri="{909E8E84-426E-40DD-AFC4-6F175D3DCCD1}">
-              <a14:hiddenFill xmlns:a14="http://schemas.microsoft.com/office/drawing/2010/main">
-                <a:solidFill>
-                  <a:schemeClr val="accent1"/>
-                </a:solidFill>
-              </a14:hiddenFill>
-            </a:ext>
-            <a:ext uri="{91240B29-F687-4F45-9708-019B960494DF}">
-              <a14:hiddenLine xmlns:a14="http://schemas.microsoft.com/office/drawing/2010/main" w="9525">
-                <a:solidFill>
-                  <a:schemeClr val="tx1"/>
-                </a:solidFill>
-                <a:miter lim="800000"/>
-                <a:headEnd/>
-                <a:tailEnd/>
-              </a14:hiddenLine>
-            </a:ext>
-            <a:ext uri="{AF507438-7753-43E0-B8FC-AC1667EBCBE1}">
-              <a14:hiddenEffects xmlns:a14="http://schemas.microsoft.com/office/drawing/2010/main">
-                <a:effectLst>
-                  <a:outerShdw dist="35921" dir="2700000" algn="ctr" rotWithShape="0">
-                    <a:schemeClr val="bg2"/>
-                  </a:outerShdw>
-                </a:effectLst>
-              </a14:hiddenEffects>
-            </a:ext>
-          </a:extLst>
-        </p:spPr>
-      </p:pic>
-    </p:spTree>
-    <p:extLst>
-      <p:ext uri="{BB962C8B-B14F-4D97-AF65-F5344CB8AC3E}">
-        <p14:creationId xmlns:p14="http://schemas.microsoft.com/office/powerpoint/2010/main" val="1748609958"/>
-      </p:ext>
-    </p:extLst>
-  </p:cSld>
-  <p:clrMapOvr>
-    <a:masterClrMapping/>
-  </p:clrMapOvr>
-  <p:transition advClick="0" advTm="0">
-    <p:fade/>
-  </p:transition>
-  <p:timing>
-    <p:tnLst>
-      <p:par>
-        <p:cTn id="1" dur="indefinite" restart="never" nodeType="tmRoot">
-          <p:childTnLst>
-            <p:seq concurrent="1" nextAc="seek">
-              <p:cTn id="2" dur="indefinite" nodeType="mainSeq">
-                <p:childTnLst>
-                  <p:par>
-                    <p:cTn id="3" fill="hold">
-                      <p:stCondLst>
-                        <p:cond delay="indefinite"/>
-                        <p:cond evt="onBegin" delay="0">
-                          <p:tn val="2"/>
-                        </p:cond>
-                      </p:stCondLst>
-                      <p:childTnLst>
-                        <p:par>
-                          <p:cTn id="4" fill="hold">
-                            <p:stCondLst>
-                              <p:cond delay="0"/>
-                            </p:stCondLst>
-                            <p:childTnLst>
-                              <p:par>
-                                <p:cTn id="5" presetID="42" presetClass="path" presetSubtype="0" accel="50000" decel="50000" fill="hold" grpId="0" nodeType="withEffect">
-                                  <p:stCondLst>
-                                    <p:cond delay="0"/>
-                                  </p:stCondLst>
-                                  <p:childTnLst>
-                                    <p:animMotion origin="layout" path="M 0 0 C 0.0125 0.275 0.0125 0.275 0.025 0.55 E" pathEditMode="relative" ptsTypes="">
-                                      <p:cBhvr>
-                                        <p:cTn id="6" dur="500" fill="hold"/>
-                                        <p:tgtEl>
-                                          <p:spTgt spid="4"/>
-                                        </p:tgtEl>
-                                        <p:attrNameLst>
-                                          <p:attrName>ppt_x</p:attrName>
-                                          <p:attrName>ppt_y</p:attrName>
-                                        </p:attrNameLst>
-                                      </p:cBhvr>
-                                    </p:animMotion>
-                                  </p:childTnLst>
-                                </p:cTn>
-                              </p:par>
-                              <p:par>
-                                <p:cTn id="7" presetID="6" presetClass="emph" presetSubtype="0" fill="hold" grpId="1" nodeType="withEffect">
-                                  <p:stCondLst>
-                                    <p:cond delay="0"/>
-                                  </p:stCondLst>
-                                  <p:childTnLst>
-                                    <p:animScale>
-                                      <p:cBhvr>
-                                        <p:cTn id="8" dur="500" fill="hold"/>
-                                        <p:tgtEl>
-                                          <p:spTgt spid="4"/>
-                                        </p:tgtEl>
-                                      </p:cBhvr>
-                                      <p:by x="150000" y="150000"/>
-                                      <p:to x="141667" y="175000"/>
-                                    </p:animScale>
-                                  </p:childTnLst>
-                                </p:cTn>
-                              </p:par>
-                              <p:par>
-                                <p:cTn id="9" presetID="4" presetClass="emph" presetSubtype="2" fill="hold" grpId="2" nodeType="withEffect">
-                                  <p:stCondLst>
-                                    <p:cond delay="0"/>
-                                  </p:stCondLst>
-                                  <p:childTnLst>
-                                    <p:anim to="1.3333" calcmode="lin" valueType="num">
-                                      <p:cBhvr override="childStyle">
-                                        <p:cTn id="10" dur="500" fill="hold"/>
-                                        <p:tgtEl>
-                                          <p:spTgt spid="4"/>
-                                        </p:tgtEl>
-                                        <p:attrNameLst>
-                                          <p:attrName>style.fontSize</p:attrName>
-                                        </p:attrNameLst>
-                                      </p:cBhvr>
-                                    </p:anim>
-                                  </p:childTnLst>
-                                </p:cTn>
-                              </p:par>
-                              <p:par>
-                                <p:cTn id="11" presetID="42" presetClass="path" presetSubtype="0" accel="50000" decel="50000" fill="hold" grpId="0" nodeType="withEffect">
-                                  <p:stCondLst>
-                                    <p:cond delay="0"/>
-                                  </p:stCondLst>
-                                  <p:childTnLst>
-                                    <p:animMotion origin="layout" path="M 0 0 C 0.01041667 0.3032052 0.01041667 0.3032052 0.02083333 0.6064103 E" pathEditMode="relative" ptsTypes="">
-                                      <p:cBhvr>
-                                        <p:cTn id="12" dur="500" fill="hold"/>
-                                        <p:tgtEl>
-                                          <p:spTgt spid="6"/>
-                                        </p:tgtEl>
-                                        <p:attrNameLst>
-                                          <p:attrName>ppt_x</p:attrName>
-                                          <p:attrName>ppt_y</p:attrName>
-                                        </p:attrNameLst>
-                                      </p:cBhvr>
-                                    </p:animMotion>
-                                  </p:childTnLst>
-                                </p:cTn>
-                              </p:par>
-                              <p:par>
-                                <p:cTn id="13" presetID="6" presetClass="emph" presetSubtype="0" fill="hold" grpId="1" nodeType="withEffect">
-                                  <p:stCondLst>
-                                    <p:cond delay="0"/>
-                                  </p:stCondLst>
-                                  <p:childTnLst>
-                                    <p:animScale>
-                                      <p:cBhvr>
-                                        <p:cTn id="14" dur="500" fill="hold"/>
-                                        <p:tgtEl>
-                                          <p:spTgt spid="6"/>
-                                        </p:tgtEl>
-                                      </p:cBhvr>
-                                      <p:by x="150000" y="150000"/>
-                                      <p:to x="68750" y="91667"/>
-                                    </p:animScale>
-                                  </p:childTnLst>
-                                </p:cTn>
-                              </p:par>
-                              <p:par>
-                                <p:cTn id="15" presetID="4" presetClass="emph" presetSubtype="2" fill="hold" grpId="2" nodeType="withEffect">
-                                  <p:stCondLst>
-                                    <p:cond delay="0"/>
-                                  </p:stCondLst>
-                                  <p:childTnLst>
-                                    <p:anim to="0.6667" calcmode="lin" valueType="num">
-                                      <p:cBhvr override="childStyle">
-                                        <p:cTn id="16" dur="500" fill="hold"/>
-                                        <p:tgtEl>
-                                          <p:spTgt spid="6"/>
-                                        </p:tgtEl>
-                                        <p:attrNameLst>
-                                          <p:attrName>style.fontSize</p:attrName>
-                                        </p:attrNameLst>
-                                      </p:cBhvr>
-                                    </p:anim>
-                                  </p:childTnLst>
-                                </p:cTn>
-                              </p:par>
-                            </p:childTnLst>
-                          </p:cTn>
-                        </p:par>
-                      </p:childTnLst>
-                    </p:cTn>
-                  </p:par>
-                </p:childTnLst>
-              </p:cTn>
-              <p:prevCondLst>
-                <p:cond evt="onPrev" delay="0">
-                  <p:tgtEl>
-                    <p:sldTgt/>
-                  </p:tgtEl>
-                </p:cond>
-              </p:prevCondLst>
-              <p:nextCondLst>
-                <p:cond evt="onNext" delay="0">
-                  <p:tgtEl>
-                    <p:sldTgt/>
-                  </p:tgtEl>
-                </p:cond>
-              </p:nextCondLst>
-            </p:seq>
-          </p:childTnLst>
-        </p:cTn>
-      </p:par>
-    </p:tnLst>
-    <p:bldLst>
-      <p:bldP spid="4" grpId="0" animBg="1"/>
-      <p:bldP spid="4" grpId="1" animBg="1"/>
-      <p:bldP spid="4" grpId="2"/>
-      <p:bldP spid="6" grpId="0" animBg="1"/>
-      <p:bldP spid="6" grpId="1" animBg="1"/>
-      <p:bldP spid="6" grpId="2"/>
-    </p:bldLst>
-  </p:timing>
-</p:sld>
-</file>
-
-<file path=ppt/slides/slide16.xml><?xml version="1.0" encoding="utf-8"?>
+<file path=ppt/slides/slide14.xml><?xml version="1.0" encoding="utf-8"?>
 <p:sld xmlns:a="http://schemas.openxmlformats.org/drawingml/2006/main" xmlns:r="http://schemas.openxmlformats.org/officeDocument/2006/relationships" xmlns:p="http://schemas.openxmlformats.org/presentationml/2006/main">
   <p:cSld>
     <p:spTree>
@@ -5644,11 +4747,11 @@
   <p:clrMapOvr>
     <a:masterClrMapping/>
   </p:clrMapOvr>
-  <mc:AlternateContent xmlns:mc="http://schemas.openxmlformats.org/markup-compatibility/2006">
-    <mc:Choice xmlns:p14="http://schemas.microsoft.com/office/powerpoint/2010/main" Requires="p14">
+  <mc:AlternateContent xmlns:mc="http://schemas.openxmlformats.org/markup-compatibility/2006" xmlns:p14="http://schemas.microsoft.com/office/powerpoint/2010/main">
+    <mc:Choice Requires="p14">
       <p:transition spd="slow" p14:dur="2000"/>
     </mc:Choice>
-    <mc:Fallback>
+    <mc:Fallback xmlns="">
       <p:transition spd="slow"/>
     </mc:Fallback>
   </mc:AlternateContent>
@@ -5662,7 +4765,7 @@
 </p:sld>
 </file>
 
-<file path=ppt/slides/slide17.xml><?xml version="1.0" encoding="utf-8"?>
+<file path=ppt/slides/slide15.xml><?xml version="1.0" encoding="utf-8"?>
 <p:sld xmlns:a="http://schemas.openxmlformats.org/drawingml/2006/main" xmlns:r="http://schemas.openxmlformats.org/officeDocument/2006/relationships" xmlns:p="http://schemas.openxmlformats.org/presentationml/2006/main">
   <p:cSld>
     <p:bg>
@@ -5761,7 +4864,7 @@
 </p:sld>
 </file>
 
-<file path=ppt/slides/slide18.xml><?xml version="1.0" encoding="utf-8"?>
+<file path=ppt/slides/slide16.xml><?xml version="1.0" encoding="utf-8"?>
 <p:sld xmlns:a="http://schemas.openxmlformats.org/drawingml/2006/main" xmlns:r="http://schemas.openxmlformats.org/officeDocument/2006/relationships" xmlns:p="http://schemas.openxmlformats.org/presentationml/2006/main">
   <p:cSld>
     <p:spTree>
@@ -6210,739 +5313,7 @@
 </p:sld>
 </file>
 
-<file path=ppt/slides/slide19.xml><?xml version="1.0" encoding="utf-8"?>
-<p:sld xmlns:a="http://schemas.openxmlformats.org/drawingml/2006/main" xmlns:r="http://schemas.openxmlformats.org/officeDocument/2006/relationships" xmlns:p="http://schemas.openxmlformats.org/presentationml/2006/main">
-  <p:cSld name="PPSlide201311231451461893">
-    <p:spTree>
-      <p:nvGrpSpPr>
-        <p:cNvPr id="1" name=""/>
-        <p:cNvGrpSpPr/>
-        <p:nvPr/>
-      </p:nvGrpSpPr>
-      <p:grpSpPr>
-        <a:xfrm>
-          <a:off x="0" y="0"/>
-          <a:ext cx="0" cy="0"/>
-          <a:chOff x="0" y="0"/>
-          <a:chExt cx="0" cy="0"/>
-        </a:xfrm>
-      </p:grpSpPr>
-      <p:sp>
-        <p:nvSpPr>
-          <p:cNvPr id="3" name="TextBox 2"/>
-          <p:cNvSpPr txBox="1"/>
-          <p:nvPr/>
-        </p:nvSpPr>
-        <p:spPr>
-          <a:xfrm>
-            <a:off x="838200" y="1137138"/>
-            <a:ext cx="3657600" cy="923330"/>
-          </a:xfrm>
-          <a:prstGeom prst="rect">
-            <a:avLst/>
-          </a:prstGeom>
-          <a:solidFill>
-            <a:schemeClr val="accent3">
-              <a:lumMod val="75000"/>
-            </a:schemeClr>
-          </a:solidFill>
-          <a:ln>
-            <a:solidFill>
-              <a:srgbClr val="002060"/>
-            </a:solidFill>
-          </a:ln>
-        </p:spPr>
-        <p:txBody>
-          <a:bodyPr wrap="square" rtlCol="0">
-            <a:spAutoFit/>
-          </a:bodyPr>
-          <a:lstStyle/>
-          <a:p>
-            <a:r>
-              <a:rPr lang="en-US" dirty="0" err="1">
-                <a:solidFill>
-                  <a:schemeClr val="bg1"/>
-                </a:solidFill>
-              </a:rPr>
-              <a:t>Lorem</a:t>
-            </a:r>
-            <a:r>
-              <a:rPr lang="en-US" dirty="0">
-                <a:solidFill>
-                  <a:schemeClr val="bg1"/>
-                </a:solidFill>
-              </a:rPr>
-              <a:t> </a:t>
-            </a:r>
-            <a:r>
-              <a:rPr lang="en-US" dirty="0" err="1">
-                <a:solidFill>
-                  <a:schemeClr val="bg1"/>
-                </a:solidFill>
-              </a:rPr>
-              <a:t>ipsum</a:t>
-            </a:r>
-            <a:r>
-              <a:rPr lang="en-US" dirty="0">
-                <a:solidFill>
-                  <a:schemeClr val="bg1"/>
-                </a:solidFill>
-              </a:rPr>
-              <a:t> dolor sit </a:t>
-            </a:r>
-            <a:r>
-              <a:rPr lang="en-US" dirty="0" err="1">
-                <a:solidFill>
-                  <a:schemeClr val="bg1"/>
-                </a:solidFill>
-              </a:rPr>
-              <a:t>amet</a:t>
-            </a:r>
-            <a:r>
-              <a:rPr lang="en-US" dirty="0">
-                <a:solidFill>
-                  <a:schemeClr val="bg1"/>
-                </a:solidFill>
-              </a:rPr>
-              <a:t>, </a:t>
-            </a:r>
-            <a:r>
-              <a:rPr lang="en-US" dirty="0" err="1">
-                <a:solidFill>
-                  <a:schemeClr val="bg1"/>
-                </a:solidFill>
-              </a:rPr>
-              <a:t>consectetur</a:t>
-            </a:r>
-            <a:r>
-              <a:rPr lang="en-US" dirty="0">
-                <a:solidFill>
-                  <a:schemeClr val="bg1"/>
-                </a:solidFill>
-              </a:rPr>
-              <a:t> </a:t>
-            </a:r>
-            <a:r>
-              <a:rPr lang="en-US" dirty="0" err="1">
-                <a:solidFill>
-                  <a:schemeClr val="bg1"/>
-                </a:solidFill>
-              </a:rPr>
-              <a:t>adipiscing</a:t>
-            </a:r>
-            <a:r>
-              <a:rPr lang="en-US" dirty="0">
-                <a:solidFill>
-                  <a:schemeClr val="bg1"/>
-                </a:solidFill>
-              </a:rPr>
-              <a:t> </a:t>
-            </a:r>
-            <a:r>
-              <a:rPr lang="en-US" dirty="0" err="1">
-                <a:solidFill>
-                  <a:schemeClr val="bg1"/>
-                </a:solidFill>
-              </a:rPr>
-              <a:t>elit</a:t>
-            </a:r>
-            <a:r>
-              <a:rPr lang="en-US" dirty="0">
-                <a:solidFill>
-                  <a:schemeClr val="bg1"/>
-                </a:solidFill>
-              </a:rPr>
-              <a:t>. </a:t>
-            </a:r>
-            <a:r>
-              <a:rPr lang="en-US" dirty="0" err="1">
-                <a:solidFill>
-                  <a:schemeClr val="bg1"/>
-                </a:solidFill>
-              </a:rPr>
-              <a:t>Sed</a:t>
-            </a:r>
-            <a:r>
-              <a:rPr lang="en-US" dirty="0">
-                <a:solidFill>
-                  <a:schemeClr val="bg1"/>
-                </a:solidFill>
-              </a:rPr>
-              <a:t> </a:t>
-            </a:r>
-            <a:r>
-              <a:rPr lang="en-US" dirty="0" err="1">
-                <a:solidFill>
-                  <a:schemeClr val="bg1"/>
-                </a:solidFill>
-              </a:rPr>
-              <a:t>accumsan</a:t>
-            </a:r>
-            <a:r>
-              <a:rPr lang="en-US" dirty="0">
-                <a:solidFill>
-                  <a:schemeClr val="bg1"/>
-                </a:solidFill>
-              </a:rPr>
-              <a:t> vitae </a:t>
-            </a:r>
-            <a:r>
-              <a:rPr lang="en-US" dirty="0" err="1">
-                <a:solidFill>
-                  <a:schemeClr val="bg1"/>
-                </a:solidFill>
-              </a:rPr>
-              <a:t>eros</a:t>
-            </a:r>
-            <a:r>
-              <a:rPr lang="en-US" dirty="0">
-                <a:solidFill>
-                  <a:schemeClr val="bg1"/>
-                </a:solidFill>
-              </a:rPr>
-              <a:t> a </a:t>
-            </a:r>
-            <a:r>
-              <a:rPr lang="en-US" dirty="0" err="1">
-                <a:solidFill>
-                  <a:schemeClr val="bg1"/>
-                </a:solidFill>
-              </a:rPr>
-              <a:t>luctus</a:t>
-            </a:r>
-            <a:r>
-              <a:rPr lang="en-US" dirty="0">
-                <a:solidFill>
-                  <a:schemeClr val="bg1"/>
-                </a:solidFill>
-              </a:rPr>
-              <a:t>. </a:t>
-            </a:r>
-            <a:r>
-              <a:rPr lang="en-US" dirty="0" err="1" smtClean="0">
-                <a:solidFill>
-                  <a:schemeClr val="bg1"/>
-                </a:solidFill>
-              </a:rPr>
-              <a:t>Aenean</a:t>
-            </a:r>
-            <a:endParaRPr lang="en-SG" dirty="0">
-              <a:solidFill>
-                <a:schemeClr val="bg1"/>
-              </a:solidFill>
-            </a:endParaRPr>
-          </a:p>
-        </p:txBody>
-      </p:sp>
-      <p:sp>
-        <p:nvSpPr>
-          <p:cNvPr id="7" name="TextBox 6"/>
-          <p:cNvSpPr txBox="1"/>
-          <p:nvPr/>
-        </p:nvSpPr>
-        <p:spPr>
-          <a:xfrm>
-            <a:off x="4876800" y="1137138"/>
-            <a:ext cx="3657600" cy="923330"/>
-          </a:xfrm>
-          <a:prstGeom prst="rect">
-            <a:avLst/>
-          </a:prstGeom>
-          <a:solidFill>
-            <a:srgbClr val="7030A0"/>
-          </a:solidFill>
-          <a:ln>
-            <a:solidFill>
-              <a:srgbClr val="002060"/>
-            </a:solidFill>
-          </a:ln>
-        </p:spPr>
-        <p:txBody>
-          <a:bodyPr wrap="square" rtlCol="0">
-            <a:spAutoFit/>
-          </a:bodyPr>
-          <a:lstStyle/>
-          <a:p>
-            <a:r>
-              <a:rPr lang="en-US" dirty="0" err="1">
-                <a:solidFill>
-                  <a:schemeClr val="bg1"/>
-                </a:solidFill>
-              </a:rPr>
-              <a:t>Lorem</a:t>
-            </a:r>
-            <a:r>
-              <a:rPr lang="en-US" dirty="0">
-                <a:solidFill>
-                  <a:schemeClr val="bg1"/>
-                </a:solidFill>
-              </a:rPr>
-              <a:t> </a:t>
-            </a:r>
-            <a:r>
-              <a:rPr lang="en-US" dirty="0" err="1">
-                <a:solidFill>
-                  <a:schemeClr val="bg1"/>
-                </a:solidFill>
-              </a:rPr>
-              <a:t>ipsum</a:t>
-            </a:r>
-            <a:r>
-              <a:rPr lang="en-US" dirty="0">
-                <a:solidFill>
-                  <a:schemeClr val="bg1"/>
-                </a:solidFill>
-              </a:rPr>
-              <a:t> dolor sit </a:t>
-            </a:r>
-            <a:r>
-              <a:rPr lang="en-US" dirty="0" err="1">
-                <a:solidFill>
-                  <a:schemeClr val="bg1"/>
-                </a:solidFill>
-              </a:rPr>
-              <a:t>amet</a:t>
-            </a:r>
-            <a:r>
-              <a:rPr lang="en-US" dirty="0">
-                <a:solidFill>
-                  <a:schemeClr val="bg1"/>
-                </a:solidFill>
-              </a:rPr>
-              <a:t>, </a:t>
-            </a:r>
-            <a:r>
-              <a:rPr lang="en-US" dirty="0" err="1">
-                <a:solidFill>
-                  <a:schemeClr val="bg1"/>
-                </a:solidFill>
-              </a:rPr>
-              <a:t>consectetur</a:t>
-            </a:r>
-            <a:r>
-              <a:rPr lang="en-US" dirty="0">
-                <a:solidFill>
-                  <a:schemeClr val="bg1"/>
-                </a:solidFill>
-              </a:rPr>
-              <a:t> </a:t>
-            </a:r>
-            <a:r>
-              <a:rPr lang="en-US" dirty="0" err="1">
-                <a:solidFill>
-                  <a:schemeClr val="bg1"/>
-                </a:solidFill>
-              </a:rPr>
-              <a:t>adipiscing</a:t>
-            </a:r>
-            <a:r>
-              <a:rPr lang="en-US" dirty="0">
-                <a:solidFill>
-                  <a:schemeClr val="bg1"/>
-                </a:solidFill>
-              </a:rPr>
-              <a:t> </a:t>
-            </a:r>
-            <a:r>
-              <a:rPr lang="en-US" dirty="0" err="1">
-                <a:solidFill>
-                  <a:schemeClr val="bg1"/>
-                </a:solidFill>
-              </a:rPr>
-              <a:t>elit</a:t>
-            </a:r>
-            <a:r>
-              <a:rPr lang="en-US" dirty="0">
-                <a:solidFill>
-                  <a:schemeClr val="bg1"/>
-                </a:solidFill>
-              </a:rPr>
-              <a:t>. </a:t>
-            </a:r>
-            <a:r>
-              <a:rPr lang="en-US" dirty="0" err="1">
-                <a:solidFill>
-                  <a:schemeClr val="bg1"/>
-                </a:solidFill>
-              </a:rPr>
-              <a:t>Sed</a:t>
-            </a:r>
-            <a:r>
-              <a:rPr lang="en-US" dirty="0">
-                <a:solidFill>
-                  <a:schemeClr val="bg1"/>
-                </a:solidFill>
-              </a:rPr>
-              <a:t> </a:t>
-            </a:r>
-            <a:r>
-              <a:rPr lang="en-US" dirty="0" err="1">
-                <a:solidFill>
-                  <a:schemeClr val="bg1"/>
-                </a:solidFill>
-              </a:rPr>
-              <a:t>accumsan</a:t>
-            </a:r>
-            <a:r>
-              <a:rPr lang="en-US" dirty="0">
-                <a:solidFill>
-                  <a:schemeClr val="bg1"/>
-                </a:solidFill>
-              </a:rPr>
-              <a:t> vitae </a:t>
-            </a:r>
-            <a:r>
-              <a:rPr lang="en-US" dirty="0" err="1">
-                <a:solidFill>
-                  <a:schemeClr val="bg1"/>
-                </a:solidFill>
-              </a:rPr>
-              <a:t>eros</a:t>
-            </a:r>
-            <a:r>
-              <a:rPr lang="en-US" dirty="0">
-                <a:solidFill>
-                  <a:schemeClr val="bg1"/>
-                </a:solidFill>
-              </a:rPr>
-              <a:t> a </a:t>
-            </a:r>
-            <a:r>
-              <a:rPr lang="en-US" dirty="0" err="1">
-                <a:solidFill>
-                  <a:schemeClr val="bg1"/>
-                </a:solidFill>
-              </a:rPr>
-              <a:t>luctus</a:t>
-            </a:r>
-            <a:r>
-              <a:rPr lang="en-US" dirty="0">
-                <a:solidFill>
-                  <a:schemeClr val="bg1"/>
-                </a:solidFill>
-              </a:rPr>
-              <a:t>. </a:t>
-            </a:r>
-            <a:r>
-              <a:rPr lang="en-US" dirty="0" err="1" smtClean="0">
-                <a:solidFill>
-                  <a:schemeClr val="bg1"/>
-                </a:solidFill>
-              </a:rPr>
-              <a:t>Aenean</a:t>
-            </a:r>
-            <a:endParaRPr lang="en-SG" dirty="0">
-              <a:solidFill>
-                <a:schemeClr val="bg1"/>
-              </a:solidFill>
-            </a:endParaRPr>
-          </a:p>
-        </p:txBody>
-      </p:sp>
-      <p:pic>
-        <p:nvPicPr>
-          <p:cNvPr id="12290" name="PPIndicator201311231451462363"/>
-          <p:cNvPicPr>
-            <a:picLocks noChangeAspect="1" noChangeArrowheads="1"/>
-          </p:cNvPicPr>
-          <p:nvPr/>
-        </p:nvPicPr>
-        <p:blipFill>
-          <a:blip r:embed="rId2">
-            <a:extLst>
-              <a:ext uri="{28A0092B-C50C-407E-A947-70E740481C1C}">
-                <a14:useLocalDpi xmlns:a14="http://schemas.microsoft.com/office/drawing/2010/main" val="0"/>
-              </a:ext>
-            </a:extLst>
-          </a:blip>
-          <a:srcRect/>
-          <a:stretch>
-            <a:fillRect/>
-          </a:stretch>
-        </p:blipFill>
-        <p:spPr bwMode="auto">
-          <a:xfrm>
-            <a:off x="7756525" y="0"/>
-            <a:ext cx="1450975" cy="1365250"/>
-          </a:xfrm>
-          <a:prstGeom prst="rect">
-            <a:avLst/>
-          </a:prstGeom>
-          <a:noFill/>
-          <a:ln>
-            <a:noFill/>
-          </a:ln>
-          <a:effectLst/>
-          <a:extLst>
-            <a:ext uri="{909E8E84-426E-40DD-AFC4-6F175D3DCCD1}">
-              <a14:hiddenFill xmlns:a14="http://schemas.microsoft.com/office/drawing/2010/main">
-                <a:solidFill>
-                  <a:schemeClr val="accent1"/>
-                </a:solidFill>
-              </a14:hiddenFill>
-            </a:ext>
-            <a:ext uri="{91240B29-F687-4F45-9708-019B960494DF}">
-              <a14:hiddenLine xmlns:a14="http://schemas.microsoft.com/office/drawing/2010/main" w="9525">
-                <a:solidFill>
-                  <a:schemeClr val="tx1"/>
-                </a:solidFill>
-                <a:miter lim="800000"/>
-                <a:headEnd/>
-                <a:tailEnd/>
-              </a14:hiddenLine>
-            </a:ext>
-            <a:ext uri="{AF507438-7753-43E0-B8FC-AC1667EBCBE1}">
-              <a14:hiddenEffects xmlns:a14="http://schemas.microsoft.com/office/drawing/2010/main">
-                <a:effectLst>
-                  <a:outerShdw dist="35921" dir="2700000" algn="ctr" rotWithShape="0">
-                    <a:schemeClr val="bg2"/>
-                  </a:outerShdw>
-                </a:effectLst>
-              </a14:hiddenEffects>
-            </a:ext>
-          </a:extLst>
-        </p:spPr>
-      </p:pic>
-    </p:spTree>
-    <p:extLst>
-      <p:ext uri="{BB962C8B-B14F-4D97-AF65-F5344CB8AC3E}">
-        <p14:creationId xmlns:p14="http://schemas.microsoft.com/office/powerpoint/2010/main" val="4173006009"/>
-      </p:ext>
-    </p:extLst>
-  </p:cSld>
-  <p:clrMapOvr>
-    <a:masterClrMapping/>
-  </p:clrMapOvr>
-  <p:transition advClick="0" advTm="0">
-    <p:fade/>
-  </p:transition>
-  <p:timing>
-    <p:tnLst>
-      <p:par>
-        <p:cTn id="1" dur="indefinite" restart="never" nodeType="tmRoot">
-          <p:childTnLst>
-            <p:seq concurrent="1" nextAc="seek">
-              <p:cTn id="2" dur="indefinite" nodeType="mainSeq">
-                <p:childTnLst>
-                  <p:par>
-                    <p:cTn id="3" fill="hold">
-                      <p:stCondLst>
-                        <p:cond delay="indefinite"/>
-                        <p:cond evt="onBegin" delay="0">
-                          <p:tn val="2"/>
-                        </p:cond>
-                      </p:stCondLst>
-                      <p:childTnLst>
-                        <p:par>
-                          <p:cTn id="4" fill="hold">
-                            <p:stCondLst>
-                              <p:cond delay="0"/>
-                            </p:stCondLst>
-                            <p:childTnLst>
-                              <p:par>
-                                <p:cTn id="5" presetID="42" presetClass="path" presetSubtype="0" accel="50000" decel="50000" fill="hold" grpId="0" nodeType="withEffect">
-                                  <p:stCondLst>
-                                    <p:cond delay="0"/>
-                                  </p:stCondLst>
-                                  <p:childTnLst>
-                                    <p:animMotion origin="layout" path="M 0 0 C -0.002083333 0.3017663 -0.002083333 0.3017663 -0.004166667 0.6035327 E" pathEditMode="relative" ptsTypes="">
-                                      <p:cBhvr>
-                                        <p:cTn id="6" dur="500" fill="hold"/>
-                                        <p:tgtEl>
-                                          <p:spTgt spid="3"/>
-                                        </p:tgtEl>
-                                        <p:attrNameLst>
-                                          <p:attrName>ppt_x</p:attrName>
-                                          <p:attrName>ppt_y</p:attrName>
-                                        </p:attrNameLst>
-                                      </p:cBhvr>
-                                    </p:animMotion>
-                                  </p:childTnLst>
-                                </p:cTn>
-                              </p:par>
-                              <p:par>
-                                <p:cTn id="7" presetID="4" presetClass="emph" presetSubtype="2" fill="hold" grpId="1" nodeType="withEffect">
-                                  <p:stCondLst>
-                                    <p:cond delay="0"/>
-                                  </p:stCondLst>
-                                  <p:childTnLst>
-                                    <p:anim to="1.3333" calcmode="lin" valueType="num">
-                                      <p:cBhvr override="childStyle">
-                                        <p:cTn id="8" dur="500" fill="hold"/>
-                                        <p:tgtEl>
-                                          <p:spTgt spid="3"/>
-                                        </p:tgtEl>
-                                        <p:attrNameLst>
-                                          <p:attrName>style.fontSize</p:attrName>
-                                        </p:attrNameLst>
-                                      </p:cBhvr>
-                                    </p:anim>
-                                  </p:childTnLst>
-                                </p:cTn>
-                              </p:par>
-                              <p:par>
-                                <p:cTn id="9" presetID="42" presetClass="path" presetSubtype="0" accel="50000" decel="50000" fill="hold" grpId="0" nodeType="withEffect">
-                                  <p:stCondLst>
-                                    <p:cond delay="0"/>
-                                  </p:stCondLst>
-                                  <p:childTnLst>
-                                    <p:animMotion origin="layout" path="M 0 0 C -0.008333334 0.3320593 -0.008333334 0.3320593 -0.01666667 0.6641186 E" pathEditMode="relative" ptsTypes="">
-                                      <p:cBhvr>
-                                        <p:cTn id="10" dur="500" fill="hold"/>
-                                        <p:tgtEl>
-                                          <p:spTgt spid="7"/>
-                                        </p:tgtEl>
-                                        <p:attrNameLst>
-                                          <p:attrName>ppt_x</p:attrName>
-                                          <p:attrName>ppt_y</p:attrName>
-                                        </p:attrNameLst>
-                                      </p:cBhvr>
-                                    </p:animMotion>
-                                  </p:childTnLst>
-                                </p:cTn>
-                              </p:par>
-                              <p:par>
-                                <p:cTn id="11" presetID="4" presetClass="emph" presetSubtype="2" fill="hold" grpId="1" nodeType="withEffect">
-                                  <p:stCondLst>
-                                    <p:cond delay="0"/>
-                                  </p:stCondLst>
-                                  <p:childTnLst>
-                                    <p:anim to="0.7778" calcmode="lin" valueType="num">
-                                      <p:cBhvr override="childStyle">
-                                        <p:cTn id="12" dur="500" fill="hold"/>
-                                        <p:tgtEl>
-                                          <p:spTgt spid="7"/>
-                                        </p:tgtEl>
-                                        <p:attrNameLst>
-                                          <p:attrName>style.fontSize</p:attrName>
-                                        </p:attrNameLst>
-                                      </p:cBhvr>
-                                    </p:anim>
-                                  </p:childTnLst>
-                                </p:cTn>
-                              </p:par>
-                            </p:childTnLst>
-                          </p:cTn>
-                        </p:par>
-                      </p:childTnLst>
-                    </p:cTn>
-                  </p:par>
-                </p:childTnLst>
-              </p:cTn>
-              <p:prevCondLst>
-                <p:cond evt="onPrev" delay="0">
-                  <p:tgtEl>
-                    <p:sldTgt/>
-                  </p:tgtEl>
-                </p:cond>
-              </p:prevCondLst>
-              <p:nextCondLst>
-                <p:cond evt="onNext" delay="0">
-                  <p:tgtEl>
-                    <p:sldTgt/>
-                  </p:tgtEl>
-                </p:cond>
-              </p:nextCondLst>
-            </p:seq>
-          </p:childTnLst>
-        </p:cTn>
-      </p:par>
-    </p:tnLst>
-    <p:bldLst>
-      <p:bldP spid="3" grpId="0" animBg="1"/>
-      <p:bldP spid="3" grpId="1"/>
-      <p:bldP spid="7" grpId="0" animBg="1"/>
-      <p:bldP spid="7" grpId="1"/>
-    </p:bldLst>
-  </p:timing>
-</p:sld>
-</file>
-
-<file path=ppt/slides/slide2.xml><?xml version="1.0" encoding="utf-8"?>
-<p:sld xmlns:a="http://schemas.openxmlformats.org/drawingml/2006/main" xmlns:r="http://schemas.openxmlformats.org/officeDocument/2006/relationships" xmlns:p="http://schemas.openxmlformats.org/presentationml/2006/main">
-  <p:cSld>
-    <p:bg>
-      <p:bgPr>
-        <a:solidFill>
-          <a:schemeClr val="tx1"/>
-        </a:solidFill>
-        <a:effectLst/>
-      </p:bgPr>
-    </p:bg>
-    <p:spTree>
-      <p:nvGrpSpPr>
-        <p:cNvPr id="1" name=""/>
-        <p:cNvGrpSpPr/>
-        <p:nvPr/>
-      </p:nvGrpSpPr>
-      <p:grpSpPr>
-        <a:xfrm>
-          <a:off x="0" y="0"/>
-          <a:ext cx="0" cy="0"/>
-          <a:chOff x="0" y="0"/>
-          <a:chExt cx="0" cy="0"/>
-        </a:xfrm>
-      </p:grpSpPr>
-      <p:sp>
-        <p:nvSpPr>
-          <p:cNvPr id="2" name="Title 1"/>
-          <p:cNvSpPr>
-            <a:spLocks noGrp="1"/>
-          </p:cNvSpPr>
-          <p:nvPr>
-            <p:ph type="title"/>
-          </p:nvPr>
-        </p:nvSpPr>
-        <p:spPr>
-          <a:xfrm>
-            <a:off x="533400" y="2819400"/>
-            <a:ext cx="8229600" cy="1143000"/>
-          </a:xfrm>
-        </p:spPr>
-        <p:txBody>
-          <a:bodyPr>
-            <a:noAutofit/>
-          </a:bodyPr>
-          <a:lstStyle/>
-          <a:p>
-            <a:pPr algn="l"/>
-            <a:r>
-              <a:rPr lang="en-US" sz="7200" dirty="0" smtClean="0">
-                <a:solidFill>
-                  <a:schemeClr val="bg1"/>
-                </a:solidFill>
-              </a:rPr>
-              <a:t>Custom shape.</a:t>
-            </a:r>
-            <a:endParaRPr lang="en-SG" sz="7200" dirty="0">
-              <a:solidFill>
-                <a:schemeClr val="bg1"/>
-              </a:solidFill>
-            </a:endParaRPr>
-          </a:p>
-        </p:txBody>
-      </p:sp>
-    </p:spTree>
-    <p:extLst>
-      <p:ext uri="{BB962C8B-B14F-4D97-AF65-F5344CB8AC3E}">
-        <p14:creationId xmlns:p14="http://schemas.microsoft.com/office/powerpoint/2010/main" val="1220527465"/>
-      </p:ext>
-    </p:extLst>
-  </p:cSld>
-  <p:clrMapOvr>
-    <a:masterClrMapping/>
-  </p:clrMapOvr>
-  <p:timing>
-    <p:tnLst>
-      <p:par>
-        <p:cTn id="1" dur="indefinite" restart="never" nodeType="tmRoot"/>
-      </p:par>
-    </p:tnLst>
-  </p:timing>
-</p:sld>
-</file>
-
-<file path=ppt/slides/slide20.xml><?xml version="1.0" encoding="utf-8"?>
+<file path=ppt/slides/slide17.xml><?xml version="1.0" encoding="utf-8"?>
 <p:sld xmlns:a="http://schemas.openxmlformats.org/drawingml/2006/main" xmlns:r="http://schemas.openxmlformats.org/officeDocument/2006/relationships" xmlns:p="http://schemas.openxmlformats.org/presentationml/2006/main">
   <p:cSld>
     <p:spTree>
@@ -7381,11 +5752,11 @@
   <p:clrMapOvr>
     <a:masterClrMapping/>
   </p:clrMapOvr>
-  <mc:AlternateContent xmlns:mc="http://schemas.openxmlformats.org/markup-compatibility/2006">
-    <mc:Choice xmlns:p14="http://schemas.microsoft.com/office/powerpoint/2010/main" Requires="p14">
+  <mc:AlternateContent xmlns:mc="http://schemas.openxmlformats.org/markup-compatibility/2006" xmlns:p14="http://schemas.microsoft.com/office/powerpoint/2010/main">
+    <mc:Choice Requires="p14">
       <p:transition spd="slow" p14:dur="2000"/>
     </mc:Choice>
-    <mc:Fallback>
+    <mc:Fallback xmlns="">
       <p:transition spd="slow"/>
     </mc:Fallback>
   </mc:AlternateContent>
@@ -7399,7 +5770,7 @@
 </p:sld>
 </file>
 
-<file path=ppt/slides/slide21.xml><?xml version="1.0" encoding="utf-8"?>
+<file path=ppt/slides/slide18.xml><?xml version="1.0" encoding="utf-8"?>
 <p:sld xmlns:a="http://schemas.openxmlformats.org/drawingml/2006/main" xmlns:r="http://schemas.openxmlformats.org/officeDocument/2006/relationships" xmlns:p="http://schemas.openxmlformats.org/presentationml/2006/main">
   <p:cSld>
     <p:bg>
@@ -7498,7 +5869,7 @@
 </p:sld>
 </file>
 
-<file path=ppt/slides/slide22.xml><?xml version="1.0" encoding="utf-8"?>
+<file path=ppt/slides/slide19.xml><?xml version="1.0" encoding="utf-8"?>
 <p:sld xmlns:a="http://schemas.openxmlformats.org/drawingml/2006/main" xmlns:r="http://schemas.openxmlformats.org/officeDocument/2006/relationships" xmlns:p="http://schemas.openxmlformats.org/presentationml/2006/main">
   <p:cSld>
     <p:spTree>
@@ -9128,9 +7499,17 @@
 </p:sld>
 </file>
 
-<file path=ppt/slides/slide23.xml><?xml version="1.0" encoding="utf-8"?>
+<file path=ppt/slides/slide2.xml><?xml version="1.0" encoding="utf-8"?>
 <p:sld xmlns:a="http://schemas.openxmlformats.org/drawingml/2006/main" xmlns:r="http://schemas.openxmlformats.org/officeDocument/2006/relationships" xmlns:p="http://schemas.openxmlformats.org/presentationml/2006/main">
-  <p:cSld name="PPSlide201311231527219589">
+  <p:cSld>
+    <p:bg>
+      <p:bgPr>
+        <a:solidFill>
+          <a:schemeClr val="tx1"/>
+        </a:solidFill>
+        <a:effectLst/>
+      </p:bgPr>
+    </p:bg>
     <p:spTree>
       <p:nvGrpSpPr>
         <p:cNvPr id="1" name=""/>
@@ -9145,1625 +7524,66 @@
           <a:chExt cx="0" cy="0"/>
         </a:xfrm>
       </p:grpSpPr>
-      <p:grpSp>
-        <p:nvGrpSpPr>
-          <p:cNvPr id="2" name="Group 1"/>
-          <p:cNvGrpSpPr/>
-          <p:nvPr/>
-        </p:nvGrpSpPr>
-        <p:grpSpPr>
+      <p:sp>
+        <p:nvSpPr>
+          <p:cNvPr id="2" name="Title 1"/>
+          <p:cNvSpPr>
+            <a:spLocks noGrp="1"/>
+          </p:cNvSpPr>
+          <p:nvPr>
+            <p:ph type="title"/>
+          </p:nvPr>
+        </p:nvSpPr>
+        <p:spPr>
           <a:xfrm>
-            <a:off x="2819400" y="487680"/>
-            <a:ext cx="3200400" cy="1691640"/>
-            <a:chOff x="2819400" y="487680"/>
-            <a:chExt cx="3200400" cy="1691640"/>
+            <a:off x="533400" y="2819400"/>
+            <a:ext cx="8229600" cy="1143000"/>
           </a:xfrm>
-        </p:grpSpPr>
-        <p:grpSp>
-          <p:nvGrpSpPr>
-            <p:cNvPr id="5" name="Group 4"/>
-            <p:cNvGrpSpPr/>
-            <p:nvPr/>
-          </p:nvGrpSpPr>
-          <p:grpSpPr>
-            <a:xfrm>
-              <a:off x="2819400" y="487680"/>
-              <a:ext cx="3200400" cy="1691640"/>
-              <a:chOff x="2819400" y="487680"/>
-              <a:chExt cx="3200400" cy="1691640"/>
-            </a:xfrm>
-          </p:grpSpPr>
-          <p:sp>
-            <p:nvSpPr>
-              <p:cNvPr id="6" name="Round Same Side Corner Rectangle 5"/>
-              <p:cNvSpPr/>
-              <p:nvPr/>
-            </p:nvSpPr>
-            <p:spPr>
-              <a:xfrm>
-                <a:off x="2819400" y="502920"/>
-                <a:ext cx="3200400" cy="1676400"/>
-              </a:xfrm>
-              <a:prstGeom prst="round2SameRect">
-                <a:avLst/>
-              </a:prstGeom>
-              <a:ln/>
-            </p:spPr>
-            <p:style>
-              <a:lnRef idx="2">
-                <a:schemeClr val="accent6">
-                  <a:shade val="50000"/>
-                </a:schemeClr>
-              </a:lnRef>
-              <a:fillRef idx="1">
-                <a:schemeClr val="accent6"/>
-              </a:fillRef>
-              <a:effectRef idx="0">
-                <a:schemeClr val="accent6"/>
-              </a:effectRef>
-              <a:fontRef idx="minor">
-                <a:schemeClr val="lt1"/>
-              </a:fontRef>
-            </p:style>
-            <p:txBody>
-              <a:bodyPr rtlCol="0" anchor="ctr"/>
-              <a:lstStyle/>
-              <a:p>
-                <a:pPr algn="ctr"/>
-                <a:endParaRPr lang="en-US" sz="2400" dirty="0">
-                  <a:solidFill>
-                    <a:schemeClr val="bg1"/>
-                  </a:solidFill>
-                </a:endParaRPr>
-              </a:p>
-            </p:txBody>
-          </p:sp>
-          <p:sp>
-            <p:nvSpPr>
-              <p:cNvPr id="7" name="TextBox 6"/>
-              <p:cNvSpPr txBox="1"/>
-              <p:nvPr/>
-            </p:nvSpPr>
-            <p:spPr>
-              <a:xfrm>
-                <a:off x="3703320" y="487680"/>
-                <a:ext cx="1661160" cy="461665"/>
-              </a:xfrm>
-              <a:prstGeom prst="rect">
-                <a:avLst/>
-              </a:prstGeom>
-              <a:noFill/>
-              <a:effectLst/>
-            </p:spPr>
-            <p:txBody>
-              <a:bodyPr wrap="square" rtlCol="0">
-                <a:spAutoFit/>
-              </a:bodyPr>
-              <a:lstStyle/>
-              <a:p>
-                <a:r>
-                  <a:rPr lang="en-US" sz="2400" b="1" dirty="0" smtClean="0">
-                    <a:solidFill>
-                      <a:schemeClr val="bg1"/>
-                    </a:solidFill>
-                  </a:rPr>
-                  <a:t>TEST CASE</a:t>
-                </a:r>
-                <a:endParaRPr lang="en-US" sz="2400" b="1" dirty="0">
-                  <a:solidFill>
-                    <a:schemeClr val="bg1"/>
-                  </a:solidFill>
-                </a:endParaRPr>
-              </a:p>
-            </p:txBody>
-          </p:sp>
-        </p:grpSp>
-        <p:sp>
-          <p:nvSpPr>
-            <p:cNvPr id="9" name="TextBox 8"/>
-            <p:cNvSpPr txBox="1"/>
-            <p:nvPr/>
-          </p:nvSpPr>
-          <p:spPr>
-            <a:xfrm>
-              <a:off x="3032761" y="890350"/>
-              <a:ext cx="990599" cy="1038701"/>
-            </a:xfrm>
-            <a:prstGeom prst="ellipse">
-              <a:avLst/>
-            </a:prstGeom>
-            <a:solidFill>
-              <a:schemeClr val="accent6">
-                <a:lumMod val="20000"/>
-                <a:lumOff val="80000"/>
-              </a:schemeClr>
-            </a:solidFill>
-            <a:ln>
+        </p:spPr>
+        <p:txBody>
+          <a:bodyPr>
+            <a:noAutofit/>
+          </a:bodyPr>
+          <a:lstStyle/>
+          <a:p>
+            <a:pPr algn="l"/>
+            <a:r>
+              <a:rPr lang="en-US" sz="7200" dirty="0" smtClean="0">
+                <a:solidFill>
+                  <a:schemeClr val="bg1"/>
+                </a:solidFill>
+              </a:rPr>
+              <a:t>Custom shape.</a:t>
+            </a:r>
+            <a:endParaRPr lang="en-SG" sz="7200" dirty="0">
               <a:solidFill>
-                <a:schemeClr val="accent6">
-                  <a:lumMod val="75000"/>
-                </a:schemeClr>
+                <a:schemeClr val="bg1"/>
               </a:solidFill>
-              <a:prstDash val="sysDash"/>
-            </a:ln>
-          </p:spPr>
-          <p:style>
-            <a:lnRef idx="2">
-              <a:schemeClr val="accent5"/>
-            </a:lnRef>
-            <a:fillRef idx="1">
-              <a:schemeClr val="lt1"/>
-            </a:fillRef>
-            <a:effectRef idx="0">
-              <a:schemeClr val="accent5"/>
-            </a:effectRef>
-            <a:fontRef idx="minor">
-              <a:schemeClr val="dk1"/>
-            </a:fontRef>
-          </p:style>
-          <p:txBody>
-            <a:bodyPr wrap="square" lIns="0" tIns="0" rIns="0" bIns="0" rtlCol="0">
-              <a:spAutoFit/>
-            </a:bodyPr>
-            <a:lstStyle/>
-            <a:p>
-              <a:pPr algn="ctr"/>
-              <a:r>
-                <a:rPr lang="en-US" sz="2400" dirty="0" smtClean="0"/>
-                <a:t>test input</a:t>
-              </a:r>
-              <a:endParaRPr lang="en-US" sz="2400" dirty="0"/>
-            </a:p>
-          </p:txBody>
-        </p:sp>
-        <p:sp>
-          <p:nvSpPr>
-            <p:cNvPr id="12" name="TextBox 11"/>
-            <p:cNvSpPr txBox="1"/>
-            <p:nvPr/>
-          </p:nvSpPr>
-          <p:spPr>
-            <a:xfrm>
-              <a:off x="4191000" y="920830"/>
-              <a:ext cx="1706880" cy="1038701"/>
-            </a:xfrm>
-            <a:prstGeom prst="ellipse">
-              <a:avLst/>
-            </a:prstGeom>
-            <a:solidFill>
-              <a:schemeClr val="accent6">
-                <a:lumMod val="20000"/>
-                <a:lumOff val="80000"/>
-              </a:schemeClr>
-            </a:solidFill>
-            <a:ln>
-              <a:solidFill>
-                <a:schemeClr val="accent6">
-                  <a:lumMod val="75000"/>
-                </a:schemeClr>
-              </a:solidFill>
-              <a:prstDash val="sysDash"/>
-            </a:ln>
-          </p:spPr>
-          <p:style>
-            <a:lnRef idx="2">
-              <a:schemeClr val="accent5"/>
-            </a:lnRef>
-            <a:fillRef idx="1">
-              <a:schemeClr val="lt1"/>
-            </a:fillRef>
-            <a:effectRef idx="0">
-              <a:schemeClr val="accent5"/>
-            </a:effectRef>
-            <a:fontRef idx="minor">
-              <a:schemeClr val="dk1"/>
-            </a:fontRef>
-          </p:style>
-          <p:txBody>
-            <a:bodyPr wrap="square" lIns="0" tIns="0" rIns="0" bIns="0" rtlCol="0">
-              <a:spAutoFit/>
-            </a:bodyPr>
-            <a:lstStyle/>
-            <a:p>
-              <a:pPr algn="ctr"/>
-              <a:r>
-                <a:rPr lang="en-US" sz="2400" dirty="0" smtClean="0"/>
-                <a:t>expected output</a:t>
-              </a:r>
-              <a:endParaRPr lang="en-US" sz="2400" dirty="0"/>
-            </a:p>
-          </p:txBody>
-        </p:sp>
-      </p:grpSp>
-      <p:grpSp>
-        <p:nvGrpSpPr>
-          <p:cNvPr id="18" name="Group 17"/>
-          <p:cNvGrpSpPr/>
-          <p:nvPr/>
-        </p:nvGrpSpPr>
-        <p:grpSpPr>
-          <a:xfrm>
-            <a:off x="350520" y="290668"/>
-            <a:ext cx="2072640" cy="1158240"/>
-            <a:chOff x="350520" y="290668"/>
-            <a:chExt cx="2072640" cy="1158240"/>
-          </a:xfrm>
-        </p:grpSpPr>
-        <p:grpSp>
-          <p:nvGrpSpPr>
-            <p:cNvPr id="19" name="Group 18"/>
-            <p:cNvGrpSpPr/>
-            <p:nvPr/>
-          </p:nvGrpSpPr>
-          <p:grpSpPr>
-            <a:xfrm>
-              <a:off x="350520" y="290668"/>
-              <a:ext cx="2072640" cy="1158240"/>
-              <a:chOff x="243840" y="883920"/>
-              <a:chExt cx="2072640" cy="1158240"/>
-            </a:xfrm>
-          </p:grpSpPr>
-          <p:sp>
-            <p:nvSpPr>
-              <p:cNvPr id="21" name="Round Same Side Corner Rectangle 20"/>
-              <p:cNvSpPr/>
-              <p:nvPr/>
-            </p:nvSpPr>
-            <p:spPr>
-              <a:xfrm>
-                <a:off x="1005840" y="883920"/>
-                <a:ext cx="1310640" cy="533400"/>
-              </a:xfrm>
-              <a:prstGeom prst="round2SameRect">
-                <a:avLst/>
-              </a:prstGeom>
-              <a:ln/>
-            </p:spPr>
-            <p:style>
-              <a:lnRef idx="2">
-                <a:schemeClr val="accent6">
-                  <a:shade val="50000"/>
-                </a:schemeClr>
-              </a:lnRef>
-              <a:fillRef idx="1">
-                <a:schemeClr val="accent6"/>
-              </a:fillRef>
-              <a:effectRef idx="0">
-                <a:schemeClr val="accent6"/>
-              </a:effectRef>
-              <a:fontRef idx="minor">
-                <a:schemeClr val="lt1"/>
-              </a:fontRef>
-            </p:style>
-            <p:txBody>
-              <a:bodyPr rtlCol="0" anchor="ctr"/>
-              <a:lstStyle/>
-              <a:p>
-                <a:pPr algn="ctr"/>
-                <a:endParaRPr lang="en-US" sz="2400" dirty="0"/>
-              </a:p>
-            </p:txBody>
-          </p:sp>
-          <p:sp>
-            <p:nvSpPr>
-              <p:cNvPr id="22" name="Round Same Side Corner Rectangle 21"/>
-              <p:cNvSpPr/>
-              <p:nvPr/>
-            </p:nvSpPr>
-            <p:spPr>
-              <a:xfrm>
-                <a:off x="899160" y="973183"/>
-                <a:ext cx="1310640" cy="533400"/>
-              </a:xfrm>
-              <a:prstGeom prst="round2SameRect">
-                <a:avLst/>
-              </a:prstGeom>
-              <a:ln/>
-            </p:spPr>
-            <p:style>
-              <a:lnRef idx="2">
-                <a:schemeClr val="accent6">
-                  <a:shade val="50000"/>
-                </a:schemeClr>
-              </a:lnRef>
-              <a:fillRef idx="1">
-                <a:schemeClr val="accent6"/>
-              </a:fillRef>
-              <a:effectRef idx="0">
-                <a:schemeClr val="accent6"/>
-              </a:effectRef>
-              <a:fontRef idx="minor">
-                <a:schemeClr val="lt1"/>
-              </a:fontRef>
-            </p:style>
-            <p:txBody>
-              <a:bodyPr rtlCol="0" anchor="ctr"/>
-              <a:lstStyle/>
-              <a:p>
-                <a:pPr algn="ctr"/>
-                <a:endParaRPr lang="en-US" sz="2400" dirty="0"/>
-              </a:p>
-            </p:txBody>
-          </p:sp>
-          <p:sp>
-            <p:nvSpPr>
-              <p:cNvPr id="23" name="Round Same Side Corner Rectangle 22"/>
-              <p:cNvSpPr/>
-              <p:nvPr/>
-            </p:nvSpPr>
-            <p:spPr>
-              <a:xfrm>
-                <a:off x="792480" y="1062446"/>
-                <a:ext cx="1310640" cy="533400"/>
-              </a:xfrm>
-              <a:prstGeom prst="round2SameRect">
-                <a:avLst/>
-              </a:prstGeom>
-              <a:ln/>
-            </p:spPr>
-            <p:style>
-              <a:lnRef idx="2">
-                <a:schemeClr val="accent6">
-                  <a:shade val="50000"/>
-                </a:schemeClr>
-              </a:lnRef>
-              <a:fillRef idx="1">
-                <a:schemeClr val="accent6"/>
-              </a:fillRef>
-              <a:effectRef idx="0">
-                <a:schemeClr val="accent6"/>
-              </a:effectRef>
-              <a:fontRef idx="minor">
-                <a:schemeClr val="lt1"/>
-              </a:fontRef>
-            </p:style>
-            <p:txBody>
-              <a:bodyPr rtlCol="0" anchor="ctr"/>
-              <a:lstStyle/>
-              <a:p>
-                <a:pPr algn="ctr"/>
-                <a:endParaRPr lang="en-US" sz="2400" dirty="0"/>
-              </a:p>
-            </p:txBody>
-          </p:sp>
-          <p:sp>
-            <p:nvSpPr>
-              <p:cNvPr id="24" name="Round Same Side Corner Rectangle 23"/>
-              <p:cNvSpPr/>
-              <p:nvPr/>
-            </p:nvSpPr>
-            <p:spPr>
-              <a:xfrm>
-                <a:off x="670560" y="1151709"/>
-                <a:ext cx="1310640" cy="533400"/>
-              </a:xfrm>
-              <a:prstGeom prst="round2SameRect">
-                <a:avLst/>
-              </a:prstGeom>
-              <a:ln/>
-            </p:spPr>
-            <p:style>
-              <a:lnRef idx="2">
-                <a:schemeClr val="accent6">
-                  <a:shade val="50000"/>
-                </a:schemeClr>
-              </a:lnRef>
-              <a:fillRef idx="1">
-                <a:schemeClr val="accent6"/>
-              </a:fillRef>
-              <a:effectRef idx="0">
-                <a:schemeClr val="accent6"/>
-              </a:effectRef>
-              <a:fontRef idx="minor">
-                <a:schemeClr val="lt1"/>
-              </a:fontRef>
-            </p:style>
-            <p:txBody>
-              <a:bodyPr rtlCol="0" anchor="ctr"/>
-              <a:lstStyle/>
-              <a:p>
-                <a:pPr algn="ctr"/>
-                <a:endParaRPr lang="en-US" sz="2400" dirty="0"/>
-              </a:p>
-            </p:txBody>
-          </p:sp>
-          <p:sp>
-            <p:nvSpPr>
-              <p:cNvPr id="25" name="Round Same Side Corner Rectangle 24"/>
-              <p:cNvSpPr/>
-              <p:nvPr/>
-            </p:nvSpPr>
-            <p:spPr>
-              <a:xfrm>
-                <a:off x="579120" y="1240972"/>
-                <a:ext cx="1310640" cy="533400"/>
-              </a:xfrm>
-              <a:prstGeom prst="round2SameRect">
-                <a:avLst/>
-              </a:prstGeom>
-              <a:ln/>
-            </p:spPr>
-            <p:style>
-              <a:lnRef idx="2">
-                <a:schemeClr val="accent6">
-                  <a:shade val="50000"/>
-                </a:schemeClr>
-              </a:lnRef>
-              <a:fillRef idx="1">
-                <a:schemeClr val="accent6"/>
-              </a:fillRef>
-              <a:effectRef idx="0">
-                <a:schemeClr val="accent6"/>
-              </a:effectRef>
-              <a:fontRef idx="minor">
-                <a:schemeClr val="lt1"/>
-              </a:fontRef>
-            </p:style>
-            <p:txBody>
-              <a:bodyPr rtlCol="0" anchor="ctr"/>
-              <a:lstStyle/>
-              <a:p>
-                <a:pPr algn="ctr"/>
-                <a:endParaRPr lang="en-US" sz="2400" dirty="0"/>
-              </a:p>
-            </p:txBody>
-          </p:sp>
-          <p:sp>
-            <p:nvSpPr>
-              <p:cNvPr id="26" name="Round Same Side Corner Rectangle 25"/>
-              <p:cNvSpPr/>
-              <p:nvPr/>
-            </p:nvSpPr>
-            <p:spPr>
-              <a:xfrm>
-                <a:off x="472440" y="1330235"/>
-                <a:ext cx="1310640" cy="533400"/>
-              </a:xfrm>
-              <a:prstGeom prst="round2SameRect">
-                <a:avLst/>
-              </a:prstGeom>
-              <a:ln/>
-            </p:spPr>
-            <p:style>
-              <a:lnRef idx="2">
-                <a:schemeClr val="accent6">
-                  <a:shade val="50000"/>
-                </a:schemeClr>
-              </a:lnRef>
-              <a:fillRef idx="1">
-                <a:schemeClr val="accent6"/>
-              </a:fillRef>
-              <a:effectRef idx="0">
-                <a:schemeClr val="accent6"/>
-              </a:effectRef>
-              <a:fontRef idx="minor">
-                <a:schemeClr val="lt1"/>
-              </a:fontRef>
-            </p:style>
-            <p:txBody>
-              <a:bodyPr rtlCol="0" anchor="ctr"/>
-              <a:lstStyle/>
-              <a:p>
-                <a:pPr algn="ctr"/>
-                <a:endParaRPr lang="en-US" sz="2400" dirty="0"/>
-              </a:p>
-            </p:txBody>
-          </p:sp>
-          <p:sp>
-            <p:nvSpPr>
-              <p:cNvPr id="27" name="Round Same Side Corner Rectangle 26"/>
-              <p:cNvSpPr/>
-              <p:nvPr/>
-            </p:nvSpPr>
-            <p:spPr>
-              <a:xfrm>
-                <a:off x="365760" y="1419498"/>
-                <a:ext cx="1310640" cy="533400"/>
-              </a:xfrm>
-              <a:prstGeom prst="round2SameRect">
-                <a:avLst/>
-              </a:prstGeom>
-              <a:ln/>
-            </p:spPr>
-            <p:style>
-              <a:lnRef idx="2">
-                <a:schemeClr val="accent6">
-                  <a:shade val="50000"/>
-                </a:schemeClr>
-              </a:lnRef>
-              <a:fillRef idx="1">
-                <a:schemeClr val="accent6"/>
-              </a:fillRef>
-              <a:effectRef idx="0">
-                <a:schemeClr val="accent6"/>
-              </a:effectRef>
-              <a:fontRef idx="minor">
-                <a:schemeClr val="lt1"/>
-              </a:fontRef>
-            </p:style>
-            <p:txBody>
-              <a:bodyPr rtlCol="0" anchor="ctr"/>
-              <a:lstStyle/>
-              <a:p>
-                <a:pPr algn="ctr"/>
-                <a:endParaRPr lang="en-US" sz="2400" dirty="0"/>
-              </a:p>
-            </p:txBody>
-          </p:sp>
-          <p:sp>
-            <p:nvSpPr>
-              <p:cNvPr id="28" name="Round Same Side Corner Rectangle 27"/>
-              <p:cNvSpPr/>
-              <p:nvPr/>
-            </p:nvSpPr>
-            <p:spPr>
-              <a:xfrm>
-                <a:off x="243840" y="1508760"/>
-                <a:ext cx="1310640" cy="533400"/>
-              </a:xfrm>
-              <a:prstGeom prst="round2SameRect">
-                <a:avLst/>
-              </a:prstGeom>
-              <a:ln/>
-            </p:spPr>
-            <p:style>
-              <a:lnRef idx="2">
-                <a:schemeClr val="accent6">
-                  <a:shade val="50000"/>
-                </a:schemeClr>
-              </a:lnRef>
-              <a:fillRef idx="1">
-                <a:schemeClr val="accent6"/>
-              </a:fillRef>
-              <a:effectRef idx="0">
-                <a:schemeClr val="accent6"/>
-              </a:effectRef>
-              <a:fontRef idx="minor">
-                <a:schemeClr val="lt1"/>
-              </a:fontRef>
-            </p:style>
-            <p:txBody>
-              <a:bodyPr rtlCol="0" anchor="ctr"/>
-              <a:lstStyle/>
-              <a:p>
-                <a:pPr algn="ctr"/>
-                <a:endParaRPr lang="en-US" sz="2400" dirty="0"/>
-              </a:p>
-            </p:txBody>
-          </p:sp>
-        </p:grpSp>
-        <p:sp>
-          <p:nvSpPr>
-            <p:cNvPr id="20" name="TextBox 19"/>
-            <p:cNvSpPr txBox="1"/>
-            <p:nvPr/>
-          </p:nvSpPr>
-          <p:spPr>
-            <a:xfrm rot="19139246">
-              <a:off x="457200" y="443069"/>
-              <a:ext cx="1661160" cy="830997"/>
-            </a:xfrm>
-            <a:prstGeom prst="rect">
-              <a:avLst/>
-            </a:prstGeom>
-            <a:noFill/>
-            <a:effectLst/>
-          </p:spPr>
-          <p:txBody>
-            <a:bodyPr wrap="square" rtlCol="0">
-              <a:spAutoFit/>
-            </a:bodyPr>
-            <a:lstStyle/>
-            <a:p>
-              <a:r>
-                <a:rPr lang="en-US" sz="2400" b="1" dirty="0" smtClean="0">
-                  <a:solidFill>
-                    <a:schemeClr val="bg1"/>
-                  </a:solidFill>
-                  <a:effectLst>
-                    <a:outerShdw blurRad="50800" dist="38100" dir="2700000" algn="tl" rotWithShape="0">
-                      <a:prstClr val="black">
-                        <a:alpha val="40000"/>
-                      </a:prstClr>
-                    </a:outerShdw>
-                  </a:effectLst>
-                </a:rPr>
-                <a:t>other test  </a:t>
-              </a:r>
-              <a:br>
-                <a:rPr lang="en-US" sz="2400" b="1" dirty="0" smtClean="0">
-                  <a:solidFill>
-                    <a:schemeClr val="bg1"/>
-                  </a:solidFill>
-                  <a:effectLst>
-                    <a:outerShdw blurRad="50800" dist="38100" dir="2700000" algn="tl" rotWithShape="0">
-                      <a:prstClr val="black">
-                        <a:alpha val="40000"/>
-                      </a:prstClr>
-                    </a:outerShdw>
-                  </a:effectLst>
-                </a:rPr>
-              </a:br>
-              <a:r>
-                <a:rPr lang="en-US" sz="2400" b="1" dirty="0" smtClean="0">
-                  <a:solidFill>
-                    <a:schemeClr val="bg1"/>
-                  </a:solidFill>
-                  <a:effectLst>
-                    <a:outerShdw blurRad="50800" dist="38100" dir="2700000" algn="tl" rotWithShape="0">
-                      <a:prstClr val="black">
-                        <a:alpha val="40000"/>
-                      </a:prstClr>
-                    </a:outerShdw>
-                  </a:effectLst>
-                </a:rPr>
-                <a:t>     cases</a:t>
-              </a:r>
-              <a:endParaRPr lang="en-US" sz="2400" b="1" dirty="0">
-                <a:solidFill>
-                  <a:schemeClr val="bg1"/>
-                </a:solidFill>
-                <a:effectLst>
-                  <a:outerShdw blurRad="50800" dist="38100" dir="2700000" algn="tl" rotWithShape="0">
-                    <a:prstClr val="black">
-                      <a:alpha val="40000"/>
-                    </a:prstClr>
-                  </a:outerShdw>
-                </a:effectLst>
-              </a:endParaRPr>
-            </a:p>
-          </p:txBody>
-        </p:sp>
-      </p:grpSp>
-      <p:grpSp>
-        <p:nvGrpSpPr>
-          <p:cNvPr id="3" name="Group 2"/>
-          <p:cNvGrpSpPr/>
-          <p:nvPr/>
-        </p:nvGrpSpPr>
-        <p:grpSpPr>
-          <a:xfrm>
-            <a:off x="710096" y="1649730"/>
-            <a:ext cx="8129104" cy="4796790"/>
-            <a:chOff x="710096" y="1649730"/>
-            <a:chExt cx="8129104" cy="4796790"/>
-          </a:xfrm>
-        </p:grpSpPr>
-        <p:pic>
-          <p:nvPicPr>
-            <p:cNvPr id="4" name="Picture 2" descr="C:\Users\dcsdcr\AppData\Local\Microsoft\Windows\Temporary Internet Files\Content.IE5\R75RNP6F\MC900331922[1].wmf"/>
-            <p:cNvPicPr>
-              <a:picLocks noChangeAspect="1" noChangeArrowheads="1"/>
-            </p:cNvPicPr>
-            <p:nvPr/>
-          </p:nvPicPr>
-          <p:blipFill>
-            <a:blip r:embed="rId2" cstate="print"/>
-            <a:srcRect/>
-            <a:stretch>
-              <a:fillRect/>
-            </a:stretch>
-          </p:blipFill>
-          <p:spPr bwMode="auto">
-            <a:xfrm rot="16906643">
-              <a:off x="4347305" y="4300713"/>
-              <a:ext cx="1324612" cy="1297716"/>
-            </a:xfrm>
-            <a:prstGeom prst="rect">
-              <a:avLst/>
-            </a:prstGeom>
-            <a:noFill/>
-          </p:spPr>
-        </p:pic>
-        <p:sp>
-          <p:nvSpPr>
-            <p:cNvPr id="8" name="Cube 7"/>
-            <p:cNvSpPr/>
-            <p:nvPr/>
-          </p:nvSpPr>
-          <p:spPr>
-            <a:xfrm>
-              <a:off x="2087880" y="2682240"/>
-              <a:ext cx="1767840" cy="1371600"/>
-            </a:xfrm>
-            <a:prstGeom prst="cube">
-              <a:avLst>
-                <a:gd name="adj" fmla="val 14412"/>
-              </a:avLst>
-            </a:prstGeom>
-            <a:ln/>
-          </p:spPr>
-          <p:style>
-            <a:lnRef idx="2">
-              <a:schemeClr val="accent2">
-                <a:shade val="50000"/>
-              </a:schemeClr>
-            </a:lnRef>
-            <a:fillRef idx="1">
-              <a:schemeClr val="accent2"/>
-            </a:fillRef>
-            <a:effectRef idx="0">
-              <a:schemeClr val="accent2"/>
-            </a:effectRef>
-            <a:fontRef idx="minor">
-              <a:schemeClr val="lt1"/>
-            </a:fontRef>
-          </p:style>
-          <p:txBody>
-            <a:bodyPr wrap="square" lIns="0" tIns="0" rIns="0" bIns="0" rtlCol="0">
-              <a:noAutofit/>
-            </a:bodyPr>
-            <a:lstStyle/>
-            <a:p>
-              <a:pPr algn="ctr"/>
-              <a:r>
-                <a:rPr lang="en-US" sz="2400" dirty="0" smtClean="0">
-                  <a:solidFill>
-                    <a:schemeClr val="bg1"/>
-                  </a:solidFill>
-                </a:rPr>
-                <a:t>Software Under Test (SUT)</a:t>
-              </a:r>
-              <a:endParaRPr lang="en-US" sz="2400" dirty="0">
-                <a:solidFill>
-                  <a:schemeClr val="bg1"/>
-                </a:solidFill>
-              </a:endParaRPr>
-            </a:p>
-          </p:txBody>
-        </p:sp>
-        <p:sp>
-          <p:nvSpPr>
-            <p:cNvPr id="10" name="TextBox 9"/>
-            <p:cNvSpPr txBox="1"/>
-            <p:nvPr/>
-          </p:nvSpPr>
-          <p:spPr>
-            <a:xfrm>
-              <a:off x="4328161" y="2825830"/>
-              <a:ext cx="1630679" cy="1038701"/>
-            </a:xfrm>
-            <a:prstGeom prst="ellipse">
-              <a:avLst/>
-            </a:prstGeom>
-            <a:solidFill>
-              <a:schemeClr val="accent4">
-                <a:lumMod val="20000"/>
-                <a:lumOff val="80000"/>
-              </a:schemeClr>
-            </a:solidFill>
-            <a:ln>
-              <a:solidFill>
-                <a:schemeClr val="accent4">
-                  <a:lumMod val="60000"/>
-                  <a:lumOff val="40000"/>
-                </a:schemeClr>
-              </a:solidFill>
-            </a:ln>
-          </p:spPr>
-          <p:style>
-            <a:lnRef idx="2">
-              <a:schemeClr val="accent5"/>
-            </a:lnRef>
-            <a:fillRef idx="1">
-              <a:schemeClr val="lt1"/>
-            </a:fillRef>
-            <a:effectRef idx="0">
-              <a:schemeClr val="accent5"/>
-            </a:effectRef>
-            <a:fontRef idx="minor">
-              <a:schemeClr val="dk1"/>
-            </a:fontRef>
-          </p:style>
-          <p:txBody>
-            <a:bodyPr wrap="square" lIns="0" tIns="0" rIns="0" bIns="0" rtlCol="0">
-              <a:spAutoFit/>
-            </a:bodyPr>
-            <a:lstStyle/>
-            <a:p>
-              <a:pPr algn="ctr"/>
-              <a:r>
-                <a:rPr lang="en-US" sz="2400" dirty="0" smtClean="0"/>
-                <a:t>actual output</a:t>
-              </a:r>
-              <a:endParaRPr lang="en-US" sz="2400" dirty="0"/>
-            </a:p>
-          </p:txBody>
-        </p:sp>
-        <p:cxnSp>
-          <p:nvCxnSpPr>
-            <p:cNvPr id="11" name="Straight Arrow Connector 10"/>
-            <p:cNvCxnSpPr/>
-            <p:nvPr/>
-          </p:nvCxnSpPr>
-          <p:spPr>
-            <a:xfrm>
-              <a:off x="3901440" y="3352801"/>
-              <a:ext cx="365760" cy="1587"/>
-            </a:xfrm>
-            <a:prstGeom prst="straightConnector1">
-              <a:avLst/>
-            </a:prstGeom>
-            <a:ln w="38100">
-              <a:solidFill>
-                <a:schemeClr val="accent6">
-                  <a:lumMod val="60000"/>
-                  <a:lumOff val="40000"/>
-                </a:schemeClr>
-              </a:solidFill>
-              <a:tailEnd type="arrow"/>
-            </a:ln>
-          </p:spPr>
-          <p:style>
-            <a:lnRef idx="1">
-              <a:schemeClr val="accent1"/>
-            </a:lnRef>
-            <a:fillRef idx="0">
-              <a:schemeClr val="accent1"/>
-            </a:fillRef>
-            <a:effectRef idx="0">
-              <a:schemeClr val="accent1"/>
-            </a:effectRef>
-            <a:fontRef idx="minor">
-              <a:schemeClr val="tx1"/>
-            </a:fontRef>
-          </p:style>
-        </p:cxnSp>
-        <p:sp>
-          <p:nvSpPr>
-            <p:cNvPr id="13" name="Down Arrow 12"/>
-            <p:cNvSpPr/>
-            <p:nvPr/>
-          </p:nvSpPr>
-          <p:spPr>
-            <a:xfrm rot="16200000">
-              <a:off x="5764530" y="1520190"/>
-              <a:ext cx="800100" cy="1706880"/>
-            </a:xfrm>
-            <a:prstGeom prst="downArrow">
-              <a:avLst>
-                <a:gd name="adj1" fmla="val 82000"/>
-                <a:gd name="adj2" fmla="val 26000"/>
-              </a:avLst>
-            </a:prstGeom>
-            <a:ln/>
-          </p:spPr>
-          <p:style>
-            <a:lnRef idx="2">
-              <a:schemeClr val="accent4">
-                <a:shade val="50000"/>
-              </a:schemeClr>
-            </a:lnRef>
-            <a:fillRef idx="1">
-              <a:schemeClr val="accent4"/>
-            </a:fillRef>
-            <a:effectRef idx="0">
-              <a:schemeClr val="accent4"/>
-            </a:effectRef>
-            <a:fontRef idx="minor">
-              <a:schemeClr val="lt1"/>
-            </a:fontRef>
-          </p:style>
-          <p:txBody>
-            <a:bodyPr vert="vert" rtlCol="0" anchor="ctr"/>
-            <a:lstStyle/>
-            <a:p>
-              <a:pPr algn="ctr"/>
-              <a:r>
-                <a:rPr lang="en-US" sz="2400" dirty="0" smtClean="0"/>
-                <a:t>Compare</a:t>
-              </a:r>
-              <a:endParaRPr lang="en-SG" sz="2400" dirty="0"/>
-            </a:p>
-          </p:txBody>
-        </p:sp>
-        <p:sp>
-          <p:nvSpPr>
-            <p:cNvPr id="14" name="Down Arrow 13"/>
-            <p:cNvSpPr/>
-            <p:nvPr/>
-          </p:nvSpPr>
-          <p:spPr>
-            <a:xfrm rot="1024353">
-              <a:off x="7572314" y="3343357"/>
-              <a:ext cx="822962" cy="1663118"/>
-            </a:xfrm>
-            <a:prstGeom prst="downArrow">
-              <a:avLst>
-                <a:gd name="adj1" fmla="val 82000"/>
-                <a:gd name="adj2" fmla="val 26000"/>
-              </a:avLst>
-            </a:prstGeom>
-            <a:ln/>
-          </p:spPr>
-          <p:style>
-            <a:lnRef idx="2">
-              <a:schemeClr val="accent4">
-                <a:shade val="50000"/>
-              </a:schemeClr>
-            </a:lnRef>
-            <a:fillRef idx="1">
-              <a:schemeClr val="accent4"/>
-            </a:fillRef>
-            <a:effectRef idx="0">
-              <a:schemeClr val="accent4"/>
-            </a:effectRef>
-            <a:fontRef idx="minor">
-              <a:schemeClr val="lt1"/>
-            </a:fontRef>
-          </p:style>
-          <p:txBody>
-            <a:bodyPr vert="vert270" rtlCol="0" anchor="ctr"/>
-            <a:lstStyle/>
-            <a:p>
-              <a:pPr algn="ctr"/>
-              <a:r>
-                <a:rPr lang="en-US" sz="2400" dirty="0" smtClean="0"/>
-                <a:t>Locate bug</a:t>
-              </a:r>
-              <a:endParaRPr lang="en-SG" sz="2400" dirty="0"/>
-            </a:p>
-          </p:txBody>
-        </p:sp>
-        <p:sp>
-          <p:nvSpPr>
-            <p:cNvPr id="15" name="Down Arrow 14"/>
-            <p:cNvSpPr/>
-            <p:nvPr/>
-          </p:nvSpPr>
-          <p:spPr>
-            <a:xfrm rot="7338608">
-              <a:off x="4759162" y="3888609"/>
-              <a:ext cx="836973" cy="1996315"/>
-            </a:xfrm>
-            <a:prstGeom prst="downArrow">
-              <a:avLst>
-                <a:gd name="adj1" fmla="val 82000"/>
-                <a:gd name="adj2" fmla="val 26000"/>
-              </a:avLst>
-            </a:prstGeom>
-            <a:ln/>
-          </p:spPr>
-          <p:style>
-            <a:lnRef idx="2">
-              <a:schemeClr val="accent4">
-                <a:shade val="50000"/>
-              </a:schemeClr>
-            </a:lnRef>
-            <a:fillRef idx="1">
-              <a:schemeClr val="accent4"/>
-            </a:fillRef>
-            <a:effectRef idx="0">
-              <a:schemeClr val="accent4"/>
-            </a:effectRef>
-            <a:fontRef idx="minor">
-              <a:schemeClr val="lt1"/>
-            </a:fontRef>
-          </p:style>
-          <p:txBody>
-            <a:bodyPr vert="vert270" rtlCol="0" anchor="ctr"/>
-            <a:lstStyle/>
-            <a:p>
-              <a:pPr algn="ctr"/>
-              <a:r>
-                <a:rPr lang="en-US" sz="2400" dirty="0" smtClean="0"/>
-                <a:t>modify</a:t>
-              </a:r>
-              <a:endParaRPr lang="en-SG" sz="2400" dirty="0"/>
-            </a:p>
-          </p:txBody>
-        </p:sp>
-        <p:cxnSp>
-          <p:nvCxnSpPr>
-            <p:cNvPr id="16" name="Straight Arrow Connector 15"/>
-            <p:cNvCxnSpPr/>
-            <p:nvPr/>
-          </p:nvCxnSpPr>
-          <p:spPr>
-            <a:xfrm rot="5400000">
-              <a:off x="4701540" y="2385060"/>
-              <a:ext cx="777240" cy="1588"/>
-            </a:xfrm>
-            <a:prstGeom prst="straightConnector1">
-              <a:avLst/>
-            </a:prstGeom>
-            <a:ln w="38100">
-              <a:solidFill>
-                <a:schemeClr val="accent4">
-                  <a:lumMod val="60000"/>
-                  <a:lumOff val="40000"/>
-                </a:schemeClr>
-              </a:solidFill>
-              <a:headEnd type="arrow"/>
-              <a:tailEnd type="arrow"/>
-            </a:ln>
-          </p:spPr>
-          <p:style>
-            <a:lnRef idx="1">
-              <a:schemeClr val="accent1"/>
-            </a:lnRef>
-            <a:fillRef idx="0">
-              <a:schemeClr val="accent1"/>
-            </a:fillRef>
-            <a:effectRef idx="0">
-              <a:schemeClr val="accent1"/>
-            </a:effectRef>
-            <a:fontRef idx="minor">
-              <a:schemeClr val="tx1"/>
-            </a:fontRef>
-          </p:style>
-        </p:cxnSp>
-        <p:cxnSp>
-          <p:nvCxnSpPr>
-            <p:cNvPr id="17" name="Straight Arrow Connector 16"/>
-            <p:cNvCxnSpPr/>
-            <p:nvPr/>
-          </p:nvCxnSpPr>
-          <p:spPr>
-            <a:xfrm>
-              <a:off x="3504406" y="1929051"/>
-              <a:ext cx="0" cy="784463"/>
-            </a:xfrm>
-            <a:prstGeom prst="straightConnector1">
-              <a:avLst/>
-            </a:prstGeom>
-            <a:ln w="38100">
-              <a:solidFill>
-                <a:schemeClr val="accent6">
-                  <a:lumMod val="60000"/>
-                  <a:lumOff val="40000"/>
-                </a:schemeClr>
-              </a:solidFill>
-              <a:tailEnd type="arrow"/>
-            </a:ln>
-          </p:spPr>
-          <p:style>
-            <a:lnRef idx="1">
-              <a:schemeClr val="accent1"/>
-            </a:lnRef>
-            <a:fillRef idx="0">
-              <a:schemeClr val="accent1"/>
-            </a:fillRef>
-            <a:effectRef idx="0">
-              <a:schemeClr val="accent1"/>
-            </a:effectRef>
-            <a:fontRef idx="minor">
-              <a:schemeClr val="tx1"/>
-            </a:fontRef>
-          </p:style>
-        </p:cxnSp>
-        <p:sp>
-          <p:nvSpPr>
-            <p:cNvPr id="29" name="Down Arrow 28"/>
-            <p:cNvSpPr/>
-            <p:nvPr/>
-          </p:nvSpPr>
-          <p:spPr>
-            <a:xfrm rot="19285858">
-              <a:off x="710096" y="1649730"/>
-              <a:ext cx="1028700" cy="1706880"/>
-            </a:xfrm>
-            <a:prstGeom prst="downArrow">
-              <a:avLst>
-                <a:gd name="adj1" fmla="val 82000"/>
-                <a:gd name="adj2" fmla="val 26000"/>
-              </a:avLst>
-            </a:prstGeom>
-            <a:solidFill>
-              <a:srgbClr val="FFFF99"/>
-            </a:solidFill>
-            <a:ln>
-              <a:solidFill>
-                <a:schemeClr val="tx1"/>
-              </a:solidFill>
-            </a:ln>
-          </p:spPr>
-          <p:style>
-            <a:lnRef idx="3">
-              <a:schemeClr val="lt1"/>
-            </a:lnRef>
-            <a:fillRef idx="1">
-              <a:schemeClr val="accent4"/>
-            </a:fillRef>
-            <a:effectRef idx="1">
-              <a:schemeClr val="accent4"/>
-            </a:effectRef>
-            <a:fontRef idx="minor">
-              <a:schemeClr val="lt1"/>
-            </a:fontRef>
-          </p:style>
-          <p:txBody>
-            <a:bodyPr vert="vert" rtlCol="0" anchor="ctr"/>
-            <a:lstStyle/>
-            <a:p>
-              <a:pPr algn="ctr"/>
-              <a:r>
-                <a:rPr lang="en-US" sz="2400" b="1" dirty="0" smtClean="0">
-                  <a:solidFill>
-                    <a:srgbClr val="C00000"/>
-                  </a:solidFill>
-                </a:rPr>
-                <a:t>Regression test</a:t>
-              </a:r>
-              <a:endParaRPr lang="en-SG" sz="2400" b="1" dirty="0" smtClean="0">
-                <a:solidFill>
-                  <a:srgbClr val="C00000"/>
-                </a:solidFill>
-              </a:endParaRPr>
-            </a:p>
-          </p:txBody>
-        </p:sp>
-        <p:grpSp>
-          <p:nvGrpSpPr>
-            <p:cNvPr id="30" name="Group 29"/>
-            <p:cNvGrpSpPr/>
-            <p:nvPr/>
-          </p:nvGrpSpPr>
-          <p:grpSpPr>
-            <a:xfrm>
-              <a:off x="7086600" y="1737360"/>
-              <a:ext cx="1752600" cy="1371600"/>
-              <a:chOff x="7086600" y="1737360"/>
-              <a:chExt cx="1752600" cy="1371600"/>
-            </a:xfrm>
-          </p:grpSpPr>
-          <p:sp>
-            <p:nvSpPr>
-              <p:cNvPr id="31" name="Rounded Rectangle 30"/>
-              <p:cNvSpPr/>
-              <p:nvPr/>
-            </p:nvSpPr>
-            <p:spPr>
-              <a:xfrm>
-                <a:off x="7086600" y="1737360"/>
-                <a:ext cx="1722120" cy="1371600"/>
-              </a:xfrm>
-              <a:prstGeom prst="roundRect">
-                <a:avLst/>
-              </a:prstGeom>
-              <a:solidFill>
-                <a:schemeClr val="accent4">
-                  <a:lumMod val="20000"/>
-                  <a:lumOff val="80000"/>
-                </a:schemeClr>
-              </a:solidFill>
-              <a:ln>
-                <a:solidFill>
-                  <a:srgbClr val="7030A0"/>
-                </a:solidFill>
-              </a:ln>
-            </p:spPr>
-            <p:style>
-              <a:lnRef idx="2">
-                <a:schemeClr val="accent5"/>
-              </a:lnRef>
-              <a:fillRef idx="1">
-                <a:schemeClr val="lt1"/>
-              </a:fillRef>
-              <a:effectRef idx="0">
-                <a:schemeClr val="accent5"/>
-              </a:effectRef>
-              <a:fontRef idx="minor">
-                <a:schemeClr val="dk1"/>
-              </a:fontRef>
-            </p:style>
-            <p:txBody>
-              <a:bodyPr wrap="square" lIns="0" tIns="0" rIns="0" bIns="0" rtlCol="0">
-                <a:noAutofit/>
-              </a:bodyPr>
-              <a:lstStyle/>
-              <a:p>
-                <a:pPr algn="ctr"/>
-                <a:endParaRPr lang="en-SG" sz="2400" dirty="0" smtClean="0">
-                  <a:solidFill>
-                    <a:schemeClr val="dk1"/>
-                  </a:solidFill>
-                </a:endParaRPr>
-              </a:p>
-            </p:txBody>
-          </p:sp>
-          <p:sp>
-            <p:nvSpPr>
-              <p:cNvPr id="32" name="TextBox 31"/>
-              <p:cNvSpPr txBox="1"/>
-              <p:nvPr/>
-            </p:nvSpPr>
-            <p:spPr>
-              <a:xfrm>
-                <a:off x="7178040" y="1859280"/>
-                <a:ext cx="1661160" cy="461665"/>
-              </a:xfrm>
-              <a:prstGeom prst="rect">
-                <a:avLst/>
-              </a:prstGeom>
-              <a:noFill/>
-              <a:effectLst/>
-            </p:spPr>
-            <p:txBody>
-              <a:bodyPr wrap="square" rtlCol="0">
-                <a:spAutoFit/>
-              </a:bodyPr>
-              <a:lstStyle/>
-              <a:p>
-                <a:r>
-                  <a:rPr lang="en-US" sz="2400" dirty="0" smtClean="0">
-                    <a:solidFill>
-                      <a:schemeClr val="dk1"/>
-                    </a:solidFill>
-                  </a:rPr>
-                  <a:t>mismatch = </a:t>
-                </a:r>
-                <a:endParaRPr lang="en-US" sz="2400" dirty="0">
-                  <a:solidFill>
-                    <a:schemeClr val="dk1"/>
-                  </a:solidFill>
-                </a:endParaRPr>
-              </a:p>
-            </p:txBody>
-          </p:sp>
-          <p:pic>
-            <p:nvPicPr>
-              <p:cNvPr id="33" name="Picture 4" descr="C:\Users\dcsdcr\AppData\Local\Microsoft\Windows\Temporary Internet Files\Content.IE5\R75RNP6F\MC900230291[1].wmf"/>
-              <p:cNvPicPr>
-                <a:picLocks noChangeAspect="1" noChangeArrowheads="1"/>
-              </p:cNvPicPr>
-              <p:nvPr/>
-            </p:nvPicPr>
-            <p:blipFill>
-              <a:blip r:embed="rId3" cstate="print"/>
-              <a:srcRect/>
-              <a:stretch>
-                <a:fillRect/>
-              </a:stretch>
-            </p:blipFill>
-            <p:spPr bwMode="auto">
-              <a:xfrm rot="4991404">
-                <a:off x="7491618" y="2263455"/>
-                <a:ext cx="844059" cy="765886"/>
-              </a:xfrm>
-              <a:prstGeom prst="rect">
-                <a:avLst/>
-              </a:prstGeom>
-              <a:noFill/>
-            </p:spPr>
-          </p:pic>
-        </p:grpSp>
-        <p:grpSp>
-          <p:nvGrpSpPr>
-            <p:cNvPr id="34" name="Group 33"/>
-            <p:cNvGrpSpPr/>
-            <p:nvPr/>
-          </p:nvGrpSpPr>
-          <p:grpSpPr>
-            <a:xfrm>
-              <a:off x="6309360" y="5059680"/>
-              <a:ext cx="1859280" cy="1386840"/>
-              <a:chOff x="6309360" y="5059680"/>
-              <a:chExt cx="1859280" cy="1386840"/>
-            </a:xfrm>
-          </p:grpSpPr>
-          <p:sp>
-            <p:nvSpPr>
-              <p:cNvPr id="35" name="Cube 34"/>
-              <p:cNvSpPr/>
-              <p:nvPr/>
-            </p:nvSpPr>
-            <p:spPr>
-              <a:xfrm>
-                <a:off x="6309360" y="5059680"/>
-                <a:ext cx="1859280" cy="1386840"/>
-              </a:xfrm>
-              <a:prstGeom prst="cube">
-                <a:avLst>
-                  <a:gd name="adj" fmla="val 14024"/>
-                </a:avLst>
-              </a:prstGeom>
-              <a:solidFill>
-                <a:schemeClr val="accent6">
-                  <a:lumMod val="40000"/>
-                  <a:lumOff val="60000"/>
-                </a:schemeClr>
-              </a:solidFill>
-              <a:ln>
-                <a:solidFill>
-                  <a:schemeClr val="accent6">
-                    <a:lumMod val="50000"/>
-                  </a:schemeClr>
-                </a:solidFill>
-              </a:ln>
-            </p:spPr>
-            <p:style>
-              <a:lnRef idx="2">
-                <a:schemeClr val="accent5"/>
-              </a:lnRef>
-              <a:fillRef idx="1">
-                <a:schemeClr val="lt1"/>
-              </a:fillRef>
-              <a:effectRef idx="0">
-                <a:schemeClr val="accent5"/>
-              </a:effectRef>
-              <a:fontRef idx="minor">
-                <a:schemeClr val="dk1"/>
-              </a:fontRef>
-            </p:style>
-            <p:txBody>
-              <a:bodyPr wrap="square" lIns="0" tIns="0" rIns="0" bIns="0" rtlCol="0">
-                <a:noAutofit/>
-              </a:bodyPr>
-              <a:lstStyle/>
-              <a:p>
-                <a:pPr algn="ctr">
-                  <a:buFont typeface="Arial" pitchFamily="34" charset="0"/>
-                  <a:buChar char="•"/>
-                </a:pPr>
-                <a:endParaRPr lang="en-US" sz="2400">
-                  <a:solidFill>
-                    <a:schemeClr val="dk1"/>
-                  </a:solidFill>
-                </a:endParaRPr>
-              </a:p>
-            </p:txBody>
-          </p:sp>
-          <p:sp>
-            <p:nvSpPr>
-              <p:cNvPr id="36" name="TextBox 35"/>
-              <p:cNvSpPr txBox="1"/>
-              <p:nvPr/>
-            </p:nvSpPr>
-            <p:spPr>
-              <a:xfrm>
-                <a:off x="6355080" y="5501640"/>
-                <a:ext cx="1661160" cy="830997"/>
-              </a:xfrm>
-              <a:prstGeom prst="rect">
-                <a:avLst/>
-              </a:prstGeom>
-              <a:noFill/>
-              <a:effectLst/>
-            </p:spPr>
-            <p:txBody>
-              <a:bodyPr wrap="square" rtlCol="0">
-                <a:spAutoFit/>
-              </a:bodyPr>
-              <a:lstStyle/>
-              <a:p>
-                <a:r>
-                  <a:rPr lang="en-US" sz="2400" dirty="0" smtClean="0">
-                    <a:solidFill>
-                      <a:schemeClr val="dk1"/>
-                    </a:solidFill>
-                  </a:rPr>
-                  <a:t>bug located!</a:t>
-                </a:r>
-                <a:endParaRPr lang="en-US" sz="2400" dirty="0">
-                  <a:solidFill>
-                    <a:schemeClr val="dk1"/>
-                  </a:solidFill>
-                </a:endParaRPr>
-              </a:p>
-            </p:txBody>
-          </p:sp>
-          <p:pic>
-            <p:nvPicPr>
-              <p:cNvPr id="37" name="Picture 4" descr="C:\Users\dcsdcr\AppData\Local\Microsoft\Windows\Temporary Internet Files\Content.IE5\R75RNP6F\MC900230291[1].wmf"/>
-              <p:cNvPicPr>
-                <a:picLocks noChangeAspect="1" noChangeArrowheads="1"/>
-              </p:cNvPicPr>
-              <p:nvPr/>
-            </p:nvPicPr>
-            <p:blipFill>
-              <a:blip r:embed="rId3" cstate="print"/>
-              <a:srcRect/>
-              <a:stretch>
-                <a:fillRect/>
-              </a:stretch>
-            </p:blipFill>
-            <p:spPr bwMode="auto">
-              <a:xfrm rot="4991404">
-                <a:off x="7064897" y="5128576"/>
-                <a:ext cx="844059" cy="765886"/>
-              </a:xfrm>
-              <a:prstGeom prst="rect">
-                <a:avLst/>
-              </a:prstGeom>
-              <a:noFill/>
-            </p:spPr>
-          </p:pic>
-        </p:grpSp>
-      </p:grpSp>
-      <p:pic>
-        <p:nvPicPr>
-          <p:cNvPr id="19458" name="PPIndicator201311231527220079"/>
-          <p:cNvPicPr>
-            <a:picLocks noChangeAspect="1" noChangeArrowheads="1"/>
-          </p:cNvPicPr>
-          <p:nvPr/>
-        </p:nvPicPr>
-        <p:blipFill>
-          <a:blip r:embed="rId4">
-            <a:extLst>
-              <a:ext uri="{28A0092B-C50C-407E-A947-70E740481C1C}">
-                <a14:useLocalDpi xmlns:a14="http://schemas.microsoft.com/office/drawing/2010/main" val="0"/>
-              </a:ext>
-            </a:extLst>
-          </a:blip>
-          <a:srcRect/>
-          <a:stretch>
-            <a:fillRect/>
-          </a:stretch>
-        </p:blipFill>
-        <p:spPr bwMode="auto">
-          <a:xfrm>
-            <a:off x="7756525" y="0"/>
-            <a:ext cx="1450975" cy="1365250"/>
-          </a:xfrm>
-          <a:prstGeom prst="rect">
-            <a:avLst/>
-          </a:prstGeom>
-          <a:noFill/>
-          <a:ln>
-            <a:noFill/>
-          </a:ln>
-          <a:effectLst/>
-          <a:extLst>
-            <a:ext uri="{909E8E84-426E-40DD-AFC4-6F175D3DCCD1}">
-              <a14:hiddenFill xmlns:a14="http://schemas.microsoft.com/office/drawing/2010/main">
-                <a:solidFill>
-                  <a:schemeClr val="accent1"/>
-                </a:solidFill>
-              </a14:hiddenFill>
-            </a:ext>
-            <a:ext uri="{91240B29-F687-4F45-9708-019B960494DF}">
-              <a14:hiddenLine xmlns:a14="http://schemas.microsoft.com/office/drawing/2010/main" w="9525">
-                <a:solidFill>
-                  <a:schemeClr val="tx1"/>
-                </a:solidFill>
-                <a:miter lim="800000"/>
-                <a:headEnd/>
-                <a:tailEnd/>
-              </a14:hiddenLine>
-            </a:ext>
-            <a:ext uri="{AF507438-7753-43E0-B8FC-AC1667EBCBE1}">
-              <a14:hiddenEffects xmlns:a14="http://schemas.microsoft.com/office/drawing/2010/main">
-                <a:effectLst>
-                  <a:outerShdw dist="35921" dir="2700000" algn="ctr" rotWithShape="0">
-                    <a:schemeClr val="bg2"/>
-                  </a:outerShdw>
-                </a:effectLst>
-              </a14:hiddenEffects>
-            </a:ext>
-          </a:extLst>
-        </p:spPr>
-      </p:pic>
+            </a:endParaRPr>
+          </a:p>
+        </p:txBody>
+      </p:sp>
     </p:spTree>
     <p:extLst>
       <p:ext uri="{BB962C8B-B14F-4D97-AF65-F5344CB8AC3E}">
-        <p14:creationId xmlns:p14="http://schemas.microsoft.com/office/powerpoint/2010/main" val="582414144"/>
+        <p14:creationId xmlns:p14="http://schemas.microsoft.com/office/powerpoint/2010/main" val="1220527465"/>
       </p:ext>
     </p:extLst>
   </p:cSld>
   <p:clrMapOvr>
     <a:masterClrMapping/>
   </p:clrMapOvr>
-  <p:transition advClick="0" advTm="0">
-    <p:fade/>
-  </p:transition>
   <p:timing>
     <p:tnLst>
       <p:par>
-        <p:cTn id="1" dur="indefinite" restart="never" nodeType="tmRoot">
-          <p:childTnLst>
-            <p:seq concurrent="1" nextAc="seek">
-              <p:cTn id="2" dur="indefinite" nodeType="mainSeq">
-                <p:childTnLst>
-                  <p:par>
-                    <p:cTn id="3" fill="hold">
-                      <p:stCondLst>
-                        <p:cond delay="indefinite"/>
-                        <p:cond evt="onBegin" delay="0">
-                          <p:tn val="2"/>
-                        </p:cond>
-                      </p:stCondLst>
-                      <p:childTnLst>
-                        <p:par>
-                          <p:cTn id="4" fill="hold">
-                            <p:stCondLst>
-                              <p:cond delay="0"/>
-                            </p:stCondLst>
-                            <p:childTnLst>
-                              <p:par>
-                                <p:cTn id="5" presetID="42" presetClass="path" presetSubtype="0" accel="50000" decel="50000" fill="hold" nodeType="withEffect">
-                                  <p:stCondLst>
-                                    <p:cond delay="0"/>
-                                  </p:stCondLst>
-                                  <p:childTnLst>
-                                    <p:animMotion origin="layout" path="M 0 0 C -0.01007623 0.1575336 -0.01007623 0.1575336 -0.02015245 0.3150671 E" pathEditMode="relative" ptsTypes="">
-                                      <p:cBhvr>
-                                        <p:cTn id="6" dur="500" fill="hold"/>
-                                        <p:tgtEl>
-                                          <p:spTgt spid="2"/>
-                                        </p:tgtEl>
-                                        <p:attrNameLst>
-                                          <p:attrName>ppt_x</p:attrName>
-                                          <p:attrName>ppt_y</p:attrName>
-                                        </p:attrNameLst>
-                                      </p:cBhvr>
-                                    </p:animMotion>
-                                  </p:childTnLst>
-                                </p:cTn>
-                              </p:par>
-                              <p:par>
-                                <p:cTn id="7" presetID="6" presetClass="emph" presetSubtype="0" fill="hold" nodeType="withEffect">
-                                  <p:stCondLst>
-                                    <p:cond delay="0"/>
-                                  </p:stCondLst>
-                                  <p:childTnLst>
-                                    <p:animScale>
-                                      <p:cBhvr>
-                                        <p:cTn id="8" dur="500" fill="hold"/>
-                                        <p:tgtEl>
-                                          <p:spTgt spid="2"/>
-                                        </p:tgtEl>
-                                      </p:cBhvr>
-                                      <p:by x="150000" y="150000"/>
-                                      <p:to x="160865" y="160865"/>
-                                    </p:animScale>
-                                  </p:childTnLst>
-                                </p:cTn>
-                              </p:par>
-                              <p:par>
-                                <p:cTn id="9" presetID="42" presetClass="path" presetSubtype="0" accel="50000" decel="50000" fill="hold" nodeType="withEffect">
-                                  <p:stCondLst>
-                                    <p:cond delay="0"/>
-                                  </p:stCondLst>
-                                  <p:childTnLst>
-                                    <p:animMotion origin="layout" path="M 0 0 C 0 0.2355556 0 0.2355556 0 0.4711111 E" pathEditMode="relative" ptsTypes="">
-                                      <p:cBhvr>
-                                        <p:cTn id="10" dur="500" fill="hold"/>
-                                        <p:tgtEl>
-                                          <p:spTgt spid="3"/>
-                                        </p:tgtEl>
-                                        <p:attrNameLst>
-                                          <p:attrName>ppt_x</p:attrName>
-                                          <p:attrName>ppt_y</p:attrName>
-                                        </p:attrNameLst>
-                                      </p:cBhvr>
-                                    </p:animMotion>
-                                  </p:childTnLst>
-                                </p:cTn>
-                              </p:par>
-                            </p:childTnLst>
-                          </p:cTn>
-                        </p:par>
-                      </p:childTnLst>
-                    </p:cTn>
-                  </p:par>
-                </p:childTnLst>
-              </p:cTn>
-              <p:prevCondLst>
-                <p:cond evt="onPrev" delay="0">
-                  <p:tgtEl>
-                    <p:sldTgt/>
-                  </p:tgtEl>
-                </p:cond>
-              </p:prevCondLst>
-              <p:nextCondLst>
-                <p:cond evt="onNext" delay="0">
-                  <p:tgtEl>
-                    <p:sldTgt/>
-                  </p:tgtEl>
-                </p:cond>
-              </p:nextCondLst>
-            </p:seq>
-          </p:childTnLst>
-        </p:cTn>
+        <p:cTn id="1" dur="indefinite" restart="never" nodeType="tmRoot"/>
       </p:par>
     </p:tnLst>
   </p:timing>
 </p:sld>
 </file>
 
-<file path=ppt/slides/slide24.xml><?xml version="1.0" encoding="utf-8"?>
+<file path=ppt/slides/slide20.xml><?xml version="1.0" encoding="utf-8"?>
 <p:sld xmlns:a="http://schemas.openxmlformats.org/drawingml/2006/main" xmlns:r="http://schemas.openxmlformats.org/officeDocument/2006/relationships" xmlns:p="http://schemas.openxmlformats.org/presentationml/2006/main">
   <p:cSld>
     <p:spTree>
@@ -12216,11 +9036,11 @@
   <p:clrMapOvr>
     <a:masterClrMapping/>
   </p:clrMapOvr>
-  <mc:AlternateContent xmlns:mc="http://schemas.openxmlformats.org/markup-compatibility/2006">
-    <mc:Choice xmlns:p14="http://schemas.microsoft.com/office/powerpoint/2010/main" Requires="p14">
+  <mc:AlternateContent xmlns:mc="http://schemas.openxmlformats.org/markup-compatibility/2006" xmlns:p14="http://schemas.microsoft.com/office/powerpoint/2010/main">
+    <mc:Choice Requires="p14">
       <p:transition spd="slow" p14:dur="2000"/>
     </mc:Choice>
-    <mc:Fallback>
+    <mc:Fallback xmlns="">
       <p:transition spd="slow"/>
     </mc:Fallback>
   </mc:AlternateContent>
@@ -12351,7 +9171,7 @@
 </p:sld>
 </file>
 
-<file path=ppt/slides/slide25.xml><?xml version="1.0" encoding="utf-8"?>
+<file path=ppt/slides/slide21.xml><?xml version="1.0" encoding="utf-8"?>
 <p:sld xmlns:a="http://schemas.openxmlformats.org/drawingml/2006/main" xmlns:r="http://schemas.openxmlformats.org/officeDocument/2006/relationships" xmlns:p="http://schemas.openxmlformats.org/presentationml/2006/main">
   <p:cSld>
     <p:bg>
@@ -12449,7 +9269,7 @@
 </p:sld>
 </file>
 
-<file path=ppt/slides/slide26.xml><?xml version="1.0" encoding="utf-8"?>
+<file path=ppt/slides/slide22.xml><?xml version="1.0" encoding="utf-8"?>
 <p:sld xmlns:a="http://schemas.openxmlformats.org/drawingml/2006/main" xmlns:r="http://schemas.openxmlformats.org/officeDocument/2006/relationships" xmlns:p="http://schemas.openxmlformats.org/presentationml/2006/main">
   <p:cSld>
     <p:bg>
@@ -12548,7 +9368,7 @@
 </p:sld>
 </file>
 
-<file path=ppt/slides/slide27.xml><?xml version="1.0" encoding="utf-8"?>
+<file path=ppt/slides/slide23.xml><?xml version="1.0" encoding="utf-8"?>
 <p:sld xmlns:a="http://schemas.openxmlformats.org/drawingml/2006/main" xmlns:r="http://schemas.openxmlformats.org/officeDocument/2006/relationships" xmlns:p="http://schemas.openxmlformats.org/presentationml/2006/main">
   <p:cSld>
     <p:spTree>
@@ -12666,7 +9486,7 @@
 </p:sld>
 </file>
 
-<file path=ppt/slides/slide28.xml><?xml version="1.0" encoding="utf-8"?>
+<file path=ppt/slides/slide24.xml><?xml version="1.0" encoding="utf-8"?>
 <p:sld xmlns:a="http://schemas.openxmlformats.org/drawingml/2006/main" xmlns:r="http://schemas.openxmlformats.org/officeDocument/2006/relationships" xmlns:p="http://schemas.openxmlformats.org/presentationml/2006/main">
   <p:cSld>
     <p:bg>
@@ -12765,7 +9585,7 @@
 </p:sld>
 </file>
 
-<file path=ppt/slides/slide29.xml><?xml version="1.0" encoding="utf-8"?>
+<file path=ppt/slides/slide25.xml><?xml version="1.0" encoding="utf-8"?>
 <p:sld xmlns:a="http://schemas.openxmlformats.org/drawingml/2006/main" xmlns:r="http://schemas.openxmlformats.org/officeDocument/2006/relationships" xmlns:p="http://schemas.openxmlformats.org/presentationml/2006/main">
   <p:cSld>
     <p:spTree>

</xml_diff>

<commit_message>
Updated test scenarios: removed generated slides from the file
</commit_message>
<xml_diff>
--- a/doc/Test scenarios.pptx
+++ b/doc/Test scenarios.pptx
@@ -8,28 +8,26 @@
     <p:sldId id="256" r:id="rId2"/>
     <p:sldId id="272" r:id="rId3"/>
     <p:sldId id="257" r:id="rId4"/>
-    <p:sldId id="258" r:id="rId5"/>
-    <p:sldId id="285" r:id="rId6"/>
-    <p:sldId id="283" r:id="rId7"/>
-    <p:sldId id="286" r:id="rId8"/>
-    <p:sldId id="282" r:id="rId9"/>
-    <p:sldId id="280" r:id="rId10"/>
-    <p:sldId id="261" r:id="rId11"/>
-    <p:sldId id="262" r:id="rId12"/>
-    <p:sldId id="278" r:id="rId13"/>
-    <p:sldId id="269" r:id="rId14"/>
-    <p:sldId id="270" r:id="rId15"/>
-    <p:sldId id="274" r:id="rId16"/>
-    <p:sldId id="275" r:id="rId17"/>
-    <p:sldId id="276" r:id="rId18"/>
-    <p:sldId id="293" r:id="rId19"/>
-    <p:sldId id="292" r:id="rId20"/>
-    <p:sldId id="294" r:id="rId21"/>
-    <p:sldId id="287" r:id="rId22"/>
-    <p:sldId id="288" r:id="rId23"/>
-    <p:sldId id="289" r:id="rId24"/>
-    <p:sldId id="290" r:id="rId25"/>
-    <p:sldId id="291" r:id="rId26"/>
+    <p:sldId id="285" r:id="rId5"/>
+    <p:sldId id="283" r:id="rId6"/>
+    <p:sldId id="282" r:id="rId7"/>
+    <p:sldId id="280" r:id="rId8"/>
+    <p:sldId id="261" r:id="rId9"/>
+    <p:sldId id="262" r:id="rId10"/>
+    <p:sldId id="278" r:id="rId11"/>
+    <p:sldId id="269" r:id="rId12"/>
+    <p:sldId id="270" r:id="rId13"/>
+    <p:sldId id="274" r:id="rId14"/>
+    <p:sldId id="275" r:id="rId15"/>
+    <p:sldId id="276" r:id="rId16"/>
+    <p:sldId id="293" r:id="rId17"/>
+    <p:sldId id="292" r:id="rId18"/>
+    <p:sldId id="294" r:id="rId19"/>
+    <p:sldId id="287" r:id="rId20"/>
+    <p:sldId id="288" r:id="rId21"/>
+    <p:sldId id="289" r:id="rId22"/>
+    <p:sldId id="290" r:id="rId23"/>
+    <p:sldId id="291" r:id="rId24"/>
   </p:sldIdLst>
   <p:sldSz cx="9144000" cy="6858000" type="screen4x3"/>
   <p:notesSz cx="6858000" cy="9144000"/>
@@ -136,10 +134,8 @@
             <p14:sldId id="256"/>
             <p14:sldId id="272"/>
             <p14:sldId id="257"/>
-            <p14:sldId id="258"/>
             <p14:sldId id="285"/>
             <p14:sldId id="283"/>
-            <p14:sldId id="286"/>
           </p14:sldIdLst>
         </p14:section>
         <p14:section name="Auto-animate" id="{6FDF723C-725B-43A9-867B-50B5C5A22F3E}">
@@ -282,8 +278,8 @@
       <inkml:brushProperty name="fitToCurve" value="1"/>
     </inkml:brush>
   </inkml:definitions>
-  <inkml:trace contextRef="#ctx0" brushRef="#br0">848 1596 6,'0'-2'31,"0"2"1,0 0-12,0 0-2,0 0-1,0 0-5,0 0 2,0 0 6,0 0-2,0 0-4,0 0-4,0 0 2,0 0-1,0 0 1,0 0-3,0 0 3,0 0 0,0 0-7,0 0-3,-6 0 1,0 0 2,0 0 1,-4 4-3,0 3-1,-2 0 1,0 6-1,0 2-1,0 3 2,2 1 0,2-1 4,0 0-6,-1 0 1,1 2 3,-1-1-3,1 1 1,1 5-1,-1-1-1,1-2 2,2 2-2,3 3-1,-1-3 2,3 0-2,0-1 2,0 3 2,0-4-3,0 2 2,10 4 1,0-7-2,5-1-1,-3 4 0,3-4 1,-1-2-1,2 0-1,8-6-1,-4 4 2,2-5-1,2-4 1,1 2-1,0-5 2,-3-2-1,5 1 2,-3-3-3,2 0 0,-7 0 2,6 0 1,0 0-2,-1 0 3,4-6-3,-4-6 1,-2-3 2,0-5 0,0 0-3,1 0 3,-3-4-3,-3-1 1,-5 3-1,3 1 4,-1-5 1,-4 7-2,-2-1 3,-4 5-2,0-5 3,-4 2 0,2-2-4,-2 0-2,0-2 0,0 0 9,0 5-9,0 1 2,0 1-2,-12-5-1,0 0 1,-4 2-2,6 2 1,3 0-1,0 4 0,-1-4 0,1 5 1,0 2-1,1-2 1,-1 10-1,0-6-1,-1 0 2,3-2 1,-5 2-1,6 3 0,-2-1-1,4 1 1,-2 0 0,0 2 0,2 2 0,0 0 0,2 0 0,-2 0-1,2 0 0,0 0 0,0 0 0,0 0 1,0-3 0,0 3-1,0 0 0,0 0 0,0 0-1,0 0 1,0 0-1,0 0-1,0 0 0,0 0 0,0 0 0,0 0-2,0 0 0,0 0-2,0 0 0,0 0-4,0 0 1,0 0 3,0 0 6,0 0 1,2 9-1,10 7 0,3 1 0,2-4 0,-2 5 0,0 0 0,2 2-1,-2-3 2,8 1-1,-5 2 0,5 2-1,-6-2 1,8-2-1,-5-5 0,2 2 0,-5 3 0,3-7-4,-1 0-1,1-4 4,-2-3 0,-2 1 0,7-1-3,-6-1 2,3-3 2,-3 0-2,1 0 2,-2 0 2,8-3-1,-6-6 2,2 1-4,0-6 4,0-1-2,2-3 0,-2 1 0,-3-2 0,3 0 0,0-4 0,0 4 0,-4 1 0,4-2 1,-2-2-1,-1 0 0,-3-3 0,2-1 0,-2 1 0,-2 4 1,-2 3 2,-2-4 2,-4 4 0,0-4-2,-2-1-2,0-5 0,-2 2-1,0 3 2,0-3-2,0 4 3,0 5 1,0 0-1,0 3 3,-4-2-1,-6 1 0,-3 1-3,0 1 3,1 2 0,-2 2-3,-1 0-3,-3 4 0,-2-1 0,1 2 1,0-1 0,-3 3 0,-4 0 0,2 2-2,-3 0 3,5 0-2,-1 0 0,1 0 3,5 0-5,-1 0 1,2 0 2,3 6-3,0 1 1,1 2 1,-5 2-1,2 1 0,0-4 1,5 1 2,3-5-1,0 1 0,5-3 2,-2-2-4,4 0 1,0 0-2,0 0-2,0 0 0,0 0-2,0 0-4,0 0 2,0 0 1,0 0-2,0 0 7,0 0 4,13-7 1,2 1-1,2-4-1,3 0 0,-3-1 1,3-5-1,3 1 1,-1-1-2,0-4 2,0 0 1,0-2-2,0-4 0,0-1 1,1-4 1,-1 5-1,-2-3 1,2-2-1,0 0 0,2 0 2,-9 0-1,0 0-1,0 1 0,-1 0 4,-4 2-1,-4 12 1,0-1-4,-2-1 2,-2 2 2,0-5-2,-2 1-1,0-5 0,0 1 2,0-1-1,0 3-2,0 0 2,-10-5-2,-2 6 1,2 0 0,-2 2 3,-3 4-4,0 4 1,-2-5-3,-5 2 3,4-1-2,-2 2 3,-2 4-2,3 5-2,-1-3 1,1 0 1,1 1 2,-1 2-3,-1-1 0,2 3-3,2 2 2,0 0 1,2 0-1,-6 0-1,2 0 0,2 13 3,0 5-6,-1-3 7,3 5-2,1 0 0,-4 0 0,5-3 0,0 10-2,-4-5 2,6-2 0,-2 4-1,0-6 1,2 2 0,2-1-1,1 3 1,0 1-1,2-5 0,0-3-1,0 2 1,3 1-3,-3 2 3,5 0 0,0-6-2,0 6 0,0-7 1,0-2 0,0-2-1,0-2 1,0-4 0,0 0 1,0-3-1,0 0 1,0 0-2,0 0 2,0 0 1,0 0-1,0 0 1,0 0 1,0 0-1,0 0 0,0 0-1,0 0 0,0 0 0,0 0 0,0 0-4,0 0 4,0 0 6,0 0-3,0-5 0,5-10-1,2-7 2,3-5-3,-3-4 1,0 0-1,1-6 0,2-3 1,2-6 1,-4-1-2,-4 3 1,0 0 1,-4 7 1,0-4-1,0 9-1,0-4 1,-8-2 2,-4 3-3,-8-5 1,-2 9 0,-6 5-1,-1 4 1,1 6 0,0 3-2,-2 0 0,5 0-1,0-5-2,-2 9 3,-3 5-1,8 1 1,-2 3 0,-1 0-1,-2 0 1,5 0-2,2 0 2,-3 4-2,-1 11-1,2 1 3,-6 2-1,2 8-1,6-1 0,0 6 1,3-2 0,5-1-1,-1-1 1,4-3 1,3 7 0,-1-2-1,4-1 1,1 4-1,2-3-1,0-3 1,0 0 0,0 3 1,12 0-2,0 2 4,4-2-4,-2-1 2,-1-3 0,1 1 0,1-2 0,-5 1 0,7-5 0,-5-3 0,-2-3-1,0-5 0,-4-3 0,-2-1 0,-2-3 1,2 2 1,-4-4 0,0 0-1,0 0 1,2 0 2,-2 0-1,0 0 0,0 0 3,0 0-1,0 0 2,0 0 0,0 0-1,0 0-2,0 0 1,0 0 0,0 0 3,0 0-1,0 0 2,0 0 0,0 0-4,0 0-2,0-4-1,-6-9 0,-10-1-1,-4-6 0,-5 3 0,3-5-1,-5 0 1,-3-5 0,5 0 0,-1-2-1,-2 3 0,1 2 1,0 0-1,-2 6 1,-1 2-3,-4 3 2,-2 2 1,-5 0 0,4 7 0,-2-1 0,7 3 1,4 2-2,-4-5 1,3 5 0,-1 0 1,-7 0-4,5 5 5,3 10-2,-1 3-2,8-2 1,-1-1 0,-1 5 1,-1 6-1,8 5-1,-1 0 0,6-2 1,-2 4-1,-2 0 0,12 1 1,-1 1 0,5 5-1,0-5 0,0 1 1,12-1 0,8 0-2,-5-1 3,5-4-1,2-1 0,4-4 0,2-3-1,-4 0 1,9-9-3,-1 2 3,0-6 2,4-2-1,2-3 0,-1-4-1,-1 0 2,-6 0 2,2 0-3,-2 0 0,-5 0 0,-1 0 0,4 0 1,-4-2-1,3-3 1,-2 1-1,-5-3 0,-6-1 0,-1 3 1,-9 3 1,-4 2 4,0 0-2,0 0-1,0 0 1,0 0-3,0 0 1,0 0 1,0 0 3,0 0 0,0 0 3,0 0 1,0 0-8,0 0-3,0 0-1,-22 0 1,-3 0 2,-1 0-1,-2 0-3,4 0 3,-4 0-1,4 0 0,-3 0 0,-13 13 0,4 5 1,-4 8-2,-2 4 2,5-2-2,-3 4 0,11-2 1,4-1-1,-2 2 0,7-3 0,3 8-1,-2-1 2,-1 3 2,-2-3-1,4-2-1,10 0-1,2-6 2,0-3-2,0 7 0,2-7 1,4 3-2,0 0 1,0-8-2,0 1 1,14 0 0,2 0 2,12-2-3,-2-2 3,2-3 0,-4-2 0,11 0 3,-5-7-3,4-2 0,3-2 3,-5 0 2,2 0-2,4-2 1,-2-13-1,4-1 1,-5 3-1,7-2 0,-8-6 0,2-5 1,0 2 0,-7-3-1,-2 1 1,-4 1 0,1 3-1,-2-4 1,-2 1 0,-8 5 1,3 0-2,-8 7 2,1 2 0,-3-2 0,2-2 0,0-8 0,3-1-1,-2 2 3,-6 4 1,-2 12-5,0 6 0,-2 0 0,-6 0 1,6 0 0,2-2-1,0-8 0,0 2 1,0 6 1,0 2-1,-2 0 1,-4 0-3,6 0 0,0 0-1,0 0 0,0 0-1,0 0-3,0 0-1,-2 0-4,-5 0-17,2 0-29,5 0-99,0 0-91</inkml:trace>
-  <inkml:trace contextRef="#ctx0" brushRef="#br0" timeOffset="1">796 1512 75,'0'2'45,"0"0"-25,0-2 29,0 0-11,0 0-11,0 0-3,0 0 6,0 0-4,0 0-3,0 0 4,0 0-1,-2 0-4,2 0-1,0 0-4,0 0-1,0 0-6,-6 0-5,2 0-3,-4 0 0,0 0 2,-4-6 0,0-3 3,2-6-2,-5 0-4,1-4 3,-1-4 1,0 0-1,3-2 2,0-1-2,2-5 0,0 0 0,2-4 0,6-3 0,0-2-1,2-2-3,0 2 4,0-4 1,0 2-4,6 5 0,7 3 0,0 6 2,-1 5-3,2-1 1,1 2-2,0 0-2,0 2 3,2 5-1,3-1 1,7 1-1,3 2 1,-1-1-2,6 3-1,-1 2 3,1 3-1,-1 3 1,-2 3-1,3 0-1,-3 0 1,0 0 0,0 0 0,-2 3 0,2 5 1,0 4-3,-5 1 2,-3-2-1,2 0 1,-4 7-1,-6-3 0,0 3 2,6-1 0,-5 3-1,-2 0 0,0 0 0,-6 0 0,-2 2 0,3-1 2,-2 0-2,0 4 3,-4-1-4,2 0 1,-4 0 2,0 3-1,-2-3-5,0 3 6,0 0-3,0 1 4,0 1-1,0 2 1,0 2-2,-4-2 0,-6 2-2,0-6 2,2-3 0,0-3-1,1 0 0,-5-3 2,0-3 0,-3 1 1,0-5-1,-3 0 1,6-1 0,0 0-1,-6-4-1,2 1 0,-9-3-3,5-1 3,-5-1 0,3-2 0,-3 0 0,6 0 0,2 0 0,-1 0 0,2 2 0,0-2-1,-4 0 0,8 0 1,-2 0 0,1 0 0,1 0 1,0 0-1,-4 0 1,4 0-1,5 0 0,-2 0 0,-1 0 0,0 0 0,2 0 0,-2 0 0,2 0 0,-1 0 0,2 0 1,-1 0 0,3 0-1,-2 0 0,-5 0 0,2 0 0,0-2 0,2-3 0,1 3 0,2 0-1,-2-1 0,4 3 1,-2-1 0,3-2-1,0 1 1,-2 0-1,4 2-6,-2-2-18,2 2-36,0 0-79,0-3-46</inkml:trace>
+  <inkml:trace contextRef="#ctx0" brushRef="#br0">848 1597 6,'0'-2'31,"0"2"1,0 0-12,0 0-2,0 0-1,0 0-5,0 0 2,0 0 6,0 0-2,0 0-4,0 0-4,0 0 2,0 0-1,0 0 1,0 0-3,0 0 3,0 0 0,0 0-7,0 0-3,-6 0 1,0 0 2,0 0 1,-4 4-3,0 3-1,-2 0 1,0 6-1,0 2-1,0 3 2,2 1 0,2-1 4,0 1-6,-1-1 1,1 2 3,-1-1-3,1 1 1,1 5-1,-1-1-1,1-2 2,2 2-2,3 3-1,-1-3 2,3 0-2,0-1 2,0 3 2,0-4-3,0 2 2,10 4 1,0-7-2,5-1-1,-3 4 0,3-4 1,-1-2-1,2 0-1,8-6-1,-4 4 2,2-5-1,2-4 1,1 2-1,0-5 2,-3-2-1,5 1 2,-3-3-3,2 0 0,-7 0 2,5 0 1,1 0-2,-1 0 3,4-6-3,-4-6 1,-2-3 2,0-5 0,0 0-3,1 0 3,-3-4-3,-3-1 1,-5 3-1,3 1 4,-1-5 1,-4 7-2,-2-1 3,-4 5-2,0-5 3,-4 2 0,2-2-4,-2 0-2,0-2 0,0 0 9,0 5-9,0 1 2,0 1-2,-12-5-1,0 0 1,-4 2-2,6 2 1,3 0-1,0 4 0,-1-4 0,1 4 1,0 3-1,1-2 1,-1 10-1,0-6-1,-1 0 2,3-2 1,-5 2-1,6 3 0,-2-1-1,4 1 1,-2 0 0,0 2 0,2 2 0,0 0 0,2 0 0,-2 0-1,2 0 0,0 0 0,0 0 0,0 0 1,0-3 0,0 3-1,0 0 0,0 0 0,0 0-1,0 0 1,0 0-1,0 0-1,0 0 0,0 0 0,0 0 0,0 0-2,0 0 0,0 0-2,0 0 0,0 0-4,0 0 1,0 0 3,0 0 6,0 0 1,2 9-1,10 7 0,3 1 0,2-4 0,-2 5 0,0 1 0,2 1-1,-2-3 2,8 1-1,-5 2 0,5 2-1,-6-2 1,8-2-1,-5-5 0,2 2 0,-5 3 0,3-7-4,-1 0-1,1-4 4,-2-3 0,-2 1 0,7-1-3,-6-1 2,3-3 2,-3 0-2,1 0 2,-2 0 2,8-3-1,-6-6 2,2 1-4,0-6 4,0-1-2,2-3 0,-2 1 0,-3-2 0,3 0 0,0-4 0,0 4 0,-4 1 0,4-2 1,-2-2-1,-1-1 0,-3-2 0,2-1 0,-2 1 0,-2 4 1,-2 3 2,-2-4 2,-4 4 0,0-4-2,-2-1-2,0-5 0,-2 2-1,0 3 2,0-3-2,0 4 3,0 5 1,0 0-1,0 3 3,-4-2-1,-6 1 0,-3 1-3,0 1 3,1 2 0,-2 2-3,-1 0-3,-3 4 0,-2-1 0,1 2 1,0-1 0,-3 3 0,-4 0 0,2 2-2,-3 0 3,5 0-2,-1 0 0,1 0 3,5 0-5,-1 0 1,2 0 2,3 6-3,0 1 1,1 2 1,-5 2-1,2 1 0,0-4 1,5 1 2,3-5-1,0 1 0,5-3 2,-2-2-4,4 0 1,0 0-2,0 0-2,0 0 0,0 0-2,0 0-4,0 0 2,0 0 1,0 0-2,0 0 7,0 0 4,13-7 1,2 1-1,2-4-1,3 0 0,-3-1 1,3-5-1,3 1 1,-1-1-2,0-4 2,0 0 1,0-2-2,0-4 0,0-1 1,1-4 1,-1 5-1,-2-3 1,2-2-1,0 0 0,2 0 2,-9 0-1,0 0-1,0 1 0,-1 0 4,-4 2-1,-4 12 1,0-1-4,-2-1 2,-2 2 2,0-5-2,-2 1-1,0-5 0,0 1 2,0-1-1,0 2-2,0 1 2,-10-5-2,-2 6 1,2 0 0,-2 2 3,-3 4-4,0 4 1,-2-5-3,-5 2 3,4-1-2,-2 2 3,-2 4-2,3 5-2,-1-3 1,1 0 1,1 1 2,-1 2-3,-1-1 0,2 3-3,2 2 2,0 0 1,2 0-1,-6 0-1,2 0 0,2 13 3,0 5-6,-1-3 7,3 5-2,1 0 0,-4 0 0,5-3 0,0 10-2,-4-5 2,6-2 0,-2 4-1,0-6 1,2 2 0,2 0-1,1 2 1,0 1-1,2-5 0,0-3-1,0 2 1,3 1-3,-3 2 3,5 0 0,0-6-2,0 6 0,0-7 1,0-2 0,0-2-1,0-2 1,0-4 0,0 0 1,0-3-1,0 0 1,0 0-2,0 0 2,0 0 1,0 0-1,0 0 1,0 0 1,0 0-1,0 0 0,0 0-1,0 0 0,0 0 0,0 0 0,0 0-4,0 0 4,0 0 6,0 0-3,0-5 0,5-10-1,2-7 2,3-5-3,-3-4 1,0 0-1,1-6 0,2-3 1,2-7 1,-4 0-2,-4 3 1,0 0 1,-4 7 1,0-4-1,0 9-1,0-4 1,-8-2 2,-4 3-3,-8-5 1,-2 9 0,-6 5-1,-1 4 1,1 6 0,0 3-2,-2 0 0,5 0-1,0-5-2,-2 9 3,-3 5-1,8 1 1,-2 3 0,-1 0-1,-2 0 1,5 0-2,2 0 2,-3 4-2,0 11-1,1 1 3,-6 2-1,2 8-1,6-1 0,0 6 1,3-2 0,5-1-1,-1-1 1,4-3 1,3 7 0,-1-2-1,4-1 1,1 4-1,2-3-1,0-3 1,0 0 0,0 3 1,12 0-2,0 2 4,4-2-4,-2 0 2,-1-4 0,1 1 0,1-2 0,-5 1 0,7-5 0,-5-3 0,-2-3-1,0-5 0,-4-3 0,-2-1 0,-2-3 1,2 2 1,-4-4 0,0 0-1,0 0 1,2 0 2,-2 0-1,0 0 0,0 0 3,0 0-1,0 0 2,0 0 0,0 0-1,0 0-2,0 0 1,0 0 0,0 0 3,0 0-1,0 0 2,0 0 0,0 0-4,0 0-2,0-4-1,-6-9 0,-10-1-1,-4-6 0,-5 3 0,3-5-1,-5 0 1,-3-5 0,5 0 0,-1-2-1,-2 2 0,1 3 1,0 0-1,-2 6 1,-1 2-3,-4 3 2,-2 2 1,-5 0 0,4 7 0,-2-1 0,7 3 1,4 2-2,-4-5 1,3 5 0,-1 0 1,-7 0-4,5 5 5,3 10-2,-1 3-2,8-2 1,-1-1 0,-1 5 1,-1 6-1,8 5-1,-1 1 0,6-3 1,-2 4-1,-2 0 0,12 1 1,-1 1 0,5 5-1,0-5 0,0 1 1,12-1 0,8 0-2,-5-1 3,5-4-1,2-1 0,4-4 0,2-3-1,-4 0 1,9-9-3,-1 2 3,0-6 2,4-2-1,2-3 0,-1-4-1,-1 0 2,-6 0 2,2 0-3,-2 0 0,-5 0 0,-1 0 0,4 0 1,-4-2-1,3-3 1,-2 1-1,-5-3 0,-6-1 0,-1 3 1,-9 3 1,-4 2 4,0 0-2,0 0-1,0 0 1,0 0-3,0 0 1,0 0 1,0 0 3,0 0 0,0 0 3,0 0 1,0 0-8,0 0-3,0 0-1,-22 0 1,-3 0 2,-1 0-1,-2 0-3,4 0 3,-4 0-1,4 0 0,-3 0 0,-13 13 0,4 5 1,-4 8-2,-2 4 2,5-2-2,-3 4 0,11-2 1,4-1-1,-2 2 0,7-3 0,3 8-1,-2-1 2,-1 3 2,-2-3-1,4-2-1,10 0-1,2-6 2,0-3-2,0 7 0,2-7 1,4 4-2,0-1 1,0-8-2,0 1 1,14 0 0,2 0 2,12-2-3,-2-2 3,2-3 0,-4-2 0,11 0 3,-5-7-3,4-2 0,3-2 3,-5 0 2,2 0-2,4-2 1,-2-13-1,4-1 1,-5 3-1,7-2 0,-8-6 0,2-5 1,0 2 0,-7-3-1,-2 1 1,-4 0 0,1 4-1,-2-4 1,-2 1 0,-8 5 1,3 0-2,-8 7 2,1 2 0,-3-2 0,2-2 0,0-8 0,3-1-1,-2 2 3,-6 4 1,-2 12-5,0 6 0,-2 0 0,-6 0 1,6 0 0,2-2-1,0-8 0,0 2 1,0 6 1,0 2-1,-2 0 1,-4 0-3,6 0 0,0 0-1,0 0 0,0 0-1,0 0-3,0 0-1,-2 0-4,-5 0-17,2 0-29,5 0-99,0 0-91</inkml:trace>
+  <inkml:trace contextRef="#ctx0" brushRef="#br0" timeOffset="1">796 1513 75,'0'2'45,"0"0"-25,0-2 29,0 0-11,0 0-11,0 0-3,0 0 6,0 0-4,0 0-3,0 0 4,0 0-1,-2 0-4,2 0-1,0 0-4,0 0-1,0 0-6,-6 0-5,2 0-3,-4 0 0,0 0 2,-4-6 0,0-3 3,2-6-2,-5 0-4,1-4 3,-1-4 1,0 0-1,3-2 2,0-1-2,2-5 0,0 0 0,2-4 0,6-3 0,0-2-1,2-2-3,0 2 4,0-4 1,0 2-4,6 5 0,7 3 0,0 6 2,-1 5-3,2-1 1,1 2-2,0 0-2,0 2 3,2 5-1,3-1 1,7 1-1,3 2 1,-1-1-2,6 3-1,-1 2 3,1 3-1,-1 3 1,-2 3-1,2 0-1,-2 0 1,0 0 0,0 0 0,-2 3 0,2 5 1,0 4-3,-5 1 2,-3-2-1,2 0 1,-4 7-1,-6-3 0,0 3 2,6-1 0,-5 3-1,-2 0 0,0 0 0,-6 0 0,-2 2 0,3-1 2,-2 0-2,0 4 3,-4-1-4,2 0 1,-4 0 2,0 3-1,-2-3-5,0 3 6,0 0-3,0 1 4,0 1-1,0 2 1,0 2-2,-4-2 0,-6 2-2,0-6 2,2-3 0,0-3-1,1 0 0,-5-3 2,0-3 0,-3 1 1,0-5-1,-3 0 1,6-1 0,0 0-1,-6-4-1,2 1 0,-9-3-3,5-1 3,-5-1 0,3-2 0,-3 0 0,6 0 0,2 0 0,-1 0 0,2 2 0,0-2-1,-4 0 0,8 0 1,-2 0 0,1 0 0,1 0 1,0 0-1,-3 0 1,3 0-1,5 0 0,-2 0 0,-1 0 0,0 0 0,2 0 0,-2 0 0,2 0 0,-1 0 0,2 0 1,-1 0 0,3 0-1,-2 0 0,-5 0 0,2 0 0,0-2 0,2-3 0,1 3 0,2 0-1,-2-1 0,4 3 1,-2-1 0,3-2-1,0 1 1,-2 0-1,4 2-6,-2-2-18,2 2-36,0 0-79,0-3-46</inkml:trace>
 </inkml:ink>
 </file>
 
@@ -469,7 +465,7 @@
             <a:fld id="{1D8BD707-D9CF-40AE-B4C6-C98DA3205C09}" type="datetimeFigureOut">
               <a:rPr lang="en-US" smtClean="0"/>
               <a:pPr/>
-              <a:t>12/12/2013</a:t>
+              <a:t>12/13/2013</a:t>
             </a:fld>
             <a:endParaRPr lang="en-US"/>
           </a:p>
@@ -636,7 +632,7 @@
             <a:fld id="{1D8BD707-D9CF-40AE-B4C6-C98DA3205C09}" type="datetimeFigureOut">
               <a:rPr lang="en-US" smtClean="0"/>
               <a:pPr/>
-              <a:t>12/12/2013</a:t>
+              <a:t>12/13/2013</a:t>
             </a:fld>
             <a:endParaRPr lang="en-US"/>
           </a:p>
@@ -813,7 +809,7 @@
             <a:fld id="{1D8BD707-D9CF-40AE-B4C6-C98DA3205C09}" type="datetimeFigureOut">
               <a:rPr lang="en-US" smtClean="0"/>
               <a:pPr/>
-              <a:t>12/12/2013</a:t>
+              <a:t>12/13/2013</a:t>
             </a:fld>
             <a:endParaRPr lang="en-US"/>
           </a:p>
@@ -980,7 +976,7 @@
             <a:fld id="{1D8BD707-D9CF-40AE-B4C6-C98DA3205C09}" type="datetimeFigureOut">
               <a:rPr lang="en-US" smtClean="0"/>
               <a:pPr/>
-              <a:t>12/12/2013</a:t>
+              <a:t>12/13/2013</a:t>
             </a:fld>
             <a:endParaRPr lang="en-US"/>
           </a:p>
@@ -1223,7 +1219,7 @@
             <a:fld id="{1D8BD707-D9CF-40AE-B4C6-C98DA3205C09}" type="datetimeFigureOut">
               <a:rPr lang="en-US" smtClean="0"/>
               <a:pPr/>
-              <a:t>12/12/2013</a:t>
+              <a:t>12/13/2013</a:t>
             </a:fld>
             <a:endParaRPr lang="en-US"/>
           </a:p>
@@ -1508,7 +1504,7 @@
             <a:fld id="{1D8BD707-D9CF-40AE-B4C6-C98DA3205C09}" type="datetimeFigureOut">
               <a:rPr lang="en-US" smtClean="0"/>
               <a:pPr/>
-              <a:t>12/12/2013</a:t>
+              <a:t>12/13/2013</a:t>
             </a:fld>
             <a:endParaRPr lang="en-US"/>
           </a:p>
@@ -1927,7 +1923,7 @@
             <a:fld id="{1D8BD707-D9CF-40AE-B4C6-C98DA3205C09}" type="datetimeFigureOut">
               <a:rPr lang="en-US" smtClean="0"/>
               <a:pPr/>
-              <a:t>12/12/2013</a:t>
+              <a:t>12/13/2013</a:t>
             </a:fld>
             <a:endParaRPr lang="en-US"/>
           </a:p>
@@ -2042,7 +2038,7 @@
             <a:fld id="{1D8BD707-D9CF-40AE-B4C6-C98DA3205C09}" type="datetimeFigureOut">
               <a:rPr lang="en-US" smtClean="0"/>
               <a:pPr/>
-              <a:t>12/12/2013</a:t>
+              <a:t>12/13/2013</a:t>
             </a:fld>
             <a:endParaRPr lang="en-US"/>
           </a:p>
@@ -2134,7 +2130,7 @@
             <a:fld id="{1D8BD707-D9CF-40AE-B4C6-C98DA3205C09}" type="datetimeFigureOut">
               <a:rPr lang="en-US" smtClean="0"/>
               <a:pPr/>
-              <a:t>12/12/2013</a:t>
+              <a:t>12/13/2013</a:t>
             </a:fld>
             <a:endParaRPr lang="en-US"/>
           </a:p>
@@ -2408,7 +2404,7 @@
             <a:fld id="{1D8BD707-D9CF-40AE-B4C6-C98DA3205C09}" type="datetimeFigureOut">
               <a:rPr lang="en-US" smtClean="0"/>
               <a:pPr/>
-              <a:t>12/12/2013</a:t>
+              <a:t>12/13/2013</a:t>
             </a:fld>
             <a:endParaRPr lang="en-US"/>
           </a:p>
@@ -2658,7 +2654,7 @@
             <a:fld id="{1D8BD707-D9CF-40AE-B4C6-C98DA3205C09}" type="datetimeFigureOut">
               <a:rPr lang="en-US" smtClean="0"/>
               <a:pPr/>
-              <a:t>12/12/2013</a:t>
+              <a:t>12/13/2013</a:t>
             </a:fld>
             <a:endParaRPr lang="en-US"/>
           </a:p>
@@ -2868,7 +2864,7 @@
             <a:fld id="{1D8BD707-D9CF-40AE-B4C6-C98DA3205C09}" type="datetimeFigureOut">
               <a:rPr lang="en-US" smtClean="0"/>
               <a:pPr/>
-              <a:t>12/12/2013</a:t>
+              <a:t>12/13/2013</a:t>
             </a:fld>
             <a:endParaRPr lang="en-US"/>
           </a:p>
@@ -3308,409 +3304,6 @@
 <file path=ppt/slides/slide10.xml><?xml version="1.0" encoding="utf-8"?>
 <p:sld xmlns:a="http://schemas.openxmlformats.org/drawingml/2006/main" xmlns:r="http://schemas.openxmlformats.org/officeDocument/2006/relationships" xmlns:p="http://schemas.openxmlformats.org/presentationml/2006/main">
   <p:cSld>
-    <p:spTree>
-      <p:nvGrpSpPr>
-        <p:cNvPr id="1" name=""/>
-        <p:cNvGrpSpPr/>
-        <p:nvPr/>
-      </p:nvGrpSpPr>
-      <p:grpSpPr>
-        <a:xfrm>
-          <a:off x="0" y="0"/>
-          <a:ext cx="0" cy="0"/>
-          <a:chOff x="0" y="0"/>
-          <a:chExt cx="0" cy="0"/>
-        </a:xfrm>
-      </p:grpSpPr>
-      <p:sp>
-        <p:nvSpPr>
-          <p:cNvPr id="4" name="Notched Right Arrow 3"/>
-          <p:cNvSpPr/>
-          <p:nvPr/>
-        </p:nvSpPr>
-        <p:spPr>
-          <a:xfrm rot="19804930">
-            <a:off x="1752600" y="1752600"/>
-            <a:ext cx="1371600" cy="838200"/>
-          </a:xfrm>
-          <a:prstGeom prst="notchedRightArrow">
-            <a:avLst/>
-          </a:prstGeom>
-        </p:spPr>
-        <p:style>
-          <a:lnRef idx="2">
-            <a:schemeClr val="accent1">
-              <a:shade val="50000"/>
-            </a:schemeClr>
-          </a:lnRef>
-          <a:fillRef idx="1">
-            <a:schemeClr val="accent1"/>
-          </a:fillRef>
-          <a:effectRef idx="0">
-            <a:schemeClr val="accent1"/>
-          </a:effectRef>
-          <a:fontRef idx="minor">
-            <a:schemeClr val="lt1"/>
-          </a:fontRef>
-        </p:style>
-        <p:txBody>
-          <a:bodyPr rtlCol="0" anchor="ctr"/>
-          <a:lstStyle/>
-          <a:p>
-            <a:pPr algn="ctr"/>
-            <a:endParaRPr lang="en-SG"/>
-          </a:p>
-        </p:txBody>
-      </p:sp>
-      <p:sp>
-        <p:nvSpPr>
-          <p:cNvPr id="5" name="Notched Right Arrow 4"/>
-          <p:cNvSpPr/>
-          <p:nvPr/>
-        </p:nvSpPr>
-        <p:spPr>
-          <a:xfrm rot="20389402">
-            <a:off x="3962400" y="3276600"/>
-            <a:ext cx="1371600" cy="838200"/>
-          </a:xfrm>
-          <a:prstGeom prst="notchedRightArrow">
-            <a:avLst/>
-          </a:prstGeom>
-        </p:spPr>
-        <p:style>
-          <a:lnRef idx="2">
-            <a:schemeClr val="accent1">
-              <a:shade val="50000"/>
-            </a:schemeClr>
-          </a:lnRef>
-          <a:fillRef idx="1">
-            <a:schemeClr val="accent1"/>
-          </a:fillRef>
-          <a:effectRef idx="0">
-            <a:schemeClr val="accent1"/>
-          </a:effectRef>
-          <a:fontRef idx="minor">
-            <a:schemeClr val="lt1"/>
-          </a:fontRef>
-        </p:style>
-        <p:txBody>
-          <a:bodyPr rtlCol="0" anchor="ctr"/>
-          <a:lstStyle/>
-          <a:p>
-            <a:pPr algn="ctr"/>
-            <a:endParaRPr lang="en-SG"/>
-          </a:p>
-        </p:txBody>
-      </p:sp>
-      <p:sp>
-        <p:nvSpPr>
-          <p:cNvPr id="6" name="Notched Right Arrow 5"/>
-          <p:cNvSpPr/>
-          <p:nvPr/>
-        </p:nvSpPr>
-        <p:spPr>
-          <a:xfrm rot="1690524">
-            <a:off x="6172200" y="4800600"/>
-            <a:ext cx="1371600" cy="838200"/>
-          </a:xfrm>
-          <a:prstGeom prst="notchedRightArrow">
-            <a:avLst/>
-          </a:prstGeom>
-        </p:spPr>
-        <p:style>
-          <a:lnRef idx="2">
-            <a:schemeClr val="accent1">
-              <a:shade val="50000"/>
-            </a:schemeClr>
-          </a:lnRef>
-          <a:fillRef idx="1">
-            <a:schemeClr val="accent1"/>
-          </a:fillRef>
-          <a:effectRef idx="0">
-            <a:schemeClr val="accent1"/>
-          </a:effectRef>
-          <a:fontRef idx="minor">
-            <a:schemeClr val="lt1"/>
-          </a:fontRef>
-        </p:style>
-        <p:txBody>
-          <a:bodyPr rtlCol="0" anchor="ctr"/>
-          <a:lstStyle/>
-          <a:p>
-            <a:pPr algn="ctr"/>
-            <a:endParaRPr lang="en-SG"/>
-          </a:p>
-        </p:txBody>
-      </p:sp>
-      <mc:AlternateContent xmlns:mc="http://schemas.openxmlformats.org/markup-compatibility/2006">
-        <mc:Choice xmlns:p14="http://schemas.microsoft.com/office/powerpoint/2010/main" Requires="p14">
-          <p:contentPart p14:bwMode="auto" r:id="rId2">
-            <p14:nvContentPartPr>
-              <p14:cNvPr id="7" name="Ink 6"/>
-              <p14:cNvContentPartPr/>
-              <p14:nvPr/>
-            </p14:nvContentPartPr>
-            <p14:xfrm>
-              <a:off x="3754080" y="1101411"/>
-              <a:ext cx="911520" cy="1130040"/>
-            </p14:xfrm>
-          </p:contentPart>
-        </mc:Choice>
-        <mc:Fallback>
-          <p:pic>
-            <p:nvPicPr>
-              <p:cNvPr id="7" name="Ink 6"/>
-              <p:cNvPicPr/>
-              <p:nvPr/>
-            </p:nvPicPr>
-            <p:blipFill>
-              <a:blip r:embed="rId3"/>
-              <a:stretch>
-                <a:fillRect/>
-              </a:stretch>
-            </p:blipFill>
-            <p:spPr>
-              <a:xfrm>
-                <a:off x="3742560" y="1090251"/>
-                <a:ext cx="933840" cy="1150920"/>
-              </a:xfrm>
-              <a:prstGeom prst="rect">
-                <a:avLst/>
-              </a:prstGeom>
-            </p:spPr>
-          </p:pic>
-        </mc:Fallback>
-      </mc:AlternateContent>
-    </p:spTree>
-    <p:extLst>
-      <p:ext uri="{BB962C8B-B14F-4D97-AF65-F5344CB8AC3E}">
-        <p14:creationId xmlns:p14="http://schemas.microsoft.com/office/powerpoint/2010/main" val="3183536092"/>
-      </p:ext>
-    </p:extLst>
-  </p:cSld>
-  <p:clrMapOvr>
-    <a:masterClrMapping/>
-  </p:clrMapOvr>
-  <p:transition spd="slow">
-    <p:push dir="u"/>
-  </p:transition>
-  <p:timing>
-    <p:tnLst>
-      <p:par>
-        <p:cTn id="1" dur="indefinite" restart="never" nodeType="tmRoot"/>
-      </p:par>
-    </p:tnLst>
-  </p:timing>
-</p:sld>
-</file>
-
-<file path=ppt/slides/slide11.xml><?xml version="1.0" encoding="utf-8"?>
-<p:sld xmlns:a="http://schemas.openxmlformats.org/drawingml/2006/main" xmlns:r="http://schemas.openxmlformats.org/officeDocument/2006/relationships" xmlns:p="http://schemas.openxmlformats.org/presentationml/2006/main">
-  <p:cSld>
-    <p:spTree>
-      <p:nvGrpSpPr>
-        <p:cNvPr id="1" name=""/>
-        <p:cNvGrpSpPr/>
-        <p:nvPr/>
-      </p:nvGrpSpPr>
-      <p:grpSpPr>
-        <a:xfrm>
-          <a:off x="0" y="0"/>
-          <a:ext cx="0" cy="0"/>
-          <a:chOff x="0" y="0"/>
-          <a:chExt cx="0" cy="0"/>
-        </a:xfrm>
-      </p:grpSpPr>
-      <p:sp>
-        <p:nvSpPr>
-          <p:cNvPr id="4" name="Notched Right Arrow 3"/>
-          <p:cNvSpPr/>
-          <p:nvPr/>
-        </p:nvSpPr>
-        <p:spPr>
-          <a:xfrm>
-            <a:off x="2743200" y="3276600"/>
-            <a:ext cx="1371600" cy="838200"/>
-          </a:xfrm>
-          <a:prstGeom prst="notchedRightArrow">
-            <a:avLst/>
-          </a:prstGeom>
-        </p:spPr>
-        <p:style>
-          <a:lnRef idx="2">
-            <a:schemeClr val="accent1">
-              <a:shade val="50000"/>
-            </a:schemeClr>
-          </a:lnRef>
-          <a:fillRef idx="1">
-            <a:schemeClr val="accent1"/>
-          </a:fillRef>
-          <a:effectRef idx="0">
-            <a:schemeClr val="accent1"/>
-          </a:effectRef>
-          <a:fontRef idx="minor">
-            <a:schemeClr val="lt1"/>
-          </a:fontRef>
-        </p:style>
-        <p:txBody>
-          <a:bodyPr rtlCol="0" anchor="ctr"/>
-          <a:lstStyle/>
-          <a:p>
-            <a:pPr algn="ctr"/>
-            <a:endParaRPr lang="en-SG"/>
-          </a:p>
-        </p:txBody>
-      </p:sp>
-      <p:sp>
-        <p:nvSpPr>
-          <p:cNvPr id="5" name="Notched Right Arrow 4"/>
-          <p:cNvSpPr/>
-          <p:nvPr/>
-        </p:nvSpPr>
-        <p:spPr>
-          <a:xfrm>
-            <a:off x="3962400" y="3276600"/>
-            <a:ext cx="1371600" cy="838200"/>
-          </a:xfrm>
-          <a:prstGeom prst="notchedRightArrow">
-            <a:avLst/>
-          </a:prstGeom>
-        </p:spPr>
-        <p:style>
-          <a:lnRef idx="2">
-            <a:schemeClr val="accent1">
-              <a:shade val="50000"/>
-            </a:schemeClr>
-          </a:lnRef>
-          <a:fillRef idx="1">
-            <a:schemeClr val="accent1"/>
-          </a:fillRef>
-          <a:effectRef idx="0">
-            <a:schemeClr val="accent1"/>
-          </a:effectRef>
-          <a:fontRef idx="minor">
-            <a:schemeClr val="lt1"/>
-          </a:fontRef>
-        </p:style>
-        <p:txBody>
-          <a:bodyPr rtlCol="0" anchor="ctr"/>
-          <a:lstStyle/>
-          <a:p>
-            <a:pPr algn="ctr"/>
-            <a:endParaRPr lang="en-SG"/>
-          </a:p>
-        </p:txBody>
-      </p:sp>
-      <p:sp>
-        <p:nvSpPr>
-          <p:cNvPr id="6" name="Notched Right Arrow 5"/>
-          <p:cNvSpPr/>
-          <p:nvPr/>
-        </p:nvSpPr>
-        <p:spPr>
-          <a:xfrm>
-            <a:off x="5171552" y="3276600"/>
-            <a:ext cx="1371600" cy="838200"/>
-          </a:xfrm>
-          <a:prstGeom prst="notchedRightArrow">
-            <a:avLst/>
-          </a:prstGeom>
-        </p:spPr>
-        <p:style>
-          <a:lnRef idx="2">
-            <a:schemeClr val="accent1">
-              <a:shade val="50000"/>
-            </a:schemeClr>
-          </a:lnRef>
-          <a:fillRef idx="1">
-            <a:schemeClr val="accent1"/>
-          </a:fillRef>
-          <a:effectRef idx="0">
-            <a:schemeClr val="accent1"/>
-          </a:effectRef>
-          <a:fontRef idx="minor">
-            <a:schemeClr val="lt1"/>
-          </a:fontRef>
-        </p:style>
-        <p:txBody>
-          <a:bodyPr rtlCol="0" anchor="ctr"/>
-          <a:lstStyle/>
-          <a:p>
-            <a:pPr algn="ctr"/>
-            <a:endParaRPr lang="en-SG"/>
-          </a:p>
-        </p:txBody>
-      </p:sp>
-      <mc:AlternateContent xmlns:mc="http://schemas.openxmlformats.org/markup-compatibility/2006">
-        <mc:Choice xmlns:p14="http://schemas.microsoft.com/office/powerpoint/2010/main" Requires="p14">
-          <p:contentPart p14:bwMode="auto" r:id="rId2">
-            <p14:nvContentPartPr>
-              <p14:cNvPr id="7" name="Ink 6"/>
-              <p14:cNvContentPartPr/>
-              <p14:nvPr/>
-            </p14:nvContentPartPr>
-            <p14:xfrm rot="1441388">
-              <a:off x="6837491" y="3285672"/>
-              <a:ext cx="734708" cy="820054"/>
-            </p14:xfrm>
-          </p:contentPart>
-        </mc:Choice>
-        <mc:Fallback>
-          <p:pic>
-            <p:nvPicPr>
-              <p:cNvPr id="7" name="Ink 6"/>
-              <p:cNvPicPr/>
-              <p:nvPr/>
-            </p:nvPicPr>
-            <p:blipFill>
-              <a:blip r:embed="rId3"/>
-              <a:stretch>
-                <a:fillRect/>
-              </a:stretch>
-            </p:blipFill>
-            <p:spPr>
-              <a:xfrm rot="1441388">
-                <a:off x="6825977" y="3274863"/>
-                <a:ext cx="757015" cy="840591"/>
-              </a:xfrm>
-              <a:prstGeom prst="rect">
-                <a:avLst/>
-              </a:prstGeom>
-            </p:spPr>
-          </p:pic>
-        </mc:Fallback>
-      </mc:AlternateContent>
-    </p:spTree>
-    <p:extLst>
-      <p:ext uri="{BB962C8B-B14F-4D97-AF65-F5344CB8AC3E}">
-        <p14:creationId xmlns:p14="http://schemas.microsoft.com/office/powerpoint/2010/main" val="1406357402"/>
-      </p:ext>
-    </p:extLst>
-  </p:cSld>
-  <p:clrMapOvr>
-    <a:masterClrMapping/>
-  </p:clrMapOvr>
-  <mc:AlternateContent xmlns:mc="http://schemas.openxmlformats.org/markup-compatibility/2006">
-    <mc:Choice xmlns:p14="http://schemas.microsoft.com/office/powerpoint/2010/main" Requires="p14">
-      <p:transition spd="slow" p14:dur="2000"/>
-    </mc:Choice>
-    <mc:Fallback>
-      <p:transition spd="slow"/>
-    </mc:Fallback>
-  </mc:AlternateContent>
-  <p:timing>
-    <p:tnLst>
-      <p:par>
-        <p:cTn id="1" dur="indefinite" restart="never" nodeType="tmRoot"/>
-      </p:par>
-    </p:tnLst>
-  </p:timing>
-</p:sld>
-</file>
-
-<file path=ppt/slides/slide12.xml><?xml version="1.0" encoding="utf-8"?>
-<p:sld xmlns:a="http://schemas.openxmlformats.org/drawingml/2006/main" xmlns:r="http://schemas.openxmlformats.org/officeDocument/2006/relationships" xmlns:p="http://schemas.openxmlformats.org/presentationml/2006/main">
-  <p:cSld>
     <p:bg>
       <p:bgPr>
         <a:solidFill>
@@ -3823,7 +3416,7 @@
 </p:sld>
 </file>
 
-<file path=ppt/slides/slide13.xml><?xml version="1.0" encoding="utf-8"?>
+<file path=ppt/slides/slide11.xml><?xml version="1.0" encoding="utf-8"?>
 <p:sld xmlns:a="http://schemas.openxmlformats.org/drawingml/2006/main" xmlns:r="http://schemas.openxmlformats.org/officeDocument/2006/relationships" xmlns:p="http://schemas.openxmlformats.org/presentationml/2006/main">
   <p:cSld>
     <p:spTree>
@@ -4290,7 +3883,7 @@
 </p:sld>
 </file>
 
-<file path=ppt/slides/slide14.xml><?xml version="1.0" encoding="utf-8"?>
+<file path=ppt/slides/slide12.xml><?xml version="1.0" encoding="utf-8"?>
 <p:sld xmlns:a="http://schemas.openxmlformats.org/drawingml/2006/main" xmlns:r="http://schemas.openxmlformats.org/officeDocument/2006/relationships" xmlns:p="http://schemas.openxmlformats.org/presentationml/2006/main">
   <p:cSld>
     <p:spTree>
@@ -4765,7 +4358,7 @@
 </p:sld>
 </file>
 
-<file path=ppt/slides/slide15.xml><?xml version="1.0" encoding="utf-8"?>
+<file path=ppt/slides/slide13.xml><?xml version="1.0" encoding="utf-8"?>
 <p:sld xmlns:a="http://schemas.openxmlformats.org/drawingml/2006/main" xmlns:r="http://schemas.openxmlformats.org/officeDocument/2006/relationships" xmlns:p="http://schemas.openxmlformats.org/presentationml/2006/main">
   <p:cSld>
     <p:bg>
@@ -4864,7 +4457,7 @@
 </p:sld>
 </file>
 
-<file path=ppt/slides/slide16.xml><?xml version="1.0" encoding="utf-8"?>
+<file path=ppt/slides/slide14.xml><?xml version="1.0" encoding="utf-8"?>
 <p:sld xmlns:a="http://schemas.openxmlformats.org/drawingml/2006/main" xmlns:r="http://schemas.openxmlformats.org/officeDocument/2006/relationships" xmlns:p="http://schemas.openxmlformats.org/presentationml/2006/main">
   <p:cSld>
     <p:spTree>
@@ -5313,7 +4906,7 @@
 </p:sld>
 </file>
 
-<file path=ppt/slides/slide17.xml><?xml version="1.0" encoding="utf-8"?>
+<file path=ppt/slides/slide15.xml><?xml version="1.0" encoding="utf-8"?>
 <p:sld xmlns:a="http://schemas.openxmlformats.org/drawingml/2006/main" xmlns:r="http://schemas.openxmlformats.org/officeDocument/2006/relationships" xmlns:p="http://schemas.openxmlformats.org/presentationml/2006/main">
   <p:cSld>
     <p:spTree>
@@ -5752,11 +5345,11 @@
   <p:clrMapOvr>
     <a:masterClrMapping/>
   </p:clrMapOvr>
-  <mc:AlternateContent xmlns:mc="http://schemas.openxmlformats.org/markup-compatibility/2006" xmlns:p14="http://schemas.microsoft.com/office/powerpoint/2010/main">
-    <mc:Choice Requires="p14">
+  <mc:AlternateContent xmlns:mc="http://schemas.openxmlformats.org/markup-compatibility/2006">
+    <mc:Choice xmlns:p14="http://schemas.microsoft.com/office/powerpoint/2010/main" Requires="p14">
       <p:transition spd="slow" p14:dur="2000"/>
     </mc:Choice>
-    <mc:Fallback xmlns="">
+    <mc:Fallback>
       <p:transition spd="slow"/>
     </mc:Fallback>
   </mc:AlternateContent>
@@ -5770,7 +5363,7 @@
 </p:sld>
 </file>
 
-<file path=ppt/slides/slide18.xml><?xml version="1.0" encoding="utf-8"?>
+<file path=ppt/slides/slide16.xml><?xml version="1.0" encoding="utf-8"?>
 <p:sld xmlns:a="http://schemas.openxmlformats.org/drawingml/2006/main" xmlns:r="http://schemas.openxmlformats.org/officeDocument/2006/relationships" xmlns:p="http://schemas.openxmlformats.org/presentationml/2006/main">
   <p:cSld>
     <p:bg>
@@ -5869,7 +5462,7 @@
 </p:sld>
 </file>
 
-<file path=ppt/slides/slide19.xml><?xml version="1.0" encoding="utf-8"?>
+<file path=ppt/slides/slide17.xml><?xml version="1.0" encoding="utf-8"?>
 <p:sld xmlns:a="http://schemas.openxmlformats.org/drawingml/2006/main" xmlns:r="http://schemas.openxmlformats.org/officeDocument/2006/relationships" xmlns:p="http://schemas.openxmlformats.org/presentationml/2006/main">
   <p:cSld>
     <p:spTree>
@@ -7499,91 +7092,7 @@
 </p:sld>
 </file>
 
-<file path=ppt/slides/slide2.xml><?xml version="1.0" encoding="utf-8"?>
-<p:sld xmlns:a="http://schemas.openxmlformats.org/drawingml/2006/main" xmlns:r="http://schemas.openxmlformats.org/officeDocument/2006/relationships" xmlns:p="http://schemas.openxmlformats.org/presentationml/2006/main">
-  <p:cSld>
-    <p:bg>
-      <p:bgPr>
-        <a:solidFill>
-          <a:schemeClr val="tx1"/>
-        </a:solidFill>
-        <a:effectLst/>
-      </p:bgPr>
-    </p:bg>
-    <p:spTree>
-      <p:nvGrpSpPr>
-        <p:cNvPr id="1" name=""/>
-        <p:cNvGrpSpPr/>
-        <p:nvPr/>
-      </p:nvGrpSpPr>
-      <p:grpSpPr>
-        <a:xfrm>
-          <a:off x="0" y="0"/>
-          <a:ext cx="0" cy="0"/>
-          <a:chOff x="0" y="0"/>
-          <a:chExt cx="0" cy="0"/>
-        </a:xfrm>
-      </p:grpSpPr>
-      <p:sp>
-        <p:nvSpPr>
-          <p:cNvPr id="2" name="Title 1"/>
-          <p:cNvSpPr>
-            <a:spLocks noGrp="1"/>
-          </p:cNvSpPr>
-          <p:nvPr>
-            <p:ph type="title"/>
-          </p:nvPr>
-        </p:nvSpPr>
-        <p:spPr>
-          <a:xfrm>
-            <a:off x="533400" y="2819400"/>
-            <a:ext cx="8229600" cy="1143000"/>
-          </a:xfrm>
-        </p:spPr>
-        <p:txBody>
-          <a:bodyPr>
-            <a:noAutofit/>
-          </a:bodyPr>
-          <a:lstStyle/>
-          <a:p>
-            <a:pPr algn="l"/>
-            <a:r>
-              <a:rPr lang="en-US" sz="7200" dirty="0" smtClean="0">
-                <a:solidFill>
-                  <a:schemeClr val="bg1"/>
-                </a:solidFill>
-              </a:rPr>
-              <a:t>Custom shape.</a:t>
-            </a:r>
-            <a:endParaRPr lang="en-SG" sz="7200" dirty="0">
-              <a:solidFill>
-                <a:schemeClr val="bg1"/>
-              </a:solidFill>
-            </a:endParaRPr>
-          </a:p>
-        </p:txBody>
-      </p:sp>
-    </p:spTree>
-    <p:extLst>
-      <p:ext uri="{BB962C8B-B14F-4D97-AF65-F5344CB8AC3E}">
-        <p14:creationId xmlns:p14="http://schemas.microsoft.com/office/powerpoint/2010/main" val="1220527465"/>
-      </p:ext>
-    </p:extLst>
-  </p:cSld>
-  <p:clrMapOvr>
-    <a:masterClrMapping/>
-  </p:clrMapOvr>
-  <p:timing>
-    <p:tnLst>
-      <p:par>
-        <p:cTn id="1" dur="indefinite" restart="never" nodeType="tmRoot"/>
-      </p:par>
-    </p:tnLst>
-  </p:timing>
-</p:sld>
-</file>
-
-<file path=ppt/slides/slide20.xml><?xml version="1.0" encoding="utf-8"?>
+<file path=ppt/slides/slide18.xml><?xml version="1.0" encoding="utf-8"?>
 <p:sld xmlns:a="http://schemas.openxmlformats.org/drawingml/2006/main" xmlns:r="http://schemas.openxmlformats.org/officeDocument/2006/relationships" xmlns:p="http://schemas.openxmlformats.org/presentationml/2006/main">
   <p:cSld>
     <p:spTree>
@@ -9171,7 +8680,7 @@
 </p:sld>
 </file>
 
-<file path=ppt/slides/slide21.xml><?xml version="1.0" encoding="utf-8"?>
+<file path=ppt/slides/slide19.xml><?xml version="1.0" encoding="utf-8"?>
 <p:sld xmlns:a="http://schemas.openxmlformats.org/drawingml/2006/main" xmlns:r="http://schemas.openxmlformats.org/officeDocument/2006/relationships" xmlns:p="http://schemas.openxmlformats.org/presentationml/2006/main">
   <p:cSld>
     <p:bg>
@@ -9253,6 +8762,307 @@
     <p:extLst>
       <p:ext uri="{BB962C8B-B14F-4D97-AF65-F5344CB8AC3E}">
         <p14:creationId xmlns:p14="http://schemas.microsoft.com/office/powerpoint/2010/main" val="576206782"/>
+      </p:ext>
+    </p:extLst>
+  </p:cSld>
+  <p:clrMapOvr>
+    <a:masterClrMapping/>
+  </p:clrMapOvr>
+  <p:timing>
+    <p:tnLst>
+      <p:par>
+        <p:cTn id="1" dur="indefinite" restart="never" nodeType="tmRoot"/>
+      </p:par>
+    </p:tnLst>
+  </p:timing>
+</p:sld>
+</file>
+
+<file path=ppt/slides/slide2.xml><?xml version="1.0" encoding="utf-8"?>
+<p:sld xmlns:a="http://schemas.openxmlformats.org/drawingml/2006/main" xmlns:r="http://schemas.openxmlformats.org/officeDocument/2006/relationships" xmlns:p="http://schemas.openxmlformats.org/presentationml/2006/main">
+  <p:cSld>
+    <p:bg>
+      <p:bgPr>
+        <a:solidFill>
+          <a:schemeClr val="tx1"/>
+        </a:solidFill>
+        <a:effectLst/>
+      </p:bgPr>
+    </p:bg>
+    <p:spTree>
+      <p:nvGrpSpPr>
+        <p:cNvPr id="1" name=""/>
+        <p:cNvGrpSpPr/>
+        <p:nvPr/>
+      </p:nvGrpSpPr>
+      <p:grpSpPr>
+        <a:xfrm>
+          <a:off x="0" y="0"/>
+          <a:ext cx="0" cy="0"/>
+          <a:chOff x="0" y="0"/>
+          <a:chExt cx="0" cy="0"/>
+        </a:xfrm>
+      </p:grpSpPr>
+      <p:sp>
+        <p:nvSpPr>
+          <p:cNvPr id="2" name="Title 1"/>
+          <p:cNvSpPr>
+            <a:spLocks noGrp="1"/>
+          </p:cNvSpPr>
+          <p:nvPr>
+            <p:ph type="title"/>
+          </p:nvPr>
+        </p:nvSpPr>
+        <p:spPr>
+          <a:xfrm>
+            <a:off x="533400" y="2819400"/>
+            <a:ext cx="8229600" cy="1143000"/>
+          </a:xfrm>
+        </p:spPr>
+        <p:txBody>
+          <a:bodyPr>
+            <a:noAutofit/>
+          </a:bodyPr>
+          <a:lstStyle/>
+          <a:p>
+            <a:pPr algn="l"/>
+            <a:r>
+              <a:rPr lang="en-US" sz="7200" dirty="0" smtClean="0">
+                <a:solidFill>
+                  <a:schemeClr val="bg1"/>
+                </a:solidFill>
+              </a:rPr>
+              <a:t>Custom shape.</a:t>
+            </a:r>
+            <a:endParaRPr lang="en-SG" sz="7200" dirty="0">
+              <a:solidFill>
+                <a:schemeClr val="bg1"/>
+              </a:solidFill>
+            </a:endParaRPr>
+          </a:p>
+        </p:txBody>
+      </p:sp>
+    </p:spTree>
+    <p:extLst>
+      <p:ext uri="{BB962C8B-B14F-4D97-AF65-F5344CB8AC3E}">
+        <p14:creationId xmlns:p14="http://schemas.microsoft.com/office/powerpoint/2010/main" val="1220527465"/>
+      </p:ext>
+    </p:extLst>
+  </p:cSld>
+  <p:clrMapOvr>
+    <a:masterClrMapping/>
+  </p:clrMapOvr>
+  <p:timing>
+    <p:tnLst>
+      <p:par>
+        <p:cTn id="1" dur="indefinite" restart="never" nodeType="tmRoot"/>
+      </p:par>
+    </p:tnLst>
+  </p:timing>
+</p:sld>
+</file>
+
+<file path=ppt/slides/slide20.xml><?xml version="1.0" encoding="utf-8"?>
+<p:sld xmlns:a="http://schemas.openxmlformats.org/drawingml/2006/main" xmlns:r="http://schemas.openxmlformats.org/officeDocument/2006/relationships" xmlns:p="http://schemas.openxmlformats.org/presentationml/2006/main">
+  <p:cSld>
+    <p:bg>
+      <p:bgPr>
+        <a:solidFill>
+          <a:schemeClr val="tx1"/>
+        </a:solidFill>
+        <a:effectLst/>
+      </p:bgPr>
+    </p:bg>
+    <p:spTree>
+      <p:nvGrpSpPr>
+        <p:cNvPr id="1" name=""/>
+        <p:cNvGrpSpPr/>
+        <p:nvPr/>
+      </p:nvGrpSpPr>
+      <p:grpSpPr>
+        <a:xfrm>
+          <a:off x="0" y="0"/>
+          <a:ext cx="0" cy="0"/>
+          <a:chOff x="0" y="0"/>
+          <a:chExt cx="0" cy="0"/>
+        </a:xfrm>
+      </p:grpSpPr>
+      <p:sp>
+        <p:nvSpPr>
+          <p:cNvPr id="2" name="Title 1"/>
+          <p:cNvSpPr>
+            <a:spLocks noGrp="1"/>
+          </p:cNvSpPr>
+          <p:nvPr>
+            <p:ph type="title"/>
+          </p:nvPr>
+        </p:nvSpPr>
+        <p:spPr>
+          <a:xfrm>
+            <a:off x="533400" y="2819400"/>
+            <a:ext cx="8229600" cy="1143000"/>
+          </a:xfrm>
+        </p:spPr>
+        <p:txBody>
+          <a:bodyPr>
+            <a:noAutofit/>
+          </a:bodyPr>
+          <a:lstStyle/>
+          <a:p>
+            <a:pPr algn="l"/>
+            <a:r>
+              <a:rPr lang="en-US" sz="7200" dirty="0" smtClean="0">
+                <a:solidFill>
+                  <a:schemeClr val="bg1"/>
+                </a:solidFill>
+              </a:rPr>
+              <a:t>For picture.</a:t>
+            </a:r>
+            <a:br>
+              <a:rPr lang="en-US" sz="7200" dirty="0" smtClean="0">
+                <a:solidFill>
+                  <a:schemeClr val="bg1"/>
+                </a:solidFill>
+              </a:rPr>
+            </a:br>
+            <a:r>
+              <a:rPr lang="en-US" sz="7200" dirty="0" smtClean="0">
+                <a:solidFill>
+                  <a:schemeClr val="bg1"/>
+                </a:solidFill>
+              </a:rPr>
+              <a:t>Typical area.</a:t>
+            </a:r>
+            <a:endParaRPr lang="en-SG" sz="7200" dirty="0">
+              <a:solidFill>
+                <a:schemeClr val="bg1"/>
+              </a:solidFill>
+            </a:endParaRPr>
+          </a:p>
+        </p:txBody>
+      </p:sp>
+    </p:spTree>
+    <p:extLst>
+      <p:ext uri="{BB962C8B-B14F-4D97-AF65-F5344CB8AC3E}">
+        <p14:creationId xmlns:p14="http://schemas.microsoft.com/office/powerpoint/2010/main" val="2336764333"/>
+      </p:ext>
+    </p:extLst>
+  </p:cSld>
+  <p:clrMapOvr>
+    <a:masterClrMapping/>
+  </p:clrMapOvr>
+  <p:timing>
+    <p:tnLst>
+      <p:par>
+        <p:cTn id="1" dur="indefinite" restart="never" nodeType="tmRoot"/>
+      </p:par>
+    </p:tnLst>
+  </p:timing>
+</p:sld>
+</file>
+
+<file path=ppt/slides/slide21.xml><?xml version="1.0" encoding="utf-8"?>
+<p:sld xmlns:a="http://schemas.openxmlformats.org/drawingml/2006/main" xmlns:r="http://schemas.openxmlformats.org/officeDocument/2006/relationships" xmlns:p="http://schemas.openxmlformats.org/presentationml/2006/main">
+  <p:cSld>
+    <p:spTree>
+      <p:nvGrpSpPr>
+        <p:cNvPr id="1" name=""/>
+        <p:cNvGrpSpPr/>
+        <p:nvPr/>
+      </p:nvGrpSpPr>
+      <p:grpSpPr>
+        <a:xfrm>
+          <a:off x="0" y="0"/>
+          <a:ext cx="0" cy="0"/>
+          <a:chOff x="0" y="0"/>
+          <a:chExt cx="0" cy="0"/>
+        </a:xfrm>
+      </p:grpSpPr>
+      <p:pic>
+        <p:nvPicPr>
+          <p:cNvPr id="1026" name="architecture" descr="https://teammatesv4.appspot.com/dev/images/highlevelArchitecture.png"/>
+          <p:cNvPicPr>
+            <a:picLocks noChangeAspect="1" noChangeArrowheads="1"/>
+          </p:cNvPicPr>
+          <p:nvPr/>
+        </p:nvPicPr>
+        <p:blipFill>
+          <a:blip r:embed="rId2">
+            <a:extLst>
+              <a:ext uri="{28A0092B-C50C-407E-A947-70E740481C1C}">
+                <a14:useLocalDpi xmlns:a14="http://schemas.microsoft.com/office/drawing/2010/main" val="0"/>
+              </a:ext>
+            </a:extLst>
+          </a:blip>
+          <a:srcRect/>
+          <a:stretch>
+            <a:fillRect/>
+          </a:stretch>
+        </p:blipFill>
+        <p:spPr bwMode="auto">
+          <a:xfrm>
+            <a:off x="457200" y="990600"/>
+            <a:ext cx="8229600" cy="4838701"/>
+          </a:xfrm>
+          <a:prstGeom prst="rect">
+            <a:avLst/>
+          </a:prstGeom>
+          <a:noFill/>
+          <a:extLst>
+            <a:ext uri="{909E8E84-426E-40DD-AFC4-6F175D3DCCD1}">
+              <a14:hiddenFill xmlns:a14="http://schemas.microsoft.com/office/drawing/2010/main">
+                <a:solidFill>
+                  <a:srgbClr val="FFFFFF"/>
+                </a:solidFill>
+              </a14:hiddenFill>
+            </a:ext>
+          </a:extLst>
+        </p:spPr>
+      </p:pic>
+      <p:sp>
+        <p:nvSpPr>
+          <p:cNvPr id="2" name="Rectangle 1"/>
+          <p:cNvSpPr/>
+          <p:nvPr/>
+        </p:nvSpPr>
+        <p:spPr>
+          <a:xfrm>
+            <a:off x="457200" y="4343400"/>
+            <a:ext cx="2743200" cy="1600200"/>
+          </a:xfrm>
+          <a:prstGeom prst="rect">
+            <a:avLst/>
+          </a:prstGeom>
+        </p:spPr>
+        <p:style>
+          <a:lnRef idx="2">
+            <a:schemeClr val="accent1">
+              <a:shade val="50000"/>
+            </a:schemeClr>
+          </a:lnRef>
+          <a:fillRef idx="1">
+            <a:schemeClr val="accent1"/>
+          </a:fillRef>
+          <a:effectRef idx="0">
+            <a:schemeClr val="accent1"/>
+          </a:effectRef>
+          <a:fontRef idx="minor">
+            <a:schemeClr val="lt1"/>
+          </a:fontRef>
+        </p:style>
+        <p:txBody>
+          <a:bodyPr rtlCol="0" anchor="ctr"/>
+          <a:lstStyle/>
+          <a:p>
+            <a:pPr algn="ctr"/>
+            <a:endParaRPr lang="en-SG"/>
+          </a:p>
+        </p:txBody>
+      </p:sp>
+    </p:spTree>
+    <p:extLst>
+      <p:ext uri="{BB962C8B-B14F-4D97-AF65-F5344CB8AC3E}">
+        <p14:creationId xmlns:p14="http://schemas.microsoft.com/office/powerpoint/2010/main" val="3388404056"/>
       </p:ext>
     </p:extLst>
   </p:cSld>
@@ -9323,223 +9133,6 @@
                   <a:schemeClr val="bg1"/>
                 </a:solidFill>
               </a:rPr>
-              <a:t>For picture.</a:t>
-            </a:r>
-            <a:br>
-              <a:rPr lang="en-US" sz="7200" dirty="0" smtClean="0">
-                <a:solidFill>
-                  <a:schemeClr val="bg1"/>
-                </a:solidFill>
-              </a:rPr>
-            </a:br>
-            <a:r>
-              <a:rPr lang="en-US" sz="7200" dirty="0" smtClean="0">
-                <a:solidFill>
-                  <a:schemeClr val="bg1"/>
-                </a:solidFill>
-              </a:rPr>
-              <a:t>Typical area.</a:t>
-            </a:r>
-            <a:endParaRPr lang="en-SG" sz="7200" dirty="0">
-              <a:solidFill>
-                <a:schemeClr val="bg1"/>
-              </a:solidFill>
-            </a:endParaRPr>
-          </a:p>
-        </p:txBody>
-      </p:sp>
-    </p:spTree>
-    <p:extLst>
-      <p:ext uri="{BB962C8B-B14F-4D97-AF65-F5344CB8AC3E}">
-        <p14:creationId xmlns:p14="http://schemas.microsoft.com/office/powerpoint/2010/main" val="2336764333"/>
-      </p:ext>
-    </p:extLst>
-  </p:cSld>
-  <p:clrMapOvr>
-    <a:masterClrMapping/>
-  </p:clrMapOvr>
-  <p:timing>
-    <p:tnLst>
-      <p:par>
-        <p:cTn id="1" dur="indefinite" restart="never" nodeType="tmRoot"/>
-      </p:par>
-    </p:tnLst>
-  </p:timing>
-</p:sld>
-</file>
-
-<file path=ppt/slides/slide23.xml><?xml version="1.0" encoding="utf-8"?>
-<p:sld xmlns:a="http://schemas.openxmlformats.org/drawingml/2006/main" xmlns:r="http://schemas.openxmlformats.org/officeDocument/2006/relationships" xmlns:p="http://schemas.openxmlformats.org/presentationml/2006/main">
-  <p:cSld>
-    <p:spTree>
-      <p:nvGrpSpPr>
-        <p:cNvPr id="1" name=""/>
-        <p:cNvGrpSpPr/>
-        <p:nvPr/>
-      </p:nvGrpSpPr>
-      <p:grpSpPr>
-        <a:xfrm>
-          <a:off x="0" y="0"/>
-          <a:ext cx="0" cy="0"/>
-          <a:chOff x="0" y="0"/>
-          <a:chExt cx="0" cy="0"/>
-        </a:xfrm>
-      </p:grpSpPr>
-      <p:pic>
-        <p:nvPicPr>
-          <p:cNvPr id="1026" name="architecture" descr="https://teammatesv4.appspot.com/dev/images/highlevelArchitecture.png"/>
-          <p:cNvPicPr>
-            <a:picLocks noChangeAspect="1" noChangeArrowheads="1"/>
-          </p:cNvPicPr>
-          <p:nvPr/>
-        </p:nvPicPr>
-        <p:blipFill>
-          <a:blip r:embed="rId2">
-            <a:extLst>
-              <a:ext uri="{28A0092B-C50C-407E-A947-70E740481C1C}">
-                <a14:useLocalDpi xmlns:a14="http://schemas.microsoft.com/office/drawing/2010/main" val="0"/>
-              </a:ext>
-            </a:extLst>
-          </a:blip>
-          <a:srcRect/>
-          <a:stretch>
-            <a:fillRect/>
-          </a:stretch>
-        </p:blipFill>
-        <p:spPr bwMode="auto">
-          <a:xfrm>
-            <a:off x="457200" y="990600"/>
-            <a:ext cx="8229600" cy="4838701"/>
-          </a:xfrm>
-          <a:prstGeom prst="rect">
-            <a:avLst/>
-          </a:prstGeom>
-          <a:noFill/>
-          <a:extLst>
-            <a:ext uri="{909E8E84-426E-40DD-AFC4-6F175D3DCCD1}">
-              <a14:hiddenFill xmlns:a14="http://schemas.microsoft.com/office/drawing/2010/main">
-                <a:solidFill>
-                  <a:srgbClr val="FFFFFF"/>
-                </a:solidFill>
-              </a14:hiddenFill>
-            </a:ext>
-          </a:extLst>
-        </p:spPr>
-      </p:pic>
-      <p:sp>
-        <p:nvSpPr>
-          <p:cNvPr id="2" name="Rectangle 1"/>
-          <p:cNvSpPr/>
-          <p:nvPr/>
-        </p:nvSpPr>
-        <p:spPr>
-          <a:xfrm>
-            <a:off x="457200" y="4343400"/>
-            <a:ext cx="2743200" cy="1600200"/>
-          </a:xfrm>
-          <a:prstGeom prst="rect">
-            <a:avLst/>
-          </a:prstGeom>
-        </p:spPr>
-        <p:style>
-          <a:lnRef idx="2">
-            <a:schemeClr val="accent1">
-              <a:shade val="50000"/>
-            </a:schemeClr>
-          </a:lnRef>
-          <a:fillRef idx="1">
-            <a:schemeClr val="accent1"/>
-          </a:fillRef>
-          <a:effectRef idx="0">
-            <a:schemeClr val="accent1"/>
-          </a:effectRef>
-          <a:fontRef idx="minor">
-            <a:schemeClr val="lt1"/>
-          </a:fontRef>
-        </p:style>
-        <p:txBody>
-          <a:bodyPr rtlCol="0" anchor="ctr"/>
-          <a:lstStyle/>
-          <a:p>
-            <a:pPr algn="ctr"/>
-            <a:endParaRPr lang="en-SG"/>
-          </a:p>
-        </p:txBody>
-      </p:sp>
-    </p:spTree>
-    <p:extLst>
-      <p:ext uri="{BB962C8B-B14F-4D97-AF65-F5344CB8AC3E}">
-        <p14:creationId xmlns:p14="http://schemas.microsoft.com/office/powerpoint/2010/main" val="3388404056"/>
-      </p:ext>
-    </p:extLst>
-  </p:cSld>
-  <p:clrMapOvr>
-    <a:masterClrMapping/>
-  </p:clrMapOvr>
-  <p:timing>
-    <p:tnLst>
-      <p:par>
-        <p:cTn id="1" dur="indefinite" restart="never" nodeType="tmRoot"/>
-      </p:par>
-    </p:tnLst>
-  </p:timing>
-</p:sld>
-</file>
-
-<file path=ppt/slides/slide24.xml><?xml version="1.0" encoding="utf-8"?>
-<p:sld xmlns:a="http://schemas.openxmlformats.org/drawingml/2006/main" xmlns:r="http://schemas.openxmlformats.org/officeDocument/2006/relationships" xmlns:p="http://schemas.openxmlformats.org/presentationml/2006/main">
-  <p:cSld>
-    <p:bg>
-      <p:bgPr>
-        <a:solidFill>
-          <a:schemeClr val="tx1"/>
-        </a:solidFill>
-        <a:effectLst/>
-      </p:bgPr>
-    </p:bg>
-    <p:spTree>
-      <p:nvGrpSpPr>
-        <p:cNvPr id="1" name=""/>
-        <p:cNvGrpSpPr/>
-        <p:nvPr/>
-      </p:nvGrpSpPr>
-      <p:grpSpPr>
-        <a:xfrm>
-          <a:off x="0" y="0"/>
-          <a:ext cx="0" cy="0"/>
-          <a:chOff x="0" y="0"/>
-          <a:chExt cx="0" cy="0"/>
-        </a:xfrm>
-      </p:grpSpPr>
-      <p:sp>
-        <p:nvSpPr>
-          <p:cNvPr id="2" name="Title 1"/>
-          <p:cNvSpPr>
-            <a:spLocks noGrp="1"/>
-          </p:cNvSpPr>
-          <p:nvPr>
-            <p:ph type="title"/>
-          </p:nvPr>
-        </p:nvSpPr>
-        <p:spPr>
-          <a:xfrm>
-            <a:off x="533400" y="2819400"/>
-            <a:ext cx="8229600" cy="1143000"/>
-          </a:xfrm>
-        </p:spPr>
-        <p:txBody>
-          <a:bodyPr>
-            <a:noAutofit/>
-          </a:bodyPr>
-          <a:lstStyle/>
-          <a:p>
-            <a:pPr algn="l"/>
-            <a:r>
-              <a:rPr lang="en-US" sz="7200" dirty="0" smtClean="0">
-                <a:solidFill>
-                  <a:schemeClr val="bg1"/>
-                </a:solidFill>
-              </a:rPr>
               <a:t>Normal objects.</a:t>
             </a:r>
             <a:br>
@@ -9585,7 +9178,7 @@
 </p:sld>
 </file>
 
-<file path=ppt/slides/slide25.xml><?xml version="1.0" encoding="utf-8"?>
+<file path=ppt/slides/slide23.xml><?xml version="1.0" encoding="utf-8"?>
 <p:sld xmlns:a="http://schemas.openxmlformats.org/drawingml/2006/main" xmlns:r="http://schemas.openxmlformats.org/officeDocument/2006/relationships" xmlns:p="http://schemas.openxmlformats.org/presentationml/2006/main">
   <p:cSld>
     <p:spTree>
@@ -11944,6 +11537,113 @@
           </a:extLst>
         </p:spPr>
       </p:pic>
+      <p:sp>
+        <p:nvSpPr>
+          <p:cNvPr id="2" name="Freeform 1"/>
+          <p:cNvSpPr/>
+          <p:nvPr/>
+        </p:nvSpPr>
+        <p:spPr>
+          <a:xfrm>
+            <a:off x="5428648" y="1790299"/>
+            <a:ext cx="3214838" cy="2849078"/>
+          </a:xfrm>
+          <a:custGeom>
+            <a:avLst/>
+            <a:gdLst>
+              <a:gd name="connsiteX0" fmla="*/ 86628 w 3214838"/>
+              <a:gd name="connsiteY0" fmla="*/ 9625 h 2849078"/>
+              <a:gd name="connsiteX1" fmla="*/ 3195588 w 3214838"/>
+              <a:gd name="connsiteY1" fmla="*/ 0 h 2849078"/>
+              <a:gd name="connsiteX2" fmla="*/ 3214838 w 3214838"/>
+              <a:gd name="connsiteY2" fmla="*/ 1443789 h 2849078"/>
+              <a:gd name="connsiteX3" fmla="*/ 1684421 w 3214838"/>
+              <a:gd name="connsiteY3" fmla="*/ 1491916 h 2849078"/>
+              <a:gd name="connsiteX4" fmla="*/ 1665171 w 3214838"/>
+              <a:gd name="connsiteY4" fmla="*/ 2849078 h 2849078"/>
+              <a:gd name="connsiteX5" fmla="*/ 0 w 3214838"/>
+              <a:gd name="connsiteY5" fmla="*/ 2829827 h 2849078"/>
+              <a:gd name="connsiteX6" fmla="*/ 86628 w 3214838"/>
+              <a:gd name="connsiteY6" fmla="*/ 9625 h 2849078"/>
+            </a:gdLst>
+            <a:ahLst/>
+            <a:cxnLst>
+              <a:cxn ang="0">
+                <a:pos x="connsiteX0" y="connsiteY0"/>
+              </a:cxn>
+              <a:cxn ang="0">
+                <a:pos x="connsiteX1" y="connsiteY1"/>
+              </a:cxn>
+              <a:cxn ang="0">
+                <a:pos x="connsiteX2" y="connsiteY2"/>
+              </a:cxn>
+              <a:cxn ang="0">
+                <a:pos x="connsiteX3" y="connsiteY3"/>
+              </a:cxn>
+              <a:cxn ang="0">
+                <a:pos x="connsiteX4" y="connsiteY4"/>
+              </a:cxn>
+              <a:cxn ang="0">
+                <a:pos x="connsiteX5" y="connsiteY5"/>
+              </a:cxn>
+              <a:cxn ang="0">
+                <a:pos x="connsiteX6" y="connsiteY6"/>
+              </a:cxn>
+            </a:cxnLst>
+            <a:rect l="l" t="t" r="r" b="b"/>
+            <a:pathLst>
+              <a:path w="3214838" h="2849078">
+                <a:moveTo>
+                  <a:pt x="86628" y="9625"/>
+                </a:moveTo>
+                <a:lnTo>
+                  <a:pt x="3195588" y="0"/>
+                </a:lnTo>
+                <a:lnTo>
+                  <a:pt x="3214838" y="1443789"/>
+                </a:lnTo>
+                <a:lnTo>
+                  <a:pt x="1684421" y="1491916"/>
+                </a:lnTo>
+                <a:lnTo>
+                  <a:pt x="1665171" y="2849078"/>
+                </a:lnTo>
+                <a:lnTo>
+                  <a:pt x="0" y="2829827"/>
+                </a:lnTo>
+                <a:lnTo>
+                  <a:pt x="86628" y="9625"/>
+                </a:lnTo>
+                <a:close/>
+              </a:path>
+            </a:pathLst>
+          </a:custGeom>
+        </p:spPr>
+        <p:style>
+          <a:lnRef idx="2">
+            <a:schemeClr val="accent1">
+              <a:shade val="50000"/>
+            </a:schemeClr>
+          </a:lnRef>
+          <a:fillRef idx="1">
+            <a:schemeClr val="accent1"/>
+          </a:fillRef>
+          <a:effectRef idx="0">
+            <a:schemeClr val="accent1"/>
+          </a:effectRef>
+          <a:fontRef idx="minor">
+            <a:schemeClr val="lt1"/>
+          </a:fontRef>
+        </p:style>
+        <p:txBody>
+          <a:bodyPr rtlCol="0" anchor="ctr"/>
+          <a:lstStyle/>
+          <a:p>
+            <a:pPr algn="ctr"/>
+            <a:endParaRPr lang="en-SG"/>
+          </a:p>
+        </p:txBody>
+      </p:sp>
     </p:spTree>
     <p:extLst>
       <p:ext uri="{BB962C8B-B14F-4D97-AF65-F5344CB8AC3E}">
@@ -11965,156 +11665,6 @@
 </file>
 
 <file path=ppt/slides/slide4.xml><?xml version="1.0" encoding="utf-8"?>
-<p:sld xmlns:a="http://schemas.openxmlformats.org/drawingml/2006/main" xmlns:r="http://schemas.openxmlformats.org/officeDocument/2006/relationships" xmlns:p="http://schemas.openxmlformats.org/presentationml/2006/main">
-  <p:cSld name="PPTLabsSpotlight201311231402397867">
-    <p:spTree>
-      <p:nvGrpSpPr>
-        <p:cNvPr id="1" name=""/>
-        <p:cNvGrpSpPr/>
-        <p:nvPr/>
-      </p:nvGrpSpPr>
-      <p:grpSpPr>
-        <a:xfrm>
-          <a:off x="0" y="0"/>
-          <a:ext cx="0" cy="0"/>
-          <a:chOff x="0" y="0"/>
-          <a:chExt cx="0" cy="0"/>
-        </a:xfrm>
-      </p:grpSpPr>
-      <p:pic>
-        <p:nvPicPr>
-          <p:cNvPr id="1026" name="architecture" descr="https://teammatesv4.appspot.com/dev/images/highlevelArchitecture.png"/>
-          <p:cNvPicPr>
-            <a:picLocks noChangeAspect="1" noChangeArrowheads="1"/>
-          </p:cNvPicPr>
-          <p:nvPr/>
-        </p:nvPicPr>
-        <p:blipFill>
-          <a:blip r:embed="rId2">
-            <a:extLst>
-              <a:ext uri="{28A0092B-C50C-407E-A947-70E740481C1C}">
-                <a14:useLocalDpi xmlns:a14="http://schemas.microsoft.com/office/drawing/2010/main" val="0"/>
-              </a:ext>
-            </a:extLst>
-          </a:blip>
-          <a:srcRect/>
-          <a:stretch>
-            <a:fillRect/>
-          </a:stretch>
-        </p:blipFill>
-        <p:spPr bwMode="auto">
-          <a:xfrm>
-            <a:off x="457200" y="990600"/>
-            <a:ext cx="8229600" cy="4838701"/>
-          </a:xfrm>
-          <a:prstGeom prst="rect">
-            <a:avLst/>
-          </a:prstGeom>
-          <a:noFill/>
-          <a:extLst>
-            <a:ext uri="{909E8E84-426E-40DD-AFC4-6F175D3DCCD1}">
-              <a14:hiddenFill xmlns:a14="http://schemas.microsoft.com/office/drawing/2010/main">
-                <a:solidFill>
-                  <a:srgbClr val="FFFFFF"/>
-                </a:solidFill>
-              </a14:hiddenFill>
-            </a:ext>
-          </a:extLst>
-        </p:spPr>
-      </p:pic>
-      <p:pic>
-        <p:nvPicPr>
-          <p:cNvPr id="2050" name="Picture 2"/>
-          <p:cNvPicPr>
-            <a:picLocks noChangeAspect="1" noChangeArrowheads="1"/>
-          </p:cNvPicPr>
-          <p:nvPr/>
-        </p:nvPicPr>
-        <p:blipFill>
-          <a:blip r:embed="rId3">
-            <a:clrChange>
-              <a:clrFrom>
-                <a:srgbClr val="FFFFFF"/>
-              </a:clrFrom>
-              <a:clrTo>
-                <a:srgbClr val="FFFFFF">
-                  <a:alpha val="0"/>
-                </a:srgbClr>
-              </a:clrTo>
-            </a:clrChange>
-            <a:extLst>
-              <a:ext uri="{28A0092B-C50C-407E-A947-70E740481C1C}">
-                <a14:useLocalDpi xmlns:a14="http://schemas.microsoft.com/office/drawing/2010/main" val="0"/>
-              </a:ext>
-            </a:extLst>
-          </a:blip>
-          <a:srcRect/>
-          <a:stretch>
-            <a:fillRect/>
-          </a:stretch>
-        </p:blipFill>
-        <p:spPr bwMode="auto">
-          <a:xfrm>
-            <a:off x="0" y="0"/>
-            <a:ext cx="9144000" cy="6858000"/>
-          </a:xfrm>
-          <a:prstGeom prst="rect">
-            <a:avLst/>
-          </a:prstGeom>
-          <a:noFill/>
-          <a:ln>
-            <a:noFill/>
-          </a:ln>
-          <a:effectLst>
-            <a:outerShdw dist="35921" dir="2700000" algn="ctr" rotWithShape="0">
-              <a:schemeClr val="bg2"/>
-            </a:outerShdw>
-            <a:softEdge rad="127000"/>
-          </a:effectLst>
-          <a:extLst>
-            <a:ext uri="{909E8E84-426E-40DD-AFC4-6F175D3DCCD1}">
-              <a14:hiddenFill xmlns:a14="http://schemas.microsoft.com/office/drawing/2010/main">
-                <a:solidFill>
-                  <a:schemeClr val="accent1">
-                    <a:alpha val="0"/>
-                  </a:schemeClr>
-                </a:solidFill>
-              </a14:hiddenFill>
-            </a:ext>
-            <a:ext uri="{91240B29-F687-4F45-9708-019B960494DF}">
-              <a14:hiddenLine xmlns:a14="http://schemas.microsoft.com/office/drawing/2010/main" w="9525">
-                <a:solidFill>
-                  <a:schemeClr val="tx1"/>
-                </a:solidFill>
-                <a:miter lim="800000"/>
-                <a:headEnd/>
-                <a:tailEnd/>
-              </a14:hiddenLine>
-            </a:ext>
-          </a:extLst>
-        </p:spPr>
-      </p:pic>
-    </p:spTree>
-    <p:extLst>
-      <p:ext uri="{BB962C8B-B14F-4D97-AF65-F5344CB8AC3E}">
-        <p14:creationId xmlns:p14="http://schemas.microsoft.com/office/powerpoint/2010/main" val="209746294"/>
-      </p:ext>
-    </p:extLst>
-  </p:cSld>
-  <p:clrMapOvr>
-    <a:masterClrMapping/>
-  </p:clrMapOvr>
-  <p:timing>
-    <p:tnLst>
-      <p:par>
-        <p:cTn id="1" dur="indefinite" restart="never" nodeType="tmRoot"/>
-      </p:par>
-    </p:tnLst>
-  </p:timing>
-</p:sld>
-</file>
-
-<file path=ppt/slides/slide5.xml><?xml version="1.0" encoding="utf-8"?>
 <p:sld xmlns:a="http://schemas.openxmlformats.org/drawingml/2006/main" xmlns:r="http://schemas.openxmlformats.org/officeDocument/2006/relationships" xmlns:p="http://schemas.openxmlformats.org/presentationml/2006/main">
   <p:cSld>
     <p:bg>
@@ -12198,7 +11748,7 @@
 </p:sld>
 </file>
 
-<file path=ppt/slides/slide6.xml><?xml version="1.0" encoding="utf-8"?>
+<file path=ppt/slides/slide5.xml><?xml version="1.0" encoding="utf-8"?>
 <p:sld xmlns:a="http://schemas.openxmlformats.org/drawingml/2006/main" xmlns:r="http://schemas.openxmlformats.org/officeDocument/2006/relationships" xmlns:p="http://schemas.openxmlformats.org/presentationml/2006/main">
   <p:cSld>
     <p:spTree>
@@ -12256,6 +11806,46 @@
           </a:extLst>
         </p:spPr>
       </p:pic>
+      <p:sp>
+        <p:nvSpPr>
+          <p:cNvPr id="2" name="Rectangle 1"/>
+          <p:cNvSpPr/>
+          <p:nvPr/>
+        </p:nvSpPr>
+        <p:spPr>
+          <a:xfrm>
+            <a:off x="-762000" y="2514600"/>
+            <a:ext cx="11049000" cy="1600200"/>
+          </a:xfrm>
+          <a:prstGeom prst="rect">
+            <a:avLst/>
+          </a:prstGeom>
+        </p:spPr>
+        <p:style>
+          <a:lnRef idx="2">
+            <a:schemeClr val="accent1">
+              <a:shade val="50000"/>
+            </a:schemeClr>
+          </a:lnRef>
+          <a:fillRef idx="1">
+            <a:schemeClr val="accent1"/>
+          </a:fillRef>
+          <a:effectRef idx="0">
+            <a:schemeClr val="accent1"/>
+          </a:effectRef>
+          <a:fontRef idx="minor">
+            <a:schemeClr val="lt1"/>
+          </a:fontRef>
+        </p:style>
+        <p:txBody>
+          <a:bodyPr rtlCol="0" anchor="ctr"/>
+          <a:lstStyle/>
+          <a:p>
+            <a:pPr algn="ctr"/>
+            <a:endParaRPr lang="en-SG"/>
+          </a:p>
+        </p:txBody>
+      </p:sp>
     </p:spTree>
     <p:extLst>
       <p:ext uri="{BB962C8B-B14F-4D97-AF65-F5344CB8AC3E}">
@@ -12276,157 +11866,7 @@
 </p:sld>
 </file>
 
-<file path=ppt/slides/slide7.xml><?xml version="1.0" encoding="utf-8"?>
-<p:sld xmlns:a="http://schemas.openxmlformats.org/drawingml/2006/main" xmlns:r="http://schemas.openxmlformats.org/officeDocument/2006/relationships" xmlns:p="http://schemas.openxmlformats.org/presentationml/2006/main">
-  <p:cSld name="PPTLabsSpotlight201311231508452492">
-    <p:spTree>
-      <p:nvGrpSpPr>
-        <p:cNvPr id="1" name=""/>
-        <p:cNvGrpSpPr/>
-        <p:nvPr/>
-      </p:nvGrpSpPr>
-      <p:grpSpPr>
-        <a:xfrm>
-          <a:off x="0" y="0"/>
-          <a:ext cx="0" cy="0"/>
-          <a:chOff x="0" y="0"/>
-          <a:chExt cx="0" cy="0"/>
-        </a:xfrm>
-      </p:grpSpPr>
-      <p:pic>
-        <p:nvPicPr>
-          <p:cNvPr id="1026" name="architecture" descr="https://teammatesv4.appspot.com/dev/images/highlevelArchitecture.png"/>
-          <p:cNvPicPr>
-            <a:picLocks noChangeAspect="1" noChangeArrowheads="1"/>
-          </p:cNvPicPr>
-          <p:nvPr/>
-        </p:nvPicPr>
-        <p:blipFill>
-          <a:blip r:embed="rId2">
-            <a:extLst>
-              <a:ext uri="{28A0092B-C50C-407E-A947-70E740481C1C}">
-                <a14:useLocalDpi xmlns:a14="http://schemas.microsoft.com/office/drawing/2010/main" val="0"/>
-              </a:ext>
-            </a:extLst>
-          </a:blip>
-          <a:srcRect/>
-          <a:stretch>
-            <a:fillRect/>
-          </a:stretch>
-        </p:blipFill>
-        <p:spPr bwMode="auto">
-          <a:xfrm>
-            <a:off x="457200" y="990600"/>
-            <a:ext cx="8229600" cy="4838701"/>
-          </a:xfrm>
-          <a:prstGeom prst="rect">
-            <a:avLst/>
-          </a:prstGeom>
-          <a:noFill/>
-          <a:extLst>
-            <a:ext uri="{909E8E84-426E-40DD-AFC4-6F175D3DCCD1}">
-              <a14:hiddenFill xmlns:a14="http://schemas.microsoft.com/office/drawing/2010/main">
-                <a:solidFill>
-                  <a:srgbClr val="FFFFFF"/>
-                </a:solidFill>
-              </a14:hiddenFill>
-            </a:ext>
-          </a:extLst>
-        </p:spPr>
-      </p:pic>
-      <p:pic>
-        <p:nvPicPr>
-          <p:cNvPr id="17410" name="Picture 2"/>
-          <p:cNvPicPr>
-            <a:picLocks noChangeAspect="1" noChangeArrowheads="1"/>
-          </p:cNvPicPr>
-          <p:nvPr/>
-        </p:nvPicPr>
-        <p:blipFill>
-          <a:blip r:embed="rId3">
-            <a:clrChange>
-              <a:clrFrom>
-                <a:srgbClr val="FFFFFF"/>
-              </a:clrFrom>
-              <a:clrTo>
-                <a:srgbClr val="FFFFFF">
-                  <a:alpha val="0"/>
-                </a:srgbClr>
-              </a:clrTo>
-            </a:clrChange>
-            <a:extLst>
-              <a:ext uri="{28A0092B-C50C-407E-A947-70E740481C1C}">
-                <a14:useLocalDpi xmlns:a14="http://schemas.microsoft.com/office/drawing/2010/main" val="0"/>
-              </a:ext>
-            </a:extLst>
-          </a:blip>
-          <a:srcRect/>
-          <a:stretch>
-            <a:fillRect/>
-          </a:stretch>
-        </p:blipFill>
-        <p:spPr bwMode="auto">
-          <a:xfrm>
-            <a:off x="0" y="0"/>
-            <a:ext cx="10821988" cy="6858000"/>
-          </a:xfrm>
-          <a:prstGeom prst="rect">
-            <a:avLst/>
-          </a:prstGeom>
-          <a:noFill/>
-          <a:ln>
-            <a:noFill/>
-          </a:ln>
-          <a:effectLst>
-            <a:outerShdw dist="35921" dir="2700000" algn="ctr" rotWithShape="0">
-              <a:schemeClr val="bg2"/>
-            </a:outerShdw>
-            <a:softEdge rad="127000"/>
-          </a:effectLst>
-          <a:extLst>
-            <a:ext uri="{909E8E84-426E-40DD-AFC4-6F175D3DCCD1}">
-              <a14:hiddenFill xmlns:a14="http://schemas.microsoft.com/office/drawing/2010/main">
-                <a:solidFill>
-                  <a:schemeClr val="accent1">
-                    <a:alpha val="0"/>
-                  </a:schemeClr>
-                </a:solidFill>
-              </a14:hiddenFill>
-            </a:ext>
-            <a:ext uri="{91240B29-F687-4F45-9708-019B960494DF}">
-              <a14:hiddenLine xmlns:a14="http://schemas.microsoft.com/office/drawing/2010/main" w="9525">
-                <a:solidFill>
-                  <a:schemeClr val="tx1"/>
-                </a:solidFill>
-                <a:miter lim="800000"/>
-                <a:headEnd/>
-                <a:tailEnd/>
-              </a14:hiddenLine>
-            </a:ext>
-          </a:extLst>
-        </p:spPr>
-      </p:pic>
-    </p:spTree>
-    <p:extLst>
-      <p:ext uri="{BB962C8B-B14F-4D97-AF65-F5344CB8AC3E}">
-        <p14:creationId xmlns:p14="http://schemas.microsoft.com/office/powerpoint/2010/main" val="702134876"/>
-      </p:ext>
-    </p:extLst>
-  </p:cSld>
-  <p:clrMapOvr>
-    <a:masterClrMapping/>
-  </p:clrMapOvr>
-  <p:timing>
-    <p:tnLst>
-      <p:par>
-        <p:cTn id="1" dur="indefinite" restart="never" nodeType="tmRoot"/>
-      </p:par>
-    </p:tnLst>
-  </p:timing>
-</p:sld>
-</file>
-
-<file path=ppt/slides/slide8.xml><?xml version="1.0" encoding="utf-8"?>
+<file path=ppt/slides/slide6.xml><?xml version="1.0" encoding="utf-8"?>
 <p:sld xmlns:a="http://schemas.openxmlformats.org/drawingml/2006/main" xmlns:r="http://schemas.openxmlformats.org/officeDocument/2006/relationships" xmlns:p="http://schemas.openxmlformats.org/presentationml/2006/main">
   <p:cSld>
     <p:bg>
@@ -12509,7 +11949,7 @@
 </p:sld>
 </file>
 
-<file path=ppt/slides/slide9.xml><?xml version="1.0" encoding="utf-8"?>
+<file path=ppt/slides/slide7.xml><?xml version="1.0" encoding="utf-8"?>
 <p:sld xmlns:a="http://schemas.openxmlformats.org/drawingml/2006/main" xmlns:r="http://schemas.openxmlformats.org/officeDocument/2006/relationships" xmlns:p="http://schemas.openxmlformats.org/presentationml/2006/main">
   <p:cSld>
     <p:bg>
@@ -12598,6 +12038,409 @@
   <p:clrMapOvr>
     <a:masterClrMapping/>
   </p:clrMapOvr>
+  <p:timing>
+    <p:tnLst>
+      <p:par>
+        <p:cTn id="1" dur="indefinite" restart="never" nodeType="tmRoot"/>
+      </p:par>
+    </p:tnLst>
+  </p:timing>
+</p:sld>
+</file>
+
+<file path=ppt/slides/slide8.xml><?xml version="1.0" encoding="utf-8"?>
+<p:sld xmlns:a="http://schemas.openxmlformats.org/drawingml/2006/main" xmlns:r="http://schemas.openxmlformats.org/officeDocument/2006/relationships" xmlns:p="http://schemas.openxmlformats.org/presentationml/2006/main">
+  <p:cSld>
+    <p:spTree>
+      <p:nvGrpSpPr>
+        <p:cNvPr id="1" name=""/>
+        <p:cNvGrpSpPr/>
+        <p:nvPr/>
+      </p:nvGrpSpPr>
+      <p:grpSpPr>
+        <a:xfrm>
+          <a:off x="0" y="0"/>
+          <a:ext cx="0" cy="0"/>
+          <a:chOff x="0" y="0"/>
+          <a:chExt cx="0" cy="0"/>
+        </a:xfrm>
+      </p:grpSpPr>
+      <p:sp>
+        <p:nvSpPr>
+          <p:cNvPr id="4" name="Notched Right Arrow 3"/>
+          <p:cNvSpPr/>
+          <p:nvPr/>
+        </p:nvSpPr>
+        <p:spPr>
+          <a:xfrm rot="19804930">
+            <a:off x="1752600" y="1752600"/>
+            <a:ext cx="1371600" cy="838200"/>
+          </a:xfrm>
+          <a:prstGeom prst="notchedRightArrow">
+            <a:avLst/>
+          </a:prstGeom>
+        </p:spPr>
+        <p:style>
+          <a:lnRef idx="2">
+            <a:schemeClr val="accent1">
+              <a:shade val="50000"/>
+            </a:schemeClr>
+          </a:lnRef>
+          <a:fillRef idx="1">
+            <a:schemeClr val="accent1"/>
+          </a:fillRef>
+          <a:effectRef idx="0">
+            <a:schemeClr val="accent1"/>
+          </a:effectRef>
+          <a:fontRef idx="minor">
+            <a:schemeClr val="lt1"/>
+          </a:fontRef>
+        </p:style>
+        <p:txBody>
+          <a:bodyPr rtlCol="0" anchor="ctr"/>
+          <a:lstStyle/>
+          <a:p>
+            <a:pPr algn="ctr"/>
+            <a:endParaRPr lang="en-SG"/>
+          </a:p>
+        </p:txBody>
+      </p:sp>
+      <p:sp>
+        <p:nvSpPr>
+          <p:cNvPr id="5" name="Notched Right Arrow 4"/>
+          <p:cNvSpPr/>
+          <p:nvPr/>
+        </p:nvSpPr>
+        <p:spPr>
+          <a:xfrm rot="20389402">
+            <a:off x="3962400" y="3276600"/>
+            <a:ext cx="1371600" cy="838200"/>
+          </a:xfrm>
+          <a:prstGeom prst="notchedRightArrow">
+            <a:avLst/>
+          </a:prstGeom>
+        </p:spPr>
+        <p:style>
+          <a:lnRef idx="2">
+            <a:schemeClr val="accent1">
+              <a:shade val="50000"/>
+            </a:schemeClr>
+          </a:lnRef>
+          <a:fillRef idx="1">
+            <a:schemeClr val="accent1"/>
+          </a:fillRef>
+          <a:effectRef idx="0">
+            <a:schemeClr val="accent1"/>
+          </a:effectRef>
+          <a:fontRef idx="minor">
+            <a:schemeClr val="lt1"/>
+          </a:fontRef>
+        </p:style>
+        <p:txBody>
+          <a:bodyPr rtlCol="0" anchor="ctr"/>
+          <a:lstStyle/>
+          <a:p>
+            <a:pPr algn="ctr"/>
+            <a:endParaRPr lang="en-SG"/>
+          </a:p>
+        </p:txBody>
+      </p:sp>
+      <p:sp>
+        <p:nvSpPr>
+          <p:cNvPr id="6" name="Notched Right Arrow 5"/>
+          <p:cNvSpPr/>
+          <p:nvPr/>
+        </p:nvSpPr>
+        <p:spPr>
+          <a:xfrm rot="1690524">
+            <a:off x="6172200" y="4800600"/>
+            <a:ext cx="1371600" cy="838200"/>
+          </a:xfrm>
+          <a:prstGeom prst="notchedRightArrow">
+            <a:avLst/>
+          </a:prstGeom>
+        </p:spPr>
+        <p:style>
+          <a:lnRef idx="2">
+            <a:schemeClr val="accent1">
+              <a:shade val="50000"/>
+            </a:schemeClr>
+          </a:lnRef>
+          <a:fillRef idx="1">
+            <a:schemeClr val="accent1"/>
+          </a:fillRef>
+          <a:effectRef idx="0">
+            <a:schemeClr val="accent1"/>
+          </a:effectRef>
+          <a:fontRef idx="minor">
+            <a:schemeClr val="lt1"/>
+          </a:fontRef>
+        </p:style>
+        <p:txBody>
+          <a:bodyPr rtlCol="0" anchor="ctr"/>
+          <a:lstStyle/>
+          <a:p>
+            <a:pPr algn="ctr"/>
+            <a:endParaRPr lang="en-SG"/>
+          </a:p>
+        </p:txBody>
+      </p:sp>
+      <mc:AlternateContent xmlns:mc="http://schemas.openxmlformats.org/markup-compatibility/2006" xmlns:p14="http://schemas.microsoft.com/office/powerpoint/2010/main">
+        <mc:Choice Requires="p14">
+          <p:contentPart p14:bwMode="auto" r:id="rId2">
+            <p14:nvContentPartPr>
+              <p14:cNvPr id="7" name="Ink 6"/>
+              <p14:cNvContentPartPr/>
+              <p14:nvPr/>
+            </p14:nvContentPartPr>
+            <p14:xfrm>
+              <a:off x="3754080" y="1101411"/>
+              <a:ext cx="911520" cy="1130040"/>
+            </p14:xfrm>
+          </p:contentPart>
+        </mc:Choice>
+        <mc:Fallback xmlns="">
+          <p:pic>
+            <p:nvPicPr>
+              <p:cNvPr id="7" name="Ink 6"/>
+              <p:cNvPicPr/>
+              <p:nvPr/>
+            </p:nvPicPr>
+            <p:blipFill>
+              <a:blip r:embed="rId3"/>
+              <a:stretch>
+                <a:fillRect/>
+              </a:stretch>
+            </p:blipFill>
+            <p:spPr>
+              <a:xfrm>
+                <a:off x="3742560" y="1090251"/>
+                <a:ext cx="933840" cy="1150920"/>
+              </a:xfrm>
+              <a:prstGeom prst="rect">
+                <a:avLst/>
+              </a:prstGeom>
+            </p:spPr>
+          </p:pic>
+        </mc:Fallback>
+      </mc:AlternateContent>
+    </p:spTree>
+    <p:extLst>
+      <p:ext uri="{BB962C8B-B14F-4D97-AF65-F5344CB8AC3E}">
+        <p14:creationId xmlns:p14="http://schemas.microsoft.com/office/powerpoint/2010/main" val="3183536092"/>
+      </p:ext>
+    </p:extLst>
+  </p:cSld>
+  <p:clrMapOvr>
+    <a:masterClrMapping/>
+  </p:clrMapOvr>
+  <p:transition spd="slow">
+    <p:push dir="u"/>
+  </p:transition>
+  <p:timing>
+    <p:tnLst>
+      <p:par>
+        <p:cTn id="1" dur="indefinite" restart="never" nodeType="tmRoot"/>
+      </p:par>
+    </p:tnLst>
+  </p:timing>
+</p:sld>
+</file>
+
+<file path=ppt/slides/slide9.xml><?xml version="1.0" encoding="utf-8"?>
+<p:sld xmlns:a="http://schemas.openxmlformats.org/drawingml/2006/main" xmlns:r="http://schemas.openxmlformats.org/officeDocument/2006/relationships" xmlns:p="http://schemas.openxmlformats.org/presentationml/2006/main">
+  <p:cSld>
+    <p:spTree>
+      <p:nvGrpSpPr>
+        <p:cNvPr id="1" name=""/>
+        <p:cNvGrpSpPr/>
+        <p:nvPr/>
+      </p:nvGrpSpPr>
+      <p:grpSpPr>
+        <a:xfrm>
+          <a:off x="0" y="0"/>
+          <a:ext cx="0" cy="0"/>
+          <a:chOff x="0" y="0"/>
+          <a:chExt cx="0" cy="0"/>
+        </a:xfrm>
+      </p:grpSpPr>
+      <p:sp>
+        <p:nvSpPr>
+          <p:cNvPr id="4" name="Notched Right Arrow 3"/>
+          <p:cNvSpPr/>
+          <p:nvPr/>
+        </p:nvSpPr>
+        <p:spPr>
+          <a:xfrm>
+            <a:off x="2743200" y="3276600"/>
+            <a:ext cx="1371600" cy="838200"/>
+          </a:xfrm>
+          <a:prstGeom prst="notchedRightArrow">
+            <a:avLst/>
+          </a:prstGeom>
+        </p:spPr>
+        <p:style>
+          <a:lnRef idx="2">
+            <a:schemeClr val="accent1">
+              <a:shade val="50000"/>
+            </a:schemeClr>
+          </a:lnRef>
+          <a:fillRef idx="1">
+            <a:schemeClr val="accent1"/>
+          </a:fillRef>
+          <a:effectRef idx="0">
+            <a:schemeClr val="accent1"/>
+          </a:effectRef>
+          <a:fontRef idx="minor">
+            <a:schemeClr val="lt1"/>
+          </a:fontRef>
+        </p:style>
+        <p:txBody>
+          <a:bodyPr rtlCol="0" anchor="ctr"/>
+          <a:lstStyle/>
+          <a:p>
+            <a:pPr algn="ctr"/>
+            <a:endParaRPr lang="en-SG"/>
+          </a:p>
+        </p:txBody>
+      </p:sp>
+      <p:sp>
+        <p:nvSpPr>
+          <p:cNvPr id="5" name="Notched Right Arrow 4"/>
+          <p:cNvSpPr/>
+          <p:nvPr/>
+        </p:nvSpPr>
+        <p:spPr>
+          <a:xfrm>
+            <a:off x="3962400" y="3276600"/>
+            <a:ext cx="1371600" cy="838200"/>
+          </a:xfrm>
+          <a:prstGeom prst="notchedRightArrow">
+            <a:avLst/>
+          </a:prstGeom>
+        </p:spPr>
+        <p:style>
+          <a:lnRef idx="2">
+            <a:schemeClr val="accent1">
+              <a:shade val="50000"/>
+            </a:schemeClr>
+          </a:lnRef>
+          <a:fillRef idx="1">
+            <a:schemeClr val="accent1"/>
+          </a:fillRef>
+          <a:effectRef idx="0">
+            <a:schemeClr val="accent1"/>
+          </a:effectRef>
+          <a:fontRef idx="minor">
+            <a:schemeClr val="lt1"/>
+          </a:fontRef>
+        </p:style>
+        <p:txBody>
+          <a:bodyPr rtlCol="0" anchor="ctr"/>
+          <a:lstStyle/>
+          <a:p>
+            <a:pPr algn="ctr"/>
+            <a:endParaRPr lang="en-SG"/>
+          </a:p>
+        </p:txBody>
+      </p:sp>
+      <p:sp>
+        <p:nvSpPr>
+          <p:cNvPr id="6" name="Notched Right Arrow 5"/>
+          <p:cNvSpPr/>
+          <p:nvPr/>
+        </p:nvSpPr>
+        <p:spPr>
+          <a:xfrm>
+            <a:off x="5171552" y="3276600"/>
+            <a:ext cx="1371600" cy="838200"/>
+          </a:xfrm>
+          <a:prstGeom prst="notchedRightArrow">
+            <a:avLst/>
+          </a:prstGeom>
+        </p:spPr>
+        <p:style>
+          <a:lnRef idx="2">
+            <a:schemeClr val="accent1">
+              <a:shade val="50000"/>
+            </a:schemeClr>
+          </a:lnRef>
+          <a:fillRef idx="1">
+            <a:schemeClr val="accent1"/>
+          </a:fillRef>
+          <a:effectRef idx="0">
+            <a:schemeClr val="accent1"/>
+          </a:effectRef>
+          <a:fontRef idx="minor">
+            <a:schemeClr val="lt1"/>
+          </a:fontRef>
+        </p:style>
+        <p:txBody>
+          <a:bodyPr rtlCol="0" anchor="ctr"/>
+          <a:lstStyle/>
+          <a:p>
+            <a:pPr algn="ctr"/>
+            <a:endParaRPr lang="en-SG"/>
+          </a:p>
+        </p:txBody>
+      </p:sp>
+      <mc:AlternateContent xmlns:mc="http://schemas.openxmlformats.org/markup-compatibility/2006" xmlns:p14="http://schemas.microsoft.com/office/powerpoint/2010/main">
+        <mc:Choice Requires="p14">
+          <p:contentPart p14:bwMode="auto" r:id="rId2">
+            <p14:nvContentPartPr>
+              <p14:cNvPr id="7" name="Ink 6"/>
+              <p14:cNvContentPartPr/>
+              <p14:nvPr/>
+            </p14:nvContentPartPr>
+            <p14:xfrm rot="1441388">
+              <a:off x="6837491" y="3285672"/>
+              <a:ext cx="734708" cy="820054"/>
+            </p14:xfrm>
+          </p:contentPart>
+        </mc:Choice>
+        <mc:Fallback xmlns="">
+          <p:pic>
+            <p:nvPicPr>
+              <p:cNvPr id="7" name="Ink 6"/>
+              <p:cNvPicPr/>
+              <p:nvPr/>
+            </p:nvPicPr>
+            <p:blipFill>
+              <a:blip r:embed="rId3"/>
+              <a:stretch>
+                <a:fillRect/>
+              </a:stretch>
+            </p:blipFill>
+            <p:spPr>
+              <a:xfrm rot="1441388">
+                <a:off x="6825977" y="3274863"/>
+                <a:ext cx="757015" cy="840591"/>
+              </a:xfrm>
+              <a:prstGeom prst="rect">
+                <a:avLst/>
+              </a:prstGeom>
+            </p:spPr>
+          </p:pic>
+        </mc:Fallback>
+      </mc:AlternateContent>
+    </p:spTree>
+    <p:extLst>
+      <p:ext uri="{BB962C8B-B14F-4D97-AF65-F5344CB8AC3E}">
+        <p14:creationId xmlns:p14="http://schemas.microsoft.com/office/powerpoint/2010/main" val="1406357402"/>
+      </p:ext>
+    </p:extLst>
+  </p:cSld>
+  <p:clrMapOvr>
+    <a:masterClrMapping/>
+  </p:clrMapOvr>
+  <mc:AlternateContent xmlns:mc="http://schemas.openxmlformats.org/markup-compatibility/2006" xmlns:p14="http://schemas.microsoft.com/office/powerpoint/2010/main">
+    <mc:Choice Requires="p14">
+      <p:transition spd="slow" p14:dur="2000"/>
+    </mc:Choice>
+    <mc:Fallback xmlns="">
+      <p:transition spd="slow"/>
+    </mc:Fallback>
+  </mc:AlternateContent>
   <p:timing>
     <p:tnLst>
       <p:par>

</xml_diff>

<commit_message>
Modifed test scenario to make Issue 29 problem more prominent
</commit_message>
<xml_diff>
--- a/doc/Test scenarios.pptx
+++ b/doc/Test scenarios.pptx
@@ -13,21 +13,23 @@
     <p:sldId id="282" r:id="rId7"/>
     <p:sldId id="280" r:id="rId8"/>
     <p:sldId id="261" r:id="rId9"/>
-    <p:sldId id="262" r:id="rId10"/>
-    <p:sldId id="278" r:id="rId11"/>
-    <p:sldId id="269" r:id="rId12"/>
-    <p:sldId id="270" r:id="rId13"/>
-    <p:sldId id="274" r:id="rId14"/>
-    <p:sldId id="275" r:id="rId15"/>
-    <p:sldId id="276" r:id="rId16"/>
-    <p:sldId id="293" r:id="rId17"/>
-    <p:sldId id="292" r:id="rId18"/>
-    <p:sldId id="294" r:id="rId19"/>
-    <p:sldId id="287" r:id="rId20"/>
-    <p:sldId id="288" r:id="rId21"/>
-    <p:sldId id="289" r:id="rId22"/>
-    <p:sldId id="290" r:id="rId23"/>
-    <p:sldId id="291" r:id="rId24"/>
+    <p:sldId id="295" r:id="rId10"/>
+    <p:sldId id="262" r:id="rId11"/>
+    <p:sldId id="278" r:id="rId12"/>
+    <p:sldId id="269" r:id="rId13"/>
+    <p:sldId id="270" r:id="rId14"/>
+    <p:sldId id="274" r:id="rId15"/>
+    <p:sldId id="275" r:id="rId16"/>
+    <p:sldId id="276" r:id="rId17"/>
+    <p:sldId id="293" r:id="rId18"/>
+    <p:sldId id="292" r:id="rId19"/>
+    <p:sldId id="294" r:id="rId20"/>
+    <p:sldId id="287" r:id="rId21"/>
+    <p:sldId id="288" r:id="rId22"/>
+    <p:sldId id="289" r:id="rId23"/>
+    <p:sldId id="290" r:id="rId24"/>
+    <p:sldId id="291" r:id="rId25"/>
+    <p:sldId id="296" r:id="rId26"/>
   </p:sldIdLst>
   <p:sldSz cx="9144000" cy="6858000" type="screen4x3"/>
   <p:notesSz cx="6858000" cy="9144000"/>
@@ -143,6 +145,7 @@
             <p14:sldId id="282"/>
             <p14:sldId id="280"/>
             <p14:sldId id="261"/>
+            <p14:sldId id="295"/>
             <p14:sldId id="262"/>
             <p14:sldId id="278"/>
             <p14:sldId id="269"/>
@@ -162,6 +165,7 @@
             <p14:sldId id="289"/>
             <p14:sldId id="290"/>
             <p14:sldId id="291"/>
+            <p14:sldId id="296"/>
           </p14:sldIdLst>
         </p14:section>
       </p14:sectionLst>
@@ -269,6 +273,36 @@
           <inkml:channelProperty channel="F" name="resolution" value="2.82441E-6" units="1/dev"/>
         </inkml:channelProperties>
       </inkml:inkSource>
+      <inkml:timestamp xml:id="ts0" timeString="2013-12-12T09:51:24.701"/>
+    </inkml:context>
+    <inkml:brush xml:id="br0">
+      <inkml:brushProperty name="width" value="0.06667" units="cm"/>
+      <inkml:brushProperty name="height" value="0.06667" units="cm"/>
+      <inkml:brushProperty name="color" value="#ED1C24"/>
+      <inkml:brushProperty name="fitToCurve" value="1"/>
+    </inkml:brush>
+  </inkml:definitions>
+  <inkml:trace contextRef="#ctx0" brushRef="#br0">1049 2203 6,'0'-3'31,"0"3"1,0 0-12,0 0-2,0 0-1,0 0-5,0 0 2,0 0 6,0 0-2,0 0-4,0 0-4,0 0 2,0 0-1,0 0 1,0 0-3,0 0 3,0 0 0,0 0-7,0 0-3,-6 0 1,-3 0 2,2 0 1,-5 6-3,0 4-1,-3-1 1,0 9-1,0 3-1,0 3 2,2 3 0,4-2 4,-1-1-6,-1 1 1,1 3 3,-2-1-3,2 0 1,2 7-1,-1-1-1,-1-2 2,5 2-2,2 4-1,-1-3 2,4-1-2,0-2 2,0 6 2,0-7-3,0 3 2,12 5 1,0-8-2,8-3-1,-5 7 0,2-7 1,1-2-1,2-1-1,10-7-1,-6 5 2,4-6-1,2-7 1,0 3-1,2-6 2,-5-3-1,6 0 2,-3-3-3,2 0 0,-9 0 2,8 0 1,0 0-2,-1 0 3,4-7-3,-4-10 1,-2-4 2,-1-7 0,0 1-3,1 0 3,-3-7-3,-4 0 1,-5 4-1,1 0 4,1-5 1,-5 8-2,-4 0 3,-3 5-2,-2-5 3,-4 2 0,2-2-4,-2-1-2,0-2 0,0-1 9,0 7-9,0 3 2,0 0-2,-15-6-1,0-1 1,-4 3-2,7 4 1,4-2-1,-2 6 0,0-5 0,2 7 1,-1 3-1,2-3 1,-2 13-1,0-8-1,-1 0 2,5-2 1,-8 3-1,8 3 0,-2 0-1,4 0 1,-2 0 0,1 3 0,1 3 0,0 0 0,3 0 0,-2 0-1,2 0 0,0 0 0,0 0 0,0 0 1,0-3 0,0 3-1,0 0 0,0 0 0,0 0-1,0 0 1,0 0-1,0 0-1,0 0 0,0 0 0,0 0 0,0 0-2,0 0 0,0 0-2,0 0 0,0 0-4,0 0 1,0 0 3,0 0 6,0 0 1,2 12-1,13 9 0,3 3 0,4-6 0,-4 7 0,1 0 0,2 3-1,-2-4 2,8 0-1,-3 4 0,3 2-1,-5-3 1,8-2-1,-5-6 0,2 1 0,-5 5 0,3-10-4,-2 0-1,2-5 4,-3-4 0,-2 0 0,8 0-3,-6-2 2,2-4 2,-3 0-2,1 0 2,-2 0 2,9-4-1,-6-8 2,2 0-4,0-7 4,-1-2-2,4-4 0,-3 1 0,-5-1 0,5-2 0,-1-4 0,1 4 0,-4 3 0,3-3 1,-2-4-1,-1 1 0,-3-5 0,1-1 0,-1 2 0,-3 5 1,-3 3 2,-2-4 2,-5 6 0,-1-6-2,-1-2-2,0-8 0,-3 4-1,0 5 2,0-4-2,0 4 3,0 7 1,0 2-1,0 1 3,-6 0-1,-6-1 0,-3 3-3,-2 1 3,2 3 0,-2 3-3,-1 0-3,-4 5 0,-3-2 0,0 3 1,2 0 0,-4 3 0,-5 0 0,2 3-2,-3 0 3,6 0-2,-2 0 0,2 0 3,6 0-5,-1 0 1,1 0 2,6 9-3,-1 0 1,1 3 1,-6 4-1,2 0 0,1-5 1,6 1 2,2-6-1,2 1 0,5-3 2,-1-4-4,4 0 1,0 0-2,0 0-2,0 0 0,0 0-2,0 0-4,0 0 2,0 0 1,0 0-2,0 0 7,0 0 4,15-11 1,5 3-1,0-5-1,5-2 0,-3 0 1,2-7-1,4 1 1,-1 0-2,1-7 2,-1 0 1,0-2-2,1-6 0,-1-1 1,1-7 1,-1 8-1,-2-3 1,2-4-1,1 0 0,2 0 2,-12 1-1,1 0-1,-1 0 0,-1 1 4,-4 1-1,-6 18 1,1-1-4,-4-2 2,-1 3 2,-1-8-2,-2 3-1,0-7 0,0 0 2,0 1-1,0 2-2,0 1 2,-12-8-2,-3 9 1,3 1 0,-3 1 3,-3 6-4,-1 6 1,-2-7-3,-6 3 3,5-2-2,-3 3 3,-2 6-2,3 6-2,0-3 1,-1-1 1,3 2 2,-1 2-3,-2 0 0,3 2-3,2 4 2,0 0 1,3 0-1,-8 0-1,3 0 0,1 18 3,2 7-6,-1-4 7,2 7-2,1-1 0,-3 1 0,5-4 0,0 12-2,-5-5 2,8-3 0,-3 5-1,0-9 1,3 4 0,2-1-1,2 3 1,-2 2-1,5-8 0,-2-3-1,1 3 1,4 1-3,-5 2 3,7 0 0,0-7-2,0 7 0,0-9 1,0-3 0,0-3-1,0-1 1,0-7 0,0-1 1,0-3-1,0 0 1,0 0-2,0 0 2,0 0 1,0 0-1,0 0 1,0 0 1,0 0-1,0 0 0,0 0-1,0 0 0,0 0 0,0 0 0,0 0-4,0 0 4,0 0 6,0 0-3,0-6 0,7-15-1,1-9 2,4-7-3,-2-6 1,-2 0-1,2-8 0,2-4 1,3-9 1,-5 0-2,-5 2 1,-1 2 1,-4 9 1,0-5-1,0 11-1,0-4 1,-9-4 2,-6 5-3,-10-7 1,-3 12 0,-6 6-1,-1 7 1,0 9 0,0 2-2,-2 2 0,6-2-1,0-6-2,-2 13 3,-4 6-1,10 3 1,-4 3 0,1 0-1,-4 0 1,7 0-2,2 0 2,-2 6-2,-4 13-1,4 4 3,-7 2-1,1 10-1,8 1 0,0 6 1,5-2 0,5-1-1,-2-2 1,6-4 1,4 10 0,-2-3-1,6-1 1,0 4-1,3-3-1,0-3 1,0-1 0,0 3 1,15 2-2,1 2 4,3-4-4,-1 0 2,-3-5 0,2 3 0,3-4 0,-8 0 0,9-4 0,-6-5 0,-3-6-1,0-5 0,-5-5 0,-1-1 0,-4-4 1,3 3 1,-5-6 0,0 0-1,0 0 1,2 0 2,-2 0-1,0 0 0,0 0 3,0 0-1,0 0 2,0 0 0,0 0-1,0 0-2,0 0 1,0 0 0,0 0 3,0 0-1,0 0 2,0 0 0,0 0-4,0 0-2,0-6-1,-7-12 0,-13-2-1,-5-7 0,-5 3 0,3-7-1,-8 1 1,-2-6 0,7-2 0,-3-1-1,-1 3 0,1 2 1,-1 1-1,-2 8 1,-1 3-3,-5 4 2,-2 3 1,-7 0 0,4 9 0,-1 0 0,9 3 1,4 3-2,-4-7 1,3 7 0,-1 0 1,-10 0-4,9 7 5,1 14-2,0 3-2,10-1 1,-1-3 0,-2 8 1,-1 7-1,10 9-1,-1-2 0,7-2 1,-3 6-1,-1-1 0,13 2 1,1 2 0,5 5-1,0-5 0,0 0 1,15 0 0,10 0-2,-7-3 3,6-4-1,4-3 0,5-4 0,1-4-1,-4-1 1,10-13-3,-1 5 3,1-10 2,5-3-1,2-3 0,-2-6-1,1 0 2,-9 0 2,2 0-3,-2 0 0,-7 0 0,1 0 0,3 0 1,-4-2-1,3-5 1,-2 1-1,-6-4 0,-7-2 0,-3 6 1,-9 4 1,-6 2 4,0 0-2,0 0-1,0 0 1,0 0-3,0 0 1,0 0 1,0 0 3,0 0 0,0 0 3,0 0 1,0 0-8,0 0-3,0 0-1,-28 0 1,-2 0 2,-3 0-1,-1 0-3,4 0 3,-5 0-1,5 0 0,-3 0 0,-16 18 0,4 7 1,-5 11-2,-2 4 2,7-1-2,-4 5 0,13-2 1,5-2-1,-2 2 0,8-2 0,3 9-1,-1-1 2,-2 5 2,-2-4-1,5-4-1,12 0-1,2-8 2,1-3-2,-1 8 0,4-8 1,4 3-2,0 0 1,0-10-2,0 0 1,16 1 0,5-1 2,13-2-3,-1-4 3,1-3 0,-4-2 0,13-1 3,-6-9-3,5-3 0,4-3 3,-7 0 2,4 0-2,3-3 1,0-18-1,3-1 1,-7 4-1,11-3 0,-11-7 0,3-8 1,-1 2 0,-8-2-1,-2-1 1,-6 3 0,2 3-1,-3-5 1,-2 2 0,-10 7 1,3-1-2,-9 10 2,1 3 0,-5-3 0,5-3 0,-2-10 0,4-3-1,-2 3 3,-7 7 1,-3 15-5,0 9 0,-3 0 0,-7 0 1,8 0 0,2-3-1,0-10 0,0 2 1,0 8 1,0 3-1,-3 0 1,-4 0-3,7 0 0,0 0-1,0 0 0,0 0-1,0 0-3,0 0-1,-3 0-4,-5 0-17,1 0-29,7 0-99,0 0-91</inkml:trace>
+  <inkml:trace contextRef="#ctx0" brushRef="#br0" timeOffset="-5262">985 2087 75,'0'3'45,"0"0"-25,0-3 29,0 0-11,0 0-11,0 0-3,0 0 6,0 0-4,0 0-3,0 0 4,0 0-1,-3 0-4,3 0-1,0 0-4,0 0-1,0 0-6,-7 0-5,2 0-3,-5 0 0,1 0 2,-6-9 0,0-4 3,2-7-2,-5-1-4,1-5 3,-3-5 1,3-2-1,1 0 2,1-4-2,3-5 0,0-1 0,2-6 0,7-3 0,1-3-1,2-3-3,0 3 4,0-7 1,0 5-4,8 6 0,7 4 0,1 8 2,-1 8-3,3-2 1,0 3-2,1-1-2,-1 3 3,4 7-1,3 0 1,8-1-1,4 4 1,-2-1-2,9 5-1,-1 1 3,-1 4-1,1 6 1,-4 3-1,4 0-1,-3 0 1,-1 0 0,1 0 0,-3 3 0,3 8 1,0 6-3,-7 2 2,-3-5-1,1 2 1,-3 8-1,-8-3 0,-1 4 2,9-1 0,-8 2-1,0 3 0,-3-2 0,-4 0 0,-5 4 0,4-2 2,-2 1-2,0 3 3,-5 0-4,2 1 1,-4-1 2,-1 4-1,-2-4-5,0 4 6,0 0-3,0 3 4,0-1-1,0 4 1,0 3-2,-5-3 0,-7 2-2,-1-8 2,4-3 0,-1-5-1,2 0 0,-7-5 2,0-3 0,-5 2 1,3-9-1,-5 2 1,7-3 0,0 1-1,-7-5-1,1 0 0,-9-3-3,5-3 3,-6 0 0,3-3 0,-2 0 0,5 0 0,5 0 0,-2 0 0,1 3 0,2-3-1,-6 0 0,10 0 1,-2 0 0,2 0 0,-1 0 1,1 0-1,-4 0 1,4 0-1,5 0 0,0 0 0,-3 0 0,1 0 0,2 0 0,-2 0 0,2 0 0,-1 0 0,2 0 1,-1 0 0,5 0-1,-5 0 0,-5 0 0,3 0 0,-1-3 0,4-3 0,1 3 0,1 0-1,-2 0 0,5 3 1,-1-3 0,2 0-1,0 0 1,-1 0-1,4 3-6,-3-3-18,3 3-36,0 0-79,0-3-46</inkml:trace>
+</inkml:ink>
+</file>
+
+<file path=ppt/ink/ink3.xml><?xml version="1.0" encoding="utf-8"?>
+<inkml:ink xmlns:inkml="http://www.w3.org/2003/InkML">
+  <inkml:definitions>
+    <inkml:context xml:id="ctx0">
+      <inkml:inkSource xml:id="inkSrc0">
+        <inkml:traceFormat>
+          <inkml:channel name="X" type="integer" max="32767" units="cm"/>
+          <inkml:channel name="Y" type="integer" max="32767" units="cm"/>
+          <inkml:channel name="F" type="integer" max="1023" units="dev"/>
+        </inkml:traceFormat>
+        <inkml:channelProperties>
+          <inkml:channelProperty channel="X" name="resolution" value="5654.35693" units="1/cm"/>
+          <inkml:channelProperty channel="Y" name="resolution" value="9046.65918" units="1/cm"/>
+          <inkml:channelProperty channel="F" name="resolution" value="2.82441E-6" units="1/dev"/>
+        </inkml:channelProperties>
+      </inkml:inkSource>
       <inkml:timestamp xml:id="ts0" timeString="2013-12-12T09:51:34.750"/>
     </inkml:context>
     <inkml:brush xml:id="br0">
@@ -278,8 +312,8 @@
       <inkml:brushProperty name="fitToCurve" value="1"/>
     </inkml:brush>
   </inkml:definitions>
-  <inkml:trace contextRef="#ctx0" brushRef="#br0">848 1597 6,'0'-2'31,"0"2"1,0 0-12,0 0-2,0 0-1,0 0-5,0 0 2,0 0 6,0 0-2,0 0-4,0 0-4,0 0 2,0 0-1,0 0 1,0 0-3,0 0 3,0 0 0,0 0-7,0 0-3,-6 0 1,0 0 2,0 0 1,-4 4-3,0 3-1,-2 0 1,0 6-1,0 2-1,0 3 2,2 1 0,2-1 4,0 1-6,-1-1 1,1 2 3,-1-1-3,1 1 1,1 5-1,-1-1-1,1-2 2,2 2-2,3 3-1,-1-3 2,3 0-2,0-1 2,0 3 2,0-4-3,0 2 2,10 4 1,0-7-2,5-1-1,-3 4 0,3-4 1,-1-2-1,2 0-1,8-6-1,-4 4 2,2-5-1,2-4 1,1 2-1,0-5 2,-3-2-1,5 1 2,-3-3-3,2 0 0,-7 0 2,5 0 1,1 0-2,-1 0 3,4-6-3,-4-6 1,-2-3 2,0-5 0,0 0-3,1 0 3,-3-4-3,-3-1 1,-5 3-1,3 1 4,-1-5 1,-4 7-2,-2-1 3,-4 5-2,0-5 3,-4 2 0,2-2-4,-2 0-2,0-2 0,0 0 9,0 5-9,0 1 2,0 1-2,-12-5-1,0 0 1,-4 2-2,6 2 1,3 0-1,0 4 0,-1-4 0,1 4 1,0 3-1,1-2 1,-1 10-1,0-6-1,-1 0 2,3-2 1,-5 2-1,6 3 0,-2-1-1,4 1 1,-2 0 0,0 2 0,2 2 0,0 0 0,2 0 0,-2 0-1,2 0 0,0 0 0,0 0 0,0 0 1,0-3 0,0 3-1,0 0 0,0 0 0,0 0-1,0 0 1,0 0-1,0 0-1,0 0 0,0 0 0,0 0 0,0 0-2,0 0 0,0 0-2,0 0 0,0 0-4,0 0 1,0 0 3,0 0 6,0 0 1,2 9-1,10 7 0,3 1 0,2-4 0,-2 5 0,0 1 0,2 1-1,-2-3 2,8 1-1,-5 2 0,5 2-1,-6-2 1,8-2-1,-5-5 0,2 2 0,-5 3 0,3-7-4,-1 0-1,1-4 4,-2-3 0,-2 1 0,7-1-3,-6-1 2,3-3 2,-3 0-2,1 0 2,-2 0 2,8-3-1,-6-6 2,2 1-4,0-6 4,0-1-2,2-3 0,-2 1 0,-3-2 0,3 0 0,0-4 0,0 4 0,-4 1 0,4-2 1,-2-2-1,-1-1 0,-3-2 0,2-1 0,-2 1 0,-2 4 1,-2 3 2,-2-4 2,-4 4 0,0-4-2,-2-1-2,0-5 0,-2 2-1,0 3 2,0-3-2,0 4 3,0 5 1,0 0-1,0 3 3,-4-2-1,-6 1 0,-3 1-3,0 1 3,1 2 0,-2 2-3,-1 0-3,-3 4 0,-2-1 0,1 2 1,0-1 0,-3 3 0,-4 0 0,2 2-2,-3 0 3,5 0-2,-1 0 0,1 0 3,5 0-5,-1 0 1,2 0 2,3 6-3,0 1 1,1 2 1,-5 2-1,2 1 0,0-4 1,5 1 2,3-5-1,0 1 0,5-3 2,-2-2-4,4 0 1,0 0-2,0 0-2,0 0 0,0 0-2,0 0-4,0 0 2,0 0 1,0 0-2,0 0 7,0 0 4,13-7 1,2 1-1,2-4-1,3 0 0,-3-1 1,3-5-1,3 1 1,-1-1-2,0-4 2,0 0 1,0-2-2,0-4 0,0-1 1,1-4 1,-1 5-1,-2-3 1,2-2-1,0 0 0,2 0 2,-9 0-1,0 0-1,0 1 0,-1 0 4,-4 2-1,-4 12 1,0-1-4,-2-1 2,-2 2 2,0-5-2,-2 1-1,0-5 0,0 1 2,0-1-1,0 2-2,0 1 2,-10-5-2,-2 6 1,2 0 0,-2 2 3,-3 4-4,0 4 1,-2-5-3,-5 2 3,4-1-2,-2 2 3,-2 4-2,3 5-2,-1-3 1,1 0 1,1 1 2,-1 2-3,-1-1 0,2 3-3,2 2 2,0 0 1,2 0-1,-6 0-1,2 0 0,2 13 3,0 5-6,-1-3 7,3 5-2,1 0 0,-4 0 0,5-3 0,0 10-2,-4-5 2,6-2 0,-2 4-1,0-6 1,2 2 0,2 0-1,1 2 1,0 1-1,2-5 0,0-3-1,0 2 1,3 1-3,-3 2 3,5 0 0,0-6-2,0 6 0,0-7 1,0-2 0,0-2-1,0-2 1,0-4 0,0 0 1,0-3-1,0 0 1,0 0-2,0 0 2,0 0 1,0 0-1,0 0 1,0 0 1,0 0-1,0 0 0,0 0-1,0 0 0,0 0 0,0 0 0,0 0-4,0 0 4,0 0 6,0 0-3,0-5 0,5-10-1,2-7 2,3-5-3,-3-4 1,0 0-1,1-6 0,2-3 1,2-7 1,-4 0-2,-4 3 1,0 0 1,-4 7 1,0-4-1,0 9-1,0-4 1,-8-2 2,-4 3-3,-8-5 1,-2 9 0,-6 5-1,-1 4 1,1 6 0,0 3-2,-2 0 0,5 0-1,0-5-2,-2 9 3,-3 5-1,8 1 1,-2 3 0,-1 0-1,-2 0 1,5 0-2,2 0 2,-3 4-2,0 11-1,1 1 3,-6 2-1,2 8-1,6-1 0,0 6 1,3-2 0,5-1-1,-1-1 1,4-3 1,3 7 0,-1-2-1,4-1 1,1 4-1,2-3-1,0-3 1,0 0 0,0 3 1,12 0-2,0 2 4,4-2-4,-2 0 2,-1-4 0,1 1 0,1-2 0,-5 1 0,7-5 0,-5-3 0,-2-3-1,0-5 0,-4-3 0,-2-1 0,-2-3 1,2 2 1,-4-4 0,0 0-1,0 0 1,2 0 2,-2 0-1,0 0 0,0 0 3,0 0-1,0 0 2,0 0 0,0 0-1,0 0-2,0 0 1,0 0 0,0 0 3,0 0-1,0 0 2,0 0 0,0 0-4,0 0-2,0-4-1,-6-9 0,-10-1-1,-4-6 0,-5 3 0,3-5-1,-5 0 1,-3-5 0,5 0 0,-1-2-1,-2 2 0,1 3 1,0 0-1,-2 6 1,-1 2-3,-4 3 2,-2 2 1,-5 0 0,4 7 0,-2-1 0,7 3 1,4 2-2,-4-5 1,3 5 0,-1 0 1,-7 0-4,5 5 5,3 10-2,-1 3-2,8-2 1,-1-1 0,-1 5 1,-1 6-1,8 5-1,-1 1 0,6-3 1,-2 4-1,-2 0 0,12 1 1,-1 1 0,5 5-1,0-5 0,0 1 1,12-1 0,8 0-2,-5-1 3,5-4-1,2-1 0,4-4 0,2-3-1,-4 0 1,9-9-3,-1 2 3,0-6 2,4-2-1,2-3 0,-1-4-1,-1 0 2,-6 0 2,2 0-3,-2 0 0,-5 0 0,-1 0 0,4 0 1,-4-2-1,3-3 1,-2 1-1,-5-3 0,-6-1 0,-1 3 1,-9 3 1,-4 2 4,0 0-2,0 0-1,0 0 1,0 0-3,0 0 1,0 0 1,0 0 3,0 0 0,0 0 3,0 0 1,0 0-8,0 0-3,0 0-1,-22 0 1,-3 0 2,-1 0-1,-2 0-3,4 0 3,-4 0-1,4 0 0,-3 0 0,-13 13 0,4 5 1,-4 8-2,-2 4 2,5-2-2,-3 4 0,11-2 1,4-1-1,-2 2 0,7-3 0,3 8-1,-2-1 2,-1 3 2,-2-3-1,4-2-1,10 0-1,2-6 2,0-3-2,0 7 0,2-7 1,4 4-2,0-1 1,0-8-2,0 1 1,14 0 0,2 0 2,12-2-3,-2-2 3,2-3 0,-4-2 0,11 0 3,-5-7-3,4-2 0,3-2 3,-5 0 2,2 0-2,4-2 1,-2-13-1,4-1 1,-5 3-1,7-2 0,-8-6 0,2-5 1,0 2 0,-7-3-1,-2 1 1,-4 0 0,1 4-1,-2-4 1,-2 1 0,-8 5 1,3 0-2,-8 7 2,1 2 0,-3-2 0,2-2 0,0-8 0,3-1-1,-2 2 3,-6 4 1,-2 12-5,0 6 0,-2 0 0,-6 0 1,6 0 0,2-2-1,0-8 0,0 2 1,0 6 1,0 2-1,-2 0 1,-4 0-3,6 0 0,0 0-1,0 0 0,0 0-1,0 0-3,0 0-1,-2 0-4,-5 0-17,2 0-29,5 0-99,0 0-91</inkml:trace>
-  <inkml:trace contextRef="#ctx0" brushRef="#br0" timeOffset="1">796 1513 75,'0'2'45,"0"0"-25,0-2 29,0 0-11,0 0-11,0 0-3,0 0 6,0 0-4,0 0-3,0 0 4,0 0-1,-2 0-4,2 0-1,0 0-4,0 0-1,0 0-6,-6 0-5,2 0-3,-4 0 0,0 0 2,-4-6 0,0-3 3,2-6-2,-5 0-4,1-4 3,-1-4 1,0 0-1,3-2 2,0-1-2,2-5 0,0 0 0,2-4 0,6-3 0,0-2-1,2-2-3,0 2 4,0-4 1,0 2-4,6 5 0,7 3 0,0 6 2,-1 5-3,2-1 1,1 2-2,0 0-2,0 2 3,2 5-1,3-1 1,7 1-1,3 2 1,-1-1-2,6 3-1,-1 2 3,1 3-1,-1 3 1,-2 3-1,2 0-1,-2 0 1,0 0 0,0 0 0,-2 3 0,2 5 1,0 4-3,-5 1 2,-3-2-1,2 0 1,-4 7-1,-6-3 0,0 3 2,6-1 0,-5 3-1,-2 0 0,0 0 0,-6 0 0,-2 2 0,3-1 2,-2 0-2,0 4 3,-4-1-4,2 0 1,-4 0 2,0 3-1,-2-3-5,0 3 6,0 0-3,0 1 4,0 1-1,0 2 1,0 2-2,-4-2 0,-6 2-2,0-6 2,2-3 0,0-3-1,1 0 0,-5-3 2,0-3 0,-3 1 1,0-5-1,-3 0 1,6-1 0,0 0-1,-6-4-1,2 1 0,-9-3-3,5-1 3,-5-1 0,3-2 0,-3 0 0,6 0 0,2 0 0,-1 0 0,2 2 0,0-2-1,-4 0 0,8 0 1,-2 0 0,1 0 0,1 0 1,0 0-1,-3 0 1,3 0-1,5 0 0,-2 0 0,-1 0 0,0 0 0,2 0 0,-2 0 0,2 0 0,-1 0 0,2 0 1,-1 0 0,3 0-1,-2 0 0,-5 0 0,2 0 0,0-2 0,2-3 0,1 3 0,2 0-1,-2-1 0,4 3 1,-2-1 0,3-2-1,0 1 1,-2 0-1,4 2-6,-2-2-18,2 2-36,0 0-79,0-3-46</inkml:trace>
+  <inkml:trace contextRef="#ctx0" brushRef="#br0">848 1597 6,'0'-2'31,"0"2"1,0 0-12,0 0-2,0 0-1,0 0-5,0 0 2,0 0 6,0 0-2,0 0-4,0 0-4,0 0 2,0 0-1,0 0 1,0 0-3,0 0 3,0 0 0,0 0-7,0 0-3,-6 0 1,0 0 2,0 0 1,-4 4-3,0 3-1,-2 0 1,0 6-1,0 2-1,0 3 2,2 1 0,2-1 4,0 1-6,-1-1 1,1 2 3,-1-1-3,1 1 1,1 5-1,-1-1-1,1-2 2,2 2-2,3 3-1,-1-3 2,3 0-2,0-1 2,0 3 2,0-4-3,0 2 2,10 4 1,0-7-2,5-1-1,-3 4 0,3-4 1,-1-2-1,2 0-1,8-6-1,-4 4 2,2-5-1,2-4 1,1 2-1,0-5 2,-3-2-1,5 1 2,-3-3-3,2 0 0,-7 0 2,4 0 1,2 0-2,-1 0 3,4-6-3,-4-6 1,-2-3 2,0-5 0,0 0-3,1 0 3,-3-4-3,-3-1 1,-5 3-1,3 1 4,-1-5 1,-4 7-2,-2-1 3,-4 5-2,0-5 3,-4 2 0,2-2-4,-2 0-2,0-2 0,0 0 9,0 5-9,0 1 2,0 1-2,-12-5-1,0 0 1,-4 2-2,6 2 1,3 0-1,0 4 0,-1-4 0,1 4 1,0 3-1,1-2 1,-1 10-1,0-6-1,-1 0 2,3-2 1,-5 2-1,6 3 0,-2-1-1,4 1 1,-2 0 0,0 2 0,2 2 0,0 0 0,2 0 0,-2 0-1,2 0 0,0 0 0,0 0 0,0 0 1,0-3 0,0 3-1,0 0 0,0 0 0,0 0-1,0 0 1,0 0-1,0 0-1,0 0 0,0 0 0,0 0 0,0 0-2,0 0 0,0 0-2,0 0 0,0 0-4,0 0 1,0 0 3,0 0 6,0 0 1,2 9-1,10 7 0,3 1 0,2-4 0,-2 5 0,0 1 0,2 1-1,-2-3 2,8 1-1,-5 2 0,5 2-1,-6-2 1,8-2-1,-5-5 0,2 2 0,-5 3 0,3-7-4,-1 0-1,1-4 4,-2-3 0,-2 1 0,7-1-3,-6-1 2,3-3 2,-3 0-2,1 0 2,-2 0 2,8-3-1,-6-6 2,2 1-4,0-6 4,0-1-2,2-3 0,-2 1 0,-3-2 0,3 0 0,0-4 0,0 4 0,-4 1 0,4-2 1,-2-2-1,-1-1 0,-3-2 0,2-1 0,-2 1 0,-2 4 1,-2 3 2,-2-4 2,-4 4 0,0-4-2,-2-1-2,0-5 0,-2 2-1,0 3 2,0-3-2,0 4 3,0 5 1,0 0-1,0 3 3,-4-2-1,-6 1 0,-3 1-3,0 1 3,1 2 0,-2 2-3,-1 0-3,-3 4 0,-2-1 0,1 2 1,0-1 0,-3 3 0,-4 0 0,2 2-2,-3 0 3,5 0-2,-1 0 0,1 0 3,5 0-5,-1 0 1,2 0 2,3 6-3,0 1 1,1 2 1,-5 2-1,2 1 0,0-4 1,5 1 2,3-5-1,0 1 0,5-3 2,-2-2-4,4 0 1,0 0-2,0 0-2,0 0 0,0 0-2,0 0-4,0 0 2,0 0 1,0 0-2,0 0 7,0 0 4,13-7 1,2 1-1,2-4-1,3 0 0,-3-1 1,3-5-1,3 1 1,-1-1-2,0-4 2,0 0 1,0-2-2,0-4 0,0-1 1,1-4 1,-1 5-1,-2-3 1,2-2-1,0 0 0,2 0 2,-9 0-1,0 0-1,0 1 0,-1 0 4,-4 2-1,-4 12 1,0-1-4,-2-1 2,-2 2 2,0-5-2,-2 1-1,0-5 0,0 1 2,0-1-1,0 2-2,0 1 2,-10-5-2,-2 6 1,2 0 0,-2 2 3,-3 4-4,0 4 1,-2-5-3,-5 2 3,4-1-2,-2 2 3,-2 4-2,3 5-2,-1-3 1,1 0 1,1 1 2,-1 2-3,-1-1 0,2 3-3,2 2 2,0 0 1,2 0-1,-6 0-1,2 0 0,2 13 3,0 5-6,-1-3 7,3 5-2,1 0 0,-4 0 0,5-3 0,0 10-2,-4-5 2,6-2 0,-2 4-1,0-6 1,2 2 0,2 0-1,1 2 1,0 1-1,2-5 0,0-3-1,0 2 1,3 1-3,-3 2 3,5 0 0,0-6-2,0 6 0,0-7 1,0-2 0,0-2-1,0-2 1,0-4 0,0 0 1,0-3-1,0 0 1,0 0-2,0 0 2,0 0 1,0 0-1,0 0 1,0 0 1,0 0-1,0 0 0,0 0-1,0 0 0,0 0 0,0 0 0,0 0-4,0 0 4,0 0 6,0 0-3,0-5 0,5-10-1,2-7 2,3-5-3,-3-4 1,0 0-1,1-6 0,2-3 1,2-7 1,-4 0-2,-4 3 1,0 0 1,-4 7 1,0-4-1,0 9-1,0-4 1,-8-2 2,-4 3-3,-8-5 1,-2 9 0,-6 5-1,-1 4 1,1 6 0,0 3-2,-2 0 0,5 0-1,0-5-2,-2 9 3,-3 5-1,8 1 1,-2 3 0,-1 0-1,-2 0 1,5 0-2,2 0 2,-3 4-2,1 11-1,0 1 3,-6 2-1,2 8-1,6-1 0,0 6 1,3-2 0,5-1-1,-1-1 1,4-3 1,3 7 0,-1-2-1,4-1 1,1 4-1,2-3-1,0-3 1,0 0 0,0 3 1,12 0-2,0 2 4,4-2-4,-2 0 2,-1-4 0,1 1 0,1-2 0,-5 1 0,7-5 0,-5-3 0,-2-3-1,0-5 0,-4-3 0,-2-1 0,-2-3 1,2 2 1,-4-4 0,0 0-1,0 0 1,2 0 2,-2 0-1,0 0 0,0 0 3,0 0-1,0 0 2,0 0 0,0 0-1,0 0-2,0 0 1,0 0 0,0 0 3,0 0-1,0 0 2,0 0 0,0 0-4,0 0-2,0-4-1,-6-9 0,-10-1-1,-4-6 0,-5 3 0,3-5-1,-5 0 1,-3-5 0,5 0 0,-1-2-1,-2 2 0,1 3 1,0 0-1,-2 6 1,-1 2-3,-4 3 2,-2 2 1,-5 0 0,4 7 0,-2-1 0,7 3 1,4 2-2,-4-5 1,3 5 0,-1 0 1,-7 0-4,5 5 5,3 10-2,-1 3-2,8-2 1,-1-1 0,-1 5 1,-1 6-1,8 5-1,-1 1 0,6-3 1,-2 4-1,-2 0 0,12 1 1,-1 1 0,5 5-1,0-5 0,0 1 1,12-1 0,8 0-2,-5-1 3,5-4-1,2-1 0,4-4 0,2-3-1,-4 0 1,9-9-3,-1 2 3,0-6 2,4-2-1,2-3 0,-1-4-1,-1 0 2,-6 0 2,2 0-3,-2 0 0,-5 0 0,-1 0 0,4 0 1,-4-2-1,3-3 1,-2 1-1,-5-3 0,-6-1 0,-1 3 1,-9 3 1,-4 2 4,0 0-2,0 0-1,0 0 1,0 0-3,0 0 1,0 0 1,0 0 3,0 0 0,0 0 3,0 0 1,0 0-8,0 0-3,0 0-1,-22 0 1,-3 0 2,-1 0-1,-2 0-3,4 0 3,-4 0-1,4 0 0,-3 0 0,-13 13 0,4 5 1,-4 8-2,-2 4 2,5-2-2,-3 4 0,11-2 1,4-1-1,-2 2 0,7-3 0,3 8-1,-2-1 2,-1 3 2,-2-3-1,4-2-1,10 0-1,2-6 2,0-3-2,0 7 0,2-7 1,4 4-2,0-1 1,0-8-2,0 1 1,14 0 0,2 0 2,12-2-3,-2-2 3,2-3 0,-4-2 0,11 0 3,-5-7-3,4-2 0,3-2 3,-5 0 2,2 0-2,4-2 1,-2-13-1,4-1 1,-5 3-1,7-2 0,-8-6 0,2-5 1,0 2 0,-7-3-1,-2 1 1,-4 0 0,1 4-1,-2-4 1,-2 1 0,-8 5 1,3 0-2,-8 7 2,1 2 0,-3-2 0,2-2 0,0-8 0,3-1-1,-2 2 3,-6 4 1,-2 12-5,0 6 0,-2 0 0,-6 0 1,6 0 0,2-2-1,0-8 0,0 2 1,0 6 1,0 2-1,-2 0 1,-4 0-3,6 0 0,0 0-1,0 0 0,0 0-1,0 0-3,0 0-1,-2 0-4,-5 0-17,2 0-29,5 0-99,0 0-91</inkml:trace>
+  <inkml:trace contextRef="#ctx0" brushRef="#br0" timeOffset="1">796 1513 75,'0'2'45,"0"0"-25,0-2 29,0 0-11,0 0-11,0 0-3,0 0 6,0 0-4,0 0-3,0 0 4,0 0-1,-2 0-4,2 0-1,0 0-4,0 0-1,0 0-6,-6 0-5,2 0-3,-4 0 0,0 0 2,-4-6 0,0-3 3,2-6-2,-5 0-4,1-4 3,-1-4 1,0 0-1,3-2 2,0-1-2,2-5 0,0 0 0,2-4 0,6-3 0,0-2-1,2-2-3,0 2 4,0-4 1,0 2-4,6 5 0,7 3 0,0 6 2,-1 5-3,2-1 1,1 2-2,0 0-2,0 2 3,2 5-1,3-1 1,7 1-1,3 2 1,-1-1-2,6 3-1,-1 2 3,1 3-1,-1 3 1,-2 3-1,1 0-1,-1 0 1,0 0 0,0 0 0,-2 3 0,2 5 1,0 4-3,-5 1 2,-3-2-1,2 0 1,-4 7-1,-6-3 0,0 3 2,6-1 0,-5 3-1,-2 0 0,0 0 0,-6 0 0,-2 2 0,3-1 2,-2 0-2,0 4 3,-4-1-4,2 0 1,-4 0 2,0 3-1,-2-3-5,0 3 6,0 0-3,0 1 4,0 1-1,0 2 1,0 2-2,-4-2 0,-6 2-2,0-6 2,2-3 0,0-3-1,1 0 0,-5-3 2,0-3 0,-3 1 1,0-5-1,-3 0 1,6-1 0,0 0-1,-6-4-1,2 1 0,-9-3-3,5-1 3,-5-1 0,3-2 0,-3 0 0,6 0 0,2 0 0,-1 0 0,2 2 0,0-2-1,-4 0 0,8 0 1,-2 0 0,1 0 0,1 0 1,0 0-1,-2 0 1,2 0-1,5 0 0,-2 0 0,-1 0 0,0 0 0,2 0 0,-2 0 0,2 0 0,-1 0 0,2 0 1,-1 0 0,3 0-1,-2 0 0,-5 0 0,2 0 0,0-2 0,2-3 0,1 3 0,2 0-1,-2-1 0,4 3 1,-2-1 0,3-2-1,0 1 1,-2 0-1,4 2-6,-2-2-18,2 2-36,0 0-79,0-3-46</inkml:trace>
 </inkml:ink>
 </file>
 
@@ -465,7 +499,7 @@
             <a:fld id="{1D8BD707-D9CF-40AE-B4C6-C98DA3205C09}" type="datetimeFigureOut">
               <a:rPr lang="en-US" smtClean="0"/>
               <a:pPr/>
-              <a:t>12/13/2013</a:t>
+              <a:t>1/4/2014</a:t>
             </a:fld>
             <a:endParaRPr lang="en-US"/>
           </a:p>
@@ -632,7 +666,7 @@
             <a:fld id="{1D8BD707-D9CF-40AE-B4C6-C98DA3205C09}" type="datetimeFigureOut">
               <a:rPr lang="en-US" smtClean="0"/>
               <a:pPr/>
-              <a:t>12/13/2013</a:t>
+              <a:t>1/4/2014</a:t>
             </a:fld>
             <a:endParaRPr lang="en-US"/>
           </a:p>
@@ -809,7 +843,7 @@
             <a:fld id="{1D8BD707-D9CF-40AE-B4C6-C98DA3205C09}" type="datetimeFigureOut">
               <a:rPr lang="en-US" smtClean="0"/>
               <a:pPr/>
-              <a:t>12/13/2013</a:t>
+              <a:t>1/4/2014</a:t>
             </a:fld>
             <a:endParaRPr lang="en-US"/>
           </a:p>
@@ -976,7 +1010,7 @@
             <a:fld id="{1D8BD707-D9CF-40AE-B4C6-C98DA3205C09}" type="datetimeFigureOut">
               <a:rPr lang="en-US" smtClean="0"/>
               <a:pPr/>
-              <a:t>12/13/2013</a:t>
+              <a:t>1/4/2014</a:t>
             </a:fld>
             <a:endParaRPr lang="en-US"/>
           </a:p>
@@ -1219,7 +1253,7 @@
             <a:fld id="{1D8BD707-D9CF-40AE-B4C6-C98DA3205C09}" type="datetimeFigureOut">
               <a:rPr lang="en-US" smtClean="0"/>
               <a:pPr/>
-              <a:t>12/13/2013</a:t>
+              <a:t>1/4/2014</a:t>
             </a:fld>
             <a:endParaRPr lang="en-US"/>
           </a:p>
@@ -1504,7 +1538,7 @@
             <a:fld id="{1D8BD707-D9CF-40AE-B4C6-C98DA3205C09}" type="datetimeFigureOut">
               <a:rPr lang="en-US" smtClean="0"/>
               <a:pPr/>
-              <a:t>12/13/2013</a:t>
+              <a:t>1/4/2014</a:t>
             </a:fld>
             <a:endParaRPr lang="en-US"/>
           </a:p>
@@ -1923,7 +1957,7 @@
             <a:fld id="{1D8BD707-D9CF-40AE-B4C6-C98DA3205C09}" type="datetimeFigureOut">
               <a:rPr lang="en-US" smtClean="0"/>
               <a:pPr/>
-              <a:t>12/13/2013</a:t>
+              <a:t>1/4/2014</a:t>
             </a:fld>
             <a:endParaRPr lang="en-US"/>
           </a:p>
@@ -2038,7 +2072,7 @@
             <a:fld id="{1D8BD707-D9CF-40AE-B4C6-C98DA3205C09}" type="datetimeFigureOut">
               <a:rPr lang="en-US" smtClean="0"/>
               <a:pPr/>
-              <a:t>12/13/2013</a:t>
+              <a:t>1/4/2014</a:t>
             </a:fld>
             <a:endParaRPr lang="en-US"/>
           </a:p>
@@ -2130,7 +2164,7 @@
             <a:fld id="{1D8BD707-D9CF-40AE-B4C6-C98DA3205C09}" type="datetimeFigureOut">
               <a:rPr lang="en-US" smtClean="0"/>
               <a:pPr/>
-              <a:t>12/13/2013</a:t>
+              <a:t>1/4/2014</a:t>
             </a:fld>
             <a:endParaRPr lang="en-US"/>
           </a:p>
@@ -2404,7 +2438,7 @@
             <a:fld id="{1D8BD707-D9CF-40AE-B4C6-C98DA3205C09}" type="datetimeFigureOut">
               <a:rPr lang="en-US" smtClean="0"/>
               <a:pPr/>
-              <a:t>12/13/2013</a:t>
+              <a:t>1/4/2014</a:t>
             </a:fld>
             <a:endParaRPr lang="en-US"/>
           </a:p>
@@ -2654,7 +2688,7 @@
             <a:fld id="{1D8BD707-D9CF-40AE-B4C6-C98DA3205C09}" type="datetimeFigureOut">
               <a:rPr lang="en-US" smtClean="0"/>
               <a:pPr/>
-              <a:t>12/13/2013</a:t>
+              <a:t>1/4/2014</a:t>
             </a:fld>
             <a:endParaRPr lang="en-US"/>
           </a:p>
@@ -2864,7 +2898,7 @@
             <a:fld id="{1D8BD707-D9CF-40AE-B4C6-C98DA3205C09}" type="datetimeFigureOut">
               <a:rPr lang="en-US" smtClean="0"/>
               <a:pPr/>
-              <a:t>12/13/2013</a:t>
+              <a:t>1/4/2014</a:t>
             </a:fld>
             <a:endParaRPr lang="en-US"/>
           </a:p>
@@ -3304,6 +3338,210 @@
 <file path=ppt/slides/slide10.xml><?xml version="1.0" encoding="utf-8"?>
 <p:sld xmlns:a="http://schemas.openxmlformats.org/drawingml/2006/main" xmlns:r="http://schemas.openxmlformats.org/officeDocument/2006/relationships" xmlns:p="http://schemas.openxmlformats.org/presentationml/2006/main">
   <p:cSld>
+    <p:spTree>
+      <p:nvGrpSpPr>
+        <p:cNvPr id="1" name=""/>
+        <p:cNvGrpSpPr/>
+        <p:nvPr/>
+      </p:nvGrpSpPr>
+      <p:grpSpPr>
+        <a:xfrm>
+          <a:off x="0" y="0"/>
+          <a:ext cx="0" cy="0"/>
+          <a:chOff x="0" y="0"/>
+          <a:chExt cx="0" cy="0"/>
+        </a:xfrm>
+      </p:grpSpPr>
+      <p:sp>
+        <p:nvSpPr>
+          <p:cNvPr id="4" name="Notched Right Arrow 3"/>
+          <p:cNvSpPr/>
+          <p:nvPr/>
+        </p:nvSpPr>
+        <p:spPr>
+          <a:xfrm>
+            <a:off x="0" y="3276600"/>
+            <a:ext cx="2743200" cy="838200"/>
+          </a:xfrm>
+          <a:prstGeom prst="notchedRightArrow">
+            <a:avLst/>
+          </a:prstGeom>
+        </p:spPr>
+        <p:style>
+          <a:lnRef idx="2">
+            <a:schemeClr val="accent1">
+              <a:shade val="50000"/>
+            </a:schemeClr>
+          </a:lnRef>
+          <a:fillRef idx="1">
+            <a:schemeClr val="accent1"/>
+          </a:fillRef>
+          <a:effectRef idx="0">
+            <a:schemeClr val="accent1"/>
+          </a:effectRef>
+          <a:fontRef idx="minor">
+            <a:schemeClr val="lt1"/>
+          </a:fontRef>
+        </p:style>
+        <p:txBody>
+          <a:bodyPr rtlCol="0" anchor="ctr"/>
+          <a:lstStyle/>
+          <a:p>
+            <a:pPr algn="ctr"/>
+            <a:endParaRPr lang="en-SG"/>
+          </a:p>
+        </p:txBody>
+      </p:sp>
+      <p:sp>
+        <p:nvSpPr>
+          <p:cNvPr id="5" name="Notched Right Arrow 4"/>
+          <p:cNvSpPr/>
+          <p:nvPr/>
+        </p:nvSpPr>
+        <p:spPr>
+          <a:xfrm>
+            <a:off x="2590800" y="3276600"/>
+            <a:ext cx="2743200" cy="838200"/>
+          </a:xfrm>
+          <a:prstGeom prst="notchedRightArrow">
+            <a:avLst/>
+          </a:prstGeom>
+        </p:spPr>
+        <p:style>
+          <a:lnRef idx="2">
+            <a:schemeClr val="accent1">
+              <a:shade val="50000"/>
+            </a:schemeClr>
+          </a:lnRef>
+          <a:fillRef idx="1">
+            <a:schemeClr val="accent1"/>
+          </a:fillRef>
+          <a:effectRef idx="0">
+            <a:schemeClr val="accent1"/>
+          </a:effectRef>
+          <a:fontRef idx="minor">
+            <a:schemeClr val="lt1"/>
+          </a:fontRef>
+        </p:style>
+        <p:txBody>
+          <a:bodyPr rtlCol="0" anchor="ctr"/>
+          <a:lstStyle/>
+          <a:p>
+            <a:pPr algn="ctr"/>
+            <a:endParaRPr lang="en-SG"/>
+          </a:p>
+        </p:txBody>
+      </p:sp>
+      <p:sp>
+        <p:nvSpPr>
+          <p:cNvPr id="6" name="Notched Right Arrow 5"/>
+          <p:cNvSpPr/>
+          <p:nvPr/>
+        </p:nvSpPr>
+        <p:spPr>
+          <a:xfrm>
+            <a:off x="5181600" y="3276599"/>
+            <a:ext cx="2743200" cy="838200"/>
+          </a:xfrm>
+          <a:prstGeom prst="notchedRightArrow">
+            <a:avLst/>
+          </a:prstGeom>
+        </p:spPr>
+        <p:style>
+          <a:lnRef idx="2">
+            <a:schemeClr val="accent1">
+              <a:shade val="50000"/>
+            </a:schemeClr>
+          </a:lnRef>
+          <a:fillRef idx="1">
+            <a:schemeClr val="accent1"/>
+          </a:fillRef>
+          <a:effectRef idx="0">
+            <a:schemeClr val="accent1"/>
+          </a:effectRef>
+          <a:fontRef idx="minor">
+            <a:schemeClr val="lt1"/>
+          </a:fontRef>
+        </p:style>
+        <p:txBody>
+          <a:bodyPr rtlCol="0" anchor="ctr"/>
+          <a:lstStyle/>
+          <a:p>
+            <a:pPr algn="ctr"/>
+            <a:endParaRPr lang="en-SG"/>
+          </a:p>
+        </p:txBody>
+      </p:sp>
+      <mc:AlternateContent xmlns:mc="http://schemas.openxmlformats.org/markup-compatibility/2006">
+        <mc:Choice xmlns:p14="http://schemas.microsoft.com/office/powerpoint/2010/main" Requires="p14">
+          <p:contentPart p14:bwMode="auto" r:id="rId2">
+            <p14:nvContentPartPr>
+              <p14:cNvPr id="7" name="Ink 6"/>
+              <p14:cNvContentPartPr/>
+              <p14:nvPr/>
+            </p14:nvContentPartPr>
+            <p14:xfrm rot="1441388">
+              <a:off x="8059905" y="3271816"/>
+              <a:ext cx="734708" cy="820054"/>
+            </p14:xfrm>
+          </p:contentPart>
+        </mc:Choice>
+        <mc:Fallback>
+          <p:pic>
+            <p:nvPicPr>
+              <p:cNvPr id="7" name="Ink 6"/>
+              <p:cNvPicPr/>
+              <p:nvPr/>
+            </p:nvPicPr>
+            <p:blipFill>
+              <a:blip r:embed="rId3"/>
+              <a:stretch>
+                <a:fillRect/>
+              </a:stretch>
+            </p:blipFill>
+            <p:spPr>
+              <a:xfrm rot="1441388">
+                <a:off x="8048380" y="3261016"/>
+                <a:ext cx="757037" cy="840573"/>
+              </a:xfrm>
+              <a:prstGeom prst="rect">
+                <a:avLst/>
+              </a:prstGeom>
+            </p:spPr>
+          </p:pic>
+        </mc:Fallback>
+      </mc:AlternateContent>
+    </p:spTree>
+    <p:extLst>
+      <p:ext uri="{BB962C8B-B14F-4D97-AF65-F5344CB8AC3E}">
+        <p14:creationId xmlns:p14="http://schemas.microsoft.com/office/powerpoint/2010/main" val="1406357402"/>
+      </p:ext>
+    </p:extLst>
+  </p:cSld>
+  <p:clrMapOvr>
+    <a:masterClrMapping/>
+  </p:clrMapOvr>
+  <mc:AlternateContent xmlns:mc="http://schemas.openxmlformats.org/markup-compatibility/2006">
+    <mc:Choice xmlns:p14="http://schemas.microsoft.com/office/powerpoint/2010/main" Requires="p14">
+      <p:transition spd="slow" p14:dur="2000"/>
+    </mc:Choice>
+    <mc:Fallback>
+      <p:transition spd="slow"/>
+    </mc:Fallback>
+  </mc:AlternateContent>
+  <p:timing>
+    <p:tnLst>
+      <p:par>
+        <p:cTn id="1" dur="indefinite" restart="never" nodeType="tmRoot"/>
+      </p:par>
+    </p:tnLst>
+  </p:timing>
+</p:sld>
+</file>
+
+<file path=ppt/slides/slide11.xml><?xml version="1.0" encoding="utf-8"?>
+<p:sld xmlns:a="http://schemas.openxmlformats.org/drawingml/2006/main" xmlns:r="http://schemas.openxmlformats.org/officeDocument/2006/relationships" xmlns:p="http://schemas.openxmlformats.org/presentationml/2006/main">
+  <p:cSld>
     <p:bg>
       <p:bgPr>
         <a:solidFill>
@@ -3416,7 +3654,7 @@
 </p:sld>
 </file>
 
-<file path=ppt/slides/slide11.xml><?xml version="1.0" encoding="utf-8"?>
+<file path=ppt/slides/slide12.xml><?xml version="1.0" encoding="utf-8"?>
 <p:sld xmlns:a="http://schemas.openxmlformats.org/drawingml/2006/main" xmlns:r="http://schemas.openxmlformats.org/officeDocument/2006/relationships" xmlns:p="http://schemas.openxmlformats.org/presentationml/2006/main">
   <p:cSld>
     <p:spTree>
@@ -3883,7 +4121,7 @@
 </p:sld>
 </file>
 
-<file path=ppt/slides/slide12.xml><?xml version="1.0" encoding="utf-8"?>
+<file path=ppt/slides/slide13.xml><?xml version="1.0" encoding="utf-8"?>
 <p:sld xmlns:a="http://schemas.openxmlformats.org/drawingml/2006/main" xmlns:r="http://schemas.openxmlformats.org/officeDocument/2006/relationships" xmlns:p="http://schemas.openxmlformats.org/presentationml/2006/main">
   <p:cSld>
     <p:spTree>
@@ -4358,7 +4596,7 @@
 </p:sld>
 </file>
 
-<file path=ppt/slides/slide13.xml><?xml version="1.0" encoding="utf-8"?>
+<file path=ppt/slides/slide14.xml><?xml version="1.0" encoding="utf-8"?>
 <p:sld xmlns:a="http://schemas.openxmlformats.org/drawingml/2006/main" xmlns:r="http://schemas.openxmlformats.org/officeDocument/2006/relationships" xmlns:p="http://schemas.openxmlformats.org/presentationml/2006/main">
   <p:cSld>
     <p:bg>
@@ -4457,7 +4695,7 @@
 </p:sld>
 </file>
 
-<file path=ppt/slides/slide14.xml><?xml version="1.0" encoding="utf-8"?>
+<file path=ppt/slides/slide15.xml><?xml version="1.0" encoding="utf-8"?>
 <p:sld xmlns:a="http://schemas.openxmlformats.org/drawingml/2006/main" xmlns:r="http://schemas.openxmlformats.org/officeDocument/2006/relationships" xmlns:p="http://schemas.openxmlformats.org/presentationml/2006/main">
   <p:cSld>
     <p:spTree>
@@ -4906,7 +5144,7 @@
 </p:sld>
 </file>
 
-<file path=ppt/slides/slide15.xml><?xml version="1.0" encoding="utf-8"?>
+<file path=ppt/slides/slide16.xml><?xml version="1.0" encoding="utf-8"?>
 <p:sld xmlns:a="http://schemas.openxmlformats.org/drawingml/2006/main" xmlns:r="http://schemas.openxmlformats.org/officeDocument/2006/relationships" xmlns:p="http://schemas.openxmlformats.org/presentationml/2006/main">
   <p:cSld>
     <p:spTree>
@@ -5345,11 +5583,11 @@
   <p:clrMapOvr>
     <a:masterClrMapping/>
   </p:clrMapOvr>
-  <mc:AlternateContent xmlns:mc="http://schemas.openxmlformats.org/markup-compatibility/2006">
-    <mc:Choice xmlns:p14="http://schemas.microsoft.com/office/powerpoint/2010/main" Requires="p14">
+  <mc:AlternateContent xmlns:mc="http://schemas.openxmlformats.org/markup-compatibility/2006" xmlns:p14="http://schemas.microsoft.com/office/powerpoint/2010/main">
+    <mc:Choice Requires="p14">
       <p:transition spd="slow" p14:dur="2000"/>
     </mc:Choice>
-    <mc:Fallback>
+    <mc:Fallback xmlns="">
       <p:transition spd="slow"/>
     </mc:Fallback>
   </mc:AlternateContent>
@@ -5363,7 +5601,7 @@
 </p:sld>
 </file>
 
-<file path=ppt/slides/slide16.xml><?xml version="1.0" encoding="utf-8"?>
+<file path=ppt/slides/slide17.xml><?xml version="1.0" encoding="utf-8"?>
 <p:sld xmlns:a="http://schemas.openxmlformats.org/drawingml/2006/main" xmlns:r="http://schemas.openxmlformats.org/officeDocument/2006/relationships" xmlns:p="http://schemas.openxmlformats.org/presentationml/2006/main">
   <p:cSld>
     <p:bg>
@@ -5462,7 +5700,7 @@
 </p:sld>
 </file>
 
-<file path=ppt/slides/slide17.xml><?xml version="1.0" encoding="utf-8"?>
+<file path=ppt/slides/slide18.xml><?xml version="1.0" encoding="utf-8"?>
 <p:sld xmlns:a="http://schemas.openxmlformats.org/drawingml/2006/main" xmlns:r="http://schemas.openxmlformats.org/officeDocument/2006/relationships" xmlns:p="http://schemas.openxmlformats.org/presentationml/2006/main">
   <p:cSld>
     <p:spTree>
@@ -7092,7 +7330,7 @@
 </p:sld>
 </file>
 
-<file path=ppt/slides/slide18.xml><?xml version="1.0" encoding="utf-8"?>
+<file path=ppt/slides/slide19.xml><?xml version="1.0" encoding="utf-8"?>
 <p:sld xmlns:a="http://schemas.openxmlformats.org/drawingml/2006/main" xmlns:r="http://schemas.openxmlformats.org/officeDocument/2006/relationships" xmlns:p="http://schemas.openxmlformats.org/presentationml/2006/main">
   <p:cSld>
     <p:spTree>
@@ -8680,104 +8918,6 @@
 </p:sld>
 </file>
 
-<file path=ppt/slides/slide19.xml><?xml version="1.0" encoding="utf-8"?>
-<p:sld xmlns:a="http://schemas.openxmlformats.org/drawingml/2006/main" xmlns:r="http://schemas.openxmlformats.org/officeDocument/2006/relationships" xmlns:p="http://schemas.openxmlformats.org/presentationml/2006/main">
-  <p:cSld>
-    <p:bg>
-      <p:bgPr>
-        <a:solidFill>
-          <a:srgbClr val="C00000"/>
-        </a:solidFill>
-        <a:effectLst/>
-      </p:bgPr>
-    </p:bg>
-    <p:spTree>
-      <p:nvGrpSpPr>
-        <p:cNvPr id="1" name=""/>
-        <p:cNvGrpSpPr/>
-        <p:nvPr/>
-      </p:nvGrpSpPr>
-      <p:grpSpPr>
-        <a:xfrm>
-          <a:off x="0" y="0"/>
-          <a:ext cx="0" cy="0"/>
-          <a:chOff x="0" y="0"/>
-          <a:chExt cx="0" cy="0"/>
-        </a:xfrm>
-      </p:grpSpPr>
-      <p:sp>
-        <p:nvSpPr>
-          <p:cNvPr id="2" name="Title 1"/>
-          <p:cNvSpPr>
-            <a:spLocks noGrp="1"/>
-          </p:cNvSpPr>
-          <p:nvPr>
-            <p:ph type="ctrTitle"/>
-          </p:nvPr>
-        </p:nvSpPr>
-        <p:spPr>
-          <a:xfrm>
-            <a:off x="685800" y="2895600"/>
-            <a:ext cx="7772400" cy="1470025"/>
-          </a:xfrm>
-        </p:spPr>
-        <p:txBody>
-          <a:bodyPr>
-            <a:noAutofit/>
-          </a:bodyPr>
-          <a:lstStyle/>
-          <a:p>
-            <a:r>
-              <a:rPr lang="en-US" sz="11500" dirty="0" smtClean="0">
-                <a:solidFill>
-                  <a:srgbClr val="FFFF00"/>
-                </a:solidFill>
-              </a:rPr>
-              <a:t>Zoom </a:t>
-            </a:r>
-            <a:br>
-              <a:rPr lang="en-US" sz="11500" dirty="0" smtClean="0">
-                <a:solidFill>
-                  <a:srgbClr val="FFFF00"/>
-                </a:solidFill>
-              </a:rPr>
-            </a:br>
-            <a:r>
-              <a:rPr lang="en-US" sz="11500" dirty="0" smtClean="0">
-                <a:solidFill>
-                  <a:srgbClr val="FFFF00"/>
-                </a:solidFill>
-              </a:rPr>
-              <a:t>to area</a:t>
-            </a:r>
-            <a:endParaRPr lang="en-SG" sz="11500" dirty="0">
-              <a:solidFill>
-                <a:srgbClr val="FFFF00"/>
-              </a:solidFill>
-            </a:endParaRPr>
-          </a:p>
-        </p:txBody>
-      </p:sp>
-    </p:spTree>
-    <p:extLst>
-      <p:ext uri="{BB962C8B-B14F-4D97-AF65-F5344CB8AC3E}">
-        <p14:creationId xmlns:p14="http://schemas.microsoft.com/office/powerpoint/2010/main" val="576206782"/>
-      </p:ext>
-    </p:extLst>
-  </p:cSld>
-  <p:clrMapOvr>
-    <a:masterClrMapping/>
-  </p:clrMapOvr>
-  <p:timing>
-    <p:tnLst>
-      <p:par>
-        <p:cTn id="1" dur="indefinite" restart="never" nodeType="tmRoot"/>
-      </p:par>
-    </p:tnLst>
-  </p:timing>
-</p:sld>
-</file>
-
 <file path=ppt/slides/slide2.xml><?xml version="1.0" encoding="utf-8"?>
 <p:sld xmlns:a="http://schemas.openxmlformats.org/drawingml/2006/main" xmlns:r="http://schemas.openxmlformats.org/officeDocument/2006/relationships" xmlns:p="http://schemas.openxmlformats.org/presentationml/2006/main">
   <p:cSld>
@@ -8868,6 +9008,104 @@
     <p:bg>
       <p:bgPr>
         <a:solidFill>
+          <a:srgbClr val="C00000"/>
+        </a:solidFill>
+        <a:effectLst/>
+      </p:bgPr>
+    </p:bg>
+    <p:spTree>
+      <p:nvGrpSpPr>
+        <p:cNvPr id="1" name=""/>
+        <p:cNvGrpSpPr/>
+        <p:nvPr/>
+      </p:nvGrpSpPr>
+      <p:grpSpPr>
+        <a:xfrm>
+          <a:off x="0" y="0"/>
+          <a:ext cx="0" cy="0"/>
+          <a:chOff x="0" y="0"/>
+          <a:chExt cx="0" cy="0"/>
+        </a:xfrm>
+      </p:grpSpPr>
+      <p:sp>
+        <p:nvSpPr>
+          <p:cNvPr id="2" name="Title 1"/>
+          <p:cNvSpPr>
+            <a:spLocks noGrp="1"/>
+          </p:cNvSpPr>
+          <p:nvPr>
+            <p:ph type="ctrTitle"/>
+          </p:nvPr>
+        </p:nvSpPr>
+        <p:spPr>
+          <a:xfrm>
+            <a:off x="685800" y="2895600"/>
+            <a:ext cx="7772400" cy="1470025"/>
+          </a:xfrm>
+        </p:spPr>
+        <p:txBody>
+          <a:bodyPr>
+            <a:noAutofit/>
+          </a:bodyPr>
+          <a:lstStyle/>
+          <a:p>
+            <a:r>
+              <a:rPr lang="en-US" sz="11500" dirty="0" smtClean="0">
+                <a:solidFill>
+                  <a:srgbClr val="FFFF00"/>
+                </a:solidFill>
+              </a:rPr>
+              <a:t>Zoom </a:t>
+            </a:r>
+            <a:br>
+              <a:rPr lang="en-US" sz="11500" dirty="0" smtClean="0">
+                <a:solidFill>
+                  <a:srgbClr val="FFFF00"/>
+                </a:solidFill>
+              </a:rPr>
+            </a:br>
+            <a:r>
+              <a:rPr lang="en-US" sz="11500" dirty="0" smtClean="0">
+                <a:solidFill>
+                  <a:srgbClr val="FFFF00"/>
+                </a:solidFill>
+              </a:rPr>
+              <a:t>to area</a:t>
+            </a:r>
+            <a:endParaRPr lang="en-SG" sz="11500" dirty="0">
+              <a:solidFill>
+                <a:srgbClr val="FFFF00"/>
+              </a:solidFill>
+            </a:endParaRPr>
+          </a:p>
+        </p:txBody>
+      </p:sp>
+    </p:spTree>
+    <p:extLst>
+      <p:ext uri="{BB962C8B-B14F-4D97-AF65-F5344CB8AC3E}">
+        <p14:creationId xmlns:p14="http://schemas.microsoft.com/office/powerpoint/2010/main" val="576206782"/>
+      </p:ext>
+    </p:extLst>
+  </p:cSld>
+  <p:clrMapOvr>
+    <a:masterClrMapping/>
+  </p:clrMapOvr>
+  <p:timing>
+    <p:tnLst>
+      <p:par>
+        <p:cTn id="1" dur="indefinite" restart="never" nodeType="tmRoot"/>
+      </p:par>
+    </p:tnLst>
+  </p:timing>
+</p:sld>
+</file>
+
+<file path=ppt/slides/slide21.xml><?xml version="1.0" encoding="utf-8"?>
+<p:sld xmlns:a="http://schemas.openxmlformats.org/drawingml/2006/main" xmlns:r="http://schemas.openxmlformats.org/officeDocument/2006/relationships" xmlns:p="http://schemas.openxmlformats.org/presentationml/2006/main">
+  <p:cSld>
+    <p:bg>
+      <p:bgPr>
+        <a:solidFill>
           <a:schemeClr val="tx1"/>
         </a:solidFill>
         <a:effectLst/>
@@ -8961,7 +9199,7 @@
 </p:sld>
 </file>
 
-<file path=ppt/slides/slide21.xml><?xml version="1.0" encoding="utf-8"?>
+<file path=ppt/slides/slide22.xml><?xml version="1.0" encoding="utf-8"?>
 <p:sld xmlns:a="http://schemas.openxmlformats.org/drawingml/2006/main" xmlns:r="http://schemas.openxmlformats.org/officeDocument/2006/relationships" xmlns:p="http://schemas.openxmlformats.org/presentationml/2006/main">
   <p:cSld>
     <p:spTree>
@@ -9079,7 +9317,7 @@
 </p:sld>
 </file>
 
-<file path=ppt/slides/slide22.xml><?xml version="1.0" encoding="utf-8"?>
+<file path=ppt/slides/slide23.xml><?xml version="1.0" encoding="utf-8"?>
 <p:sld xmlns:a="http://schemas.openxmlformats.org/drawingml/2006/main" xmlns:r="http://schemas.openxmlformats.org/officeDocument/2006/relationships" xmlns:p="http://schemas.openxmlformats.org/presentationml/2006/main">
   <p:cSld>
     <p:bg>
@@ -9178,7 +9416,7 @@
 </p:sld>
 </file>
 
-<file path=ppt/slides/slide23.xml><?xml version="1.0" encoding="utf-8"?>
+<file path=ppt/slides/slide24.xml><?xml version="1.0" encoding="utf-8"?>
 <p:sld xmlns:a="http://schemas.openxmlformats.org/drawingml/2006/main" xmlns:r="http://schemas.openxmlformats.org/officeDocument/2006/relationships" xmlns:p="http://schemas.openxmlformats.org/presentationml/2006/main">
   <p:cSld>
     <p:spTree>
@@ -11479,6 +11717,92 @@
 </p:sld>
 </file>
 
+<file path=ppt/slides/slide25.xml><?xml version="1.0" encoding="utf-8"?>
+<p:sld xmlns:a="http://schemas.openxmlformats.org/drawingml/2006/main" xmlns:r="http://schemas.openxmlformats.org/officeDocument/2006/relationships" xmlns:p="http://schemas.openxmlformats.org/presentationml/2006/main" show="0">
+  <p:cSld name="PPAck201401040911257868">
+    <p:spTree>
+      <p:nvGrpSpPr>
+        <p:cNvPr id="1" name=""/>
+        <p:cNvGrpSpPr/>
+        <p:nvPr/>
+      </p:nvGrpSpPr>
+      <p:grpSpPr>
+        <a:xfrm>
+          <a:off x="0" y="0"/>
+          <a:ext cx="0" cy="0"/>
+          <a:chOff x="0" y="0"/>
+          <a:chExt cx="0" cy="0"/>
+        </a:xfrm>
+      </p:grpSpPr>
+      <p:sp>
+        <p:nvSpPr>
+          <p:cNvPr id="2" name="Title 1"/>
+          <p:cNvSpPr>
+            <a:spLocks noGrp="1"/>
+          </p:cNvSpPr>
+          <p:nvPr>
+            <p:ph type="title"/>
+          </p:nvPr>
+        </p:nvSpPr>
+        <p:spPr/>
+        <p:txBody>
+          <a:bodyPr/>
+          <a:lstStyle/>
+          <a:p>
+            <a:endParaRPr lang="en-US"/>
+          </a:p>
+        </p:txBody>
+      </p:sp>
+      <p:pic>
+        <p:nvPicPr>
+          <p:cNvPr id="4" name="Content Placeholder 3"/>
+          <p:cNvPicPr>
+            <a:picLocks noGrp="1"/>
+          </p:cNvPicPr>
+          <p:nvPr>
+            <p:ph idx="1"/>
+          </p:nvPr>
+        </p:nvPicPr>
+        <p:blipFill>
+          <a:blip r:embed="rId2">
+            <a:extLst>
+              <a:ext uri="{28A0092B-C50C-407E-A947-70E740481C1C}">
+                <a14:useLocalDpi xmlns:a14="http://schemas.microsoft.com/office/drawing/2010/main" val="0"/>
+              </a:ext>
+            </a:extLst>
+          </a:blip>
+          <a:stretch>
+            <a:fillRect/>
+          </a:stretch>
+        </p:blipFill>
+        <p:spPr>
+          <a:xfrm>
+            <a:off x="1074665" y="1600200"/>
+            <a:ext cx="6994670" cy="4525963"/>
+          </a:xfrm>
+        </p:spPr>
+      </p:pic>
+    </p:spTree>
+    <p:extLst>
+      <p:ext uri="{BB962C8B-B14F-4D97-AF65-F5344CB8AC3E}">
+        <p14:creationId xmlns:p14="http://schemas.microsoft.com/office/powerpoint/2010/main" val="2259344336"/>
+      </p:ext>
+    </p:extLst>
+  </p:cSld>
+  <p:clrMapOvr>
+    <a:masterClrMapping/>
+  </p:clrMapOvr>
+  <mc:AlternateContent xmlns:mc="http://schemas.openxmlformats.org/markup-compatibility/2006">
+    <mc:Choice xmlns:p14="http://schemas.microsoft.com/office/powerpoint/2010/main" Requires="p14">
+      <p:transition spd="slow" p14:dur="2000"/>
+    </mc:Choice>
+    <mc:Fallback>
+      <p:transition spd="slow"/>
+    </mc:Fallback>
+  </mc:AlternateContent>
+</p:sld>
+</file>
+
 <file path=ppt/slides/slide3.xml><?xml version="1.0" encoding="utf-8"?>
 <p:sld xmlns:a="http://schemas.openxmlformats.org/drawingml/2006/main" xmlns:r="http://schemas.openxmlformats.org/officeDocument/2006/relationships" xmlns:p="http://schemas.openxmlformats.org/presentationml/2006/main">
   <p:cSld>
@@ -12018,7 +12342,15 @@
                   <a:schemeClr val="bg1"/>
                 </a:solidFill>
               </a:rPr>
-              <a:t>Rotate + move.</a:t>
+              <a:t>Rotate + </a:t>
+            </a:r>
+            <a:r>
+              <a:rPr lang="en-US" sz="8000" dirty="0" smtClean="0">
+                <a:solidFill>
+                  <a:schemeClr val="bg1"/>
+                </a:solidFill>
+              </a:rPr>
+              <a:t>move + resize.</a:t>
             </a:r>
             <a:endParaRPr lang="en-SG" sz="8000" dirty="0">
               <a:solidFill>
@@ -12249,7 +12581,7 @@
 
 <file path=ppt/slides/slide9.xml><?xml version="1.0" encoding="utf-8"?>
 <p:sld xmlns:a="http://schemas.openxmlformats.org/drawingml/2006/main" xmlns:r="http://schemas.openxmlformats.org/officeDocument/2006/relationships" xmlns:p="http://schemas.openxmlformats.org/presentationml/2006/main">
-  <p:cSld>
+  <p:cSld name="PPSlide201401040911254058">
     <p:spTree>
       <p:nvGrpSpPr>
         <p:cNvPr id="1" name=""/>
@@ -12271,8 +12603,8 @@
           <p:nvPr/>
         </p:nvSpPr>
         <p:spPr>
-          <a:xfrm>
-            <a:off x="2743200" y="3276600"/>
+          <a:xfrm rot="19804930">
+            <a:off x="1752600" y="1752600"/>
             <a:ext cx="1371600" cy="838200"/>
           </a:xfrm>
           <a:prstGeom prst="notchedRightArrow">
@@ -12311,7 +12643,7 @@
           <p:nvPr/>
         </p:nvSpPr>
         <p:spPr>
-          <a:xfrm>
+          <a:xfrm rot="20389402">
             <a:off x="3962400" y="3276600"/>
             <a:ext cx="1371600" cy="838200"/>
           </a:xfrm>
@@ -12351,8 +12683,8 @@
           <p:nvPr/>
         </p:nvSpPr>
         <p:spPr>
-          <a:xfrm>
-            <a:off x="5171552" y="3276600"/>
+          <a:xfrm rot="1690524">
+            <a:off x="6172200" y="4800600"/>
             <a:ext cx="1371600" cy="838200"/>
           </a:xfrm>
           <a:prstGeom prst="notchedRightArrow">
@@ -12392,9 +12724,9 @@
               <p14:cNvContentPartPr/>
               <p14:nvPr/>
             </p14:nvContentPartPr>
-            <p14:xfrm rot="1441388">
-              <a:off x="6837491" y="3285672"/>
-              <a:ext cx="734708" cy="820054"/>
+            <p14:xfrm>
+              <a:off x="3754080" y="1101411"/>
+              <a:ext cx="911520" cy="1130040"/>
             </p14:xfrm>
           </p:contentPart>
         </mc:Choice>
@@ -12412,9 +12744,9 @@
               </a:stretch>
             </p:blipFill>
             <p:spPr>
-              <a:xfrm rot="1441388">
-                <a:off x="6825977" y="3274863"/>
-                <a:ext cx="757015" cy="840591"/>
+              <a:xfrm>
+                <a:off x="3742560" y="1090251"/>
+                <a:ext cx="933840" cy="1150920"/>
               </a:xfrm>
               <a:prstGeom prst="rect">
                 <a:avLst/>
@@ -12423,30 +12755,375 @@
           </p:pic>
         </mc:Fallback>
       </mc:AlternateContent>
+      <p:pic>
+        <p:nvPicPr>
+          <p:cNvPr id="2" name="PPIndicator201401040911258838"/>
+          <p:cNvPicPr>
+            <a:picLocks/>
+          </p:cNvPicPr>
+          <p:nvPr/>
+        </p:nvPicPr>
+        <p:blipFill>
+          <a:blip r:embed="rId4" cstate="print">
+            <a:extLst>
+              <a:ext uri="{28A0092B-C50C-407E-A947-70E740481C1C}">
+                <a14:useLocalDpi xmlns:a14="http://schemas.microsoft.com/office/drawing/2010/main" val="0"/>
+              </a:ext>
+            </a:extLst>
+          </a:blip>
+          <a:stretch>
+            <a:fillRect/>
+          </a:stretch>
+        </p:blipFill>
+        <p:spPr>
+          <a:xfrm>
+            <a:off x="7620000" y="0"/>
+            <a:ext cx="1524000" cy="1066800"/>
+          </a:xfrm>
+          <a:prstGeom prst="rect">
+            <a:avLst/>
+          </a:prstGeom>
+        </p:spPr>
+      </p:pic>
     </p:spTree>
     <p:extLst>
       <p:ext uri="{BB962C8B-B14F-4D97-AF65-F5344CB8AC3E}">
-        <p14:creationId xmlns:p14="http://schemas.microsoft.com/office/powerpoint/2010/main" val="1406357402"/>
+        <p14:creationId xmlns:p14="http://schemas.microsoft.com/office/powerpoint/2010/main" val="3877962176"/>
       </p:ext>
     </p:extLst>
   </p:cSld>
   <p:clrMapOvr>
     <a:masterClrMapping/>
   </p:clrMapOvr>
-  <mc:AlternateContent xmlns:mc="http://schemas.openxmlformats.org/markup-compatibility/2006" xmlns:p14="http://schemas.microsoft.com/office/powerpoint/2010/main">
-    <mc:Choice Requires="p14">
-      <p:transition spd="slow" p14:dur="2000"/>
-    </mc:Choice>
-    <mc:Fallback xmlns="">
-      <p:transition spd="slow"/>
-    </mc:Fallback>
-  </mc:AlternateContent>
+  <p:transition spd="slow" advClick="0" advTm="0"/>
   <p:timing>
     <p:tnLst>
       <p:par>
-        <p:cTn id="1" dur="indefinite" restart="never" nodeType="tmRoot"/>
+        <p:cTn id="1" dur="indefinite" restart="never" nodeType="tmRoot">
+          <p:childTnLst>
+            <p:seq concurrent="1" nextAc="seek">
+              <p:cTn id="2" dur="indefinite" nodeType="mainSeq">
+                <p:childTnLst>
+                  <p:par>
+                    <p:cTn id="3" fill="hold">
+                      <p:stCondLst>
+                        <p:cond delay="indefinite"/>
+                        <p:cond evt="onBegin" delay="0">
+                          <p:tn val="2"/>
+                        </p:cond>
+                      </p:stCondLst>
+                      <p:childTnLst>
+                        <p:par>
+                          <p:cTn id="4" fill="hold">
+                            <p:stCondLst>
+                              <p:cond delay="0"/>
+                            </p:stCondLst>
+                            <p:childTnLst>
+                              <p:par>
+                                <p:cTn id="5" presetID="1" presetClass="exit" presetSubtype="0" fill="hold" nodeType="withEffect">
+                                  <p:stCondLst>
+                                    <p:cond delay="0"/>
+                                  </p:stCondLst>
+                                  <p:childTnLst>
+                                    <p:set>
+                                      <p:cBhvr>
+                                        <p:cTn id="6" dur="1" fill="hold">
+                                          <p:stCondLst>
+                                            <p:cond delay="0"/>
+                                          </p:stCondLst>
+                                        </p:cTn>
+                                        <p:tgtEl>
+                                          <p:spTgt spid="2"/>
+                                        </p:tgtEl>
+                                        <p:attrNameLst>
+                                          <p:attrName>style.visibility</p:attrName>
+                                        </p:attrNameLst>
+                                      </p:cBhvr>
+                                      <p:to>
+                                        <p:strVal val="hidden"/>
+                                      </p:to>
+                                    </p:set>
+                                  </p:childTnLst>
+                                </p:cTn>
+                              </p:par>
+                              <p:par>
+                                <p:cTn id="7" presetID="42" presetClass="path" presetSubtype="0" accel="50000" decel="50000" fill="hold" grpId="0" nodeType="withEffect">
+                                  <p:stCondLst>
+                                    <p:cond delay="0"/>
+                                  </p:stCondLst>
+                                  <p:childTnLst>
+                                    <p:animMotion origin="layout" path="M 0 0 C -0.05833333 0.1111111 -0.05833333 0.1111111 -0.1166667 0.2222222 E" pathEditMode="relative" ptsTypes="">
+                                      <p:cBhvr>
+                                        <p:cTn id="8" dur="500" fill="hold"/>
+                                        <p:tgtEl>
+                                          <p:spTgt spid="4"/>
+                                        </p:tgtEl>
+                                        <p:attrNameLst>
+                                          <p:attrName>ppt_x</p:attrName>
+                                          <p:attrName>ppt_y</p:attrName>
+                                        </p:attrNameLst>
+                                      </p:cBhvr>
+                                    </p:animMotion>
+                                  </p:childTnLst>
+                                </p:cTn>
+                              </p:par>
+                              <p:par>
+                                <p:cTn id="9" presetID="6" presetClass="emph" presetSubtype="0" fill="hold" grpId="1" nodeType="withEffect">
+                                  <p:stCondLst>
+                                    <p:cond delay="0"/>
+                                  </p:stCondLst>
+                                  <p:childTnLst>
+                                    <p:animScale>
+                                      <p:cBhvr>
+                                        <p:cTn id="10" dur="500" fill="hold"/>
+                                        <p:tgtEl>
+                                          <p:spTgt spid="4"/>
+                                        </p:tgtEl>
+                                      </p:cBhvr>
+                                      <p:by x="150000" y="150000"/>
+                                      <p:to x="200000" y="100000"/>
+                                    </p:animScale>
+                                  </p:childTnLst>
+                                </p:cTn>
+                              </p:par>
+                              <p:par>
+                                <p:cTn id="11" presetID="8" presetClass="emph" presetSubtype="0" fill="hold" grpId="2" nodeType="withEffect">
+                                  <p:stCondLst>
+                                    <p:cond delay="0"/>
+                                  </p:stCondLst>
+                                  <p:childTnLst>
+                                    <p:animRot by="1795071">
+                                      <p:cBhvr>
+                                        <p:cTn id="12" dur="500" fill="hold"/>
+                                        <p:tgtEl>
+                                          <p:spTgt spid="4"/>
+                                        </p:tgtEl>
+                                        <p:attrNameLst>
+                                          <p:attrName>r</p:attrName>
+                                        </p:attrNameLst>
+                                      </p:cBhvr>
+                                    </p:animRot>
+                                  </p:childTnLst>
+                                </p:cTn>
+                              </p:par>
+                              <p:par>
+                                <p:cTn id="13" presetID="42" presetClass="path" presetSubtype="0" accel="50000" decel="50000" fill="hold" grpId="0" nodeType="withEffect">
+                                  <p:stCondLst>
+                                    <p:cond delay="0"/>
+                                  </p:stCondLst>
+                                  <p:childTnLst>
+                                    <p:animMotion origin="layout" path="M 0 0 C -0.0375 0 -0.0375 0 -0.075 0 E" pathEditMode="relative" ptsTypes="">
+                                      <p:cBhvr>
+                                        <p:cTn id="14" dur="500" fill="hold"/>
+                                        <p:tgtEl>
+                                          <p:spTgt spid="5"/>
+                                        </p:tgtEl>
+                                        <p:attrNameLst>
+                                          <p:attrName>ppt_x</p:attrName>
+                                          <p:attrName>ppt_y</p:attrName>
+                                        </p:attrNameLst>
+                                      </p:cBhvr>
+                                    </p:animMotion>
+                                  </p:childTnLst>
+                                </p:cTn>
+                              </p:par>
+                              <p:par>
+                                <p:cTn id="15" presetID="6" presetClass="emph" presetSubtype="0" fill="hold" grpId="1" nodeType="withEffect">
+                                  <p:stCondLst>
+                                    <p:cond delay="0"/>
+                                  </p:stCondLst>
+                                  <p:childTnLst>
+                                    <p:animScale>
+                                      <p:cBhvr>
+                                        <p:cTn id="16" dur="500" fill="hold"/>
+                                        <p:tgtEl>
+                                          <p:spTgt spid="5"/>
+                                        </p:tgtEl>
+                                      </p:cBhvr>
+                                      <p:by x="150000" y="150000"/>
+                                      <p:to x="200000" y="100000"/>
+                                    </p:animScale>
+                                  </p:childTnLst>
+                                </p:cTn>
+                              </p:par>
+                              <p:par>
+                                <p:cTn id="17" presetID="8" presetClass="emph" presetSubtype="0" fill="hold" grpId="2" nodeType="withEffect">
+                                  <p:stCondLst>
+                                    <p:cond delay="0"/>
+                                  </p:stCondLst>
+                                  <p:childTnLst>
+                                    <p:animRot by="1210598">
+                                      <p:cBhvr>
+                                        <p:cTn id="18" dur="500" fill="hold"/>
+                                        <p:tgtEl>
+                                          <p:spTgt spid="5"/>
+                                        </p:tgtEl>
+                                        <p:attrNameLst>
+                                          <p:attrName>r</p:attrName>
+                                        </p:attrNameLst>
+                                      </p:cBhvr>
+                                    </p:animRot>
+                                  </p:childTnLst>
+                                </p:cTn>
+                              </p:par>
+                              <p:par>
+                                <p:cTn id="19" presetID="42" presetClass="path" presetSubtype="0" accel="50000" decel="50000" fill="hold" grpId="0" nodeType="withEffect">
+                                  <p:stCondLst>
+                                    <p:cond delay="0"/>
+                                  </p:stCondLst>
+                                  <p:childTnLst>
+                                    <p:animMotion origin="layout" path="M 0 0 C -0.01666667 -0.1111112 -0.01666667 -0.1111112 -0.03333334 -0.2222224 E" pathEditMode="relative" ptsTypes="">
+                                      <p:cBhvr>
+                                        <p:cTn id="20" dur="500" fill="hold"/>
+                                        <p:tgtEl>
+                                          <p:spTgt spid="6"/>
+                                        </p:tgtEl>
+                                        <p:attrNameLst>
+                                          <p:attrName>ppt_x</p:attrName>
+                                          <p:attrName>ppt_y</p:attrName>
+                                        </p:attrNameLst>
+                                      </p:cBhvr>
+                                    </p:animMotion>
+                                  </p:childTnLst>
+                                </p:cTn>
+                              </p:par>
+                              <p:par>
+                                <p:cTn id="21" presetID="6" presetClass="emph" presetSubtype="0" fill="hold" grpId="1" nodeType="withEffect">
+                                  <p:stCondLst>
+                                    <p:cond delay="0"/>
+                                  </p:stCondLst>
+                                  <p:childTnLst>
+                                    <p:animScale>
+                                      <p:cBhvr>
+                                        <p:cTn id="22" dur="500" fill="hold"/>
+                                        <p:tgtEl>
+                                          <p:spTgt spid="6"/>
+                                        </p:tgtEl>
+                                      </p:cBhvr>
+                                      <p:by x="150000" y="150000"/>
+                                      <p:to x="200000" y="100000"/>
+                                    </p:animScale>
+                                  </p:childTnLst>
+                                </p:cTn>
+                              </p:par>
+                              <p:par>
+                                <p:cTn id="23" presetID="8" presetClass="emph" presetSubtype="0" fill="hold" grpId="2" nodeType="withEffect">
+                                  <p:stCondLst>
+                                    <p:cond delay="0"/>
+                                  </p:stCondLst>
+                                  <p:childTnLst>
+                                    <p:animRot by="-1690524">
+                                      <p:cBhvr>
+                                        <p:cTn id="24" dur="500" fill="hold"/>
+                                        <p:tgtEl>
+                                          <p:spTgt spid="6"/>
+                                        </p:tgtEl>
+                                        <p:attrNameLst>
+                                          <p:attrName>r</p:attrName>
+                                        </p:attrNameLst>
+                                      </p:cBhvr>
+                                    </p:animRot>
+                                  </p:childTnLst>
+                                </p:cTn>
+                              </p:par>
+                              <p:par>
+                                <p:cTn id="25" presetID="42" presetClass="path" presetSubtype="0" accel="50000" decel="50000" fill="hold" nodeType="withEffect">
+                                  <p:stCondLst>
+                                    <p:cond delay="0"/>
+                                  </p:stCondLst>
+                                  <p:childTnLst>
+                                    <p:animMotion origin="layout" path="M 0 0 C 0.2306113 0.1469388 0.2306113 0.1469388 0.4612225 0.2938775 E" pathEditMode="relative" ptsTypes="">
+                                      <p:cBhvr>
+                                        <p:cTn id="26" dur="500" fill="hold"/>
+                                        <p:tgtEl>
+                                          <p:spTgt spid="7"/>
+                                        </p:tgtEl>
+                                        <p:attrNameLst>
+                                          <p:attrName>ppt_x</p:attrName>
+                                          <p:attrName>ppt_y</p:attrName>
+                                        </p:attrNameLst>
+                                      </p:cBhvr>
+                                    </p:animMotion>
+                                  </p:childTnLst>
+                                </p:cTn>
+                              </p:par>
+                              <p:par>
+                                <p:cTn id="27" presetID="6" presetClass="emph" presetSubtype="0" fill="hold" nodeType="withEffect">
+                                  <p:stCondLst>
+                                    <p:cond delay="0"/>
+                                  </p:stCondLst>
+                                  <p:childTnLst>
+                                    <p:animScale>
+                                      <p:cBhvr>
+                                        <p:cTn id="28" dur="500" fill="hold"/>
+                                        <p:tgtEl>
+                                          <p:spTgt spid="7"/>
+                                        </p:tgtEl>
+                                      </p:cBhvr>
+                                      <p:by x="150000" y="150000"/>
+                                      <p:to x="80603" y="72569"/>
+                                    </p:animScale>
+                                  </p:childTnLst>
+                                </p:cTn>
+                              </p:par>
+                              <p:par>
+                                <p:cTn id="29" presetID="8" presetClass="emph" presetSubtype="0" fill="hold" nodeType="withEffect">
+                                  <p:stCondLst>
+                                    <p:cond delay="0"/>
+                                  </p:stCondLst>
+                                  <p:childTnLst>
+                                    <p:animRot by="1441388">
+                                      <p:cBhvr>
+                                        <p:cTn id="30" dur="500" fill="hold"/>
+                                        <p:tgtEl>
+                                          <p:spTgt spid="7"/>
+                                        </p:tgtEl>
+                                        <p:attrNameLst>
+                                          <p:attrName>r</p:attrName>
+                                        </p:attrNameLst>
+                                      </p:cBhvr>
+                                    </p:animRot>
+                                  </p:childTnLst>
+                                </p:cTn>
+                              </p:par>
+                            </p:childTnLst>
+                          </p:cTn>
+                        </p:par>
+                      </p:childTnLst>
+                    </p:cTn>
+                  </p:par>
+                </p:childTnLst>
+              </p:cTn>
+              <p:prevCondLst>
+                <p:cond evt="onPrev" delay="0">
+                  <p:tgtEl>
+                    <p:sldTgt/>
+                  </p:tgtEl>
+                </p:cond>
+              </p:prevCondLst>
+              <p:nextCondLst>
+                <p:cond evt="onNext" delay="0">
+                  <p:tgtEl>
+                    <p:sldTgt/>
+                  </p:tgtEl>
+                </p:cond>
+              </p:nextCondLst>
+            </p:seq>
+          </p:childTnLst>
+        </p:cTn>
       </p:par>
     </p:tnLst>
+    <p:bldLst>
+      <p:bldP spid="4" grpId="0" animBg="1"/>
+      <p:bldP spid="4" grpId="1" animBg="1"/>
+      <p:bldP spid="4" grpId="2" animBg="1"/>
+      <p:bldP spid="5" grpId="0" animBg="1"/>
+      <p:bldP spid="5" grpId="1" animBg="1"/>
+      <p:bldP spid="5" grpId="2" animBg="1"/>
+      <p:bldP spid="6" grpId="0" animBg="1"/>
+      <p:bldP spid="6" grpId="1" animBg="1"/>
+      <p:bldP spid="6" grpId="2" animBg="1"/>
+    </p:bldLst>
   </p:timing>
 </p:sld>
 </file>

</xml_diff>

<commit_message>
Issue 162: Already disappeared shapes reappear briefly during animation
</commit_message>
<xml_diff>
--- a/doc/Test scenarios.pptx
+++ b/doc/Test scenarios.pptx
@@ -5,50 +5,43 @@
     <p:sldMasterId id="2147483648" r:id="rId1"/>
   </p:sldMasterIdLst>
   <p:sldIdLst>
-    <p:sldId id="256" r:id="rId2"/>
-    <p:sldId id="272" r:id="rId3"/>
-    <p:sldId id="257" r:id="rId4"/>
-    <p:sldId id="285" r:id="rId5"/>
-    <p:sldId id="283" r:id="rId6"/>
-    <p:sldId id="324" r:id="rId7"/>
-    <p:sldId id="326" r:id="rId8"/>
-    <p:sldId id="282" r:id="rId9"/>
-    <p:sldId id="280" r:id="rId10"/>
-    <p:sldId id="307" r:id="rId11"/>
-    <p:sldId id="308" r:id="rId12"/>
-    <p:sldId id="310" r:id="rId13"/>
-    <p:sldId id="311" r:id="rId14"/>
-    <p:sldId id="317" r:id="rId15"/>
-    <p:sldId id="319" r:id="rId16"/>
-    <p:sldId id="321" r:id="rId17"/>
-    <p:sldId id="322" r:id="rId18"/>
-    <p:sldId id="306" r:id="rId19"/>
-    <p:sldId id="303" r:id="rId20"/>
-    <p:sldId id="304" r:id="rId21"/>
-    <p:sldId id="298" r:id="rId22"/>
-    <p:sldId id="299" r:id="rId23"/>
-    <p:sldId id="300" r:id="rId24"/>
-    <p:sldId id="302" r:id="rId25"/>
-    <p:sldId id="261" r:id="rId26"/>
-    <p:sldId id="262" r:id="rId27"/>
-    <p:sldId id="313" r:id="rId28"/>
-    <p:sldId id="314" r:id="rId29"/>
-    <p:sldId id="315" r:id="rId30"/>
-    <p:sldId id="278" r:id="rId31"/>
-    <p:sldId id="269" r:id="rId32"/>
-    <p:sldId id="270" r:id="rId33"/>
-    <p:sldId id="274" r:id="rId34"/>
-    <p:sldId id="275" r:id="rId35"/>
-    <p:sldId id="276" r:id="rId36"/>
-    <p:sldId id="293" r:id="rId37"/>
-    <p:sldId id="292" r:id="rId38"/>
-    <p:sldId id="294" r:id="rId39"/>
-    <p:sldId id="287" r:id="rId40"/>
-    <p:sldId id="288" r:id="rId41"/>
-    <p:sldId id="289" r:id="rId42"/>
-    <p:sldId id="290" r:id="rId43"/>
-    <p:sldId id="291" r:id="rId44"/>
-    <p:sldId id="296" r:id="rId45"/>
+    <p:sldId id="282" r:id="rId2"/>
+    <p:sldId id="280" r:id="rId3"/>
+    <p:sldId id="307" r:id="rId4"/>
+    <p:sldId id="308" r:id="rId5"/>
+    <p:sldId id="310" r:id="rId6"/>
+    <p:sldId id="311" r:id="rId7"/>
+    <p:sldId id="317" r:id="rId8"/>
+    <p:sldId id="319" r:id="rId9"/>
+    <p:sldId id="321" r:id="rId10"/>
+    <p:sldId id="322" r:id="rId11"/>
+    <p:sldId id="306" r:id="rId12"/>
+    <p:sldId id="303" r:id="rId13"/>
+    <p:sldId id="304" r:id="rId14"/>
+    <p:sldId id="298" r:id="rId15"/>
+    <p:sldId id="299" r:id="rId16"/>
+    <p:sldId id="300" r:id="rId17"/>
+    <p:sldId id="302" r:id="rId18"/>
+    <p:sldId id="261" r:id="rId19"/>
+    <p:sldId id="262" r:id="rId20"/>
+    <p:sldId id="313" r:id="rId21"/>
+    <p:sldId id="314" r:id="rId22"/>
+    <p:sldId id="315" r:id="rId23"/>
+    <p:sldId id="278" r:id="rId24"/>
+    <p:sldId id="269" r:id="rId25"/>
+    <p:sldId id="270" r:id="rId26"/>
+    <p:sldId id="274" r:id="rId27"/>
+    <p:sldId id="275" r:id="rId28"/>
+    <p:sldId id="276" r:id="rId29"/>
+    <p:sldId id="293" r:id="rId30"/>
+    <p:sldId id="292" r:id="rId31"/>
+    <p:sldId id="294" r:id="rId32"/>
+    <p:sldId id="287" r:id="rId33"/>
+    <p:sldId id="288" r:id="rId34"/>
+    <p:sldId id="289" r:id="rId35"/>
+    <p:sldId id="290" r:id="rId36"/>
+    <p:sldId id="291" r:id="rId37"/>
+    <p:sldId id="296" r:id="rId38"/>
   </p:sldIdLst>
   <p:sldSz cx="9144000" cy="6858000" type="screen4x3"/>
   <p:notesSz cx="6858000" cy="9144000"/>
@@ -150,17 +143,6 @@
   <p:extLst>
     <p:ext uri="{521415D9-36F7-43E2-AB2F-B90AF26B5E84}">
       <p14:sectionLst xmlns:p14="http://schemas.microsoft.com/office/powerpoint/2010/main">
-        <p14:section name="Spotlight" id="{DDE8DD22-B65B-4E28-9F29-690797D3DB05}">
-          <p14:sldIdLst>
-            <p14:sldId id="256"/>
-            <p14:sldId id="272"/>
-            <p14:sldId id="257"/>
-            <p14:sldId id="285"/>
-            <p14:sldId id="283"/>
-            <p14:sldId id="324"/>
-            <p14:sldId id="326"/>
-          </p14:sldIdLst>
-        </p14:section>
         <p14:section name="Auto-animate" id="{6FDF723C-725B-43A9-867B-50B5C5A22F3E}">
           <p14:sldIdLst>
             <p14:sldId id="282"/>
@@ -507,7 +489,7 @@
             <a:fld id="{1D8BD707-D9CF-40AE-B4C6-C98DA3205C09}" type="datetimeFigureOut">
               <a:rPr lang="en-US" smtClean="0"/>
               <a:pPr/>
-              <a:t>1/8/2014</a:t>
+              <a:t>1/22/2014</a:t>
             </a:fld>
             <a:endParaRPr lang="en-US"/>
           </a:p>
@@ -674,7 +656,7 @@
             <a:fld id="{1D8BD707-D9CF-40AE-B4C6-C98DA3205C09}" type="datetimeFigureOut">
               <a:rPr lang="en-US" smtClean="0"/>
               <a:pPr/>
-              <a:t>1/8/2014</a:t>
+              <a:t>1/22/2014</a:t>
             </a:fld>
             <a:endParaRPr lang="en-US"/>
           </a:p>
@@ -851,7 +833,7 @@
             <a:fld id="{1D8BD707-D9CF-40AE-B4C6-C98DA3205C09}" type="datetimeFigureOut">
               <a:rPr lang="en-US" smtClean="0"/>
               <a:pPr/>
-              <a:t>1/8/2014</a:t>
+              <a:t>1/22/2014</a:t>
             </a:fld>
             <a:endParaRPr lang="en-US"/>
           </a:p>
@@ -1018,7 +1000,7 @@
             <a:fld id="{1D8BD707-D9CF-40AE-B4C6-C98DA3205C09}" type="datetimeFigureOut">
               <a:rPr lang="en-US" smtClean="0"/>
               <a:pPr/>
-              <a:t>1/8/2014</a:t>
+              <a:t>1/22/2014</a:t>
             </a:fld>
             <a:endParaRPr lang="en-US"/>
           </a:p>
@@ -1261,7 +1243,7 @@
             <a:fld id="{1D8BD707-D9CF-40AE-B4C6-C98DA3205C09}" type="datetimeFigureOut">
               <a:rPr lang="en-US" smtClean="0"/>
               <a:pPr/>
-              <a:t>1/8/2014</a:t>
+              <a:t>1/22/2014</a:t>
             </a:fld>
             <a:endParaRPr lang="en-US"/>
           </a:p>
@@ -1546,7 +1528,7 @@
             <a:fld id="{1D8BD707-D9CF-40AE-B4C6-C98DA3205C09}" type="datetimeFigureOut">
               <a:rPr lang="en-US" smtClean="0"/>
               <a:pPr/>
-              <a:t>1/8/2014</a:t>
+              <a:t>1/22/2014</a:t>
             </a:fld>
             <a:endParaRPr lang="en-US"/>
           </a:p>
@@ -1965,7 +1947,7 @@
             <a:fld id="{1D8BD707-D9CF-40AE-B4C6-C98DA3205C09}" type="datetimeFigureOut">
               <a:rPr lang="en-US" smtClean="0"/>
               <a:pPr/>
-              <a:t>1/8/2014</a:t>
+              <a:t>1/22/2014</a:t>
             </a:fld>
             <a:endParaRPr lang="en-US"/>
           </a:p>
@@ -2080,7 +2062,7 @@
             <a:fld id="{1D8BD707-D9CF-40AE-B4C6-C98DA3205C09}" type="datetimeFigureOut">
               <a:rPr lang="en-US" smtClean="0"/>
               <a:pPr/>
-              <a:t>1/8/2014</a:t>
+              <a:t>1/22/2014</a:t>
             </a:fld>
             <a:endParaRPr lang="en-US"/>
           </a:p>
@@ -2172,7 +2154,7 @@
             <a:fld id="{1D8BD707-D9CF-40AE-B4C6-C98DA3205C09}" type="datetimeFigureOut">
               <a:rPr lang="en-US" smtClean="0"/>
               <a:pPr/>
-              <a:t>1/8/2014</a:t>
+              <a:t>1/22/2014</a:t>
             </a:fld>
             <a:endParaRPr lang="en-US"/>
           </a:p>
@@ -2446,7 +2428,7 @@
             <a:fld id="{1D8BD707-D9CF-40AE-B4C6-C98DA3205C09}" type="datetimeFigureOut">
               <a:rPr lang="en-US" smtClean="0"/>
               <a:pPr/>
-              <a:t>1/8/2014</a:t>
+              <a:t>1/22/2014</a:t>
             </a:fld>
             <a:endParaRPr lang="en-US"/>
           </a:p>
@@ -2696,7 +2678,7 @@
             <a:fld id="{1D8BD707-D9CF-40AE-B4C6-C98DA3205C09}" type="datetimeFigureOut">
               <a:rPr lang="en-US" smtClean="0"/>
               <a:pPr/>
-              <a:t>1/8/2014</a:t>
+              <a:t>1/22/2014</a:t>
             </a:fld>
             <a:endParaRPr lang="en-US"/>
           </a:p>
@@ -2906,7 +2888,7 @@
             <a:fld id="{1D8BD707-D9CF-40AE-B4C6-C98DA3205C09}" type="datetimeFigureOut">
               <a:rPr lang="en-US" smtClean="0"/>
               <a:pPr/>
-              <a:t>1/8/2014</a:t>
+              <a:t>1/22/2014</a:t>
             </a:fld>
             <a:endParaRPr lang="en-US"/>
           </a:p>
@@ -3313,7 +3295,7 @@
                   <a:srgbClr val="FFFF00"/>
                 </a:solidFill>
               </a:rPr>
-              <a:t>Spotlight</a:t>
+              <a:t>Basic Cases</a:t>
             </a:r>
             <a:endParaRPr lang="en-SG" sz="11500" dirty="0">
               <a:solidFill>
@@ -3326,7 +3308,7 @@
     </p:spTree>
     <p:extLst>
       <p:ext uri="{BB962C8B-B14F-4D97-AF65-F5344CB8AC3E}">
-        <p14:creationId xmlns:p14="http://schemas.microsoft.com/office/powerpoint/2010/main" val="350539167"/>
+        <p14:creationId xmlns:p14="http://schemas.microsoft.com/office/powerpoint/2010/main" val="1268718629"/>
       </p:ext>
     </p:extLst>
   </p:cSld>
@@ -3344,651 +3326,6 @@
 </file>
 
 <file path=ppt/slides/slide10.xml><?xml version="1.0" encoding="utf-8"?>
-<p:sld xmlns:a="http://schemas.openxmlformats.org/drawingml/2006/main" xmlns:r="http://schemas.openxmlformats.org/officeDocument/2006/relationships" xmlns:p="http://schemas.openxmlformats.org/presentationml/2006/main">
-  <p:cSld name="PPSlideStart201401081207220024">
-    <p:spTree>
-      <p:nvGrpSpPr>
-        <p:cNvPr id="1" name=""/>
-        <p:cNvGrpSpPr/>
-        <p:nvPr/>
-      </p:nvGrpSpPr>
-      <p:grpSpPr>
-        <a:xfrm>
-          <a:off x="0" y="0"/>
-          <a:ext cx="0" cy="0"/>
-          <a:chOff x="0" y="0"/>
-          <a:chExt cx="0" cy="0"/>
-        </a:xfrm>
-      </p:grpSpPr>
-      <p:sp>
-        <p:nvSpPr>
-          <p:cNvPr id="5" name="Right Arrow 4"/>
-          <p:cNvSpPr/>
-          <p:nvPr/>
-        </p:nvSpPr>
-        <p:spPr>
-          <a:xfrm rot="18334521">
-            <a:off x="2836354" y="2672724"/>
-            <a:ext cx="2209800" cy="990600"/>
-          </a:xfrm>
-          <a:prstGeom prst="rightArrow">
-            <a:avLst/>
-          </a:prstGeom>
-        </p:spPr>
-        <p:style>
-          <a:lnRef idx="2">
-            <a:schemeClr val="accent1">
-              <a:shade val="50000"/>
-            </a:schemeClr>
-          </a:lnRef>
-          <a:fillRef idx="1">
-            <a:schemeClr val="accent1"/>
-          </a:fillRef>
-          <a:effectRef idx="0">
-            <a:schemeClr val="accent1"/>
-          </a:effectRef>
-          <a:fontRef idx="minor">
-            <a:schemeClr val="lt1"/>
-          </a:fontRef>
-        </p:style>
-        <p:txBody>
-          <a:bodyPr rtlCol="0" anchor="ctr"/>
-          <a:lstStyle/>
-          <a:p>
-            <a:pPr algn="ctr"/>
-            <a:endParaRPr lang="en-US">
-              <a:solidFill>
-                <a:prstClr val="white"/>
-              </a:solidFill>
-            </a:endParaRPr>
-          </a:p>
-        </p:txBody>
-      </p:sp>
-    </p:spTree>
-    <p:extLst>
-      <p:ext uri="{BB962C8B-B14F-4D97-AF65-F5344CB8AC3E}">
-        <p14:creationId xmlns:p14="http://schemas.microsoft.com/office/powerpoint/2010/main" val="1423342019"/>
-      </p:ext>
-    </p:extLst>
-  </p:cSld>
-  <p:clrMapOvr>
-    <a:masterClrMapping/>
-  </p:clrMapOvr>
-  <p:timing>
-    <p:tnLst>
-      <p:par>
-        <p:cTn id="1" dur="indefinite" restart="never" nodeType="tmRoot"/>
-      </p:par>
-    </p:tnLst>
-  </p:timing>
-</p:sld>
-</file>
-
-<file path=ppt/slides/slide11.xml><?xml version="1.0" encoding="utf-8"?>
-<p:sld xmlns:a="http://schemas.openxmlformats.org/drawingml/2006/main" xmlns:r="http://schemas.openxmlformats.org/officeDocument/2006/relationships" xmlns:p="http://schemas.openxmlformats.org/presentationml/2006/main">
-  <p:cSld name="PPSlideEnd201401081207220074">
-    <p:spTree>
-      <p:nvGrpSpPr>
-        <p:cNvPr id="1" name=""/>
-        <p:cNvGrpSpPr/>
-        <p:nvPr/>
-      </p:nvGrpSpPr>
-      <p:grpSpPr>
-        <a:xfrm>
-          <a:off x="0" y="0"/>
-          <a:ext cx="0" cy="0"/>
-          <a:chOff x="0" y="0"/>
-          <a:chExt cx="0" cy="0"/>
-        </a:xfrm>
-      </p:grpSpPr>
-      <p:sp>
-        <p:nvSpPr>
-          <p:cNvPr id="5" name="Right Arrow 4"/>
-          <p:cNvSpPr/>
-          <p:nvPr/>
-        </p:nvSpPr>
-        <p:spPr>
-          <a:xfrm>
-            <a:off x="2836354" y="2672724"/>
-            <a:ext cx="2209800" cy="990600"/>
-          </a:xfrm>
-          <a:prstGeom prst="rightArrow">
-            <a:avLst/>
-          </a:prstGeom>
-        </p:spPr>
-        <p:style>
-          <a:lnRef idx="2">
-            <a:schemeClr val="accent1">
-              <a:shade val="50000"/>
-            </a:schemeClr>
-          </a:lnRef>
-          <a:fillRef idx="1">
-            <a:schemeClr val="accent1"/>
-          </a:fillRef>
-          <a:effectRef idx="0">
-            <a:schemeClr val="accent1"/>
-          </a:effectRef>
-          <a:fontRef idx="minor">
-            <a:schemeClr val="lt1"/>
-          </a:fontRef>
-        </p:style>
-        <p:txBody>
-          <a:bodyPr rtlCol="0" anchor="ctr"/>
-          <a:lstStyle/>
-          <a:p>
-            <a:pPr algn="ctr"/>
-            <a:endParaRPr lang="en-US">
-              <a:solidFill>
-                <a:prstClr val="white"/>
-              </a:solidFill>
-            </a:endParaRPr>
-          </a:p>
-        </p:txBody>
-      </p:sp>
-    </p:spTree>
-    <p:extLst>
-      <p:ext uri="{BB962C8B-B14F-4D97-AF65-F5344CB8AC3E}">
-        <p14:creationId xmlns:p14="http://schemas.microsoft.com/office/powerpoint/2010/main" val="2685534052"/>
-      </p:ext>
-    </p:extLst>
-  </p:cSld>
-  <p:clrMapOvr>
-    <a:masterClrMapping/>
-  </p:clrMapOvr>
-  <mc:AlternateContent xmlns:mc="http://schemas.openxmlformats.org/markup-compatibility/2006" xmlns:p14="http://schemas.microsoft.com/office/powerpoint/2010/main">
-    <mc:Choice Requires="p14">
-      <p:transition spd="slow" p14:dur="2000"/>
-    </mc:Choice>
-    <mc:Fallback xmlns="">
-      <p:transition spd="slow"/>
-    </mc:Fallback>
-  </mc:AlternateContent>
-  <p:timing>
-    <p:tnLst>
-      <p:par>
-        <p:cTn id="1" dur="indefinite" restart="never" nodeType="tmRoot"/>
-      </p:par>
-    </p:tnLst>
-  </p:timing>
-</p:sld>
-</file>
-
-<file path=ppt/slides/slide12.xml><?xml version="1.0" encoding="utf-8"?>
-<p:sld xmlns:a="http://schemas.openxmlformats.org/drawingml/2006/main" xmlns:r="http://schemas.openxmlformats.org/officeDocument/2006/relationships" xmlns:p="http://schemas.openxmlformats.org/presentationml/2006/main">
-  <p:cSld>
-    <p:bg>
-      <p:bgPr>
-        <a:solidFill>
-          <a:schemeClr val="tx1"/>
-        </a:solidFill>
-        <a:effectLst/>
-      </p:bgPr>
-    </p:bg>
-    <p:spTree>
-      <p:nvGrpSpPr>
-        <p:cNvPr id="1" name=""/>
-        <p:cNvGrpSpPr/>
-        <p:nvPr/>
-      </p:nvGrpSpPr>
-      <p:grpSpPr>
-        <a:xfrm>
-          <a:off x="0" y="0"/>
-          <a:ext cx="0" cy="0"/>
-          <a:chOff x="0" y="0"/>
-          <a:chExt cx="0" cy="0"/>
-        </a:xfrm>
-      </p:grpSpPr>
-      <p:sp>
-        <p:nvSpPr>
-          <p:cNvPr id="2" name="Title 1"/>
-          <p:cNvSpPr>
-            <a:spLocks noGrp="1"/>
-          </p:cNvSpPr>
-          <p:nvPr>
-            <p:ph type="title"/>
-          </p:nvPr>
-        </p:nvSpPr>
-        <p:spPr>
-          <a:xfrm>
-            <a:off x="533400" y="2819400"/>
-            <a:ext cx="8229600" cy="1143000"/>
-          </a:xfrm>
-        </p:spPr>
-        <p:txBody>
-          <a:bodyPr>
-            <a:noAutofit/>
-          </a:bodyPr>
-          <a:lstStyle/>
-          <a:p>
-            <a:pPr algn="l"/>
-            <a:r>
-              <a:rPr lang="en-US" sz="8000" dirty="0" smtClean="0">
-                <a:solidFill>
-                  <a:schemeClr val="bg1"/>
-                </a:solidFill>
-              </a:rPr>
-              <a:t>Normal objects. </a:t>
-            </a:r>
-            <a:br>
-              <a:rPr lang="en-US" sz="8000" dirty="0" smtClean="0">
-                <a:solidFill>
-                  <a:schemeClr val="bg1"/>
-                </a:solidFill>
-              </a:rPr>
-            </a:br>
-            <a:r>
-              <a:rPr lang="en-US" sz="8000" dirty="0" smtClean="0">
-                <a:solidFill>
-                  <a:schemeClr val="bg1"/>
-                </a:solidFill>
-              </a:rPr>
-              <a:t>Resize non-rotated object</a:t>
-            </a:r>
-            <a:br>
-              <a:rPr lang="en-US" sz="8000" dirty="0" smtClean="0">
-                <a:solidFill>
-                  <a:schemeClr val="bg1"/>
-                </a:solidFill>
-              </a:rPr>
-            </a:br>
-            <a:r>
-              <a:rPr lang="en-US" sz="5400" dirty="0" smtClean="0">
-                <a:solidFill>
-                  <a:prstClr val="white"/>
-                </a:solidFill>
-              </a:rPr>
-              <a:t>(Default AutoMotion)</a:t>
-            </a:r>
-            <a:endParaRPr lang="en-SG" sz="8000" dirty="0">
-              <a:solidFill>
-                <a:schemeClr val="bg1"/>
-              </a:solidFill>
-            </a:endParaRPr>
-          </a:p>
-        </p:txBody>
-      </p:sp>
-    </p:spTree>
-    <p:extLst>
-      <p:ext uri="{BB962C8B-B14F-4D97-AF65-F5344CB8AC3E}">
-        <p14:creationId xmlns:p14="http://schemas.microsoft.com/office/powerpoint/2010/main" val="1042219595"/>
-      </p:ext>
-    </p:extLst>
-  </p:cSld>
-  <p:clrMapOvr>
-    <a:masterClrMapping/>
-  </p:clrMapOvr>
-  <p:timing>
-    <p:tnLst>
-      <p:par>
-        <p:cTn id="1" dur="indefinite" restart="never" nodeType="tmRoot"/>
-      </p:par>
-    </p:tnLst>
-  </p:timing>
-</p:sld>
-</file>
-
-<file path=ppt/slides/slide13.xml><?xml version="1.0" encoding="utf-8"?>
-<p:sld xmlns:a="http://schemas.openxmlformats.org/drawingml/2006/main" xmlns:r="http://schemas.openxmlformats.org/officeDocument/2006/relationships" xmlns:p="http://schemas.openxmlformats.org/presentationml/2006/main">
-  <p:cSld name="PPSlideStart201401082124030779">
-    <p:spTree>
-      <p:nvGrpSpPr>
-        <p:cNvPr id="1" name=""/>
-        <p:cNvGrpSpPr/>
-        <p:nvPr/>
-      </p:nvGrpSpPr>
-      <p:grpSpPr>
-        <a:xfrm>
-          <a:off x="0" y="0"/>
-          <a:ext cx="0" cy="0"/>
-          <a:chOff x="0" y="0"/>
-          <a:chExt cx="0" cy="0"/>
-        </a:xfrm>
-      </p:grpSpPr>
-      <p:sp>
-        <p:nvSpPr>
-          <p:cNvPr id="5" name="Right Arrow 4"/>
-          <p:cNvSpPr/>
-          <p:nvPr/>
-        </p:nvSpPr>
-        <p:spPr>
-          <a:xfrm>
-            <a:off x="2836354" y="2672724"/>
-            <a:ext cx="2209800" cy="990600"/>
-          </a:xfrm>
-          <a:prstGeom prst="rightArrow">
-            <a:avLst/>
-          </a:prstGeom>
-        </p:spPr>
-        <p:style>
-          <a:lnRef idx="2">
-            <a:schemeClr val="accent1">
-              <a:shade val="50000"/>
-            </a:schemeClr>
-          </a:lnRef>
-          <a:fillRef idx="1">
-            <a:schemeClr val="accent1"/>
-          </a:fillRef>
-          <a:effectRef idx="0">
-            <a:schemeClr val="accent1"/>
-          </a:effectRef>
-          <a:fontRef idx="minor">
-            <a:schemeClr val="lt1"/>
-          </a:fontRef>
-        </p:style>
-        <p:txBody>
-          <a:bodyPr rtlCol="0" anchor="ctr"/>
-          <a:lstStyle/>
-          <a:p>
-            <a:pPr algn="ctr"/>
-            <a:endParaRPr lang="en-US">
-              <a:solidFill>
-                <a:prstClr val="white"/>
-              </a:solidFill>
-            </a:endParaRPr>
-          </a:p>
-        </p:txBody>
-      </p:sp>
-    </p:spTree>
-    <p:extLst>
-      <p:ext uri="{BB962C8B-B14F-4D97-AF65-F5344CB8AC3E}">
-        <p14:creationId xmlns:p14="http://schemas.microsoft.com/office/powerpoint/2010/main" val="2298387781"/>
-      </p:ext>
-    </p:extLst>
-  </p:cSld>
-  <p:clrMapOvr>
-    <a:masterClrMapping/>
-  </p:clrMapOvr>
-  <p:timing>
-    <p:tnLst>
-      <p:par>
-        <p:cTn id="1" dur="indefinite" restart="never" nodeType="tmRoot"/>
-      </p:par>
-    </p:tnLst>
-  </p:timing>
-</p:sld>
-</file>
-
-<file path=ppt/slides/slide14.xml><?xml version="1.0" encoding="utf-8"?>
-<p:sld xmlns:a="http://schemas.openxmlformats.org/drawingml/2006/main" xmlns:r="http://schemas.openxmlformats.org/officeDocument/2006/relationships" xmlns:p="http://schemas.openxmlformats.org/presentationml/2006/main">
-  <p:cSld name="PPSlideEnd201401082124030869">
-    <p:spTree>
-      <p:nvGrpSpPr>
-        <p:cNvPr id="1" name=""/>
-        <p:cNvGrpSpPr/>
-        <p:nvPr/>
-      </p:nvGrpSpPr>
-      <p:grpSpPr>
-        <a:xfrm>
-          <a:off x="0" y="0"/>
-          <a:ext cx="0" cy="0"/>
-          <a:chOff x="0" y="0"/>
-          <a:chExt cx="0" cy="0"/>
-        </a:xfrm>
-      </p:grpSpPr>
-      <p:sp>
-        <p:nvSpPr>
-          <p:cNvPr id="5" name="Right Arrow 4"/>
-          <p:cNvSpPr/>
-          <p:nvPr/>
-        </p:nvSpPr>
-        <p:spPr>
-          <a:xfrm>
-            <a:off x="2836354" y="2672724"/>
-            <a:ext cx="4402646" cy="990600"/>
-          </a:xfrm>
-          <a:prstGeom prst="rightArrow">
-            <a:avLst/>
-          </a:prstGeom>
-        </p:spPr>
-        <p:style>
-          <a:lnRef idx="2">
-            <a:schemeClr val="accent1">
-              <a:shade val="50000"/>
-            </a:schemeClr>
-          </a:lnRef>
-          <a:fillRef idx="1">
-            <a:schemeClr val="accent1"/>
-          </a:fillRef>
-          <a:effectRef idx="0">
-            <a:schemeClr val="accent1"/>
-          </a:effectRef>
-          <a:fontRef idx="minor">
-            <a:schemeClr val="lt1"/>
-          </a:fontRef>
-        </p:style>
-        <p:txBody>
-          <a:bodyPr rtlCol="0" anchor="ctr"/>
-          <a:lstStyle/>
-          <a:p>
-            <a:pPr algn="ctr"/>
-            <a:endParaRPr lang="en-US">
-              <a:solidFill>
-                <a:prstClr val="white"/>
-              </a:solidFill>
-            </a:endParaRPr>
-          </a:p>
-        </p:txBody>
-      </p:sp>
-    </p:spTree>
-    <p:extLst>
-      <p:ext uri="{BB962C8B-B14F-4D97-AF65-F5344CB8AC3E}">
-        <p14:creationId xmlns:p14="http://schemas.microsoft.com/office/powerpoint/2010/main" val="15130966"/>
-      </p:ext>
-    </p:extLst>
-  </p:cSld>
-  <p:clrMapOvr>
-    <a:masterClrMapping/>
-  </p:clrMapOvr>
-  <mc:AlternateContent xmlns:mc="http://schemas.openxmlformats.org/markup-compatibility/2006">
-    <mc:Choice xmlns:p14="http://schemas.microsoft.com/office/powerpoint/2010/main" Requires="p14">
-      <p:transition spd="slow" p14:dur="2000"/>
-    </mc:Choice>
-    <mc:Fallback>
-      <p:transition spd="slow"/>
-    </mc:Fallback>
-  </mc:AlternateContent>
-  <p:timing>
-    <p:tnLst>
-      <p:par>
-        <p:cTn id="1" dur="indefinite" restart="never" nodeType="tmRoot"/>
-      </p:par>
-    </p:tnLst>
-  </p:timing>
-</p:sld>
-</file>
-
-<file path=ppt/slides/slide15.xml><?xml version="1.0" encoding="utf-8"?>
-<p:sld xmlns:a="http://schemas.openxmlformats.org/drawingml/2006/main" xmlns:r="http://schemas.openxmlformats.org/officeDocument/2006/relationships" xmlns:p="http://schemas.openxmlformats.org/presentationml/2006/main">
-  <p:cSld>
-    <p:bg>
-      <p:bgPr>
-        <a:solidFill>
-          <a:schemeClr val="tx1"/>
-        </a:solidFill>
-        <a:effectLst/>
-      </p:bgPr>
-    </p:bg>
-    <p:spTree>
-      <p:nvGrpSpPr>
-        <p:cNvPr id="1" name=""/>
-        <p:cNvGrpSpPr/>
-        <p:nvPr/>
-      </p:nvGrpSpPr>
-      <p:grpSpPr>
-        <a:xfrm>
-          <a:off x="0" y="0"/>
-          <a:ext cx="0" cy="0"/>
-          <a:chOff x="0" y="0"/>
-          <a:chExt cx="0" cy="0"/>
-        </a:xfrm>
-      </p:grpSpPr>
-      <p:sp>
-        <p:nvSpPr>
-          <p:cNvPr id="2" name="Title 1"/>
-          <p:cNvSpPr>
-            <a:spLocks noGrp="1"/>
-          </p:cNvSpPr>
-          <p:nvPr>
-            <p:ph type="title"/>
-          </p:nvPr>
-        </p:nvSpPr>
-        <p:spPr>
-          <a:xfrm>
-            <a:off x="533400" y="2819400"/>
-            <a:ext cx="8229600" cy="1143000"/>
-          </a:xfrm>
-        </p:spPr>
-        <p:txBody>
-          <a:bodyPr>
-            <a:noAutofit/>
-          </a:bodyPr>
-          <a:lstStyle/>
-          <a:p>
-            <a:pPr algn="l"/>
-            <a:r>
-              <a:rPr lang="en-US" sz="8000" dirty="0" smtClean="0">
-                <a:solidFill>
-                  <a:schemeClr val="bg1"/>
-                </a:solidFill>
-              </a:rPr>
-              <a:t>Normal objects. </a:t>
-            </a:r>
-            <a:br>
-              <a:rPr lang="en-US" sz="8000" dirty="0" smtClean="0">
-                <a:solidFill>
-                  <a:schemeClr val="bg1"/>
-                </a:solidFill>
-              </a:rPr>
-            </a:br>
-            <a:r>
-              <a:rPr lang="en-US" sz="8000" dirty="0" smtClean="0">
-                <a:solidFill>
-                  <a:schemeClr val="bg1"/>
-                </a:solidFill>
-              </a:rPr>
-              <a:t>Resize rotated object</a:t>
-            </a:r>
-            <a:br>
-              <a:rPr lang="en-US" sz="8000" dirty="0" smtClean="0">
-                <a:solidFill>
-                  <a:schemeClr val="bg1"/>
-                </a:solidFill>
-              </a:rPr>
-            </a:br>
-            <a:r>
-              <a:rPr lang="en-US" sz="5400" dirty="0" smtClean="0">
-                <a:solidFill>
-                  <a:prstClr val="white"/>
-                </a:solidFill>
-              </a:rPr>
-              <a:t>(Sequence of shapes)</a:t>
-            </a:r>
-            <a:endParaRPr lang="en-SG" sz="8000" dirty="0">
-              <a:solidFill>
-                <a:schemeClr val="bg1"/>
-              </a:solidFill>
-            </a:endParaRPr>
-          </a:p>
-        </p:txBody>
-      </p:sp>
-    </p:spTree>
-    <p:extLst>
-      <p:ext uri="{BB962C8B-B14F-4D97-AF65-F5344CB8AC3E}">
-        <p14:creationId xmlns:p14="http://schemas.microsoft.com/office/powerpoint/2010/main" val="1835137444"/>
-      </p:ext>
-    </p:extLst>
-  </p:cSld>
-  <p:clrMapOvr>
-    <a:masterClrMapping/>
-  </p:clrMapOvr>
-  <p:timing>
-    <p:tnLst>
-      <p:par>
-        <p:cTn id="1" dur="indefinite" restart="never" nodeType="tmRoot"/>
-      </p:par>
-    </p:tnLst>
-  </p:timing>
-</p:sld>
-</file>
-
-<file path=ppt/slides/slide16.xml><?xml version="1.0" encoding="utf-8"?>
-<p:sld xmlns:a="http://schemas.openxmlformats.org/drawingml/2006/main" xmlns:r="http://schemas.openxmlformats.org/officeDocument/2006/relationships" xmlns:p="http://schemas.openxmlformats.org/presentationml/2006/main">
-  <p:cSld name="PPSlideStart201401082124123259">
-    <p:spTree>
-      <p:nvGrpSpPr>
-        <p:cNvPr id="1" name=""/>
-        <p:cNvGrpSpPr/>
-        <p:nvPr/>
-      </p:nvGrpSpPr>
-      <p:grpSpPr>
-        <a:xfrm>
-          <a:off x="0" y="0"/>
-          <a:ext cx="0" cy="0"/>
-          <a:chOff x="0" y="0"/>
-          <a:chExt cx="0" cy="0"/>
-        </a:xfrm>
-      </p:grpSpPr>
-      <p:sp>
-        <p:nvSpPr>
-          <p:cNvPr id="4" name="Right Arrow 3"/>
-          <p:cNvSpPr/>
-          <p:nvPr/>
-        </p:nvSpPr>
-        <p:spPr>
-          <a:xfrm rot="19313590">
-            <a:off x="2609130" y="3401361"/>
-            <a:ext cx="1981200" cy="990600"/>
-          </a:xfrm>
-          <a:prstGeom prst="rightArrow">
-            <a:avLst/>
-          </a:prstGeom>
-        </p:spPr>
-        <p:style>
-          <a:lnRef idx="2">
-            <a:schemeClr val="accent1">
-              <a:shade val="50000"/>
-            </a:schemeClr>
-          </a:lnRef>
-          <a:fillRef idx="1">
-            <a:schemeClr val="accent1"/>
-          </a:fillRef>
-          <a:effectRef idx="0">
-            <a:schemeClr val="accent1"/>
-          </a:effectRef>
-          <a:fontRef idx="minor">
-            <a:schemeClr val="lt1"/>
-          </a:fontRef>
-        </p:style>
-        <p:txBody>
-          <a:bodyPr rtlCol="0" anchor="ctr"/>
-          <a:lstStyle/>
-          <a:p>
-            <a:pPr algn="ctr"/>
-            <a:endParaRPr lang="en-US"/>
-          </a:p>
-        </p:txBody>
-      </p:sp>
-    </p:spTree>
-    <p:extLst>
-      <p:ext uri="{BB962C8B-B14F-4D97-AF65-F5344CB8AC3E}">
-        <p14:creationId xmlns:p14="http://schemas.microsoft.com/office/powerpoint/2010/main" val="1579323628"/>
-      </p:ext>
-    </p:extLst>
-  </p:cSld>
-  <p:clrMapOvr>
-    <a:masterClrMapping/>
-  </p:clrMapOvr>
-  <p:timing>
-    <p:tnLst>
-      <p:par>
-        <p:cTn id="1" dur="indefinite" restart="never" nodeType="tmRoot"/>
-      </p:par>
-    </p:tnLst>
-  </p:timing>
-</p:sld>
-</file>
-
-<file path=ppt/slides/slide17.xml><?xml version="1.0" encoding="utf-8"?>
 <p:sld xmlns:a="http://schemas.openxmlformats.org/drawingml/2006/main" xmlns:r="http://schemas.openxmlformats.org/officeDocument/2006/relationships" xmlns:p="http://schemas.openxmlformats.org/presentationml/2006/main">
   <p:cSld name="PPSlideEnd201401082124123329">
     <p:spTree>
@@ -4055,11 +3392,11 @@
   <p:clrMapOvr>
     <a:masterClrMapping/>
   </p:clrMapOvr>
-  <mc:AlternateContent xmlns:mc="http://schemas.openxmlformats.org/markup-compatibility/2006">
-    <mc:Choice xmlns:p14="http://schemas.microsoft.com/office/powerpoint/2010/main" Requires="p14">
+  <mc:AlternateContent xmlns:mc="http://schemas.openxmlformats.org/markup-compatibility/2006" xmlns:p14="http://schemas.microsoft.com/office/powerpoint/2010/main">
+    <mc:Choice Requires="p14">
       <p:transition spd="slow" p14:dur="2000"/>
     </mc:Choice>
-    <mc:Fallback>
+    <mc:Fallback xmlns="">
       <p:transition spd="slow"/>
     </mc:Fallback>
   </mc:AlternateContent>
@@ -4073,7 +3410,7 @@
 </p:sld>
 </file>
 
-<file path=ppt/slides/slide18.xml><?xml version="1.0" encoding="utf-8"?>
+<file path=ppt/slides/slide11.xml><?xml version="1.0" encoding="utf-8"?>
 <p:sld xmlns:a="http://schemas.openxmlformats.org/drawingml/2006/main" xmlns:r="http://schemas.openxmlformats.org/officeDocument/2006/relationships" xmlns:p="http://schemas.openxmlformats.org/presentationml/2006/main">
   <p:cSld>
     <p:bg>
@@ -4187,7 +3524,7 @@
 </p:sld>
 </file>
 
-<file path=ppt/slides/slide19.xml><?xml version="1.0" encoding="utf-8"?>
+<file path=ppt/slides/slide12.xml><?xml version="1.0" encoding="utf-8"?>
 <p:sld xmlns:a="http://schemas.openxmlformats.org/drawingml/2006/main" xmlns:r="http://schemas.openxmlformats.org/officeDocument/2006/relationships" xmlns:p="http://schemas.openxmlformats.org/presentationml/2006/main">
   <p:cSld name="PPSlideStart201401082124212289">
     <p:spTree>
@@ -4264,91 +3601,7 @@
 </p:sld>
 </file>
 
-<file path=ppt/slides/slide2.xml><?xml version="1.0" encoding="utf-8"?>
-<p:sld xmlns:a="http://schemas.openxmlformats.org/drawingml/2006/main" xmlns:r="http://schemas.openxmlformats.org/officeDocument/2006/relationships" xmlns:p="http://schemas.openxmlformats.org/presentationml/2006/main">
-  <p:cSld>
-    <p:bg>
-      <p:bgPr>
-        <a:solidFill>
-          <a:schemeClr val="tx1"/>
-        </a:solidFill>
-        <a:effectLst/>
-      </p:bgPr>
-    </p:bg>
-    <p:spTree>
-      <p:nvGrpSpPr>
-        <p:cNvPr id="1" name=""/>
-        <p:cNvGrpSpPr/>
-        <p:nvPr/>
-      </p:nvGrpSpPr>
-      <p:grpSpPr>
-        <a:xfrm>
-          <a:off x="0" y="0"/>
-          <a:ext cx="0" cy="0"/>
-          <a:chOff x="0" y="0"/>
-          <a:chExt cx="0" cy="0"/>
-        </a:xfrm>
-      </p:grpSpPr>
-      <p:sp>
-        <p:nvSpPr>
-          <p:cNvPr id="2" name="Title 1"/>
-          <p:cNvSpPr>
-            <a:spLocks noGrp="1"/>
-          </p:cNvSpPr>
-          <p:nvPr>
-            <p:ph type="title"/>
-          </p:nvPr>
-        </p:nvSpPr>
-        <p:spPr>
-          <a:xfrm>
-            <a:off x="533400" y="2819400"/>
-            <a:ext cx="8229600" cy="1143000"/>
-          </a:xfrm>
-        </p:spPr>
-        <p:txBody>
-          <a:bodyPr>
-            <a:noAutofit/>
-          </a:bodyPr>
-          <a:lstStyle/>
-          <a:p>
-            <a:pPr algn="l"/>
-            <a:r>
-              <a:rPr lang="en-US" sz="7200" dirty="0" smtClean="0">
-                <a:solidFill>
-                  <a:schemeClr val="bg1"/>
-                </a:solidFill>
-              </a:rPr>
-              <a:t>Custom shape.</a:t>
-            </a:r>
-            <a:endParaRPr lang="en-SG" sz="7200" dirty="0">
-              <a:solidFill>
-                <a:schemeClr val="bg1"/>
-              </a:solidFill>
-            </a:endParaRPr>
-          </a:p>
-        </p:txBody>
-      </p:sp>
-    </p:spTree>
-    <p:extLst>
-      <p:ext uri="{BB962C8B-B14F-4D97-AF65-F5344CB8AC3E}">
-        <p14:creationId xmlns:p14="http://schemas.microsoft.com/office/powerpoint/2010/main" val="1220527465"/>
-      </p:ext>
-    </p:extLst>
-  </p:cSld>
-  <p:clrMapOvr>
-    <a:masterClrMapping/>
-  </p:clrMapOvr>
-  <p:timing>
-    <p:tnLst>
-      <p:par>
-        <p:cTn id="1" dur="indefinite" restart="never" nodeType="tmRoot"/>
-      </p:par>
-    </p:tnLst>
-  </p:timing>
-</p:sld>
-</file>
-
-<file path=ppt/slides/slide20.xml><?xml version="1.0" encoding="utf-8"?>
+<file path=ppt/slides/slide13.xml><?xml version="1.0" encoding="utf-8"?>
 <p:sld xmlns:a="http://schemas.openxmlformats.org/drawingml/2006/main" xmlns:r="http://schemas.openxmlformats.org/officeDocument/2006/relationships" xmlns:p="http://schemas.openxmlformats.org/presentationml/2006/main">
   <p:cSld name="PPSlideEnd201401082124212349">
     <p:spTree>
@@ -4415,11 +3668,11 @@
   <p:clrMapOvr>
     <a:masterClrMapping/>
   </p:clrMapOvr>
-  <mc:AlternateContent xmlns:mc="http://schemas.openxmlformats.org/markup-compatibility/2006">
-    <mc:Choice xmlns:p14="http://schemas.microsoft.com/office/powerpoint/2010/main" Requires="p14">
+  <mc:AlternateContent xmlns:mc="http://schemas.openxmlformats.org/markup-compatibility/2006" xmlns:p14="http://schemas.microsoft.com/office/powerpoint/2010/main">
+    <mc:Choice Requires="p14">
       <p:transition spd="slow" p14:dur="2000"/>
     </mc:Choice>
-    <mc:Fallback>
+    <mc:Fallback xmlns="">
       <p:transition spd="slow"/>
     </mc:Fallback>
   </mc:AlternateContent>
@@ -4433,7 +3686,7 @@
 </p:sld>
 </file>
 
-<file path=ppt/slides/slide21.xml><?xml version="1.0" encoding="utf-8"?>
+<file path=ppt/slides/slide14.xml><?xml version="1.0" encoding="utf-8"?>
 <p:sld xmlns:a="http://schemas.openxmlformats.org/drawingml/2006/main" xmlns:r="http://schemas.openxmlformats.org/officeDocument/2006/relationships" xmlns:p="http://schemas.openxmlformats.org/presentationml/2006/main">
   <p:cSld>
     <p:bg>
@@ -4540,7 +3793,7 @@
 </p:sld>
 </file>
 
-<file path=ppt/slides/slide22.xml><?xml version="1.0" encoding="utf-8"?>
+<file path=ppt/slides/slide15.xml><?xml version="1.0" encoding="utf-8"?>
 <p:sld xmlns:a="http://schemas.openxmlformats.org/drawingml/2006/main" xmlns:r="http://schemas.openxmlformats.org/officeDocument/2006/relationships" xmlns:p="http://schemas.openxmlformats.org/presentationml/2006/main">
   <p:cSld name="PPSlideStart201401082124303849">
     <p:spTree>
@@ -4697,7 +3950,7 @@
 </p:sld>
 </file>
 
-<file path=ppt/slides/slide23.xml><?xml version="1.0" encoding="utf-8"?>
+<file path=ppt/slides/slide16.xml><?xml version="1.0" encoding="utf-8"?>
 <p:sld xmlns:a="http://schemas.openxmlformats.org/drawingml/2006/main" xmlns:r="http://schemas.openxmlformats.org/officeDocument/2006/relationships" xmlns:p="http://schemas.openxmlformats.org/presentationml/2006/main">
   <p:cSld name="PPSlideEnd201401082124303949">
     <p:spTree>
@@ -4844,11 +4097,11 @@
   <p:clrMapOvr>
     <a:masterClrMapping/>
   </p:clrMapOvr>
-  <mc:AlternateContent xmlns:mc="http://schemas.openxmlformats.org/markup-compatibility/2006">
-    <mc:Choice xmlns:p14="http://schemas.microsoft.com/office/powerpoint/2010/main" Requires="p14">
+  <mc:AlternateContent xmlns:mc="http://schemas.openxmlformats.org/markup-compatibility/2006" xmlns:p14="http://schemas.microsoft.com/office/powerpoint/2010/main">
+    <mc:Choice Requires="p14">
       <p:transition spd="slow" p14:dur="2000"/>
     </mc:Choice>
-    <mc:Fallback>
+    <mc:Fallback xmlns="">
       <p:transition spd="slow"/>
     </mc:Fallback>
   </mc:AlternateContent>
@@ -4862,7 +4115,7 @@
 </p:sld>
 </file>
 
-<file path=ppt/slides/slide24.xml><?xml version="1.0" encoding="utf-8"?>
+<file path=ppt/slides/slide17.xml><?xml version="1.0" encoding="utf-8"?>
 <p:sld xmlns:a="http://schemas.openxmlformats.org/drawingml/2006/main" xmlns:r="http://schemas.openxmlformats.org/officeDocument/2006/relationships" xmlns:p="http://schemas.openxmlformats.org/presentationml/2006/main">
   <p:cSld>
     <p:bg>
@@ -4976,7 +4229,7 @@
 </p:sld>
 </file>
 
-<file path=ppt/slides/slide25.xml><?xml version="1.0" encoding="utf-8"?>
+<file path=ppt/slides/slide18.xml><?xml version="1.0" encoding="utf-8"?>
 <p:sld xmlns:a="http://schemas.openxmlformats.org/drawingml/2006/main" xmlns:r="http://schemas.openxmlformats.org/officeDocument/2006/relationships" xmlns:p="http://schemas.openxmlformats.org/presentationml/2006/main">
   <p:cSld name="PPSlideStart201401082124388379">
     <p:spTree>
@@ -5175,7 +4428,7 @@
 </p:sld>
 </file>
 
-<file path=ppt/slides/slide26.xml><?xml version="1.0" encoding="utf-8"?>
+<file path=ppt/slides/slide19.xml><?xml version="1.0" encoding="utf-8"?>
 <p:sld xmlns:a="http://schemas.openxmlformats.org/drawingml/2006/main" xmlns:r="http://schemas.openxmlformats.org/officeDocument/2006/relationships" xmlns:p="http://schemas.openxmlformats.org/presentationml/2006/main">
   <p:cSld name="PPSlideEnd201401082124388479">
     <p:spTree>
@@ -5361,11 +4614,11 @@
   <p:clrMapOvr>
     <a:masterClrMapping/>
   </p:clrMapOvr>
-  <mc:AlternateContent xmlns:mc="http://schemas.openxmlformats.org/markup-compatibility/2006">
-    <mc:Choice xmlns:p14="http://schemas.microsoft.com/office/powerpoint/2010/main" Requires="p14">
+  <mc:AlternateContent xmlns:mc="http://schemas.openxmlformats.org/markup-compatibility/2006" xmlns:p14="http://schemas.microsoft.com/office/powerpoint/2010/main">
+    <mc:Choice Requires="p14">
       <p:transition spd="slow" p14:dur="2000"/>
     </mc:Choice>
-    <mc:Fallback>
+    <mc:Fallback xmlns="">
       <p:transition spd="slow"/>
     </mc:Fallback>
   </mc:AlternateContent>
@@ -5379,7 +4632,7 @@
 </p:sld>
 </file>
 
-<file path=ppt/slides/slide27.xml><?xml version="1.0" encoding="utf-8"?>
+<file path=ppt/slides/slide2.xml><?xml version="1.0" encoding="utf-8"?>
 <p:sld xmlns:a="http://schemas.openxmlformats.org/drawingml/2006/main" xmlns:r="http://schemas.openxmlformats.org/officeDocument/2006/relationships" xmlns:p="http://schemas.openxmlformats.org/presentationml/2006/main">
   <p:cSld>
     <p:bg>
@@ -5448,6 +4701,120 @@
                   <a:schemeClr val="bg1"/>
                 </a:solidFill>
               </a:rPr>
+              <a:t>Rotate only</a:t>
+            </a:r>
+            <a:br>
+              <a:rPr lang="en-US" sz="8000" dirty="0" smtClean="0">
+                <a:solidFill>
+                  <a:schemeClr val="bg1"/>
+                </a:solidFill>
+              </a:rPr>
+            </a:br>
+            <a:r>
+              <a:rPr lang="en-US" sz="5400" dirty="0" smtClean="0">
+                <a:solidFill>
+                  <a:prstClr val="white"/>
+                </a:solidFill>
+              </a:rPr>
+              <a:t>(Default AutoMotion)</a:t>
+            </a:r>
+            <a:endParaRPr lang="en-SG" sz="8000" dirty="0">
+              <a:solidFill>
+                <a:schemeClr val="bg1"/>
+              </a:solidFill>
+            </a:endParaRPr>
+          </a:p>
+        </p:txBody>
+      </p:sp>
+    </p:spTree>
+    <p:extLst>
+      <p:ext uri="{BB962C8B-B14F-4D97-AF65-F5344CB8AC3E}">
+        <p14:creationId xmlns:p14="http://schemas.microsoft.com/office/powerpoint/2010/main" val="1140781394"/>
+      </p:ext>
+    </p:extLst>
+  </p:cSld>
+  <p:clrMapOvr>
+    <a:masterClrMapping/>
+  </p:clrMapOvr>
+  <p:timing>
+    <p:tnLst>
+      <p:par>
+        <p:cTn id="1" dur="indefinite" restart="never" nodeType="tmRoot"/>
+      </p:par>
+    </p:tnLst>
+  </p:timing>
+</p:sld>
+</file>
+
+<file path=ppt/slides/slide20.xml><?xml version="1.0" encoding="utf-8"?>
+<p:sld xmlns:a="http://schemas.openxmlformats.org/drawingml/2006/main" xmlns:r="http://schemas.openxmlformats.org/officeDocument/2006/relationships" xmlns:p="http://schemas.openxmlformats.org/presentationml/2006/main">
+  <p:cSld>
+    <p:bg>
+      <p:bgPr>
+        <a:solidFill>
+          <a:schemeClr val="tx1"/>
+        </a:solidFill>
+        <a:effectLst/>
+      </p:bgPr>
+    </p:bg>
+    <p:spTree>
+      <p:nvGrpSpPr>
+        <p:cNvPr id="1" name=""/>
+        <p:cNvGrpSpPr/>
+        <p:nvPr/>
+      </p:nvGrpSpPr>
+      <p:grpSpPr>
+        <a:xfrm>
+          <a:off x="0" y="0"/>
+          <a:ext cx="0" cy="0"/>
+          <a:chOff x="0" y="0"/>
+          <a:chExt cx="0" cy="0"/>
+        </a:xfrm>
+      </p:grpSpPr>
+      <p:sp>
+        <p:nvSpPr>
+          <p:cNvPr id="2" name="Title 1"/>
+          <p:cNvSpPr>
+            <a:spLocks noGrp="1"/>
+          </p:cNvSpPr>
+          <p:nvPr>
+            <p:ph type="title"/>
+          </p:nvPr>
+        </p:nvSpPr>
+        <p:spPr>
+          <a:xfrm>
+            <a:off x="533400" y="2819400"/>
+            <a:ext cx="8229600" cy="1143000"/>
+          </a:xfrm>
+        </p:spPr>
+        <p:txBody>
+          <a:bodyPr>
+            <a:noAutofit/>
+          </a:bodyPr>
+          <a:lstStyle/>
+          <a:p>
+            <a:pPr algn="l"/>
+            <a:r>
+              <a:rPr lang="en-US" sz="8000" dirty="0" smtClean="0">
+                <a:solidFill>
+                  <a:schemeClr val="bg1"/>
+                </a:solidFill>
+              </a:rPr>
+              <a:t>Normal objects. </a:t>
+            </a:r>
+            <a:br>
+              <a:rPr lang="en-US" sz="8000" dirty="0" smtClean="0">
+                <a:solidFill>
+                  <a:schemeClr val="bg1"/>
+                </a:solidFill>
+              </a:rPr>
+            </a:br>
+            <a:r>
+              <a:rPr lang="en-US" sz="8000" dirty="0" smtClean="0">
+                <a:solidFill>
+                  <a:schemeClr val="bg1"/>
+                </a:solidFill>
+              </a:rPr>
               <a:t>Rotate + move + resize. </a:t>
             </a:r>
             <a:br>
@@ -5493,7 +4860,7 @@
 </p:sld>
 </file>
 
-<file path=ppt/slides/slide28.xml><?xml version="1.0" encoding="utf-8"?>
+<file path=ppt/slides/slide21.xml><?xml version="1.0" encoding="utf-8"?>
 <p:sld xmlns:a="http://schemas.openxmlformats.org/drawingml/2006/main" xmlns:r="http://schemas.openxmlformats.org/officeDocument/2006/relationships" xmlns:p="http://schemas.openxmlformats.org/presentationml/2006/main">
   <p:cSld name="PPSlideStart201401082124528659">
     <p:spTree>
@@ -5653,7 +5020,7 @@
 </p:sld>
 </file>
 
-<file path=ppt/slides/slide29.xml><?xml version="1.0" encoding="utf-8"?>
+<file path=ppt/slides/slide22.xml><?xml version="1.0" encoding="utf-8"?>
 <p:sld xmlns:a="http://schemas.openxmlformats.org/drawingml/2006/main" xmlns:r="http://schemas.openxmlformats.org/officeDocument/2006/relationships" xmlns:p="http://schemas.openxmlformats.org/presentationml/2006/main">
   <p:cSld name="PPSlideEnd201401082124528769">
     <p:spTree>
@@ -5811,192 +5178,7 @@
 </p:sld>
 </file>
 
-<file path=ppt/slides/slide3.xml><?xml version="1.0" encoding="utf-8"?>
-<p:sld xmlns:a="http://schemas.openxmlformats.org/drawingml/2006/main" xmlns:r="http://schemas.openxmlformats.org/officeDocument/2006/relationships" xmlns:p="http://schemas.openxmlformats.org/presentationml/2006/main">
-  <p:cSld>
-    <p:spTree>
-      <p:nvGrpSpPr>
-        <p:cNvPr id="1" name=""/>
-        <p:cNvGrpSpPr/>
-        <p:nvPr/>
-      </p:nvGrpSpPr>
-      <p:grpSpPr>
-        <a:xfrm>
-          <a:off x="0" y="0"/>
-          <a:ext cx="0" cy="0"/>
-          <a:chOff x="0" y="0"/>
-          <a:chExt cx="0" cy="0"/>
-        </a:xfrm>
-      </p:grpSpPr>
-      <p:pic>
-        <p:nvPicPr>
-          <p:cNvPr id="1026" name="architecture" descr="https://teammatesv4.appspot.com/dev/images/highlevelArchitecture.png"/>
-          <p:cNvPicPr>
-            <a:picLocks noChangeAspect="1" noChangeArrowheads="1"/>
-          </p:cNvPicPr>
-          <p:nvPr/>
-        </p:nvPicPr>
-        <p:blipFill>
-          <a:blip r:embed="rId2">
-            <a:extLst>
-              <a:ext uri="{28A0092B-C50C-407E-A947-70E740481C1C}">
-                <a14:useLocalDpi xmlns:a14="http://schemas.microsoft.com/office/drawing/2010/main" val="0"/>
-              </a:ext>
-            </a:extLst>
-          </a:blip>
-          <a:srcRect/>
-          <a:stretch>
-            <a:fillRect/>
-          </a:stretch>
-        </p:blipFill>
-        <p:spPr bwMode="auto">
-          <a:xfrm>
-            <a:off x="457200" y="990600"/>
-            <a:ext cx="8229600" cy="4838701"/>
-          </a:xfrm>
-          <a:prstGeom prst="rect">
-            <a:avLst/>
-          </a:prstGeom>
-          <a:noFill/>
-          <a:extLst>
-            <a:ext uri="{909E8E84-426E-40DD-AFC4-6F175D3DCCD1}">
-              <a14:hiddenFill xmlns:a14="http://schemas.microsoft.com/office/drawing/2010/main">
-                <a:solidFill>
-                  <a:srgbClr val="FFFFFF"/>
-                </a:solidFill>
-              </a14:hiddenFill>
-            </a:ext>
-          </a:extLst>
-        </p:spPr>
-      </p:pic>
-      <p:sp>
-        <p:nvSpPr>
-          <p:cNvPr id="2" name="Freeform 1"/>
-          <p:cNvSpPr/>
-          <p:nvPr/>
-        </p:nvSpPr>
-        <p:spPr>
-          <a:xfrm>
-            <a:off x="5428648" y="1790299"/>
-            <a:ext cx="3214838" cy="2849078"/>
-          </a:xfrm>
-          <a:custGeom>
-            <a:avLst/>
-            <a:gdLst>
-              <a:gd name="connsiteX0" fmla="*/ 86628 w 3214838"/>
-              <a:gd name="connsiteY0" fmla="*/ 9625 h 2849078"/>
-              <a:gd name="connsiteX1" fmla="*/ 3195588 w 3214838"/>
-              <a:gd name="connsiteY1" fmla="*/ 0 h 2849078"/>
-              <a:gd name="connsiteX2" fmla="*/ 3214838 w 3214838"/>
-              <a:gd name="connsiteY2" fmla="*/ 1443789 h 2849078"/>
-              <a:gd name="connsiteX3" fmla="*/ 1684421 w 3214838"/>
-              <a:gd name="connsiteY3" fmla="*/ 1491916 h 2849078"/>
-              <a:gd name="connsiteX4" fmla="*/ 1665171 w 3214838"/>
-              <a:gd name="connsiteY4" fmla="*/ 2849078 h 2849078"/>
-              <a:gd name="connsiteX5" fmla="*/ 0 w 3214838"/>
-              <a:gd name="connsiteY5" fmla="*/ 2829827 h 2849078"/>
-              <a:gd name="connsiteX6" fmla="*/ 86628 w 3214838"/>
-              <a:gd name="connsiteY6" fmla="*/ 9625 h 2849078"/>
-            </a:gdLst>
-            <a:ahLst/>
-            <a:cxnLst>
-              <a:cxn ang="0">
-                <a:pos x="connsiteX0" y="connsiteY0"/>
-              </a:cxn>
-              <a:cxn ang="0">
-                <a:pos x="connsiteX1" y="connsiteY1"/>
-              </a:cxn>
-              <a:cxn ang="0">
-                <a:pos x="connsiteX2" y="connsiteY2"/>
-              </a:cxn>
-              <a:cxn ang="0">
-                <a:pos x="connsiteX3" y="connsiteY3"/>
-              </a:cxn>
-              <a:cxn ang="0">
-                <a:pos x="connsiteX4" y="connsiteY4"/>
-              </a:cxn>
-              <a:cxn ang="0">
-                <a:pos x="connsiteX5" y="connsiteY5"/>
-              </a:cxn>
-              <a:cxn ang="0">
-                <a:pos x="connsiteX6" y="connsiteY6"/>
-              </a:cxn>
-            </a:cxnLst>
-            <a:rect l="l" t="t" r="r" b="b"/>
-            <a:pathLst>
-              <a:path w="3214838" h="2849078">
-                <a:moveTo>
-                  <a:pt x="86628" y="9625"/>
-                </a:moveTo>
-                <a:lnTo>
-                  <a:pt x="3195588" y="0"/>
-                </a:lnTo>
-                <a:lnTo>
-                  <a:pt x="3214838" y="1443789"/>
-                </a:lnTo>
-                <a:lnTo>
-                  <a:pt x="1684421" y="1491916"/>
-                </a:lnTo>
-                <a:lnTo>
-                  <a:pt x="1665171" y="2849078"/>
-                </a:lnTo>
-                <a:lnTo>
-                  <a:pt x="0" y="2829827"/>
-                </a:lnTo>
-                <a:lnTo>
-                  <a:pt x="86628" y="9625"/>
-                </a:lnTo>
-                <a:close/>
-              </a:path>
-            </a:pathLst>
-          </a:custGeom>
-        </p:spPr>
-        <p:style>
-          <a:lnRef idx="2">
-            <a:schemeClr val="accent1">
-              <a:shade val="50000"/>
-            </a:schemeClr>
-          </a:lnRef>
-          <a:fillRef idx="1">
-            <a:schemeClr val="accent1"/>
-          </a:fillRef>
-          <a:effectRef idx="0">
-            <a:schemeClr val="accent1"/>
-          </a:effectRef>
-          <a:fontRef idx="minor">
-            <a:schemeClr val="lt1"/>
-          </a:fontRef>
-        </p:style>
-        <p:txBody>
-          <a:bodyPr rtlCol="0" anchor="ctr"/>
-          <a:lstStyle/>
-          <a:p>
-            <a:pPr algn="ctr"/>
-            <a:endParaRPr lang="en-SG"/>
-          </a:p>
-        </p:txBody>
-      </p:sp>
-    </p:spTree>
-    <p:extLst>
-      <p:ext uri="{BB962C8B-B14F-4D97-AF65-F5344CB8AC3E}">
-        <p14:creationId xmlns:p14="http://schemas.microsoft.com/office/powerpoint/2010/main" val="1265805766"/>
-      </p:ext>
-    </p:extLst>
-  </p:cSld>
-  <p:clrMapOvr>
-    <a:masterClrMapping/>
-  </p:clrMapOvr>
-  <p:timing>
-    <p:tnLst>
-      <p:par>
-        <p:cTn id="1" dur="indefinite" restart="never" nodeType="tmRoot"/>
-      </p:par>
-    </p:tnLst>
-  </p:timing>
-</p:sld>
-</file>
-
-<file path=ppt/slides/slide30.xml><?xml version="1.0" encoding="utf-8"?>
+<file path=ppt/slides/slide23.xml><?xml version="1.0" encoding="utf-8"?>
 <p:sld xmlns:a="http://schemas.openxmlformats.org/drawingml/2006/main" xmlns:r="http://schemas.openxmlformats.org/officeDocument/2006/relationships" xmlns:p="http://schemas.openxmlformats.org/presentationml/2006/main">
   <p:cSld>
     <p:bg>
@@ -6111,7 +5293,7 @@
 </p:sld>
 </file>
 
-<file path=ppt/slides/slide31.xml><?xml version="1.0" encoding="utf-8"?>
+<file path=ppt/slides/slide24.xml><?xml version="1.0" encoding="utf-8"?>
 <p:sld xmlns:a="http://schemas.openxmlformats.org/drawingml/2006/main" xmlns:r="http://schemas.openxmlformats.org/officeDocument/2006/relationships" xmlns:p="http://schemas.openxmlformats.org/presentationml/2006/main">
   <p:cSld name="PPSlideStart201401081155398640">
     <p:spTree>
@@ -6578,7 +5760,7 @@
 </p:sld>
 </file>
 
-<file path=ppt/slides/slide32.xml><?xml version="1.0" encoding="utf-8"?>
+<file path=ppt/slides/slide25.xml><?xml version="1.0" encoding="utf-8"?>
 <p:sld xmlns:a="http://schemas.openxmlformats.org/drawingml/2006/main" xmlns:r="http://schemas.openxmlformats.org/officeDocument/2006/relationships" xmlns:p="http://schemas.openxmlformats.org/presentationml/2006/main">
   <p:cSld name="PPSlideEnd201401081155398840">
     <p:spTree>
@@ -7053,7 +6235,7 @@
 </p:sld>
 </file>
 
-<file path=ppt/slides/slide33.xml><?xml version="1.0" encoding="utf-8"?>
+<file path=ppt/slides/slide26.xml><?xml version="1.0" encoding="utf-8"?>
 <p:sld xmlns:a="http://schemas.openxmlformats.org/drawingml/2006/main" xmlns:r="http://schemas.openxmlformats.org/officeDocument/2006/relationships" xmlns:p="http://schemas.openxmlformats.org/presentationml/2006/main">
   <p:cSld>
     <p:bg>
@@ -7152,7 +6334,7 @@
 </p:sld>
 </file>
 
-<file path=ppt/slides/slide34.xml><?xml version="1.0" encoding="utf-8"?>
+<file path=ppt/slides/slide27.xml><?xml version="1.0" encoding="utf-8"?>
 <p:sld xmlns:a="http://schemas.openxmlformats.org/drawingml/2006/main" xmlns:r="http://schemas.openxmlformats.org/officeDocument/2006/relationships" xmlns:p="http://schemas.openxmlformats.org/presentationml/2006/main">
   <p:cSld name="PPSlideStart201401081155485907">
     <p:spTree>
@@ -7601,7 +6783,7 @@
 </p:sld>
 </file>
 
-<file path=ppt/slides/slide35.xml><?xml version="1.0" encoding="utf-8"?>
+<file path=ppt/slides/slide28.xml><?xml version="1.0" encoding="utf-8"?>
 <p:sld xmlns:a="http://schemas.openxmlformats.org/drawingml/2006/main" xmlns:r="http://schemas.openxmlformats.org/officeDocument/2006/relationships" xmlns:p="http://schemas.openxmlformats.org/presentationml/2006/main">
   <p:cSld name="PPSlideEnd201401081155486057">
     <p:spTree>
@@ -8058,7 +7240,7 @@
 </p:sld>
 </file>
 
-<file path=ppt/slides/slide36.xml><?xml version="1.0" encoding="utf-8"?>
+<file path=ppt/slides/slide29.xml><?xml version="1.0" encoding="utf-8"?>
 <p:sld xmlns:a="http://schemas.openxmlformats.org/drawingml/2006/main" xmlns:r="http://schemas.openxmlformats.org/officeDocument/2006/relationships" xmlns:p="http://schemas.openxmlformats.org/presentationml/2006/main">
   <p:cSld>
     <p:bg>
@@ -8157,7 +7339,88 @@
 </p:sld>
 </file>
 
-<file path=ppt/slides/slide37.xml><?xml version="1.0" encoding="utf-8"?>
+<file path=ppt/slides/slide3.xml><?xml version="1.0" encoding="utf-8"?>
+<p:sld xmlns:a="http://schemas.openxmlformats.org/drawingml/2006/main" xmlns:r="http://schemas.openxmlformats.org/officeDocument/2006/relationships" xmlns:p="http://schemas.openxmlformats.org/presentationml/2006/main">
+  <p:cSld name="PPSlideStart201401081207220024">
+    <p:spTree>
+      <p:nvGrpSpPr>
+        <p:cNvPr id="1" name=""/>
+        <p:cNvGrpSpPr/>
+        <p:nvPr/>
+      </p:nvGrpSpPr>
+      <p:grpSpPr>
+        <a:xfrm>
+          <a:off x="0" y="0"/>
+          <a:ext cx="0" cy="0"/>
+          <a:chOff x="0" y="0"/>
+          <a:chExt cx="0" cy="0"/>
+        </a:xfrm>
+      </p:grpSpPr>
+      <p:sp>
+        <p:nvSpPr>
+          <p:cNvPr id="5" name="Right Arrow 4"/>
+          <p:cNvSpPr/>
+          <p:nvPr/>
+        </p:nvSpPr>
+        <p:spPr>
+          <a:xfrm rot="18334521">
+            <a:off x="2836354" y="2672724"/>
+            <a:ext cx="2209800" cy="990600"/>
+          </a:xfrm>
+          <a:prstGeom prst="rightArrow">
+            <a:avLst/>
+          </a:prstGeom>
+        </p:spPr>
+        <p:style>
+          <a:lnRef idx="2">
+            <a:schemeClr val="accent1">
+              <a:shade val="50000"/>
+            </a:schemeClr>
+          </a:lnRef>
+          <a:fillRef idx="1">
+            <a:schemeClr val="accent1"/>
+          </a:fillRef>
+          <a:effectRef idx="0">
+            <a:schemeClr val="accent1"/>
+          </a:effectRef>
+          <a:fontRef idx="minor">
+            <a:schemeClr val="lt1"/>
+          </a:fontRef>
+        </p:style>
+        <p:txBody>
+          <a:bodyPr rtlCol="0" anchor="ctr"/>
+          <a:lstStyle/>
+          <a:p>
+            <a:pPr algn="ctr"/>
+            <a:endParaRPr lang="en-US">
+              <a:solidFill>
+                <a:prstClr val="white"/>
+              </a:solidFill>
+            </a:endParaRPr>
+          </a:p>
+        </p:txBody>
+      </p:sp>
+    </p:spTree>
+    <p:extLst>
+      <p:ext uri="{BB962C8B-B14F-4D97-AF65-F5344CB8AC3E}">
+        <p14:creationId xmlns:p14="http://schemas.microsoft.com/office/powerpoint/2010/main" val="1423342019"/>
+      </p:ext>
+    </p:extLst>
+  </p:cSld>
+  <p:clrMapOvr>
+    <a:masterClrMapping/>
+  </p:clrMapOvr>
+  <p:timing>
+    <p:tnLst>
+      <p:par>
+        <p:cTn id="1" dur="indefinite" restart="never" nodeType="tmRoot"/>
+      </p:par>
+    </p:tnLst>
+  </p:timing>
+</p:sld>
+</file>
+
+<file path=ppt/slides/slide30.xml><?xml version="1.0" encoding="utf-8"?>
 <p:sld xmlns:a="http://schemas.openxmlformats.org/drawingml/2006/main" xmlns:r="http://schemas.openxmlformats.org/officeDocument/2006/relationships" xmlns:p="http://schemas.openxmlformats.org/presentationml/2006/main">
   <p:cSld name="PPSlideStart201401081156088831">
     <p:spTree>
@@ -9787,7 +9050,7 @@
 </p:sld>
 </file>
 
-<file path=ppt/slides/slide38.xml><?xml version="1.0" encoding="utf-8"?>
+<file path=ppt/slides/slide31.xml><?xml version="1.0" encoding="utf-8"?>
 <p:sld xmlns:a="http://schemas.openxmlformats.org/drawingml/2006/main" xmlns:r="http://schemas.openxmlformats.org/officeDocument/2006/relationships" xmlns:p="http://schemas.openxmlformats.org/presentationml/2006/main">
   <p:cSld name="PPSlideEnd201401081156089131">
     <p:spTree>
@@ -11258,7 +10521,7 @@
 </p:sld>
 </file>
 
-<file path=ppt/slides/slide39.xml><?xml version="1.0" encoding="utf-8"?>
+<file path=ppt/slides/slide32.xml><?xml version="1.0" encoding="utf-8"?>
 <p:sld xmlns:a="http://schemas.openxmlformats.org/drawingml/2006/main" xmlns:r="http://schemas.openxmlformats.org/officeDocument/2006/relationships" xmlns:p="http://schemas.openxmlformats.org/presentationml/2006/main">
   <p:cSld>
     <p:bg>
@@ -11356,7 +10619,7 @@
 </p:sld>
 </file>
 
-<file path=ppt/slides/slide4.xml><?xml version="1.0" encoding="utf-8"?>
+<file path=ppt/slides/slide33.xml><?xml version="1.0" encoding="utf-8"?>
 <p:sld xmlns:a="http://schemas.openxmlformats.org/drawingml/2006/main" xmlns:r="http://schemas.openxmlformats.org/officeDocument/2006/relationships" xmlns:p="http://schemas.openxmlformats.org/presentationml/2006/main">
   <p:cSld>
     <p:bg>
@@ -11410,90 +10673,6 @@
                   <a:schemeClr val="bg1"/>
                 </a:solidFill>
               </a:rPr>
-              <a:t>Shape bigger than slide.</a:t>
-            </a:r>
-            <a:endParaRPr lang="en-SG" sz="7200" dirty="0">
-              <a:solidFill>
-                <a:schemeClr val="bg1"/>
-              </a:solidFill>
-            </a:endParaRPr>
-          </a:p>
-        </p:txBody>
-      </p:sp>
-    </p:spTree>
-    <p:extLst>
-      <p:ext uri="{BB962C8B-B14F-4D97-AF65-F5344CB8AC3E}">
-        <p14:creationId xmlns:p14="http://schemas.microsoft.com/office/powerpoint/2010/main" val="4031528783"/>
-      </p:ext>
-    </p:extLst>
-  </p:cSld>
-  <p:clrMapOvr>
-    <a:masterClrMapping/>
-  </p:clrMapOvr>
-  <p:timing>
-    <p:tnLst>
-      <p:par>
-        <p:cTn id="1" dur="indefinite" restart="never" nodeType="tmRoot"/>
-      </p:par>
-    </p:tnLst>
-  </p:timing>
-</p:sld>
-</file>
-
-<file path=ppt/slides/slide40.xml><?xml version="1.0" encoding="utf-8"?>
-<p:sld xmlns:a="http://schemas.openxmlformats.org/drawingml/2006/main" xmlns:r="http://schemas.openxmlformats.org/officeDocument/2006/relationships" xmlns:p="http://schemas.openxmlformats.org/presentationml/2006/main">
-  <p:cSld>
-    <p:bg>
-      <p:bgPr>
-        <a:solidFill>
-          <a:schemeClr val="tx1"/>
-        </a:solidFill>
-        <a:effectLst/>
-      </p:bgPr>
-    </p:bg>
-    <p:spTree>
-      <p:nvGrpSpPr>
-        <p:cNvPr id="1" name=""/>
-        <p:cNvGrpSpPr/>
-        <p:nvPr/>
-      </p:nvGrpSpPr>
-      <p:grpSpPr>
-        <a:xfrm>
-          <a:off x="0" y="0"/>
-          <a:ext cx="0" cy="0"/>
-          <a:chOff x="0" y="0"/>
-          <a:chExt cx="0" cy="0"/>
-        </a:xfrm>
-      </p:grpSpPr>
-      <p:sp>
-        <p:nvSpPr>
-          <p:cNvPr id="2" name="Title 1"/>
-          <p:cNvSpPr>
-            <a:spLocks noGrp="1"/>
-          </p:cNvSpPr>
-          <p:nvPr>
-            <p:ph type="title"/>
-          </p:nvPr>
-        </p:nvSpPr>
-        <p:spPr>
-          <a:xfrm>
-            <a:off x="533400" y="2819400"/>
-            <a:ext cx="8229600" cy="1143000"/>
-          </a:xfrm>
-        </p:spPr>
-        <p:txBody>
-          <a:bodyPr>
-            <a:noAutofit/>
-          </a:bodyPr>
-          <a:lstStyle/>
-          <a:p>
-            <a:pPr algn="l"/>
-            <a:r>
-              <a:rPr lang="en-US" sz="7200" dirty="0" smtClean="0">
-                <a:solidFill>
-                  <a:schemeClr val="bg1"/>
-                </a:solidFill>
-              </a:rPr>
               <a:t>For picture.</a:t>
             </a:r>
             <a:br>
@@ -11539,7 +10718,7 @@
 </p:sld>
 </file>
 
-<file path=ppt/slides/slide41.xml><?xml version="1.0" encoding="utf-8"?>
+<file path=ppt/slides/slide34.xml><?xml version="1.0" encoding="utf-8"?>
 <p:sld xmlns:a="http://schemas.openxmlformats.org/drawingml/2006/main" xmlns:r="http://schemas.openxmlformats.org/officeDocument/2006/relationships" xmlns:p="http://schemas.openxmlformats.org/presentationml/2006/main">
   <p:cSld>
     <p:spTree>
@@ -11657,7 +10836,7 @@
 </p:sld>
 </file>
 
-<file path=ppt/slides/slide42.xml><?xml version="1.0" encoding="utf-8"?>
+<file path=ppt/slides/slide35.xml><?xml version="1.0" encoding="utf-8"?>
 <p:sld xmlns:a="http://schemas.openxmlformats.org/drawingml/2006/main" xmlns:r="http://schemas.openxmlformats.org/officeDocument/2006/relationships" xmlns:p="http://schemas.openxmlformats.org/presentationml/2006/main">
   <p:cSld>
     <p:bg>
@@ -11756,7 +10935,7 @@
 </p:sld>
 </file>
 
-<file path=ppt/slides/slide43.xml><?xml version="1.0" encoding="utf-8"?>
+<file path=ppt/slides/slide36.xml><?xml version="1.0" encoding="utf-8"?>
 <p:sld xmlns:a="http://schemas.openxmlformats.org/drawingml/2006/main" xmlns:r="http://schemas.openxmlformats.org/officeDocument/2006/relationships" xmlns:p="http://schemas.openxmlformats.org/presentationml/2006/main">
   <p:cSld>
     <p:spTree>
@@ -14057,7 +13236,7 @@
 </p:sld>
 </file>
 
-<file path=ppt/slides/slide44.xml><?xml version="1.0" encoding="utf-8"?>
+<file path=ppt/slides/slide37.xml><?xml version="1.0" encoding="utf-8"?>
 <p:sld xmlns:a="http://schemas.openxmlformats.org/drawingml/2006/main" xmlns:r="http://schemas.openxmlformats.org/officeDocument/2006/relationships" xmlns:p="http://schemas.openxmlformats.org/presentationml/2006/main" show="0">
   <p:cSld name="PPAck201401040911257868">
     <p:spTree>
@@ -14150,9 +13329,9 @@
 </p:sld>
 </file>
 
-<file path=ppt/slides/slide5.xml><?xml version="1.0" encoding="utf-8"?>
+<file path=ppt/slides/slide4.xml><?xml version="1.0" encoding="utf-8"?>
 <p:sld xmlns:a="http://schemas.openxmlformats.org/drawingml/2006/main" xmlns:r="http://schemas.openxmlformats.org/officeDocument/2006/relationships" xmlns:p="http://schemas.openxmlformats.org/presentationml/2006/main">
-  <p:cSld>
+  <p:cSld name="PPSlideEnd201401081207220074">
     <p:spTree>
       <p:nvGrpSpPr>
         <p:cNvPr id="1" name=""/>
@@ -14167,59 +13346,18 @@
           <a:chExt cx="0" cy="0"/>
         </a:xfrm>
       </p:grpSpPr>
-      <p:pic>
-        <p:nvPicPr>
-          <p:cNvPr id="1026" name="architecture" descr="https://teammatesv4.appspot.com/dev/images/highlevelArchitecture.png"/>
-          <p:cNvPicPr>
-            <a:picLocks noChangeAspect="1" noChangeArrowheads="1"/>
-          </p:cNvPicPr>
-          <p:nvPr/>
-        </p:nvPicPr>
-        <p:blipFill>
-          <a:blip r:embed="rId2">
-            <a:extLst>
-              <a:ext uri="{28A0092B-C50C-407E-A947-70E740481C1C}">
-                <a14:useLocalDpi xmlns:a14="http://schemas.microsoft.com/office/drawing/2010/main" val="0"/>
-              </a:ext>
-            </a:extLst>
-          </a:blip>
-          <a:srcRect/>
-          <a:stretch>
-            <a:fillRect/>
-          </a:stretch>
-        </p:blipFill>
-        <p:spPr bwMode="auto">
-          <a:xfrm>
-            <a:off x="457200" y="990600"/>
-            <a:ext cx="8229600" cy="4838701"/>
-          </a:xfrm>
-          <a:prstGeom prst="rect">
-            <a:avLst/>
-          </a:prstGeom>
-          <a:noFill/>
-          <a:extLst>
-            <a:ext uri="{909E8E84-426E-40DD-AFC4-6F175D3DCCD1}">
-              <a14:hiddenFill xmlns:a14="http://schemas.microsoft.com/office/drawing/2010/main">
-                <a:solidFill>
-                  <a:srgbClr val="FFFFFF"/>
-                </a:solidFill>
-              </a14:hiddenFill>
-            </a:ext>
-          </a:extLst>
-        </p:spPr>
-      </p:pic>
       <p:sp>
         <p:nvSpPr>
-          <p:cNvPr id="2" name="Rectangle 1"/>
+          <p:cNvPr id="5" name="Right Arrow 4"/>
           <p:cNvSpPr/>
           <p:nvPr/>
         </p:nvSpPr>
         <p:spPr>
           <a:xfrm>
-            <a:off x="-762000" y="2514600"/>
-            <a:ext cx="11049000" cy="1600200"/>
+            <a:off x="2836354" y="2672724"/>
+            <a:ext cx="2209800" cy="990600"/>
           </a:xfrm>
-          <a:prstGeom prst="rect">
+          <a:prstGeom prst="rightArrow">
             <a:avLst/>
           </a:prstGeom>
         </p:spPr>
@@ -14244,20 +13382,32 @@
           <a:lstStyle/>
           <a:p>
             <a:pPr algn="ctr"/>
-            <a:endParaRPr lang="en-SG"/>
+            <a:endParaRPr lang="en-US">
+              <a:solidFill>
+                <a:prstClr val="white"/>
+              </a:solidFill>
+            </a:endParaRPr>
           </a:p>
         </p:txBody>
       </p:sp>
     </p:spTree>
     <p:extLst>
       <p:ext uri="{BB962C8B-B14F-4D97-AF65-F5344CB8AC3E}">
-        <p14:creationId xmlns:p14="http://schemas.microsoft.com/office/powerpoint/2010/main" val="12995689"/>
+        <p14:creationId xmlns:p14="http://schemas.microsoft.com/office/powerpoint/2010/main" val="2685534052"/>
       </p:ext>
     </p:extLst>
   </p:cSld>
   <p:clrMapOvr>
     <a:masterClrMapping/>
   </p:clrMapOvr>
+  <mc:AlternateContent xmlns:mc="http://schemas.openxmlformats.org/markup-compatibility/2006" xmlns:p14="http://schemas.microsoft.com/office/powerpoint/2010/main">
+    <mc:Choice Requires="p14">
+      <p:transition spd="slow" p14:dur="2000"/>
+    </mc:Choice>
+    <mc:Fallback xmlns="">
+      <p:transition spd="slow"/>
+    </mc:Fallback>
+  </mc:AlternateContent>
   <p:timing>
     <p:tnLst>
       <p:par>
@@ -14268,7 +13418,7 @@
 </p:sld>
 </file>
 
-<file path=ppt/slides/slide6.xml><?xml version="1.0" encoding="utf-8"?>
+<file path=ppt/slides/slide5.xml><?xml version="1.0" encoding="utf-8"?>
 <p:sld xmlns:a="http://schemas.openxmlformats.org/drawingml/2006/main" xmlns:r="http://schemas.openxmlformats.org/officeDocument/2006/relationships" xmlns:p="http://schemas.openxmlformats.org/presentationml/2006/main">
   <p:cSld>
     <p:bg>
@@ -14317,14 +13467,44 @@
           <a:p>
             <a:pPr algn="l"/>
             <a:r>
-              <a:rPr lang="en-US" sz="7200" dirty="0" smtClean="0">
-                <a:solidFill>
-                  <a:schemeClr val="bg1"/>
-                </a:solidFill>
-              </a:rPr>
-              <a:t>Multiple Spotlight shapes.</a:t>
-            </a:r>
-            <a:endParaRPr lang="en-SG" sz="7200" dirty="0">
+              <a:rPr lang="en-US" sz="8000" dirty="0" smtClean="0">
+                <a:solidFill>
+                  <a:schemeClr val="bg1"/>
+                </a:solidFill>
+              </a:rPr>
+              <a:t>Normal objects. </a:t>
+            </a:r>
+            <a:br>
+              <a:rPr lang="en-US" sz="8000" dirty="0" smtClean="0">
+                <a:solidFill>
+                  <a:schemeClr val="bg1"/>
+                </a:solidFill>
+              </a:rPr>
+            </a:br>
+            <a:r>
+              <a:rPr lang="en-US" sz="8000" dirty="0" smtClean="0">
+                <a:solidFill>
+                  <a:schemeClr val="bg1"/>
+                </a:solidFill>
+              </a:rPr>
+              <a:t>Resize non-rotated object</a:t>
+            </a:r>
+            <a:br>
+              <a:rPr lang="en-US" sz="8000" dirty="0" smtClean="0">
+                <a:solidFill>
+                  <a:schemeClr val="bg1"/>
+                </a:solidFill>
+              </a:rPr>
+            </a:br>
+            <a:r>
+              <a:rPr lang="en-US" sz="5400" dirty="0" smtClean="0">
+                <a:solidFill>
+                  <a:prstClr val="white"/>
+                </a:solidFill>
+              </a:rPr>
+              <a:t>(Default AutoMotion)</a:t>
+            </a:r>
+            <a:endParaRPr lang="en-SG" sz="8000" dirty="0">
               <a:solidFill>
                 <a:schemeClr val="bg1"/>
               </a:solidFill>
@@ -14335,7 +13515,7 @@
     </p:spTree>
     <p:extLst>
       <p:ext uri="{BB962C8B-B14F-4D97-AF65-F5344CB8AC3E}">
-        <p14:creationId xmlns:p14="http://schemas.microsoft.com/office/powerpoint/2010/main" val="4078236770"/>
+        <p14:creationId xmlns:p14="http://schemas.microsoft.com/office/powerpoint/2010/main" val="1042219595"/>
       </p:ext>
     </p:extLst>
   </p:cSld>
@@ -14352,9 +13532,9 @@
 </p:sld>
 </file>
 
-<file path=ppt/slides/slide7.xml><?xml version="1.0" encoding="utf-8"?>
+<file path=ppt/slides/slide6.xml><?xml version="1.0" encoding="utf-8"?>
 <p:sld xmlns:a="http://schemas.openxmlformats.org/drawingml/2006/main" xmlns:r="http://schemas.openxmlformats.org/officeDocument/2006/relationships" xmlns:p="http://schemas.openxmlformats.org/presentationml/2006/main">
-  <p:cSld>
+  <p:cSld name="PPSlideStart201401082124030779">
     <p:spTree>
       <p:nvGrpSpPr>
         <p:cNvPr id="1" name=""/>
@@ -14369,59 +13549,18 @@
           <a:chExt cx="0" cy="0"/>
         </a:xfrm>
       </p:grpSpPr>
-      <p:pic>
-        <p:nvPicPr>
-          <p:cNvPr id="1026" name="architecture" descr="https://teammatesv4.appspot.com/dev/images/highlevelArchitecture.png"/>
-          <p:cNvPicPr>
-            <a:picLocks noChangeAspect="1" noChangeArrowheads="1"/>
-          </p:cNvPicPr>
-          <p:nvPr/>
-        </p:nvPicPr>
-        <p:blipFill>
-          <a:blip r:embed="rId2">
-            <a:extLst>
-              <a:ext uri="{28A0092B-C50C-407E-A947-70E740481C1C}">
-                <a14:useLocalDpi xmlns:a14="http://schemas.microsoft.com/office/drawing/2010/main" val="0"/>
-              </a:ext>
-            </a:extLst>
-          </a:blip>
-          <a:srcRect/>
-          <a:stretch>
-            <a:fillRect/>
-          </a:stretch>
-        </p:blipFill>
-        <p:spPr bwMode="auto">
-          <a:xfrm>
-            <a:off x="457200" y="990600"/>
-            <a:ext cx="8229600" cy="4838701"/>
-          </a:xfrm>
-          <a:prstGeom prst="rect">
-            <a:avLst/>
-          </a:prstGeom>
-          <a:noFill/>
-          <a:extLst>
-            <a:ext uri="{909E8E84-426E-40DD-AFC4-6F175D3DCCD1}">
-              <a14:hiddenFill xmlns:a14="http://schemas.microsoft.com/office/drawing/2010/main">
-                <a:solidFill>
-                  <a:srgbClr val="FFFFFF"/>
-                </a:solidFill>
-              </a14:hiddenFill>
-            </a:ext>
-          </a:extLst>
-        </p:spPr>
-      </p:pic>
       <p:sp>
         <p:nvSpPr>
-          <p:cNvPr id="3" name="Rectangle 2"/>
+          <p:cNvPr id="5" name="Right Arrow 4"/>
           <p:cNvSpPr/>
           <p:nvPr/>
         </p:nvSpPr>
         <p:spPr>
           <a:xfrm>
-            <a:off x="457200" y="990600"/>
-            <a:ext cx="2590800" cy="2057400"/>
+            <a:off x="2836354" y="2672724"/>
+            <a:ext cx="2209800" cy="990600"/>
           </a:xfrm>
-          <a:prstGeom prst="rect">
+          <a:prstGeom prst="rightArrow">
             <a:avLst/>
           </a:prstGeom>
         </p:spPr>
@@ -14446,22 +13585,63 @@
           <a:lstStyle/>
           <a:p>
             <a:pPr algn="ctr"/>
-            <a:endParaRPr lang="en-US"/>
+            <a:endParaRPr lang="en-US">
+              <a:solidFill>
+                <a:prstClr val="white"/>
+              </a:solidFill>
+            </a:endParaRPr>
           </a:p>
         </p:txBody>
       </p:sp>
+    </p:spTree>
+    <p:extLst>
+      <p:ext uri="{BB962C8B-B14F-4D97-AF65-F5344CB8AC3E}">
+        <p14:creationId xmlns:p14="http://schemas.microsoft.com/office/powerpoint/2010/main" val="2298387781"/>
+      </p:ext>
+    </p:extLst>
+  </p:cSld>
+  <p:clrMapOvr>
+    <a:masterClrMapping/>
+  </p:clrMapOvr>
+  <p:timing>
+    <p:tnLst>
+      <p:par>
+        <p:cTn id="1" dur="indefinite" restart="never" nodeType="tmRoot"/>
+      </p:par>
+    </p:tnLst>
+  </p:timing>
+</p:sld>
+</file>
+
+<file path=ppt/slides/slide7.xml><?xml version="1.0" encoding="utf-8"?>
+<p:sld xmlns:a="http://schemas.openxmlformats.org/drawingml/2006/main" xmlns:r="http://schemas.openxmlformats.org/officeDocument/2006/relationships" xmlns:p="http://schemas.openxmlformats.org/presentationml/2006/main">
+  <p:cSld name="PPSlideEnd201401082124030869">
+    <p:spTree>
+      <p:nvGrpSpPr>
+        <p:cNvPr id="1" name=""/>
+        <p:cNvGrpSpPr/>
+        <p:nvPr/>
+      </p:nvGrpSpPr>
+      <p:grpSpPr>
+        <a:xfrm>
+          <a:off x="0" y="0"/>
+          <a:ext cx="0" cy="0"/>
+          <a:chOff x="0" y="0"/>
+          <a:chExt cx="0" cy="0"/>
+        </a:xfrm>
+      </p:grpSpPr>
       <p:sp>
         <p:nvSpPr>
-          <p:cNvPr id="4" name="Oval 3"/>
+          <p:cNvPr id="5" name="Right Arrow 4"/>
           <p:cNvSpPr/>
           <p:nvPr/>
         </p:nvSpPr>
         <p:spPr>
           <a:xfrm>
-            <a:off x="3962400" y="1752600"/>
-            <a:ext cx="1295400" cy="1581150"/>
+            <a:off x="2836354" y="2672724"/>
+            <a:ext cx="4402646" cy="990600"/>
           </a:xfrm>
-          <a:prstGeom prst="ellipse">
+          <a:prstGeom prst="rightArrow">
             <a:avLst/>
           </a:prstGeom>
         </p:spPr>
@@ -14486,20 +13666,32 @@
           <a:lstStyle/>
           <a:p>
             <a:pPr algn="ctr"/>
-            <a:endParaRPr lang="en-US"/>
+            <a:endParaRPr lang="en-US">
+              <a:solidFill>
+                <a:prstClr val="white"/>
+              </a:solidFill>
+            </a:endParaRPr>
           </a:p>
         </p:txBody>
       </p:sp>
     </p:spTree>
     <p:extLst>
       <p:ext uri="{BB962C8B-B14F-4D97-AF65-F5344CB8AC3E}">
-        <p14:creationId xmlns:p14="http://schemas.microsoft.com/office/powerpoint/2010/main" val="3679838460"/>
+        <p14:creationId xmlns:p14="http://schemas.microsoft.com/office/powerpoint/2010/main" val="15130966"/>
       </p:ext>
     </p:extLst>
   </p:cSld>
   <p:clrMapOvr>
     <a:masterClrMapping/>
   </p:clrMapOvr>
+  <mc:AlternateContent xmlns:mc="http://schemas.openxmlformats.org/markup-compatibility/2006" xmlns:p14="http://schemas.microsoft.com/office/powerpoint/2010/main">
+    <mc:Choice Requires="p14">
+      <p:transition spd="slow" p14:dur="2000"/>
+    </mc:Choice>
+    <mc:Fallback xmlns="">
+      <p:transition spd="slow"/>
+    </mc:Fallback>
+  </mc:AlternateContent>
   <p:timing>
     <p:tnLst>
       <p:par>
@@ -14511,89 +13703,6 @@
 </file>
 
 <file path=ppt/slides/slide8.xml><?xml version="1.0" encoding="utf-8"?>
-<p:sld xmlns:a="http://schemas.openxmlformats.org/drawingml/2006/main" xmlns:r="http://schemas.openxmlformats.org/officeDocument/2006/relationships" xmlns:p="http://schemas.openxmlformats.org/presentationml/2006/main">
-  <p:cSld>
-    <p:bg>
-      <p:bgPr>
-        <a:solidFill>
-          <a:srgbClr val="C00000"/>
-        </a:solidFill>
-        <a:effectLst/>
-      </p:bgPr>
-    </p:bg>
-    <p:spTree>
-      <p:nvGrpSpPr>
-        <p:cNvPr id="1" name=""/>
-        <p:cNvGrpSpPr/>
-        <p:nvPr/>
-      </p:nvGrpSpPr>
-      <p:grpSpPr>
-        <a:xfrm>
-          <a:off x="0" y="0"/>
-          <a:ext cx="0" cy="0"/>
-          <a:chOff x="0" y="0"/>
-          <a:chExt cx="0" cy="0"/>
-        </a:xfrm>
-      </p:grpSpPr>
-      <p:sp>
-        <p:nvSpPr>
-          <p:cNvPr id="2" name="Title 1"/>
-          <p:cNvSpPr>
-            <a:spLocks noGrp="1"/>
-          </p:cNvSpPr>
-          <p:nvPr>
-            <p:ph type="ctrTitle"/>
-          </p:nvPr>
-        </p:nvSpPr>
-        <p:spPr>
-          <a:xfrm>
-            <a:off x="685800" y="2895600"/>
-            <a:ext cx="7772400" cy="1470025"/>
-          </a:xfrm>
-        </p:spPr>
-        <p:txBody>
-          <a:bodyPr>
-            <a:noAutofit/>
-          </a:bodyPr>
-          <a:lstStyle/>
-          <a:p>
-            <a:r>
-              <a:rPr lang="en-US" sz="11500" dirty="0" smtClean="0">
-                <a:solidFill>
-                  <a:srgbClr val="FFFF00"/>
-                </a:solidFill>
-              </a:rPr>
-              <a:t>Auto-animate</a:t>
-            </a:r>
-            <a:endParaRPr lang="en-SG" sz="11500" dirty="0">
-              <a:solidFill>
-                <a:srgbClr val="FFFF00"/>
-              </a:solidFill>
-            </a:endParaRPr>
-          </a:p>
-        </p:txBody>
-      </p:sp>
-    </p:spTree>
-    <p:extLst>
-      <p:ext uri="{BB962C8B-B14F-4D97-AF65-F5344CB8AC3E}">
-        <p14:creationId xmlns:p14="http://schemas.microsoft.com/office/powerpoint/2010/main" val="1268718629"/>
-      </p:ext>
-    </p:extLst>
-  </p:cSld>
-  <p:clrMapOvr>
-    <a:masterClrMapping/>
-  </p:clrMapOvr>
-  <p:timing>
-    <p:tnLst>
-      <p:par>
-        <p:cTn id="1" dur="indefinite" restart="never" nodeType="tmRoot"/>
-      </p:par>
-    </p:tnLst>
-  </p:timing>
-</p:sld>
-</file>
-
-<file path=ppt/slides/slide9.xml><?xml version="1.0" encoding="utf-8"?>
 <p:sld xmlns:a="http://schemas.openxmlformats.org/drawingml/2006/main" xmlns:r="http://schemas.openxmlformats.org/officeDocument/2006/relationships" xmlns:p="http://schemas.openxmlformats.org/presentationml/2006/main">
   <p:cSld>
     <p:bg>
@@ -14662,7 +13771,7 @@
                   <a:schemeClr val="bg1"/>
                 </a:solidFill>
               </a:rPr>
-              <a:t>Rotate only</a:t>
+              <a:t>Resize rotated object</a:t>
             </a:r>
             <a:br>
               <a:rPr lang="en-US" sz="8000" dirty="0" smtClean="0">
@@ -14677,7 +13786,7 @@
                   <a:prstClr val="white"/>
                 </a:solidFill>
               </a:rPr>
-              <a:t>(Default AutoMotion)</a:t>
+              <a:t>(Sequence of shapes)</a:t>
             </a:r>
             <a:endParaRPr lang="en-SG" sz="8000" dirty="0">
               <a:solidFill>
@@ -14690,7 +13799,84 @@
     </p:spTree>
     <p:extLst>
       <p:ext uri="{BB962C8B-B14F-4D97-AF65-F5344CB8AC3E}">
-        <p14:creationId xmlns:p14="http://schemas.microsoft.com/office/powerpoint/2010/main" val="1140781394"/>
+        <p14:creationId xmlns:p14="http://schemas.microsoft.com/office/powerpoint/2010/main" val="1835137444"/>
+      </p:ext>
+    </p:extLst>
+  </p:cSld>
+  <p:clrMapOvr>
+    <a:masterClrMapping/>
+  </p:clrMapOvr>
+  <p:timing>
+    <p:tnLst>
+      <p:par>
+        <p:cTn id="1" dur="indefinite" restart="never" nodeType="tmRoot"/>
+      </p:par>
+    </p:tnLst>
+  </p:timing>
+</p:sld>
+</file>
+
+<file path=ppt/slides/slide9.xml><?xml version="1.0" encoding="utf-8"?>
+<p:sld xmlns:a="http://schemas.openxmlformats.org/drawingml/2006/main" xmlns:r="http://schemas.openxmlformats.org/officeDocument/2006/relationships" xmlns:p="http://schemas.openxmlformats.org/presentationml/2006/main">
+  <p:cSld name="PPSlideStart201401082124123259">
+    <p:spTree>
+      <p:nvGrpSpPr>
+        <p:cNvPr id="1" name=""/>
+        <p:cNvGrpSpPr/>
+        <p:nvPr/>
+      </p:nvGrpSpPr>
+      <p:grpSpPr>
+        <a:xfrm>
+          <a:off x="0" y="0"/>
+          <a:ext cx="0" cy="0"/>
+          <a:chOff x="0" y="0"/>
+          <a:chExt cx="0" cy="0"/>
+        </a:xfrm>
+      </p:grpSpPr>
+      <p:sp>
+        <p:nvSpPr>
+          <p:cNvPr id="4" name="Right Arrow 3"/>
+          <p:cNvSpPr/>
+          <p:nvPr/>
+        </p:nvSpPr>
+        <p:spPr>
+          <a:xfrm rot="19313590">
+            <a:off x="2609130" y="3401361"/>
+            <a:ext cx="1981200" cy="990600"/>
+          </a:xfrm>
+          <a:prstGeom prst="rightArrow">
+            <a:avLst/>
+          </a:prstGeom>
+        </p:spPr>
+        <p:style>
+          <a:lnRef idx="2">
+            <a:schemeClr val="accent1">
+              <a:shade val="50000"/>
+            </a:schemeClr>
+          </a:lnRef>
+          <a:fillRef idx="1">
+            <a:schemeClr val="accent1"/>
+          </a:fillRef>
+          <a:effectRef idx="0">
+            <a:schemeClr val="accent1"/>
+          </a:effectRef>
+          <a:fontRef idx="minor">
+            <a:schemeClr val="lt1"/>
+          </a:fontRef>
+        </p:style>
+        <p:txBody>
+          <a:bodyPr rtlCol="0" anchor="ctr"/>
+          <a:lstStyle/>
+          <a:p>
+            <a:pPr algn="ctr"/>
+            <a:endParaRPr lang="en-US"/>
+          </a:p>
+        </p:txBody>
+      </p:sp>
+    </p:spTree>
+    <p:extLst>
+      <p:ext uri="{BB962C8B-B14F-4D97-AF65-F5344CB8AC3E}">
+        <p14:creationId xmlns:p14="http://schemas.microsoft.com/office/powerpoint/2010/main" val="1579323628"/>
       </p:ext>
     </p:extLst>
   </p:cSld>

</xml_diff>